<commit_message>
Updated machine learning slides.  Created intro scikit-learn example code.
</commit_message>
<xml_diff>
--- a/Session 7 - Python/Instructional Material/Session 7 - Python Brief Intro to Machine Learning with Scikit Learn.pptx
+++ b/Session 7 - Python/Instructional Material/Session 7 - Python Brief Intro to Machine Learning with Scikit Learn.pptx
@@ -8,7 +8,37 @@
   <p:sldIdLst>
     <p:sldId id="256" r:id="rId3"/>
     <p:sldId id="283" r:id="rId4"/>
-    <p:sldId id="375" r:id="rId5"/>
+    <p:sldId id="379" r:id="rId5"/>
+    <p:sldId id="408" r:id="rId6"/>
+    <p:sldId id="381" r:id="rId7"/>
+    <p:sldId id="409" r:id="rId8"/>
+    <p:sldId id="380" r:id="rId9"/>
+    <p:sldId id="383" r:id="rId10"/>
+    <p:sldId id="382" r:id="rId11"/>
+    <p:sldId id="407" r:id="rId12"/>
+    <p:sldId id="378" r:id="rId13"/>
+    <p:sldId id="388" r:id="rId14"/>
+    <p:sldId id="387" r:id="rId15"/>
+    <p:sldId id="389" r:id="rId16"/>
+    <p:sldId id="401" r:id="rId17"/>
+    <p:sldId id="403" r:id="rId18"/>
+    <p:sldId id="402" r:id="rId19"/>
+    <p:sldId id="406" r:id="rId20"/>
+    <p:sldId id="404" r:id="rId21"/>
+    <p:sldId id="377" r:id="rId22"/>
+    <p:sldId id="390" r:id="rId23"/>
+    <p:sldId id="391" r:id="rId24"/>
+    <p:sldId id="396" r:id="rId25"/>
+    <p:sldId id="397" r:id="rId26"/>
+    <p:sldId id="398" r:id="rId27"/>
+    <p:sldId id="399" r:id="rId28"/>
+    <p:sldId id="376" r:id="rId29"/>
+    <p:sldId id="405" r:id="rId30"/>
+    <p:sldId id="385" r:id="rId31"/>
+    <p:sldId id="386" r:id="rId32"/>
+    <p:sldId id="400" r:id="rId33"/>
+    <p:sldId id="384" r:id="rId34"/>
+    <p:sldId id="375" r:id="rId35"/>
   </p:sldIdLst>
   <p:sldSz cx="9144000" cy="6858000" type="screen4x3"/>
   <p:notesSz cx="6858000" cy="9144000"/>
@@ -305,7 +335,7 @@
           <a:p>
             <a:fld id="{547641E8-73DF-4AD2-848E-3103064331B1}" type="datetimeFigureOut">
               <a:rPr lang="en-US" smtClean="0"/>
-              <a:t>2/13/2020</a:t>
+              <a:t>11/22/2021</a:t>
             </a:fld>
             <a:endParaRPr lang="en-US"/>
           </a:p>
@@ -473,7 +503,7 @@
           <a:p>
             <a:fld id="{547641E8-73DF-4AD2-848E-3103064331B1}" type="datetimeFigureOut">
               <a:rPr lang="en-US" smtClean="0"/>
-              <a:t>2/13/2020</a:t>
+              <a:t>11/22/2021</a:t>
             </a:fld>
             <a:endParaRPr lang="en-US"/>
           </a:p>
@@ -651,7 +681,7 @@
           <a:p>
             <a:fld id="{547641E8-73DF-4AD2-848E-3103064331B1}" type="datetimeFigureOut">
               <a:rPr lang="en-US" smtClean="0"/>
-              <a:t>2/13/2020</a:t>
+              <a:t>11/22/2021</a:t>
             </a:fld>
             <a:endParaRPr lang="en-US"/>
           </a:p>
@@ -898,7 +928,7 @@
                 </a:solidFill>
               </a:rPr>
               <a:pPr/>
-              <a:t>2/13/2020</a:t>
+              <a:t>11/22/2021</a:t>
             </a:fld>
             <a:endParaRPr lang="en-US">
               <a:solidFill>
@@ -1098,7 +1128,7 @@
                 </a:solidFill>
               </a:rPr>
               <a:pPr/>
-              <a:t>2/13/2020</a:t>
+              <a:t>11/22/2021</a:t>
             </a:fld>
             <a:endParaRPr lang="en-US">
               <a:solidFill>
@@ -1375,7 +1405,7 @@
                 </a:solidFill>
               </a:rPr>
               <a:pPr/>
-              <a:t>2/13/2020</a:t>
+              <a:t>11/22/2021</a:t>
             </a:fld>
             <a:endParaRPr lang="en-US">
               <a:solidFill>
@@ -1692,7 +1722,7 @@
                 </a:solidFill>
               </a:rPr>
               <a:pPr/>
-              <a:t>2/13/2020</a:t>
+              <a:t>11/22/2021</a:t>
             </a:fld>
             <a:endParaRPr lang="en-US">
               <a:solidFill>
@@ -2143,7 +2173,7 @@
                 </a:solidFill>
               </a:rPr>
               <a:pPr/>
-              <a:t>2/13/2020</a:t>
+              <a:t>11/22/2021</a:t>
             </a:fld>
             <a:endParaRPr lang="en-US">
               <a:solidFill>
@@ -2292,7 +2322,7 @@
                 </a:solidFill>
               </a:rPr>
               <a:pPr/>
-              <a:t>2/13/2020</a:t>
+              <a:t>11/22/2021</a:t>
             </a:fld>
             <a:endParaRPr lang="en-US">
               <a:solidFill>
@@ -2419,7 +2449,7 @@
                 </a:solidFill>
               </a:rPr>
               <a:pPr/>
-              <a:t>2/13/2020</a:t>
+              <a:t>11/22/2021</a:t>
             </a:fld>
             <a:endParaRPr lang="en-US">
               <a:solidFill>
@@ -2726,7 +2756,7 @@
                 </a:solidFill>
               </a:rPr>
               <a:pPr/>
-              <a:t>2/13/2020</a:t>
+              <a:t>11/22/2021</a:t>
             </a:fld>
             <a:endParaRPr lang="en-US">
               <a:solidFill>
@@ -2919,7 +2949,7 @@
           <a:p>
             <a:fld id="{547641E8-73DF-4AD2-848E-3103064331B1}" type="datetimeFigureOut">
               <a:rPr lang="en-US" smtClean="0"/>
-              <a:t>2/13/2020</a:t>
+              <a:t>11/22/2021</a:t>
             </a:fld>
             <a:endParaRPr lang="en-US"/>
           </a:p>
@@ -3178,7 +3208,7 @@
                 </a:solidFill>
               </a:rPr>
               <a:pPr/>
-              <a:t>2/13/2020</a:t>
+              <a:t>11/22/2021</a:t>
             </a:fld>
             <a:endParaRPr lang="en-US">
               <a:solidFill>
@@ -3378,7 +3408,7 @@
                 </a:solidFill>
               </a:rPr>
               <a:pPr/>
-              <a:t>2/13/2020</a:t>
+              <a:t>11/22/2021</a:t>
             </a:fld>
             <a:endParaRPr lang="en-US">
               <a:solidFill>
@@ -3588,7 +3618,7 @@
                 </a:solidFill>
               </a:rPr>
               <a:pPr/>
-              <a:t>2/13/2020</a:t>
+              <a:t>11/22/2021</a:t>
             </a:fld>
             <a:endParaRPr lang="en-US">
               <a:solidFill>
@@ -3858,7 +3888,7 @@
           <a:p>
             <a:fld id="{547641E8-73DF-4AD2-848E-3103064331B1}" type="datetimeFigureOut">
               <a:rPr lang="en-US" smtClean="0"/>
-              <a:t>2/13/2020</a:t>
+              <a:t>11/22/2021</a:t>
             </a:fld>
             <a:endParaRPr lang="en-US"/>
           </a:p>
@@ -4143,7 +4173,7 @@
           <a:p>
             <a:fld id="{547641E8-73DF-4AD2-848E-3103064331B1}" type="datetimeFigureOut">
               <a:rPr lang="en-US" smtClean="0"/>
-              <a:t>2/13/2020</a:t>
+              <a:t>11/22/2021</a:t>
             </a:fld>
             <a:endParaRPr lang="en-US"/>
           </a:p>
@@ -4562,7 +4592,7 @@
           <a:p>
             <a:fld id="{547641E8-73DF-4AD2-848E-3103064331B1}" type="datetimeFigureOut">
               <a:rPr lang="en-US" smtClean="0"/>
-              <a:t>2/13/2020</a:t>
+              <a:t>11/22/2021</a:t>
             </a:fld>
             <a:endParaRPr lang="en-US"/>
           </a:p>
@@ -4679,7 +4709,7 @@
           <a:p>
             <a:fld id="{547641E8-73DF-4AD2-848E-3103064331B1}" type="datetimeFigureOut">
               <a:rPr lang="en-US" smtClean="0"/>
-              <a:t>2/13/2020</a:t>
+              <a:t>11/22/2021</a:t>
             </a:fld>
             <a:endParaRPr lang="en-US"/>
           </a:p>
@@ -4774,7 +4804,7 @@
           <a:p>
             <a:fld id="{547641E8-73DF-4AD2-848E-3103064331B1}" type="datetimeFigureOut">
               <a:rPr lang="en-US" smtClean="0"/>
-              <a:t>2/13/2020</a:t>
+              <a:t>11/22/2021</a:t>
             </a:fld>
             <a:endParaRPr lang="en-US"/>
           </a:p>
@@ -5049,7 +5079,7 @@
           <a:p>
             <a:fld id="{547641E8-73DF-4AD2-848E-3103064331B1}" type="datetimeFigureOut">
               <a:rPr lang="en-US" smtClean="0"/>
-              <a:t>2/13/2020</a:t>
+              <a:t>11/22/2021</a:t>
             </a:fld>
             <a:endParaRPr lang="en-US"/>
           </a:p>
@@ -5301,7 +5331,7 @@
           <a:p>
             <a:fld id="{547641E8-73DF-4AD2-848E-3103064331B1}" type="datetimeFigureOut">
               <a:rPr lang="en-US" smtClean="0"/>
-              <a:t>2/13/2020</a:t>
+              <a:t>11/22/2021</a:t>
             </a:fld>
             <a:endParaRPr lang="en-US"/>
           </a:p>
@@ -5515,7 +5545,7 @@
           <a:p>
             <a:fld id="{547641E8-73DF-4AD2-848E-3103064331B1}" type="datetimeFigureOut">
               <a:rPr lang="en-US" smtClean="0"/>
-              <a:t>2/13/2020</a:t>
+              <a:t>11/22/2021</a:t>
             </a:fld>
             <a:endParaRPr lang="en-US"/>
           </a:p>
@@ -6030,7 +6060,7 @@
                 </a:solidFill>
               </a:rPr>
               <a:pPr/>
-              <a:t>2/13/2020</a:t>
+              <a:t>11/22/2021</a:t>
             </a:fld>
             <a:endParaRPr lang="en-US">
               <a:solidFill>
@@ -6509,6 +6539,1173 @@
 </p:sld>
 </file>
 
+<file path=ppt/slides/slide10.xml><?xml version="1.0" encoding="utf-8"?>
+<p:sld xmlns:a="http://schemas.openxmlformats.org/drawingml/2006/main" xmlns:r="http://schemas.openxmlformats.org/officeDocument/2006/relationships" xmlns:p="http://schemas.openxmlformats.org/presentationml/2006/main">
+  <p:cSld>
+    <p:bg>
+      <p:bgPr>
+        <a:blipFill dpi="0" rotWithShape="1">
+          <a:blip r:embed="rId2">
+            <a:lum/>
+          </a:blip>
+          <a:srcRect/>
+          <a:stretch>
+            <a:fillRect l="-10000" r="-10000"/>
+          </a:stretch>
+        </a:blipFill>
+        <a:effectLst/>
+      </p:bgPr>
+    </p:bg>
+    <p:spTree>
+      <p:nvGrpSpPr>
+        <p:cNvPr id="1" name=""/>
+        <p:cNvGrpSpPr/>
+        <p:nvPr/>
+      </p:nvGrpSpPr>
+      <p:grpSpPr>
+        <a:xfrm>
+          <a:off x="0" y="0"/>
+          <a:ext cx="0" cy="0"/>
+          <a:chOff x="0" y="0"/>
+          <a:chExt cx="0" cy="0"/>
+        </a:xfrm>
+      </p:grpSpPr>
+      <p:sp>
+        <p:nvSpPr>
+          <p:cNvPr id="2" name="Title 1"/>
+          <p:cNvSpPr>
+            <a:spLocks noGrp="1"/>
+          </p:cNvSpPr>
+          <p:nvPr>
+            <p:ph type="title"/>
+          </p:nvPr>
+        </p:nvSpPr>
+        <p:spPr/>
+        <p:txBody>
+          <a:bodyPr/>
+          <a:lstStyle/>
+          <a:p>
+            <a:r>
+              <a:rPr lang="en-US" dirty="0"/>
+              <a:t>Definition</a:t>
+            </a:r>
+          </a:p>
+        </p:txBody>
+      </p:sp>
+      <p:sp>
+        <p:nvSpPr>
+          <p:cNvPr id="3" name="Content Placeholder 2"/>
+          <p:cNvSpPr>
+            <a:spLocks noGrp="1"/>
+          </p:cNvSpPr>
+          <p:nvPr>
+            <p:ph idx="1"/>
+          </p:nvPr>
+        </p:nvSpPr>
+        <p:spPr/>
+        <p:txBody>
+          <a:bodyPr/>
+          <a:lstStyle/>
+          <a:p>
+            <a:r>
+              <a:rPr lang="en-US" dirty="0"/>
+              <a:t>Label (Classification Problems)</a:t>
+            </a:r>
+          </a:p>
+          <a:p>
+            <a:pPr lvl="1"/>
+            <a:r>
+              <a:rPr lang="en-US" dirty="0"/>
+              <a:t>The name associated with data point (row) for classification problems.  </a:t>
+            </a:r>
+          </a:p>
+          <a:p>
+            <a:pPr lvl="1"/>
+            <a:r>
+              <a:rPr lang="en-US" dirty="0"/>
+              <a:t>This is generally the thing we are trying to predict.</a:t>
+            </a:r>
+          </a:p>
+          <a:p>
+            <a:endParaRPr lang="en-US" dirty="0"/>
+          </a:p>
+          <a:p>
+            <a:pPr lvl="2"/>
+            <a:endParaRPr lang="en-US" dirty="0"/>
+          </a:p>
+          <a:p>
+            <a:endParaRPr lang="en-US" dirty="0"/>
+          </a:p>
+        </p:txBody>
+      </p:sp>
+    </p:spTree>
+    <p:extLst>
+      <p:ext uri="{BB962C8B-B14F-4D97-AF65-F5344CB8AC3E}">
+        <p14:creationId xmlns:p14="http://schemas.microsoft.com/office/powerpoint/2010/main" val="3114704726"/>
+      </p:ext>
+    </p:extLst>
+  </p:cSld>
+  <p:clrMapOvr>
+    <a:masterClrMapping/>
+  </p:clrMapOvr>
+</p:sld>
+</file>
+
+<file path=ppt/slides/slide11.xml><?xml version="1.0" encoding="utf-8"?>
+<p:sld xmlns:a="http://schemas.openxmlformats.org/drawingml/2006/main" xmlns:r="http://schemas.openxmlformats.org/officeDocument/2006/relationships" xmlns:p="http://schemas.openxmlformats.org/presentationml/2006/main">
+  <p:cSld>
+    <p:bg>
+      <p:bgPr>
+        <a:blipFill dpi="0" rotWithShape="1">
+          <a:blip r:embed="rId2">
+            <a:lum/>
+          </a:blip>
+          <a:srcRect/>
+          <a:stretch>
+            <a:fillRect l="-10000" r="-10000"/>
+          </a:stretch>
+        </a:blipFill>
+        <a:effectLst/>
+      </p:bgPr>
+    </p:bg>
+    <p:spTree>
+      <p:nvGrpSpPr>
+        <p:cNvPr id="1" name=""/>
+        <p:cNvGrpSpPr/>
+        <p:nvPr/>
+      </p:nvGrpSpPr>
+      <p:grpSpPr>
+        <a:xfrm>
+          <a:off x="0" y="0"/>
+          <a:ext cx="0" cy="0"/>
+          <a:chOff x="0" y="0"/>
+          <a:chExt cx="0" cy="0"/>
+        </a:xfrm>
+      </p:grpSpPr>
+      <p:sp>
+        <p:nvSpPr>
+          <p:cNvPr id="2" name="Title 1"/>
+          <p:cNvSpPr>
+            <a:spLocks noGrp="1"/>
+          </p:cNvSpPr>
+          <p:nvPr>
+            <p:ph type="title"/>
+          </p:nvPr>
+        </p:nvSpPr>
+        <p:spPr/>
+        <p:txBody>
+          <a:bodyPr>
+            <a:normAutofit/>
+          </a:bodyPr>
+          <a:lstStyle/>
+          <a:p>
+            <a:r>
+              <a:rPr lang="en-US" dirty="0"/>
+              <a:t>General Model Types</a:t>
+            </a:r>
+          </a:p>
+        </p:txBody>
+      </p:sp>
+      <p:sp>
+        <p:nvSpPr>
+          <p:cNvPr id="3" name="Content Placeholder 2"/>
+          <p:cNvSpPr>
+            <a:spLocks noGrp="1"/>
+          </p:cNvSpPr>
+          <p:nvPr>
+            <p:ph idx="1"/>
+          </p:nvPr>
+        </p:nvSpPr>
+        <p:spPr/>
+        <p:txBody>
+          <a:bodyPr>
+            <a:normAutofit/>
+          </a:bodyPr>
+          <a:lstStyle/>
+          <a:p>
+            <a:r>
+              <a:rPr lang="en-US" dirty="0"/>
+              <a:t>Supervised</a:t>
+            </a:r>
+          </a:p>
+          <a:p>
+            <a:pPr lvl="1"/>
+            <a:r>
+              <a:rPr lang="en-US" dirty="0"/>
+              <a:t>Machine learning model is given a set of data to build experience with.</a:t>
+            </a:r>
+          </a:p>
+          <a:p>
+            <a:pPr lvl="1"/>
+            <a:r>
+              <a:rPr lang="en-US" dirty="0"/>
+              <a:t>Data is given with features, and an algorithm is given to the model on how to best categorize and group the data.</a:t>
+            </a:r>
+          </a:p>
+          <a:p>
+            <a:pPr lvl="1"/>
+            <a:endParaRPr lang="en-US" dirty="0"/>
+          </a:p>
+          <a:p>
+            <a:pPr lvl="2"/>
+            <a:endParaRPr lang="en-US" dirty="0"/>
+          </a:p>
+          <a:p>
+            <a:endParaRPr lang="en-US" dirty="0"/>
+          </a:p>
+        </p:txBody>
+      </p:sp>
+    </p:spTree>
+    <p:extLst>
+      <p:ext uri="{BB962C8B-B14F-4D97-AF65-F5344CB8AC3E}">
+        <p14:creationId xmlns:p14="http://schemas.microsoft.com/office/powerpoint/2010/main" val="3051561418"/>
+      </p:ext>
+    </p:extLst>
+  </p:cSld>
+  <p:clrMapOvr>
+    <a:masterClrMapping/>
+  </p:clrMapOvr>
+</p:sld>
+</file>
+
+<file path=ppt/slides/slide12.xml><?xml version="1.0" encoding="utf-8"?>
+<p:sld xmlns:a="http://schemas.openxmlformats.org/drawingml/2006/main" xmlns:r="http://schemas.openxmlformats.org/officeDocument/2006/relationships" xmlns:p="http://schemas.openxmlformats.org/presentationml/2006/main">
+  <p:cSld>
+    <p:bg>
+      <p:bgPr>
+        <a:blipFill dpi="0" rotWithShape="1">
+          <a:blip r:embed="rId2">
+            <a:lum/>
+          </a:blip>
+          <a:srcRect/>
+          <a:stretch>
+            <a:fillRect l="-10000" r="-10000"/>
+          </a:stretch>
+        </a:blipFill>
+        <a:effectLst/>
+      </p:bgPr>
+    </p:bg>
+    <p:spTree>
+      <p:nvGrpSpPr>
+        <p:cNvPr id="1" name=""/>
+        <p:cNvGrpSpPr/>
+        <p:nvPr/>
+      </p:nvGrpSpPr>
+      <p:grpSpPr>
+        <a:xfrm>
+          <a:off x="0" y="0"/>
+          <a:ext cx="0" cy="0"/>
+          <a:chOff x="0" y="0"/>
+          <a:chExt cx="0" cy="0"/>
+        </a:xfrm>
+      </p:grpSpPr>
+      <p:sp>
+        <p:nvSpPr>
+          <p:cNvPr id="2" name="Title 1"/>
+          <p:cNvSpPr>
+            <a:spLocks noGrp="1"/>
+          </p:cNvSpPr>
+          <p:nvPr>
+            <p:ph type="title"/>
+          </p:nvPr>
+        </p:nvSpPr>
+        <p:spPr/>
+        <p:txBody>
+          <a:bodyPr>
+            <a:normAutofit/>
+          </a:bodyPr>
+          <a:lstStyle/>
+          <a:p>
+            <a:r>
+              <a:rPr lang="en-US" dirty="0"/>
+              <a:t>General Model Types</a:t>
+            </a:r>
+          </a:p>
+        </p:txBody>
+      </p:sp>
+      <p:sp>
+        <p:nvSpPr>
+          <p:cNvPr id="3" name="Content Placeholder 2"/>
+          <p:cNvSpPr>
+            <a:spLocks noGrp="1"/>
+          </p:cNvSpPr>
+          <p:nvPr>
+            <p:ph idx="1"/>
+          </p:nvPr>
+        </p:nvSpPr>
+        <p:spPr/>
+        <p:txBody>
+          <a:bodyPr>
+            <a:normAutofit/>
+          </a:bodyPr>
+          <a:lstStyle/>
+          <a:p>
+            <a:r>
+              <a:rPr lang="en-US" dirty="0"/>
+              <a:t>Unsupervised</a:t>
+            </a:r>
+          </a:p>
+          <a:p>
+            <a:pPr lvl="1"/>
+            <a:r>
+              <a:rPr lang="en-US" dirty="0"/>
+              <a:t>The model determines the data for itself, and builds the model accordingly.</a:t>
+            </a:r>
+          </a:p>
+          <a:p>
+            <a:pPr lvl="1"/>
+            <a:r>
+              <a:rPr lang="en-US" dirty="0"/>
+              <a:t>Features and grouping data is done by the algorithm.</a:t>
+            </a:r>
+          </a:p>
+          <a:p>
+            <a:pPr lvl="1"/>
+            <a:endParaRPr lang="en-US" dirty="0"/>
+          </a:p>
+          <a:p>
+            <a:pPr lvl="2"/>
+            <a:endParaRPr lang="en-US" dirty="0"/>
+          </a:p>
+          <a:p>
+            <a:endParaRPr lang="en-US" dirty="0"/>
+          </a:p>
+        </p:txBody>
+      </p:sp>
+    </p:spTree>
+    <p:extLst>
+      <p:ext uri="{BB962C8B-B14F-4D97-AF65-F5344CB8AC3E}">
+        <p14:creationId xmlns:p14="http://schemas.microsoft.com/office/powerpoint/2010/main" val="843243868"/>
+      </p:ext>
+    </p:extLst>
+  </p:cSld>
+  <p:clrMapOvr>
+    <a:masterClrMapping/>
+  </p:clrMapOvr>
+</p:sld>
+</file>
+
+<file path=ppt/slides/slide13.xml><?xml version="1.0" encoding="utf-8"?>
+<p:sld xmlns:a="http://schemas.openxmlformats.org/drawingml/2006/main" xmlns:r="http://schemas.openxmlformats.org/officeDocument/2006/relationships" xmlns:p="http://schemas.openxmlformats.org/presentationml/2006/main">
+  <p:cSld>
+    <p:bg>
+      <p:bgPr>
+        <a:blipFill dpi="0" rotWithShape="1">
+          <a:blip r:embed="rId2">
+            <a:lum/>
+          </a:blip>
+          <a:srcRect/>
+          <a:stretch>
+            <a:fillRect l="-10000" r="-10000"/>
+          </a:stretch>
+        </a:blipFill>
+        <a:effectLst/>
+      </p:bgPr>
+    </p:bg>
+    <p:spTree>
+      <p:nvGrpSpPr>
+        <p:cNvPr id="1" name=""/>
+        <p:cNvGrpSpPr/>
+        <p:nvPr/>
+      </p:nvGrpSpPr>
+      <p:grpSpPr>
+        <a:xfrm>
+          <a:off x="0" y="0"/>
+          <a:ext cx="0" cy="0"/>
+          <a:chOff x="0" y="0"/>
+          <a:chExt cx="0" cy="0"/>
+        </a:xfrm>
+      </p:grpSpPr>
+      <p:sp>
+        <p:nvSpPr>
+          <p:cNvPr id="2" name="Title 1"/>
+          <p:cNvSpPr>
+            <a:spLocks noGrp="1"/>
+          </p:cNvSpPr>
+          <p:nvPr>
+            <p:ph type="title"/>
+          </p:nvPr>
+        </p:nvSpPr>
+        <p:spPr/>
+        <p:txBody>
+          <a:bodyPr>
+            <a:normAutofit/>
+          </a:bodyPr>
+          <a:lstStyle/>
+          <a:p>
+            <a:r>
+              <a:rPr lang="en-US" dirty="0"/>
+              <a:t>General Model Types</a:t>
+            </a:r>
+          </a:p>
+        </p:txBody>
+      </p:sp>
+      <p:sp>
+        <p:nvSpPr>
+          <p:cNvPr id="3" name="Content Placeholder 2"/>
+          <p:cNvSpPr>
+            <a:spLocks noGrp="1"/>
+          </p:cNvSpPr>
+          <p:nvPr>
+            <p:ph idx="1"/>
+          </p:nvPr>
+        </p:nvSpPr>
+        <p:spPr/>
+        <p:txBody>
+          <a:bodyPr>
+            <a:normAutofit/>
+          </a:bodyPr>
+          <a:lstStyle/>
+          <a:p>
+            <a:r>
+              <a:rPr lang="en-US" dirty="0"/>
+              <a:t>Reinforcement</a:t>
+            </a:r>
+          </a:p>
+          <a:p>
+            <a:pPr lvl="1"/>
+            <a:r>
+              <a:rPr lang="en-US" dirty="0"/>
+              <a:t>The algorithm “learns” from making mistakes.</a:t>
+            </a:r>
+          </a:p>
+          <a:p>
+            <a:pPr lvl="1"/>
+            <a:r>
+              <a:rPr lang="en-US" dirty="0"/>
+              <a:t>There must be some sort of way to tell the algorithm when it makes a correction in the right direction, and a way to tell the algorithm a correction was made in the wrong direction.</a:t>
+            </a:r>
+          </a:p>
+          <a:p>
+            <a:pPr lvl="1"/>
+            <a:r>
+              <a:rPr lang="en-US" dirty="0"/>
+              <a:t>Initially, the model built is very inaccurate, but gets better with time.</a:t>
+            </a:r>
+          </a:p>
+          <a:p>
+            <a:pPr lvl="1"/>
+            <a:endParaRPr lang="en-US" dirty="0"/>
+          </a:p>
+          <a:p>
+            <a:pPr lvl="2"/>
+            <a:endParaRPr lang="en-US" dirty="0"/>
+          </a:p>
+          <a:p>
+            <a:endParaRPr lang="en-US" dirty="0"/>
+          </a:p>
+        </p:txBody>
+      </p:sp>
+    </p:spTree>
+    <p:extLst>
+      <p:ext uri="{BB962C8B-B14F-4D97-AF65-F5344CB8AC3E}">
+        <p14:creationId xmlns:p14="http://schemas.microsoft.com/office/powerpoint/2010/main" val="3389942429"/>
+      </p:ext>
+    </p:extLst>
+  </p:cSld>
+  <p:clrMapOvr>
+    <a:masterClrMapping/>
+  </p:clrMapOvr>
+</p:sld>
+</file>
+
+<file path=ppt/slides/slide14.xml><?xml version="1.0" encoding="utf-8"?>
+<p:sld xmlns:a="http://schemas.openxmlformats.org/drawingml/2006/main" xmlns:r="http://schemas.openxmlformats.org/officeDocument/2006/relationships" xmlns:p="http://schemas.openxmlformats.org/presentationml/2006/main">
+  <p:cSld>
+    <p:bg>
+      <p:bgPr>
+        <a:blipFill dpi="0" rotWithShape="1">
+          <a:blip r:embed="rId2">
+            <a:lum/>
+          </a:blip>
+          <a:srcRect/>
+          <a:stretch>
+            <a:fillRect l="-10000" r="-10000"/>
+          </a:stretch>
+        </a:blipFill>
+        <a:effectLst/>
+      </p:bgPr>
+    </p:bg>
+    <p:spTree>
+      <p:nvGrpSpPr>
+        <p:cNvPr id="1" name=""/>
+        <p:cNvGrpSpPr/>
+        <p:nvPr/>
+      </p:nvGrpSpPr>
+      <p:grpSpPr>
+        <a:xfrm>
+          <a:off x="0" y="0"/>
+          <a:ext cx="0" cy="0"/>
+          <a:chOff x="0" y="0"/>
+          <a:chExt cx="0" cy="0"/>
+        </a:xfrm>
+      </p:grpSpPr>
+      <p:sp>
+        <p:nvSpPr>
+          <p:cNvPr id="2" name="Title 1"/>
+          <p:cNvSpPr>
+            <a:spLocks noGrp="1"/>
+          </p:cNvSpPr>
+          <p:nvPr>
+            <p:ph type="title"/>
+          </p:nvPr>
+        </p:nvSpPr>
+        <p:spPr/>
+        <p:txBody>
+          <a:bodyPr>
+            <a:normAutofit/>
+          </a:bodyPr>
+          <a:lstStyle/>
+          <a:p>
+            <a:r>
+              <a:rPr lang="en-US" dirty="0"/>
+              <a:t>General Model Types</a:t>
+            </a:r>
+          </a:p>
+        </p:txBody>
+      </p:sp>
+      <p:sp>
+        <p:nvSpPr>
+          <p:cNvPr id="3" name="Content Placeholder 2"/>
+          <p:cNvSpPr>
+            <a:spLocks noGrp="1"/>
+          </p:cNvSpPr>
+          <p:nvPr>
+            <p:ph idx="1"/>
+          </p:nvPr>
+        </p:nvSpPr>
+        <p:spPr/>
+        <p:txBody>
+          <a:bodyPr>
+            <a:normAutofit/>
+          </a:bodyPr>
+          <a:lstStyle/>
+          <a:p>
+            <a:r>
+              <a:rPr lang="en-US" dirty="0"/>
+              <a:t>This part of the Python course will focus on supervised learning, as this is all I know.</a:t>
+            </a:r>
+          </a:p>
+          <a:p>
+            <a:pPr lvl="1"/>
+            <a:endParaRPr lang="en-US" dirty="0"/>
+          </a:p>
+          <a:p>
+            <a:pPr lvl="2"/>
+            <a:endParaRPr lang="en-US" dirty="0"/>
+          </a:p>
+          <a:p>
+            <a:endParaRPr lang="en-US" dirty="0"/>
+          </a:p>
+        </p:txBody>
+      </p:sp>
+    </p:spTree>
+    <p:extLst>
+      <p:ext uri="{BB962C8B-B14F-4D97-AF65-F5344CB8AC3E}">
+        <p14:creationId xmlns:p14="http://schemas.microsoft.com/office/powerpoint/2010/main" val="2610853396"/>
+      </p:ext>
+    </p:extLst>
+  </p:cSld>
+  <p:clrMapOvr>
+    <a:masterClrMapping/>
+  </p:clrMapOvr>
+</p:sld>
+</file>
+
+<file path=ppt/slides/slide15.xml><?xml version="1.0" encoding="utf-8"?>
+<p:sld xmlns:a="http://schemas.openxmlformats.org/drawingml/2006/main" xmlns:r="http://schemas.openxmlformats.org/officeDocument/2006/relationships" xmlns:p="http://schemas.openxmlformats.org/presentationml/2006/main">
+  <p:cSld>
+    <p:bg>
+      <p:bgPr>
+        <a:blipFill dpi="0" rotWithShape="1">
+          <a:blip r:embed="rId2">
+            <a:lum/>
+          </a:blip>
+          <a:srcRect/>
+          <a:stretch>
+            <a:fillRect l="-10000" r="-10000"/>
+          </a:stretch>
+        </a:blipFill>
+        <a:effectLst/>
+      </p:bgPr>
+    </p:bg>
+    <p:spTree>
+      <p:nvGrpSpPr>
+        <p:cNvPr id="1" name=""/>
+        <p:cNvGrpSpPr/>
+        <p:nvPr/>
+      </p:nvGrpSpPr>
+      <p:grpSpPr>
+        <a:xfrm>
+          <a:off x="0" y="0"/>
+          <a:ext cx="0" cy="0"/>
+          <a:chOff x="0" y="0"/>
+          <a:chExt cx="0" cy="0"/>
+        </a:xfrm>
+      </p:grpSpPr>
+      <p:sp>
+        <p:nvSpPr>
+          <p:cNvPr id="2" name="Title 1"/>
+          <p:cNvSpPr>
+            <a:spLocks noGrp="1"/>
+          </p:cNvSpPr>
+          <p:nvPr>
+            <p:ph type="title"/>
+          </p:nvPr>
+        </p:nvSpPr>
+        <p:spPr/>
+        <p:txBody>
+          <a:bodyPr>
+            <a:normAutofit/>
+          </a:bodyPr>
+          <a:lstStyle/>
+          <a:p>
+            <a:r>
+              <a:rPr lang="en-US" dirty="0"/>
+              <a:t>General Workflow</a:t>
+            </a:r>
+          </a:p>
+        </p:txBody>
+      </p:sp>
+      <p:sp>
+        <p:nvSpPr>
+          <p:cNvPr id="3" name="Content Placeholder 2"/>
+          <p:cNvSpPr>
+            <a:spLocks noGrp="1"/>
+          </p:cNvSpPr>
+          <p:nvPr>
+            <p:ph idx="1"/>
+          </p:nvPr>
+        </p:nvSpPr>
+        <p:spPr/>
+        <p:txBody>
+          <a:bodyPr>
+            <a:normAutofit/>
+          </a:bodyPr>
+          <a:lstStyle/>
+          <a:p>
+            <a:r>
+              <a:rPr lang="en-US" dirty="0"/>
+              <a:t>Get data</a:t>
+            </a:r>
+          </a:p>
+          <a:p>
+            <a:pPr lvl="1"/>
+            <a:r>
+              <a:rPr lang="en-US" dirty="0"/>
+              <a:t>Get set of data about what we wish to predict.</a:t>
+            </a:r>
+          </a:p>
+          <a:p>
+            <a:pPr lvl="1"/>
+            <a:r>
+              <a:rPr lang="en-US" dirty="0"/>
+              <a:t>Include the labels.</a:t>
+            </a:r>
+          </a:p>
+          <a:p>
+            <a:pPr lvl="2"/>
+            <a:endParaRPr lang="en-US" dirty="0"/>
+          </a:p>
+          <a:p>
+            <a:endParaRPr lang="en-US" dirty="0"/>
+          </a:p>
+        </p:txBody>
+      </p:sp>
+    </p:spTree>
+    <p:extLst>
+      <p:ext uri="{BB962C8B-B14F-4D97-AF65-F5344CB8AC3E}">
+        <p14:creationId xmlns:p14="http://schemas.microsoft.com/office/powerpoint/2010/main" val="504396564"/>
+      </p:ext>
+    </p:extLst>
+  </p:cSld>
+  <p:clrMapOvr>
+    <a:masterClrMapping/>
+  </p:clrMapOvr>
+</p:sld>
+</file>
+
+<file path=ppt/slides/slide16.xml><?xml version="1.0" encoding="utf-8"?>
+<p:sld xmlns:a="http://schemas.openxmlformats.org/drawingml/2006/main" xmlns:r="http://schemas.openxmlformats.org/officeDocument/2006/relationships" xmlns:p="http://schemas.openxmlformats.org/presentationml/2006/main">
+  <p:cSld>
+    <p:bg>
+      <p:bgPr>
+        <a:blipFill dpi="0" rotWithShape="1">
+          <a:blip r:embed="rId2">
+            <a:lum/>
+          </a:blip>
+          <a:srcRect/>
+          <a:stretch>
+            <a:fillRect l="-10000" r="-10000"/>
+          </a:stretch>
+        </a:blipFill>
+        <a:effectLst/>
+      </p:bgPr>
+    </p:bg>
+    <p:spTree>
+      <p:nvGrpSpPr>
+        <p:cNvPr id="1" name=""/>
+        <p:cNvGrpSpPr/>
+        <p:nvPr/>
+      </p:nvGrpSpPr>
+      <p:grpSpPr>
+        <a:xfrm>
+          <a:off x="0" y="0"/>
+          <a:ext cx="0" cy="0"/>
+          <a:chOff x="0" y="0"/>
+          <a:chExt cx="0" cy="0"/>
+        </a:xfrm>
+      </p:grpSpPr>
+      <p:sp>
+        <p:nvSpPr>
+          <p:cNvPr id="2" name="Title 1"/>
+          <p:cNvSpPr>
+            <a:spLocks noGrp="1"/>
+          </p:cNvSpPr>
+          <p:nvPr>
+            <p:ph type="title"/>
+          </p:nvPr>
+        </p:nvSpPr>
+        <p:spPr/>
+        <p:txBody>
+          <a:bodyPr>
+            <a:normAutofit/>
+          </a:bodyPr>
+          <a:lstStyle/>
+          <a:p>
+            <a:r>
+              <a:rPr lang="en-US" dirty="0"/>
+              <a:t>General Workflow</a:t>
+            </a:r>
+          </a:p>
+        </p:txBody>
+      </p:sp>
+      <p:sp>
+        <p:nvSpPr>
+          <p:cNvPr id="3" name="Content Placeholder 2"/>
+          <p:cNvSpPr>
+            <a:spLocks noGrp="1"/>
+          </p:cNvSpPr>
+          <p:nvPr>
+            <p:ph idx="1"/>
+          </p:nvPr>
+        </p:nvSpPr>
+        <p:spPr/>
+        <p:txBody>
+          <a:bodyPr>
+            <a:normAutofit/>
+          </a:bodyPr>
+          <a:lstStyle/>
+          <a:p>
+            <a:r>
+              <a:rPr lang="en-US" dirty="0"/>
+              <a:t>Build model</a:t>
+            </a:r>
+          </a:p>
+          <a:p>
+            <a:pPr lvl="1"/>
+            <a:r>
+              <a:rPr lang="en-US" dirty="0"/>
+              <a:t>Select an appropriate classifier.</a:t>
+            </a:r>
+          </a:p>
+          <a:p>
+            <a:pPr lvl="1"/>
+            <a:r>
+              <a:rPr lang="en-US" dirty="0"/>
+              <a:t>The model should be trained with a majority of the data we gathered, say with 75% of the data.</a:t>
+            </a:r>
+          </a:p>
+          <a:p>
+            <a:pPr lvl="1"/>
+            <a:r>
+              <a:rPr lang="en-US" dirty="0"/>
+              <a:t>The other 25% can be used to test how good our model can predict.</a:t>
+            </a:r>
+          </a:p>
+          <a:p>
+            <a:pPr lvl="1"/>
+            <a:endParaRPr lang="en-US" dirty="0"/>
+          </a:p>
+          <a:p>
+            <a:pPr lvl="2"/>
+            <a:endParaRPr lang="en-US" dirty="0"/>
+          </a:p>
+          <a:p>
+            <a:endParaRPr lang="en-US" dirty="0"/>
+          </a:p>
+        </p:txBody>
+      </p:sp>
+    </p:spTree>
+    <p:extLst>
+      <p:ext uri="{BB962C8B-B14F-4D97-AF65-F5344CB8AC3E}">
+        <p14:creationId xmlns:p14="http://schemas.microsoft.com/office/powerpoint/2010/main" val="823098654"/>
+      </p:ext>
+    </p:extLst>
+  </p:cSld>
+  <p:clrMapOvr>
+    <a:masterClrMapping/>
+  </p:clrMapOvr>
+</p:sld>
+</file>
+
+<file path=ppt/slides/slide17.xml><?xml version="1.0" encoding="utf-8"?>
+<p:sld xmlns:a="http://schemas.openxmlformats.org/drawingml/2006/main" xmlns:r="http://schemas.openxmlformats.org/officeDocument/2006/relationships" xmlns:p="http://schemas.openxmlformats.org/presentationml/2006/main">
+  <p:cSld>
+    <p:bg>
+      <p:bgPr>
+        <a:blipFill dpi="0" rotWithShape="1">
+          <a:blip r:embed="rId2">
+            <a:lum/>
+          </a:blip>
+          <a:srcRect/>
+          <a:stretch>
+            <a:fillRect l="-10000" r="-10000"/>
+          </a:stretch>
+        </a:blipFill>
+        <a:effectLst/>
+      </p:bgPr>
+    </p:bg>
+    <p:spTree>
+      <p:nvGrpSpPr>
+        <p:cNvPr id="1" name=""/>
+        <p:cNvGrpSpPr/>
+        <p:nvPr/>
+      </p:nvGrpSpPr>
+      <p:grpSpPr>
+        <a:xfrm>
+          <a:off x="0" y="0"/>
+          <a:ext cx="0" cy="0"/>
+          <a:chOff x="0" y="0"/>
+          <a:chExt cx="0" cy="0"/>
+        </a:xfrm>
+      </p:grpSpPr>
+      <p:sp>
+        <p:nvSpPr>
+          <p:cNvPr id="2" name="Title 1"/>
+          <p:cNvSpPr>
+            <a:spLocks noGrp="1"/>
+          </p:cNvSpPr>
+          <p:nvPr>
+            <p:ph type="title"/>
+          </p:nvPr>
+        </p:nvSpPr>
+        <p:spPr/>
+        <p:txBody>
+          <a:bodyPr>
+            <a:normAutofit/>
+          </a:bodyPr>
+          <a:lstStyle/>
+          <a:p>
+            <a:r>
+              <a:rPr lang="en-US" dirty="0"/>
+              <a:t>General Workflow</a:t>
+            </a:r>
+          </a:p>
+        </p:txBody>
+      </p:sp>
+      <p:sp>
+        <p:nvSpPr>
+          <p:cNvPr id="3" name="Content Placeholder 2"/>
+          <p:cNvSpPr>
+            <a:spLocks noGrp="1"/>
+          </p:cNvSpPr>
+          <p:nvPr>
+            <p:ph idx="1"/>
+          </p:nvPr>
+        </p:nvSpPr>
+        <p:spPr/>
+        <p:txBody>
+          <a:bodyPr>
+            <a:normAutofit/>
+          </a:bodyPr>
+          <a:lstStyle/>
+          <a:p>
+            <a:r>
+              <a:rPr lang="en-US" dirty="0"/>
+              <a:t>Evaluate accuracy</a:t>
+            </a:r>
+          </a:p>
+          <a:p>
+            <a:pPr lvl="1"/>
+            <a:r>
+              <a:rPr lang="en-US" dirty="0"/>
+              <a:t>The model needs to be evaluated for accuracy to ensure our predictions will have a high degree of correctness.</a:t>
+            </a:r>
+          </a:p>
+          <a:p>
+            <a:pPr lvl="1"/>
+            <a:r>
+              <a:rPr lang="en-US" dirty="0"/>
+              <a:t>This is usually done using the 25% of data that we did not use for training.</a:t>
+            </a:r>
+          </a:p>
+          <a:p>
+            <a:pPr lvl="1"/>
+            <a:endParaRPr lang="en-US" dirty="0"/>
+          </a:p>
+          <a:p>
+            <a:pPr lvl="2"/>
+            <a:endParaRPr lang="en-US" dirty="0"/>
+          </a:p>
+          <a:p>
+            <a:endParaRPr lang="en-US" dirty="0"/>
+          </a:p>
+        </p:txBody>
+      </p:sp>
+    </p:spTree>
+    <p:extLst>
+      <p:ext uri="{BB962C8B-B14F-4D97-AF65-F5344CB8AC3E}">
+        <p14:creationId xmlns:p14="http://schemas.microsoft.com/office/powerpoint/2010/main" val="3005493130"/>
+      </p:ext>
+    </p:extLst>
+  </p:cSld>
+  <p:clrMapOvr>
+    <a:masterClrMapping/>
+  </p:clrMapOvr>
+</p:sld>
+</file>
+
+<file path=ppt/slides/slide18.xml><?xml version="1.0" encoding="utf-8"?>
+<p:sld xmlns:a="http://schemas.openxmlformats.org/drawingml/2006/main" xmlns:r="http://schemas.openxmlformats.org/officeDocument/2006/relationships" xmlns:p="http://schemas.openxmlformats.org/presentationml/2006/main">
+  <p:cSld>
+    <p:bg>
+      <p:bgPr>
+        <a:blipFill dpi="0" rotWithShape="1">
+          <a:blip r:embed="rId2">
+            <a:lum/>
+          </a:blip>
+          <a:srcRect/>
+          <a:stretch>
+            <a:fillRect l="-10000" r="-10000"/>
+          </a:stretch>
+        </a:blipFill>
+        <a:effectLst/>
+      </p:bgPr>
+    </p:bg>
+    <p:spTree>
+      <p:nvGrpSpPr>
+        <p:cNvPr id="1" name=""/>
+        <p:cNvGrpSpPr/>
+        <p:nvPr/>
+      </p:nvGrpSpPr>
+      <p:grpSpPr>
+        <a:xfrm>
+          <a:off x="0" y="0"/>
+          <a:ext cx="0" cy="0"/>
+          <a:chOff x="0" y="0"/>
+          <a:chExt cx="0" cy="0"/>
+        </a:xfrm>
+      </p:grpSpPr>
+      <p:sp>
+        <p:nvSpPr>
+          <p:cNvPr id="2" name="Title 1"/>
+          <p:cNvSpPr>
+            <a:spLocks noGrp="1"/>
+          </p:cNvSpPr>
+          <p:nvPr>
+            <p:ph type="title"/>
+          </p:nvPr>
+        </p:nvSpPr>
+        <p:spPr/>
+        <p:txBody>
+          <a:bodyPr>
+            <a:normAutofit/>
+          </a:bodyPr>
+          <a:lstStyle/>
+          <a:p>
+            <a:r>
+              <a:rPr lang="en-US" dirty="0"/>
+              <a:t>General Workflow</a:t>
+            </a:r>
+          </a:p>
+        </p:txBody>
+      </p:sp>
+      <p:sp>
+        <p:nvSpPr>
+          <p:cNvPr id="3" name="Content Placeholder 2"/>
+          <p:cNvSpPr>
+            <a:spLocks noGrp="1"/>
+          </p:cNvSpPr>
+          <p:nvPr>
+            <p:ph idx="1"/>
+          </p:nvPr>
+        </p:nvSpPr>
+        <p:spPr/>
+        <p:txBody>
+          <a:bodyPr>
+            <a:normAutofit/>
+          </a:bodyPr>
+          <a:lstStyle/>
+          <a:p>
+            <a:r>
+              <a:rPr lang="en-US" dirty="0"/>
+              <a:t>Evaluate accuracy</a:t>
+            </a:r>
+          </a:p>
+          <a:p>
+            <a:pPr lvl="1"/>
+            <a:r>
+              <a:rPr lang="en-US" dirty="0"/>
+              <a:t>There is no such thing as 100% accuracy unless you have toy data, or a completely defined system that does not need machine learning.</a:t>
+            </a:r>
+          </a:p>
+          <a:p>
+            <a:pPr lvl="1"/>
+            <a:r>
+              <a:rPr lang="en-US" dirty="0"/>
+              <a:t>If we get 100% accuracy, and the above are not true, we have most likely over-fitted our model, possibly by using training data as test data.</a:t>
+            </a:r>
+          </a:p>
+          <a:p>
+            <a:pPr lvl="2"/>
+            <a:r>
+              <a:rPr lang="en-US" dirty="0"/>
+              <a:t>Leads to inaccurate predictions on new data without known labels</a:t>
+            </a:r>
+          </a:p>
+          <a:p>
+            <a:pPr marL="457200" lvl="1" indent="0">
+              <a:buNone/>
+            </a:pPr>
+            <a:endParaRPr lang="en-US" dirty="0"/>
+          </a:p>
+          <a:p>
+            <a:pPr lvl="1"/>
+            <a:endParaRPr lang="en-US" dirty="0"/>
+          </a:p>
+          <a:p>
+            <a:pPr lvl="2"/>
+            <a:endParaRPr lang="en-US" dirty="0"/>
+          </a:p>
+          <a:p>
+            <a:endParaRPr lang="en-US" dirty="0"/>
+          </a:p>
+        </p:txBody>
+      </p:sp>
+    </p:spTree>
+    <p:extLst>
+      <p:ext uri="{BB962C8B-B14F-4D97-AF65-F5344CB8AC3E}">
+        <p14:creationId xmlns:p14="http://schemas.microsoft.com/office/powerpoint/2010/main" val="140326188"/>
+      </p:ext>
+    </p:extLst>
+  </p:cSld>
+  <p:clrMapOvr>
+    <a:masterClrMapping/>
+  </p:clrMapOvr>
+</p:sld>
+</file>
+
+<file path=ppt/slides/slide19.xml><?xml version="1.0" encoding="utf-8"?>
+<p:sld xmlns:a="http://schemas.openxmlformats.org/drawingml/2006/main" xmlns:r="http://schemas.openxmlformats.org/officeDocument/2006/relationships" xmlns:p="http://schemas.openxmlformats.org/presentationml/2006/main">
+  <p:cSld>
+    <p:bg>
+      <p:bgPr>
+        <a:blipFill dpi="0" rotWithShape="1">
+          <a:blip r:embed="rId2">
+            <a:lum/>
+          </a:blip>
+          <a:srcRect/>
+          <a:stretch>
+            <a:fillRect l="-10000" r="-10000"/>
+          </a:stretch>
+        </a:blipFill>
+        <a:effectLst/>
+      </p:bgPr>
+    </p:bg>
+    <p:spTree>
+      <p:nvGrpSpPr>
+        <p:cNvPr id="1" name=""/>
+        <p:cNvGrpSpPr/>
+        <p:nvPr/>
+      </p:nvGrpSpPr>
+      <p:grpSpPr>
+        <a:xfrm>
+          <a:off x="0" y="0"/>
+          <a:ext cx="0" cy="0"/>
+          <a:chOff x="0" y="0"/>
+          <a:chExt cx="0" cy="0"/>
+        </a:xfrm>
+      </p:grpSpPr>
+      <p:sp>
+        <p:nvSpPr>
+          <p:cNvPr id="2" name="Title 1"/>
+          <p:cNvSpPr>
+            <a:spLocks noGrp="1"/>
+          </p:cNvSpPr>
+          <p:nvPr>
+            <p:ph type="title"/>
+          </p:nvPr>
+        </p:nvSpPr>
+        <p:spPr/>
+        <p:txBody>
+          <a:bodyPr>
+            <a:normAutofit/>
+          </a:bodyPr>
+          <a:lstStyle/>
+          <a:p>
+            <a:r>
+              <a:rPr lang="en-US" dirty="0"/>
+              <a:t>General Workflow</a:t>
+            </a:r>
+          </a:p>
+        </p:txBody>
+      </p:sp>
+      <p:sp>
+        <p:nvSpPr>
+          <p:cNvPr id="3" name="Content Placeholder 2"/>
+          <p:cNvSpPr>
+            <a:spLocks noGrp="1"/>
+          </p:cNvSpPr>
+          <p:nvPr>
+            <p:ph idx="1"/>
+          </p:nvPr>
+        </p:nvSpPr>
+        <p:spPr/>
+        <p:txBody>
+          <a:bodyPr>
+            <a:normAutofit/>
+          </a:bodyPr>
+          <a:lstStyle/>
+          <a:p>
+            <a:r>
+              <a:rPr lang="en-US" dirty="0"/>
+              <a:t>Predict real-world outcomes</a:t>
+            </a:r>
+          </a:p>
+          <a:p>
+            <a:pPr lvl="1"/>
+            <a:r>
+              <a:rPr lang="en-US" dirty="0"/>
+              <a:t>Once the model is as accurate as we want, the model can be used to predict real-world outcomes that are unknown.</a:t>
+            </a:r>
+          </a:p>
+          <a:p>
+            <a:pPr lvl="1"/>
+            <a:endParaRPr lang="en-US" dirty="0"/>
+          </a:p>
+          <a:p>
+            <a:pPr lvl="2"/>
+            <a:endParaRPr lang="en-US" dirty="0"/>
+          </a:p>
+          <a:p>
+            <a:endParaRPr lang="en-US" dirty="0"/>
+          </a:p>
+        </p:txBody>
+      </p:sp>
+    </p:spTree>
+    <p:extLst>
+      <p:ext uri="{BB962C8B-B14F-4D97-AF65-F5344CB8AC3E}">
+        <p14:creationId xmlns:p14="http://schemas.microsoft.com/office/powerpoint/2010/main" val="293541596"/>
+      </p:ext>
+    </p:extLst>
+  </p:cSld>
+  <p:clrMapOvr>
+    <a:masterClrMapping/>
+  </p:clrMapOvr>
+</p:sld>
+</file>
+
 <file path=ppt/slides/slide2.xml><?xml version="1.0" encoding="utf-8"?>
 <p:sld xmlns:a="http://schemas.openxmlformats.org/drawingml/2006/main" xmlns:r="http://schemas.openxmlformats.org/officeDocument/2006/relationships" xmlns:p="http://schemas.openxmlformats.org/presentationml/2006/main">
   <p:cSld>
@@ -6556,12 +7753,8 @@
           <a:lstStyle/>
           <a:p>
             <a:r>
-              <a:rPr lang="en-US" dirty="0" err="1"/>
-              <a:t>Scikit</a:t>
-            </a:r>
-            <a:r>
-              <a:rPr lang="en-US" dirty="0"/>
-              <a:t>-Learn Machine Learning</a:t>
+              <a:rPr lang="en-US" dirty="0"/>
+              <a:t>Overview</a:t>
             </a:r>
           </a:p>
         </p:txBody>
@@ -6590,14 +7783,28 @@
             <a:pPr lvl="1"/>
             <a:r>
               <a:rPr lang="en-US" dirty="0"/>
-              <a:t>Basic Linear Model</a:t>
+              <a:t>Definitions</a:t>
             </a:r>
           </a:p>
           <a:p>
             <a:pPr lvl="1"/>
             <a:r>
               <a:rPr lang="en-US" dirty="0"/>
-              <a:t>Algorithm Types</a:t>
+              <a:t>General Model Types</a:t>
+            </a:r>
+          </a:p>
+          <a:p>
+            <a:pPr lvl="1"/>
+            <a:r>
+              <a:rPr lang="en-US" dirty="0"/>
+              <a:t>Linear Models</a:t>
+            </a:r>
+          </a:p>
+          <a:p>
+            <a:pPr lvl="1"/>
+            <a:r>
+              <a:rPr lang="en-US" dirty="0"/>
+              <a:t>Evaluating Accuracy</a:t>
             </a:r>
           </a:p>
           <a:p>
@@ -6620,6 +7827,1068 @@
     <p:extLst>
       <p:ext uri="{BB962C8B-B14F-4D97-AF65-F5344CB8AC3E}">
         <p14:creationId xmlns:p14="http://schemas.microsoft.com/office/powerpoint/2010/main" val="3913015809"/>
+      </p:ext>
+    </p:extLst>
+  </p:cSld>
+  <p:clrMapOvr>
+    <a:masterClrMapping/>
+  </p:clrMapOvr>
+</p:sld>
+</file>
+
+<file path=ppt/slides/slide20.xml><?xml version="1.0" encoding="utf-8"?>
+<p:sld xmlns:a="http://schemas.openxmlformats.org/drawingml/2006/main" xmlns:r="http://schemas.openxmlformats.org/officeDocument/2006/relationships" xmlns:p="http://schemas.openxmlformats.org/presentationml/2006/main">
+  <p:cSld>
+    <p:bg>
+      <p:bgPr>
+        <a:blipFill dpi="0" rotWithShape="1">
+          <a:blip r:embed="rId2">
+            <a:lum/>
+          </a:blip>
+          <a:srcRect/>
+          <a:stretch>
+            <a:fillRect l="-10000" r="-10000"/>
+          </a:stretch>
+        </a:blipFill>
+        <a:effectLst/>
+      </p:bgPr>
+    </p:bg>
+    <p:spTree>
+      <p:nvGrpSpPr>
+        <p:cNvPr id="1" name=""/>
+        <p:cNvGrpSpPr/>
+        <p:nvPr/>
+      </p:nvGrpSpPr>
+      <p:grpSpPr>
+        <a:xfrm>
+          <a:off x="0" y="0"/>
+          <a:ext cx="0" cy="0"/>
+          <a:chOff x="0" y="0"/>
+          <a:chExt cx="0" cy="0"/>
+        </a:xfrm>
+      </p:grpSpPr>
+      <p:sp>
+        <p:nvSpPr>
+          <p:cNvPr id="2" name="Title 1"/>
+          <p:cNvSpPr>
+            <a:spLocks noGrp="1"/>
+          </p:cNvSpPr>
+          <p:nvPr>
+            <p:ph type="title"/>
+          </p:nvPr>
+        </p:nvSpPr>
+        <p:spPr/>
+        <p:txBody>
+          <a:bodyPr/>
+          <a:lstStyle/>
+          <a:p>
+            <a:r>
+              <a:rPr lang="en-US" dirty="0"/>
+              <a:t>Linear Classifiers</a:t>
+            </a:r>
+          </a:p>
+        </p:txBody>
+      </p:sp>
+      <p:sp>
+        <p:nvSpPr>
+          <p:cNvPr id="3" name="Content Placeholder 2"/>
+          <p:cNvSpPr>
+            <a:spLocks noGrp="1"/>
+          </p:cNvSpPr>
+          <p:nvPr>
+            <p:ph idx="1"/>
+          </p:nvPr>
+        </p:nvSpPr>
+        <p:spPr/>
+        <p:txBody>
+          <a:bodyPr/>
+          <a:lstStyle/>
+          <a:p>
+            <a:r>
+              <a:rPr lang="en-US" dirty="0"/>
+              <a:t>List of some Types we will Cover</a:t>
+            </a:r>
+          </a:p>
+          <a:p>
+            <a:pPr lvl="1"/>
+            <a:r>
+              <a:rPr lang="en-US" dirty="0"/>
+              <a:t>K-Nearest Neighbors</a:t>
+            </a:r>
+          </a:p>
+          <a:p>
+            <a:pPr lvl="1"/>
+            <a:r>
+              <a:rPr lang="en-US" dirty="0"/>
+              <a:t>Lasso</a:t>
+            </a:r>
+          </a:p>
+          <a:p>
+            <a:pPr lvl="1"/>
+            <a:r>
+              <a:rPr lang="en-US" dirty="0"/>
+              <a:t>Regression</a:t>
+            </a:r>
+          </a:p>
+          <a:p>
+            <a:pPr lvl="1"/>
+            <a:r>
+              <a:rPr lang="en-US" dirty="0"/>
+              <a:t>Tree</a:t>
+            </a:r>
+          </a:p>
+          <a:p>
+            <a:pPr lvl="1"/>
+            <a:r>
+              <a:rPr lang="en-US" dirty="0"/>
+              <a:t>Forest</a:t>
+            </a:r>
+          </a:p>
+          <a:p>
+            <a:pPr lvl="1"/>
+            <a:r>
+              <a:rPr lang="en-US" dirty="0"/>
+              <a:t>Gradient-Boosted Forest</a:t>
+            </a:r>
+          </a:p>
+          <a:p>
+            <a:pPr lvl="2"/>
+            <a:endParaRPr lang="en-US" dirty="0"/>
+          </a:p>
+          <a:p>
+            <a:endParaRPr lang="en-US" dirty="0"/>
+          </a:p>
+        </p:txBody>
+      </p:sp>
+    </p:spTree>
+    <p:extLst>
+      <p:ext uri="{BB962C8B-B14F-4D97-AF65-F5344CB8AC3E}">
+        <p14:creationId xmlns:p14="http://schemas.microsoft.com/office/powerpoint/2010/main" val="3895443771"/>
+      </p:ext>
+    </p:extLst>
+  </p:cSld>
+  <p:clrMapOvr>
+    <a:masterClrMapping/>
+  </p:clrMapOvr>
+</p:sld>
+</file>
+
+<file path=ppt/slides/slide21.xml><?xml version="1.0" encoding="utf-8"?>
+<p:sld xmlns:a="http://schemas.openxmlformats.org/drawingml/2006/main" xmlns:r="http://schemas.openxmlformats.org/officeDocument/2006/relationships" xmlns:p="http://schemas.openxmlformats.org/presentationml/2006/main">
+  <p:cSld>
+    <p:bg>
+      <p:bgPr>
+        <a:blipFill dpi="0" rotWithShape="1">
+          <a:blip r:embed="rId3">
+            <a:lum/>
+          </a:blip>
+          <a:srcRect/>
+          <a:stretch>
+            <a:fillRect l="-10000" r="-10000"/>
+          </a:stretch>
+        </a:blipFill>
+        <a:effectLst/>
+      </p:bgPr>
+    </p:bg>
+    <p:spTree>
+      <p:nvGrpSpPr>
+        <p:cNvPr id="1" name=""/>
+        <p:cNvGrpSpPr/>
+        <p:nvPr/>
+      </p:nvGrpSpPr>
+      <p:grpSpPr>
+        <a:xfrm>
+          <a:off x="0" y="0"/>
+          <a:ext cx="0" cy="0"/>
+          <a:chOff x="0" y="0"/>
+          <a:chExt cx="0" cy="0"/>
+        </a:xfrm>
+      </p:grpSpPr>
+      <p:sp>
+        <p:nvSpPr>
+          <p:cNvPr id="2" name="Title 1"/>
+          <p:cNvSpPr>
+            <a:spLocks noGrp="1"/>
+          </p:cNvSpPr>
+          <p:nvPr>
+            <p:ph type="title"/>
+          </p:nvPr>
+        </p:nvSpPr>
+        <p:spPr/>
+        <p:txBody>
+          <a:bodyPr/>
+          <a:lstStyle/>
+          <a:p>
+            <a:r>
+              <a:rPr lang="en-US" dirty="0"/>
+              <a:t>Linear Models</a:t>
+            </a:r>
+          </a:p>
+        </p:txBody>
+      </p:sp>
+      <p:sp>
+        <p:nvSpPr>
+          <p:cNvPr id="3" name="Content Placeholder 2"/>
+          <p:cNvSpPr>
+            <a:spLocks noGrp="1"/>
+          </p:cNvSpPr>
+          <p:nvPr>
+            <p:ph idx="1"/>
+          </p:nvPr>
+        </p:nvSpPr>
+        <p:spPr/>
+        <p:txBody>
+          <a:bodyPr/>
+          <a:lstStyle/>
+          <a:p>
+            <a:r>
+              <a:rPr lang="en-US" dirty="0"/>
+              <a:t>K-Nearest Neighbors</a:t>
+            </a:r>
+          </a:p>
+          <a:p>
+            <a:pPr lvl="1"/>
+            <a:r>
+              <a:rPr lang="en-US" dirty="0"/>
+              <a:t>Predicts outcome by finding the closest matching data point.</a:t>
+            </a:r>
+          </a:p>
+          <a:p>
+            <a:pPr lvl="2"/>
+            <a:endParaRPr lang="en-US" dirty="0"/>
+          </a:p>
+          <a:p>
+            <a:endParaRPr lang="en-US" dirty="0"/>
+          </a:p>
+        </p:txBody>
+      </p:sp>
+    </p:spTree>
+    <p:extLst>
+      <p:ext uri="{BB962C8B-B14F-4D97-AF65-F5344CB8AC3E}">
+        <p14:creationId xmlns:p14="http://schemas.microsoft.com/office/powerpoint/2010/main" val="76902119"/>
+      </p:ext>
+    </p:extLst>
+  </p:cSld>
+  <p:clrMapOvr>
+    <a:overrideClrMapping bg1="lt1" tx1="dk1" bg2="lt2" tx2="dk2" accent1="accent1" accent2="accent2" accent3="accent3" accent4="accent4" accent5="accent5" accent6="accent6" hlink="hlink" folHlink="folHlink"/>
+  </p:clrMapOvr>
+</p:sld>
+</file>
+
+<file path=ppt/slides/slide22.xml><?xml version="1.0" encoding="utf-8"?>
+<p:sld xmlns:a="http://schemas.openxmlformats.org/drawingml/2006/main" xmlns:r="http://schemas.openxmlformats.org/officeDocument/2006/relationships" xmlns:p="http://schemas.openxmlformats.org/presentationml/2006/main">
+  <p:cSld>
+    <p:bg>
+      <p:bgPr>
+        <a:blipFill dpi="0" rotWithShape="1">
+          <a:blip r:embed="rId3">
+            <a:lum/>
+          </a:blip>
+          <a:srcRect/>
+          <a:stretch>
+            <a:fillRect l="-10000" r="-10000"/>
+          </a:stretch>
+        </a:blipFill>
+        <a:effectLst/>
+      </p:bgPr>
+    </p:bg>
+    <p:spTree>
+      <p:nvGrpSpPr>
+        <p:cNvPr id="1" name=""/>
+        <p:cNvGrpSpPr/>
+        <p:nvPr/>
+      </p:nvGrpSpPr>
+      <p:grpSpPr>
+        <a:xfrm>
+          <a:off x="0" y="0"/>
+          <a:ext cx="0" cy="0"/>
+          <a:chOff x="0" y="0"/>
+          <a:chExt cx="0" cy="0"/>
+        </a:xfrm>
+      </p:grpSpPr>
+      <p:sp>
+        <p:nvSpPr>
+          <p:cNvPr id="2" name="Title 1"/>
+          <p:cNvSpPr>
+            <a:spLocks noGrp="1"/>
+          </p:cNvSpPr>
+          <p:nvPr>
+            <p:ph type="title"/>
+          </p:nvPr>
+        </p:nvSpPr>
+        <p:spPr/>
+        <p:txBody>
+          <a:bodyPr/>
+          <a:lstStyle/>
+          <a:p>
+            <a:r>
+              <a:rPr lang="en-US" dirty="0"/>
+              <a:t>Linear Models</a:t>
+            </a:r>
+          </a:p>
+        </p:txBody>
+      </p:sp>
+      <p:sp>
+        <p:nvSpPr>
+          <p:cNvPr id="3" name="Content Placeholder 2"/>
+          <p:cNvSpPr>
+            <a:spLocks noGrp="1"/>
+          </p:cNvSpPr>
+          <p:nvPr>
+            <p:ph idx="1"/>
+          </p:nvPr>
+        </p:nvSpPr>
+        <p:spPr/>
+        <p:txBody>
+          <a:bodyPr/>
+          <a:lstStyle/>
+          <a:p>
+            <a:r>
+              <a:rPr lang="en-US" dirty="0"/>
+              <a:t>Lasso</a:t>
+            </a:r>
+          </a:p>
+          <a:p>
+            <a:pPr lvl="2"/>
+            <a:endParaRPr lang="en-US" dirty="0"/>
+          </a:p>
+          <a:p>
+            <a:endParaRPr lang="en-US" dirty="0"/>
+          </a:p>
+        </p:txBody>
+      </p:sp>
+    </p:spTree>
+    <p:extLst>
+      <p:ext uri="{BB962C8B-B14F-4D97-AF65-F5344CB8AC3E}">
+        <p14:creationId xmlns:p14="http://schemas.microsoft.com/office/powerpoint/2010/main" val="1469044682"/>
+      </p:ext>
+    </p:extLst>
+  </p:cSld>
+  <p:clrMapOvr>
+    <a:overrideClrMapping bg1="lt1" tx1="dk1" bg2="lt2" tx2="dk2" accent1="accent1" accent2="accent2" accent3="accent3" accent4="accent4" accent5="accent5" accent6="accent6" hlink="hlink" folHlink="folHlink"/>
+  </p:clrMapOvr>
+</p:sld>
+</file>
+
+<file path=ppt/slides/slide23.xml><?xml version="1.0" encoding="utf-8"?>
+<p:sld xmlns:a="http://schemas.openxmlformats.org/drawingml/2006/main" xmlns:r="http://schemas.openxmlformats.org/officeDocument/2006/relationships" xmlns:p="http://schemas.openxmlformats.org/presentationml/2006/main">
+  <p:cSld>
+    <p:bg>
+      <p:bgPr>
+        <a:blipFill dpi="0" rotWithShape="1">
+          <a:blip r:embed="rId3">
+            <a:lum/>
+          </a:blip>
+          <a:srcRect/>
+          <a:stretch>
+            <a:fillRect l="-10000" r="-10000"/>
+          </a:stretch>
+        </a:blipFill>
+        <a:effectLst/>
+      </p:bgPr>
+    </p:bg>
+    <p:spTree>
+      <p:nvGrpSpPr>
+        <p:cNvPr id="1" name=""/>
+        <p:cNvGrpSpPr/>
+        <p:nvPr/>
+      </p:nvGrpSpPr>
+      <p:grpSpPr>
+        <a:xfrm>
+          <a:off x="0" y="0"/>
+          <a:ext cx="0" cy="0"/>
+          <a:chOff x="0" y="0"/>
+          <a:chExt cx="0" cy="0"/>
+        </a:xfrm>
+      </p:grpSpPr>
+      <p:sp>
+        <p:nvSpPr>
+          <p:cNvPr id="2" name="Title 1"/>
+          <p:cNvSpPr>
+            <a:spLocks noGrp="1"/>
+          </p:cNvSpPr>
+          <p:nvPr>
+            <p:ph type="title"/>
+          </p:nvPr>
+        </p:nvSpPr>
+        <p:spPr/>
+        <p:txBody>
+          <a:bodyPr/>
+          <a:lstStyle/>
+          <a:p>
+            <a:r>
+              <a:rPr lang="en-US" dirty="0"/>
+              <a:t>Linear Models</a:t>
+            </a:r>
+          </a:p>
+        </p:txBody>
+      </p:sp>
+      <p:sp>
+        <p:nvSpPr>
+          <p:cNvPr id="3" name="Content Placeholder 2"/>
+          <p:cNvSpPr>
+            <a:spLocks noGrp="1"/>
+          </p:cNvSpPr>
+          <p:nvPr>
+            <p:ph idx="1"/>
+          </p:nvPr>
+        </p:nvSpPr>
+        <p:spPr/>
+        <p:txBody>
+          <a:bodyPr/>
+          <a:lstStyle/>
+          <a:p>
+            <a:r>
+              <a:rPr lang="en-US" dirty="0"/>
+              <a:t>Regression</a:t>
+            </a:r>
+          </a:p>
+          <a:p>
+            <a:pPr lvl="2"/>
+            <a:endParaRPr lang="en-US" dirty="0"/>
+          </a:p>
+          <a:p>
+            <a:endParaRPr lang="en-US" dirty="0"/>
+          </a:p>
+        </p:txBody>
+      </p:sp>
+    </p:spTree>
+    <p:extLst>
+      <p:ext uri="{BB962C8B-B14F-4D97-AF65-F5344CB8AC3E}">
+        <p14:creationId xmlns:p14="http://schemas.microsoft.com/office/powerpoint/2010/main" val="474133971"/>
+      </p:ext>
+    </p:extLst>
+  </p:cSld>
+  <p:clrMapOvr>
+    <a:overrideClrMapping bg1="lt1" tx1="dk1" bg2="lt2" tx2="dk2" accent1="accent1" accent2="accent2" accent3="accent3" accent4="accent4" accent5="accent5" accent6="accent6" hlink="hlink" folHlink="folHlink"/>
+  </p:clrMapOvr>
+</p:sld>
+</file>
+
+<file path=ppt/slides/slide24.xml><?xml version="1.0" encoding="utf-8"?>
+<p:sld xmlns:a="http://schemas.openxmlformats.org/drawingml/2006/main" xmlns:r="http://schemas.openxmlformats.org/officeDocument/2006/relationships" xmlns:p="http://schemas.openxmlformats.org/presentationml/2006/main">
+  <p:cSld>
+    <p:bg>
+      <p:bgPr>
+        <a:blipFill dpi="0" rotWithShape="1">
+          <a:blip r:embed="rId3">
+            <a:lum/>
+          </a:blip>
+          <a:srcRect/>
+          <a:stretch>
+            <a:fillRect l="-10000" r="-10000"/>
+          </a:stretch>
+        </a:blipFill>
+        <a:effectLst/>
+      </p:bgPr>
+    </p:bg>
+    <p:spTree>
+      <p:nvGrpSpPr>
+        <p:cNvPr id="1" name=""/>
+        <p:cNvGrpSpPr/>
+        <p:nvPr/>
+      </p:nvGrpSpPr>
+      <p:grpSpPr>
+        <a:xfrm>
+          <a:off x="0" y="0"/>
+          <a:ext cx="0" cy="0"/>
+          <a:chOff x="0" y="0"/>
+          <a:chExt cx="0" cy="0"/>
+        </a:xfrm>
+      </p:grpSpPr>
+      <p:sp>
+        <p:nvSpPr>
+          <p:cNvPr id="2" name="Title 1"/>
+          <p:cNvSpPr>
+            <a:spLocks noGrp="1"/>
+          </p:cNvSpPr>
+          <p:nvPr>
+            <p:ph type="title"/>
+          </p:nvPr>
+        </p:nvSpPr>
+        <p:spPr/>
+        <p:txBody>
+          <a:bodyPr/>
+          <a:lstStyle/>
+          <a:p>
+            <a:r>
+              <a:rPr lang="en-US" dirty="0"/>
+              <a:t>Linear Models</a:t>
+            </a:r>
+          </a:p>
+        </p:txBody>
+      </p:sp>
+      <p:sp>
+        <p:nvSpPr>
+          <p:cNvPr id="3" name="Content Placeholder 2"/>
+          <p:cNvSpPr>
+            <a:spLocks noGrp="1"/>
+          </p:cNvSpPr>
+          <p:nvPr>
+            <p:ph idx="1"/>
+          </p:nvPr>
+        </p:nvSpPr>
+        <p:spPr/>
+        <p:txBody>
+          <a:bodyPr/>
+          <a:lstStyle/>
+          <a:p>
+            <a:r>
+              <a:rPr lang="en-US" dirty="0"/>
+              <a:t>Tree</a:t>
+            </a:r>
+          </a:p>
+          <a:p>
+            <a:pPr lvl="2"/>
+            <a:endParaRPr lang="en-US" dirty="0"/>
+          </a:p>
+          <a:p>
+            <a:endParaRPr lang="en-US" dirty="0"/>
+          </a:p>
+        </p:txBody>
+      </p:sp>
+    </p:spTree>
+    <p:extLst>
+      <p:ext uri="{BB962C8B-B14F-4D97-AF65-F5344CB8AC3E}">
+        <p14:creationId xmlns:p14="http://schemas.microsoft.com/office/powerpoint/2010/main" val="1924952010"/>
+      </p:ext>
+    </p:extLst>
+  </p:cSld>
+  <p:clrMapOvr>
+    <a:overrideClrMapping bg1="lt1" tx1="dk1" bg2="lt2" tx2="dk2" accent1="accent1" accent2="accent2" accent3="accent3" accent4="accent4" accent5="accent5" accent6="accent6" hlink="hlink" folHlink="folHlink"/>
+  </p:clrMapOvr>
+</p:sld>
+</file>
+
+<file path=ppt/slides/slide25.xml><?xml version="1.0" encoding="utf-8"?>
+<p:sld xmlns:a="http://schemas.openxmlformats.org/drawingml/2006/main" xmlns:r="http://schemas.openxmlformats.org/officeDocument/2006/relationships" xmlns:p="http://schemas.openxmlformats.org/presentationml/2006/main">
+  <p:cSld>
+    <p:bg>
+      <p:bgPr>
+        <a:blipFill dpi="0" rotWithShape="1">
+          <a:blip r:embed="rId3">
+            <a:lum/>
+          </a:blip>
+          <a:srcRect/>
+          <a:stretch>
+            <a:fillRect l="-10000" r="-10000"/>
+          </a:stretch>
+        </a:blipFill>
+        <a:effectLst/>
+      </p:bgPr>
+    </p:bg>
+    <p:spTree>
+      <p:nvGrpSpPr>
+        <p:cNvPr id="1" name=""/>
+        <p:cNvGrpSpPr/>
+        <p:nvPr/>
+      </p:nvGrpSpPr>
+      <p:grpSpPr>
+        <a:xfrm>
+          <a:off x="0" y="0"/>
+          <a:ext cx="0" cy="0"/>
+          <a:chOff x="0" y="0"/>
+          <a:chExt cx="0" cy="0"/>
+        </a:xfrm>
+      </p:grpSpPr>
+      <p:sp>
+        <p:nvSpPr>
+          <p:cNvPr id="2" name="Title 1"/>
+          <p:cNvSpPr>
+            <a:spLocks noGrp="1"/>
+          </p:cNvSpPr>
+          <p:nvPr>
+            <p:ph type="title"/>
+          </p:nvPr>
+        </p:nvSpPr>
+        <p:spPr/>
+        <p:txBody>
+          <a:bodyPr/>
+          <a:lstStyle/>
+          <a:p>
+            <a:r>
+              <a:rPr lang="en-US" dirty="0"/>
+              <a:t>Linear Models</a:t>
+            </a:r>
+          </a:p>
+        </p:txBody>
+      </p:sp>
+      <p:sp>
+        <p:nvSpPr>
+          <p:cNvPr id="3" name="Content Placeholder 2"/>
+          <p:cNvSpPr>
+            <a:spLocks noGrp="1"/>
+          </p:cNvSpPr>
+          <p:nvPr>
+            <p:ph idx="1"/>
+          </p:nvPr>
+        </p:nvSpPr>
+        <p:spPr/>
+        <p:txBody>
+          <a:bodyPr/>
+          <a:lstStyle/>
+          <a:p>
+            <a:r>
+              <a:rPr lang="en-US" dirty="0"/>
+              <a:t>Forest</a:t>
+            </a:r>
+          </a:p>
+          <a:p>
+            <a:pPr lvl="2"/>
+            <a:endParaRPr lang="en-US" dirty="0"/>
+          </a:p>
+          <a:p>
+            <a:endParaRPr lang="en-US" dirty="0"/>
+          </a:p>
+        </p:txBody>
+      </p:sp>
+    </p:spTree>
+    <p:extLst>
+      <p:ext uri="{BB962C8B-B14F-4D97-AF65-F5344CB8AC3E}">
+        <p14:creationId xmlns:p14="http://schemas.microsoft.com/office/powerpoint/2010/main" val="358457677"/>
+      </p:ext>
+    </p:extLst>
+  </p:cSld>
+  <p:clrMapOvr>
+    <a:overrideClrMapping bg1="lt1" tx1="dk1" bg2="lt2" tx2="dk2" accent1="accent1" accent2="accent2" accent3="accent3" accent4="accent4" accent5="accent5" accent6="accent6" hlink="hlink" folHlink="folHlink"/>
+  </p:clrMapOvr>
+</p:sld>
+</file>
+
+<file path=ppt/slides/slide26.xml><?xml version="1.0" encoding="utf-8"?>
+<p:sld xmlns:a="http://schemas.openxmlformats.org/drawingml/2006/main" xmlns:r="http://schemas.openxmlformats.org/officeDocument/2006/relationships" xmlns:p="http://schemas.openxmlformats.org/presentationml/2006/main">
+  <p:cSld>
+    <p:bg>
+      <p:bgPr>
+        <a:blipFill dpi="0" rotWithShape="1">
+          <a:blip r:embed="rId3">
+            <a:lum/>
+          </a:blip>
+          <a:srcRect/>
+          <a:stretch>
+            <a:fillRect l="-10000" r="-10000"/>
+          </a:stretch>
+        </a:blipFill>
+        <a:effectLst/>
+      </p:bgPr>
+    </p:bg>
+    <p:spTree>
+      <p:nvGrpSpPr>
+        <p:cNvPr id="1" name=""/>
+        <p:cNvGrpSpPr/>
+        <p:nvPr/>
+      </p:nvGrpSpPr>
+      <p:grpSpPr>
+        <a:xfrm>
+          <a:off x="0" y="0"/>
+          <a:ext cx="0" cy="0"/>
+          <a:chOff x="0" y="0"/>
+          <a:chExt cx="0" cy="0"/>
+        </a:xfrm>
+      </p:grpSpPr>
+      <p:sp>
+        <p:nvSpPr>
+          <p:cNvPr id="2" name="Title 1"/>
+          <p:cNvSpPr>
+            <a:spLocks noGrp="1"/>
+          </p:cNvSpPr>
+          <p:nvPr>
+            <p:ph type="title"/>
+          </p:nvPr>
+        </p:nvSpPr>
+        <p:spPr/>
+        <p:txBody>
+          <a:bodyPr/>
+          <a:lstStyle/>
+          <a:p>
+            <a:r>
+              <a:rPr lang="en-US" dirty="0"/>
+              <a:t>Linear Models</a:t>
+            </a:r>
+          </a:p>
+        </p:txBody>
+      </p:sp>
+      <p:sp>
+        <p:nvSpPr>
+          <p:cNvPr id="3" name="Content Placeholder 2"/>
+          <p:cNvSpPr>
+            <a:spLocks noGrp="1"/>
+          </p:cNvSpPr>
+          <p:nvPr>
+            <p:ph idx="1"/>
+          </p:nvPr>
+        </p:nvSpPr>
+        <p:spPr/>
+        <p:txBody>
+          <a:bodyPr/>
+          <a:lstStyle/>
+          <a:p>
+            <a:r>
+              <a:rPr lang="en-US" dirty="0"/>
+              <a:t>Gradient-Boosted Forest</a:t>
+            </a:r>
+          </a:p>
+          <a:p>
+            <a:pPr lvl="2"/>
+            <a:endParaRPr lang="en-US" dirty="0"/>
+          </a:p>
+          <a:p>
+            <a:endParaRPr lang="en-US" dirty="0"/>
+          </a:p>
+        </p:txBody>
+      </p:sp>
+    </p:spTree>
+    <p:extLst>
+      <p:ext uri="{BB962C8B-B14F-4D97-AF65-F5344CB8AC3E}">
+        <p14:creationId xmlns:p14="http://schemas.microsoft.com/office/powerpoint/2010/main" val="1436682753"/>
+      </p:ext>
+    </p:extLst>
+  </p:cSld>
+  <p:clrMapOvr>
+    <a:overrideClrMapping bg1="lt1" tx1="dk1" bg2="lt2" tx2="dk2" accent1="accent1" accent2="accent2" accent3="accent3" accent4="accent4" accent5="accent5" accent6="accent6" hlink="hlink" folHlink="folHlink"/>
+  </p:clrMapOvr>
+</p:sld>
+</file>
+
+<file path=ppt/slides/slide27.xml><?xml version="1.0" encoding="utf-8"?>
+<p:sld xmlns:a="http://schemas.openxmlformats.org/drawingml/2006/main" xmlns:r="http://schemas.openxmlformats.org/officeDocument/2006/relationships" xmlns:p="http://schemas.openxmlformats.org/presentationml/2006/main">
+  <p:cSld>
+    <p:bg>
+      <p:bgPr>
+        <a:blipFill dpi="0" rotWithShape="1">
+          <a:blip r:embed="rId2">
+            <a:lum/>
+          </a:blip>
+          <a:srcRect/>
+          <a:stretch>
+            <a:fillRect l="-10000" r="-10000"/>
+          </a:stretch>
+        </a:blipFill>
+        <a:effectLst/>
+      </p:bgPr>
+    </p:bg>
+    <p:spTree>
+      <p:nvGrpSpPr>
+        <p:cNvPr id="1" name=""/>
+        <p:cNvGrpSpPr/>
+        <p:nvPr/>
+      </p:nvGrpSpPr>
+      <p:grpSpPr>
+        <a:xfrm>
+          <a:off x="0" y="0"/>
+          <a:ext cx="0" cy="0"/>
+          <a:chOff x="0" y="0"/>
+          <a:chExt cx="0" cy="0"/>
+        </a:xfrm>
+      </p:grpSpPr>
+      <p:sp>
+        <p:nvSpPr>
+          <p:cNvPr id="2" name="Title 1"/>
+          <p:cNvSpPr>
+            <a:spLocks noGrp="1"/>
+          </p:cNvSpPr>
+          <p:nvPr>
+            <p:ph type="title"/>
+          </p:nvPr>
+        </p:nvSpPr>
+        <p:spPr/>
+        <p:txBody>
+          <a:bodyPr/>
+          <a:lstStyle/>
+          <a:p>
+            <a:r>
+              <a:rPr lang="en-US" dirty="0"/>
+              <a:t>Evaluating Accuracy</a:t>
+            </a:r>
+          </a:p>
+        </p:txBody>
+      </p:sp>
+      <p:sp>
+        <p:nvSpPr>
+          <p:cNvPr id="3" name="Content Placeholder 2"/>
+          <p:cNvSpPr>
+            <a:spLocks noGrp="1"/>
+          </p:cNvSpPr>
+          <p:nvPr>
+            <p:ph idx="1"/>
+          </p:nvPr>
+        </p:nvSpPr>
+        <p:spPr/>
+        <p:txBody>
+          <a:bodyPr/>
+          <a:lstStyle/>
+          <a:p>
+            <a:r>
+              <a:rPr lang="en-US" dirty="0"/>
+              <a:t>Overview</a:t>
+            </a:r>
+          </a:p>
+          <a:p>
+            <a:pPr lvl="1"/>
+            <a:r>
+              <a:rPr lang="en-US" dirty="0"/>
+              <a:t>&lt;model&gt;.score(</a:t>
+            </a:r>
+            <a:r>
+              <a:rPr lang="en-US" dirty="0" err="1"/>
+              <a:t>test_data</a:t>
+            </a:r>
+            <a:r>
+              <a:rPr lang="en-US" dirty="0"/>
+              <a:t>, </a:t>
+            </a:r>
+            <a:r>
+              <a:rPr lang="en-US" dirty="0" err="1"/>
+              <a:t>test_labels</a:t>
+            </a:r>
+            <a:r>
+              <a:rPr lang="en-US"/>
+              <a:t>)</a:t>
+            </a:r>
+            <a:endParaRPr lang="en-US" dirty="0"/>
+          </a:p>
+          <a:p>
+            <a:pPr lvl="2"/>
+            <a:endParaRPr lang="en-US" dirty="0"/>
+          </a:p>
+          <a:p>
+            <a:endParaRPr lang="en-US" dirty="0"/>
+          </a:p>
+        </p:txBody>
+      </p:sp>
+    </p:spTree>
+    <p:extLst>
+      <p:ext uri="{BB962C8B-B14F-4D97-AF65-F5344CB8AC3E}">
+        <p14:creationId xmlns:p14="http://schemas.microsoft.com/office/powerpoint/2010/main" val="4053921630"/>
+      </p:ext>
+    </p:extLst>
+  </p:cSld>
+  <p:clrMapOvr>
+    <a:masterClrMapping/>
+  </p:clrMapOvr>
+</p:sld>
+</file>
+
+<file path=ppt/slides/slide28.xml><?xml version="1.0" encoding="utf-8"?>
+<p:sld xmlns:a="http://schemas.openxmlformats.org/drawingml/2006/main" xmlns:r="http://schemas.openxmlformats.org/officeDocument/2006/relationships" xmlns:p="http://schemas.openxmlformats.org/presentationml/2006/main">
+  <p:cSld>
+    <p:bg>
+      <p:bgPr>
+        <a:blipFill dpi="0" rotWithShape="1">
+          <a:blip r:embed="rId2">
+            <a:lum/>
+          </a:blip>
+          <a:srcRect/>
+          <a:stretch>
+            <a:fillRect l="-10000" r="-10000"/>
+          </a:stretch>
+        </a:blipFill>
+        <a:effectLst/>
+      </p:bgPr>
+    </p:bg>
+    <p:spTree>
+      <p:nvGrpSpPr>
+        <p:cNvPr id="1" name=""/>
+        <p:cNvGrpSpPr/>
+        <p:nvPr/>
+      </p:nvGrpSpPr>
+      <p:grpSpPr>
+        <a:xfrm>
+          <a:off x="0" y="0"/>
+          <a:ext cx="0" cy="0"/>
+          <a:chOff x="0" y="0"/>
+          <a:chExt cx="0" cy="0"/>
+        </a:xfrm>
+      </p:grpSpPr>
+      <p:sp>
+        <p:nvSpPr>
+          <p:cNvPr id="2" name="Title 1"/>
+          <p:cNvSpPr>
+            <a:spLocks noGrp="1"/>
+          </p:cNvSpPr>
+          <p:nvPr>
+            <p:ph type="title"/>
+          </p:nvPr>
+        </p:nvSpPr>
+        <p:spPr/>
+        <p:txBody>
+          <a:bodyPr/>
+          <a:lstStyle/>
+          <a:p>
+            <a:r>
+              <a:rPr lang="en-US" dirty="0" err="1"/>
+              <a:t>Scikit</a:t>
+            </a:r>
+            <a:r>
+              <a:rPr lang="en-US" dirty="0"/>
+              <a:t>-Learn Machine Learning</a:t>
+            </a:r>
+          </a:p>
+        </p:txBody>
+      </p:sp>
+      <p:sp>
+        <p:nvSpPr>
+          <p:cNvPr id="3" name="Content Placeholder 2"/>
+          <p:cNvSpPr>
+            <a:spLocks noGrp="1"/>
+          </p:cNvSpPr>
+          <p:nvPr>
+            <p:ph idx="1"/>
+          </p:nvPr>
+        </p:nvSpPr>
+        <p:spPr/>
+        <p:txBody>
+          <a:bodyPr/>
+          <a:lstStyle/>
+          <a:p>
+            <a:r>
+              <a:rPr lang="en-US" dirty="0"/>
+              <a:t>Overview</a:t>
+            </a:r>
+          </a:p>
+          <a:p>
+            <a:pPr lvl="1"/>
+            <a:r>
+              <a:rPr lang="en-US" dirty="0"/>
+              <a:t>Definition</a:t>
+            </a:r>
+          </a:p>
+          <a:p>
+            <a:pPr lvl="1"/>
+            <a:r>
+              <a:rPr lang="en-US" dirty="0"/>
+              <a:t>General Types</a:t>
+            </a:r>
+          </a:p>
+          <a:p>
+            <a:pPr lvl="1"/>
+            <a:r>
+              <a:rPr lang="en-US" dirty="0"/>
+              <a:t>Basic Linear Models</a:t>
+            </a:r>
+          </a:p>
+          <a:p>
+            <a:pPr lvl="1"/>
+            <a:r>
+              <a:rPr lang="en-US" dirty="0"/>
+              <a:t>Algorithm Types</a:t>
+            </a:r>
+          </a:p>
+          <a:p>
+            <a:pPr lvl="1"/>
+            <a:r>
+              <a:rPr lang="en-US" dirty="0"/>
+              <a:t>Tuning</a:t>
+            </a:r>
+          </a:p>
+          <a:p>
+            <a:pPr lvl="2"/>
+            <a:endParaRPr lang="en-US" dirty="0"/>
+          </a:p>
+          <a:p>
+            <a:endParaRPr lang="en-US" dirty="0"/>
+          </a:p>
+        </p:txBody>
+      </p:sp>
+    </p:spTree>
+    <p:extLst>
+      <p:ext uri="{BB962C8B-B14F-4D97-AF65-F5344CB8AC3E}">
+        <p14:creationId xmlns:p14="http://schemas.microsoft.com/office/powerpoint/2010/main" val="754999196"/>
+      </p:ext>
+    </p:extLst>
+  </p:cSld>
+  <p:clrMapOvr>
+    <a:masterClrMapping/>
+  </p:clrMapOvr>
+</p:sld>
+</file>
+
+<file path=ppt/slides/slide29.xml><?xml version="1.0" encoding="utf-8"?>
+<p:sld xmlns:a="http://schemas.openxmlformats.org/drawingml/2006/main" xmlns:r="http://schemas.openxmlformats.org/officeDocument/2006/relationships" xmlns:p="http://schemas.openxmlformats.org/presentationml/2006/main">
+  <p:cSld>
+    <p:bg>
+      <p:bgPr>
+        <a:blipFill dpi="0" rotWithShape="1">
+          <a:blip r:embed="rId2">
+            <a:lum/>
+          </a:blip>
+          <a:srcRect/>
+          <a:stretch>
+            <a:fillRect l="-10000" r="-10000"/>
+          </a:stretch>
+        </a:blipFill>
+        <a:effectLst/>
+      </p:bgPr>
+    </p:bg>
+    <p:spTree>
+      <p:nvGrpSpPr>
+        <p:cNvPr id="1" name=""/>
+        <p:cNvGrpSpPr/>
+        <p:nvPr/>
+      </p:nvGrpSpPr>
+      <p:grpSpPr>
+        <a:xfrm>
+          <a:off x="0" y="0"/>
+          <a:ext cx="0" cy="0"/>
+          <a:chOff x="0" y="0"/>
+          <a:chExt cx="0" cy="0"/>
+        </a:xfrm>
+      </p:grpSpPr>
+      <p:sp>
+        <p:nvSpPr>
+          <p:cNvPr id="2" name="Title 1"/>
+          <p:cNvSpPr>
+            <a:spLocks noGrp="1"/>
+          </p:cNvSpPr>
+          <p:nvPr>
+            <p:ph type="title"/>
+          </p:nvPr>
+        </p:nvSpPr>
+        <p:spPr/>
+        <p:txBody>
+          <a:bodyPr/>
+          <a:lstStyle/>
+          <a:p>
+            <a:r>
+              <a:rPr lang="en-US" dirty="0"/>
+              <a:t>Tuning</a:t>
+            </a:r>
+          </a:p>
+        </p:txBody>
+      </p:sp>
+      <p:sp>
+        <p:nvSpPr>
+          <p:cNvPr id="3" name="Content Placeholder 2"/>
+          <p:cNvSpPr>
+            <a:spLocks noGrp="1"/>
+          </p:cNvSpPr>
+          <p:nvPr>
+            <p:ph idx="1"/>
+          </p:nvPr>
+        </p:nvSpPr>
+        <p:spPr/>
+        <p:txBody>
+          <a:bodyPr/>
+          <a:lstStyle/>
+          <a:p>
+            <a:r>
+              <a:rPr lang="en-US" dirty="0"/>
+              <a:t>Determining what features matter</a:t>
+            </a:r>
+          </a:p>
+          <a:p>
+            <a:pPr lvl="2"/>
+            <a:endParaRPr lang="en-US" dirty="0"/>
+          </a:p>
+          <a:p>
+            <a:endParaRPr lang="en-US" dirty="0"/>
+          </a:p>
+        </p:txBody>
+      </p:sp>
+    </p:spTree>
+    <p:extLst>
+      <p:ext uri="{BB962C8B-B14F-4D97-AF65-F5344CB8AC3E}">
+        <p14:creationId xmlns:p14="http://schemas.microsoft.com/office/powerpoint/2010/main" val="3393037686"/>
       </p:ext>
     </p:extLst>
   </p:cSld>
@@ -6677,6 +8946,442 @@
           <a:p>
             <a:r>
               <a:rPr lang="en-US" dirty="0"/>
+              <a:t>Definition</a:t>
+            </a:r>
+          </a:p>
+        </p:txBody>
+      </p:sp>
+      <p:sp>
+        <p:nvSpPr>
+          <p:cNvPr id="3" name="Content Placeholder 2"/>
+          <p:cNvSpPr>
+            <a:spLocks noGrp="1"/>
+          </p:cNvSpPr>
+          <p:nvPr>
+            <p:ph idx="1"/>
+          </p:nvPr>
+        </p:nvSpPr>
+        <p:spPr/>
+        <p:txBody>
+          <a:bodyPr/>
+          <a:lstStyle/>
+          <a:p>
+            <a:r>
+              <a:rPr lang="en-US" dirty="0"/>
+              <a:t>Machine Learning</a:t>
+            </a:r>
+          </a:p>
+          <a:p>
+            <a:pPr lvl="1"/>
+            <a:r>
+              <a:rPr lang="en-US" dirty="0"/>
+              <a:t>The use of a model built off of data to increase the predictive ability of a computer.</a:t>
+            </a:r>
+          </a:p>
+          <a:p>
+            <a:pPr lvl="1"/>
+            <a:r>
+              <a:rPr lang="en-US" dirty="0"/>
+              <a:t>Data by itself is not machine learning if the predictive capabilities do not increase—no learning occurs in this situation.</a:t>
+            </a:r>
+          </a:p>
+          <a:p>
+            <a:endParaRPr lang="en-US" dirty="0"/>
+          </a:p>
+          <a:p>
+            <a:pPr lvl="2"/>
+            <a:endParaRPr lang="en-US" dirty="0"/>
+          </a:p>
+          <a:p>
+            <a:endParaRPr lang="en-US" dirty="0"/>
+          </a:p>
+        </p:txBody>
+      </p:sp>
+    </p:spTree>
+    <p:extLst>
+      <p:ext uri="{BB962C8B-B14F-4D97-AF65-F5344CB8AC3E}">
+        <p14:creationId xmlns:p14="http://schemas.microsoft.com/office/powerpoint/2010/main" val="3227970962"/>
+      </p:ext>
+    </p:extLst>
+  </p:cSld>
+  <p:clrMapOvr>
+    <a:masterClrMapping/>
+  </p:clrMapOvr>
+</p:sld>
+</file>
+
+<file path=ppt/slides/slide30.xml><?xml version="1.0" encoding="utf-8"?>
+<p:sld xmlns:a="http://schemas.openxmlformats.org/drawingml/2006/main" xmlns:r="http://schemas.openxmlformats.org/officeDocument/2006/relationships" xmlns:p="http://schemas.openxmlformats.org/presentationml/2006/main">
+  <p:cSld>
+    <p:bg>
+      <p:bgPr>
+        <a:blipFill dpi="0" rotWithShape="1">
+          <a:blip r:embed="rId2">
+            <a:lum/>
+          </a:blip>
+          <a:srcRect/>
+          <a:stretch>
+            <a:fillRect l="-10000" r="-10000"/>
+          </a:stretch>
+        </a:blipFill>
+        <a:effectLst/>
+      </p:bgPr>
+    </p:bg>
+    <p:spTree>
+      <p:nvGrpSpPr>
+        <p:cNvPr id="1" name=""/>
+        <p:cNvGrpSpPr/>
+        <p:nvPr/>
+      </p:nvGrpSpPr>
+      <p:grpSpPr>
+        <a:xfrm>
+          <a:off x="0" y="0"/>
+          <a:ext cx="0" cy="0"/>
+          <a:chOff x="0" y="0"/>
+          <a:chExt cx="0" cy="0"/>
+        </a:xfrm>
+      </p:grpSpPr>
+      <p:sp>
+        <p:nvSpPr>
+          <p:cNvPr id="2" name="Title 1"/>
+          <p:cNvSpPr>
+            <a:spLocks noGrp="1"/>
+          </p:cNvSpPr>
+          <p:nvPr>
+            <p:ph type="title"/>
+          </p:nvPr>
+        </p:nvSpPr>
+        <p:spPr/>
+        <p:txBody>
+          <a:bodyPr/>
+          <a:lstStyle/>
+          <a:p>
+            <a:r>
+              <a:rPr lang="en-US" dirty="0"/>
+              <a:t>Tuning</a:t>
+            </a:r>
+          </a:p>
+        </p:txBody>
+      </p:sp>
+      <p:sp>
+        <p:nvSpPr>
+          <p:cNvPr id="3" name="Content Placeholder 2"/>
+          <p:cNvSpPr>
+            <a:spLocks noGrp="1"/>
+          </p:cNvSpPr>
+          <p:nvPr>
+            <p:ph idx="1"/>
+          </p:nvPr>
+        </p:nvSpPr>
+        <p:spPr/>
+        <p:txBody>
+          <a:bodyPr/>
+          <a:lstStyle/>
+          <a:p>
+            <a:r>
+              <a:rPr lang="en-US" dirty="0"/>
+              <a:t>Parameters to Play with</a:t>
+            </a:r>
+          </a:p>
+          <a:p>
+            <a:pPr lvl="2"/>
+            <a:endParaRPr lang="en-US" dirty="0"/>
+          </a:p>
+          <a:p>
+            <a:endParaRPr lang="en-US" dirty="0"/>
+          </a:p>
+        </p:txBody>
+      </p:sp>
+    </p:spTree>
+    <p:extLst>
+      <p:ext uri="{BB962C8B-B14F-4D97-AF65-F5344CB8AC3E}">
+        <p14:creationId xmlns:p14="http://schemas.microsoft.com/office/powerpoint/2010/main" val="274238177"/>
+      </p:ext>
+    </p:extLst>
+  </p:cSld>
+  <p:clrMapOvr>
+    <a:masterClrMapping/>
+  </p:clrMapOvr>
+</p:sld>
+</file>
+
+<file path=ppt/slides/slide31.xml><?xml version="1.0" encoding="utf-8"?>
+<p:sld xmlns:a="http://schemas.openxmlformats.org/drawingml/2006/main" xmlns:r="http://schemas.openxmlformats.org/officeDocument/2006/relationships" xmlns:p="http://schemas.openxmlformats.org/presentationml/2006/main">
+  <p:cSld>
+    <p:bg>
+      <p:bgPr>
+        <a:blipFill dpi="0" rotWithShape="1">
+          <a:blip r:embed="rId2">
+            <a:lum/>
+          </a:blip>
+          <a:srcRect/>
+          <a:stretch>
+            <a:fillRect l="-10000" r="-10000"/>
+          </a:stretch>
+        </a:blipFill>
+        <a:effectLst/>
+      </p:bgPr>
+    </p:bg>
+    <p:spTree>
+      <p:nvGrpSpPr>
+        <p:cNvPr id="1" name=""/>
+        <p:cNvGrpSpPr/>
+        <p:nvPr/>
+      </p:nvGrpSpPr>
+      <p:grpSpPr>
+        <a:xfrm>
+          <a:off x="0" y="0"/>
+          <a:ext cx="0" cy="0"/>
+          <a:chOff x="0" y="0"/>
+          <a:chExt cx="0" cy="0"/>
+        </a:xfrm>
+      </p:grpSpPr>
+      <p:sp>
+        <p:nvSpPr>
+          <p:cNvPr id="2" name="Title 1"/>
+          <p:cNvSpPr>
+            <a:spLocks noGrp="1"/>
+          </p:cNvSpPr>
+          <p:nvPr>
+            <p:ph type="title"/>
+          </p:nvPr>
+        </p:nvSpPr>
+        <p:spPr/>
+        <p:txBody>
+          <a:bodyPr/>
+          <a:lstStyle/>
+          <a:p>
+            <a:r>
+              <a:rPr lang="en-US" dirty="0"/>
+              <a:t>Tuning</a:t>
+            </a:r>
+          </a:p>
+        </p:txBody>
+      </p:sp>
+      <p:sp>
+        <p:nvSpPr>
+          <p:cNvPr id="3" name="Content Placeholder 2"/>
+          <p:cNvSpPr>
+            <a:spLocks noGrp="1"/>
+          </p:cNvSpPr>
+          <p:nvPr>
+            <p:ph idx="1"/>
+          </p:nvPr>
+        </p:nvSpPr>
+        <p:spPr/>
+        <p:txBody>
+          <a:bodyPr/>
+          <a:lstStyle/>
+          <a:p>
+            <a:r>
+              <a:rPr lang="en-US" dirty="0"/>
+              <a:t>Grid Search</a:t>
+            </a:r>
+          </a:p>
+          <a:p>
+            <a:pPr lvl="2"/>
+            <a:endParaRPr lang="en-US" dirty="0"/>
+          </a:p>
+          <a:p>
+            <a:endParaRPr lang="en-US" dirty="0"/>
+          </a:p>
+        </p:txBody>
+      </p:sp>
+    </p:spTree>
+    <p:extLst>
+      <p:ext uri="{BB962C8B-B14F-4D97-AF65-F5344CB8AC3E}">
+        <p14:creationId xmlns:p14="http://schemas.microsoft.com/office/powerpoint/2010/main" val="2622179278"/>
+      </p:ext>
+    </p:extLst>
+  </p:cSld>
+  <p:clrMapOvr>
+    <a:masterClrMapping/>
+  </p:clrMapOvr>
+</p:sld>
+</file>
+
+<file path=ppt/slides/slide32.xml><?xml version="1.0" encoding="utf-8"?>
+<p:sld xmlns:a="http://schemas.openxmlformats.org/drawingml/2006/main" xmlns:r="http://schemas.openxmlformats.org/officeDocument/2006/relationships" xmlns:p="http://schemas.openxmlformats.org/presentationml/2006/main">
+  <p:cSld>
+    <p:bg>
+      <p:bgPr>
+        <a:blipFill dpi="0" rotWithShape="1">
+          <a:blip r:embed="rId2">
+            <a:lum/>
+          </a:blip>
+          <a:srcRect/>
+          <a:stretch>
+            <a:fillRect l="-10000" r="-10000"/>
+          </a:stretch>
+        </a:blipFill>
+        <a:effectLst/>
+      </p:bgPr>
+    </p:bg>
+    <p:spTree>
+      <p:nvGrpSpPr>
+        <p:cNvPr id="1" name=""/>
+        <p:cNvGrpSpPr/>
+        <p:nvPr/>
+      </p:nvGrpSpPr>
+      <p:grpSpPr>
+        <a:xfrm>
+          <a:off x="0" y="0"/>
+          <a:ext cx="0" cy="0"/>
+          <a:chOff x="0" y="0"/>
+          <a:chExt cx="0" cy="0"/>
+        </a:xfrm>
+      </p:grpSpPr>
+      <p:sp>
+        <p:nvSpPr>
+          <p:cNvPr id="2" name="Title 1"/>
+          <p:cNvSpPr>
+            <a:spLocks noGrp="1"/>
+          </p:cNvSpPr>
+          <p:nvPr>
+            <p:ph type="title"/>
+          </p:nvPr>
+        </p:nvSpPr>
+        <p:spPr/>
+        <p:txBody>
+          <a:bodyPr/>
+          <a:lstStyle/>
+          <a:p>
+            <a:r>
+              <a:rPr lang="en-US" dirty="0" err="1"/>
+              <a:t>Scikit</a:t>
+            </a:r>
+            <a:r>
+              <a:rPr lang="en-US" dirty="0"/>
+              <a:t>-Learn Machine Learning</a:t>
+            </a:r>
+          </a:p>
+        </p:txBody>
+      </p:sp>
+      <p:sp>
+        <p:nvSpPr>
+          <p:cNvPr id="3" name="Content Placeholder 2"/>
+          <p:cNvSpPr>
+            <a:spLocks noGrp="1"/>
+          </p:cNvSpPr>
+          <p:nvPr>
+            <p:ph idx="1"/>
+          </p:nvPr>
+        </p:nvSpPr>
+        <p:spPr/>
+        <p:txBody>
+          <a:bodyPr/>
+          <a:lstStyle/>
+          <a:p>
+            <a:r>
+              <a:rPr lang="en-US" dirty="0"/>
+              <a:t>Overview</a:t>
+            </a:r>
+          </a:p>
+          <a:p>
+            <a:pPr lvl="1"/>
+            <a:r>
+              <a:rPr lang="en-US" dirty="0"/>
+              <a:t>Definition</a:t>
+            </a:r>
+          </a:p>
+          <a:p>
+            <a:pPr lvl="1"/>
+            <a:r>
+              <a:rPr lang="en-US" dirty="0"/>
+              <a:t>General Types</a:t>
+            </a:r>
+          </a:p>
+          <a:p>
+            <a:pPr lvl="1"/>
+            <a:r>
+              <a:rPr lang="en-US" dirty="0"/>
+              <a:t>Basic Linear Models</a:t>
+            </a:r>
+          </a:p>
+          <a:p>
+            <a:pPr lvl="1"/>
+            <a:r>
+              <a:rPr lang="en-US" dirty="0"/>
+              <a:t>Algorithm Types</a:t>
+            </a:r>
+          </a:p>
+          <a:p>
+            <a:pPr lvl="1"/>
+            <a:r>
+              <a:rPr lang="en-US" dirty="0"/>
+              <a:t>Tuning</a:t>
+            </a:r>
+          </a:p>
+          <a:p>
+            <a:pPr lvl="2"/>
+            <a:endParaRPr lang="en-US" dirty="0"/>
+          </a:p>
+          <a:p>
+            <a:endParaRPr lang="en-US" dirty="0"/>
+          </a:p>
+        </p:txBody>
+      </p:sp>
+    </p:spTree>
+    <p:extLst>
+      <p:ext uri="{BB962C8B-B14F-4D97-AF65-F5344CB8AC3E}">
+        <p14:creationId xmlns:p14="http://schemas.microsoft.com/office/powerpoint/2010/main" val="2946119377"/>
+      </p:ext>
+    </p:extLst>
+  </p:cSld>
+  <p:clrMapOvr>
+    <a:masterClrMapping/>
+  </p:clrMapOvr>
+</p:sld>
+</file>
+
+<file path=ppt/slides/slide33.xml><?xml version="1.0" encoding="utf-8"?>
+<p:sld xmlns:a="http://schemas.openxmlformats.org/drawingml/2006/main" xmlns:r="http://schemas.openxmlformats.org/officeDocument/2006/relationships" xmlns:p="http://schemas.openxmlformats.org/presentationml/2006/main">
+  <p:cSld>
+    <p:bg>
+      <p:bgPr>
+        <a:blipFill dpi="0" rotWithShape="1">
+          <a:blip r:embed="rId2">
+            <a:lum/>
+          </a:blip>
+          <a:srcRect/>
+          <a:stretch>
+            <a:fillRect l="-10000" r="-10000"/>
+          </a:stretch>
+        </a:blipFill>
+        <a:effectLst/>
+      </p:bgPr>
+    </p:bg>
+    <p:spTree>
+      <p:nvGrpSpPr>
+        <p:cNvPr id="1" name=""/>
+        <p:cNvGrpSpPr/>
+        <p:nvPr/>
+      </p:nvGrpSpPr>
+      <p:grpSpPr>
+        <a:xfrm>
+          <a:off x="0" y="0"/>
+          <a:ext cx="0" cy="0"/>
+          <a:chOff x="0" y="0"/>
+          <a:chExt cx="0" cy="0"/>
+        </a:xfrm>
+      </p:grpSpPr>
+      <p:sp>
+        <p:nvSpPr>
+          <p:cNvPr id="2" name="Title 1"/>
+          <p:cNvSpPr>
+            <a:spLocks noGrp="1"/>
+          </p:cNvSpPr>
+          <p:nvPr>
+            <p:ph type="title"/>
+          </p:nvPr>
+        </p:nvSpPr>
+        <p:spPr/>
+        <p:txBody>
+          <a:bodyPr/>
+          <a:lstStyle/>
+          <a:p>
+            <a:r>
+              <a:rPr lang="en-US" dirty="0"/>
               <a:t>LICENSE</a:t>
             </a:r>
           </a:p>
@@ -6728,6 +9433,664 @@
     <p:extLst>
       <p:ext uri="{BB962C8B-B14F-4D97-AF65-F5344CB8AC3E}">
         <p14:creationId xmlns:p14="http://schemas.microsoft.com/office/powerpoint/2010/main" val="3645036191"/>
+      </p:ext>
+    </p:extLst>
+  </p:cSld>
+  <p:clrMapOvr>
+    <a:masterClrMapping/>
+  </p:clrMapOvr>
+</p:sld>
+</file>
+
+<file path=ppt/slides/slide4.xml><?xml version="1.0" encoding="utf-8"?>
+<p:sld xmlns:a="http://schemas.openxmlformats.org/drawingml/2006/main" xmlns:r="http://schemas.openxmlformats.org/officeDocument/2006/relationships" xmlns:p="http://schemas.openxmlformats.org/presentationml/2006/main">
+  <p:cSld>
+    <p:bg>
+      <p:bgPr>
+        <a:blipFill dpi="0" rotWithShape="1">
+          <a:blip r:embed="rId2">
+            <a:lum/>
+          </a:blip>
+          <a:srcRect/>
+          <a:stretch>
+            <a:fillRect l="-10000" r="-10000"/>
+          </a:stretch>
+        </a:blipFill>
+        <a:effectLst/>
+      </p:bgPr>
+    </p:bg>
+    <p:spTree>
+      <p:nvGrpSpPr>
+        <p:cNvPr id="1" name=""/>
+        <p:cNvGrpSpPr/>
+        <p:nvPr/>
+      </p:nvGrpSpPr>
+      <p:grpSpPr>
+        <a:xfrm>
+          <a:off x="0" y="0"/>
+          <a:ext cx="0" cy="0"/>
+          <a:chOff x="0" y="0"/>
+          <a:chExt cx="0" cy="0"/>
+        </a:xfrm>
+      </p:grpSpPr>
+      <p:sp>
+        <p:nvSpPr>
+          <p:cNvPr id="2" name="Title 1"/>
+          <p:cNvSpPr>
+            <a:spLocks noGrp="1"/>
+          </p:cNvSpPr>
+          <p:nvPr>
+            <p:ph type="title"/>
+          </p:nvPr>
+        </p:nvSpPr>
+        <p:spPr/>
+        <p:txBody>
+          <a:bodyPr/>
+          <a:lstStyle/>
+          <a:p>
+            <a:r>
+              <a:rPr lang="en-US" dirty="0"/>
+              <a:t>Definitions</a:t>
+            </a:r>
+          </a:p>
+        </p:txBody>
+      </p:sp>
+      <p:sp>
+        <p:nvSpPr>
+          <p:cNvPr id="3" name="Content Placeholder 2"/>
+          <p:cNvSpPr>
+            <a:spLocks noGrp="1"/>
+          </p:cNvSpPr>
+          <p:nvPr>
+            <p:ph idx="1"/>
+          </p:nvPr>
+        </p:nvSpPr>
+        <p:spPr/>
+        <p:txBody>
+          <a:bodyPr/>
+          <a:lstStyle/>
+          <a:p>
+            <a:r>
+              <a:rPr lang="en-US" dirty="0"/>
+              <a:t>Classifier</a:t>
+            </a:r>
+          </a:p>
+          <a:p>
+            <a:pPr lvl="1"/>
+            <a:r>
+              <a:rPr lang="en-US" dirty="0"/>
+              <a:t>The mathematical equation, set of equations, and/or algorithm that a computer uses to predict outcomes.</a:t>
+            </a:r>
+          </a:p>
+          <a:p>
+            <a:pPr lvl="1"/>
+            <a:r>
+              <a:rPr lang="en-US" dirty="0"/>
+              <a:t>This is the scaffolding for our model.</a:t>
+            </a:r>
+          </a:p>
+          <a:p>
+            <a:endParaRPr lang="en-US" dirty="0"/>
+          </a:p>
+          <a:p>
+            <a:pPr lvl="2"/>
+            <a:endParaRPr lang="en-US" dirty="0"/>
+          </a:p>
+          <a:p>
+            <a:endParaRPr lang="en-US" dirty="0"/>
+          </a:p>
+        </p:txBody>
+      </p:sp>
+    </p:spTree>
+    <p:extLst>
+      <p:ext uri="{BB962C8B-B14F-4D97-AF65-F5344CB8AC3E}">
+        <p14:creationId xmlns:p14="http://schemas.microsoft.com/office/powerpoint/2010/main" val="789975062"/>
+      </p:ext>
+    </p:extLst>
+  </p:cSld>
+  <p:clrMapOvr>
+    <a:masterClrMapping/>
+  </p:clrMapOvr>
+</p:sld>
+</file>
+
+<file path=ppt/slides/slide5.xml><?xml version="1.0" encoding="utf-8"?>
+<p:sld xmlns:a="http://schemas.openxmlformats.org/drawingml/2006/main" xmlns:r="http://schemas.openxmlformats.org/officeDocument/2006/relationships" xmlns:p="http://schemas.openxmlformats.org/presentationml/2006/main">
+  <p:cSld>
+    <p:bg>
+      <p:bgPr>
+        <a:blipFill dpi="0" rotWithShape="1">
+          <a:blip r:embed="rId2">
+            <a:lum/>
+          </a:blip>
+          <a:srcRect/>
+          <a:stretch>
+            <a:fillRect l="-10000" r="-10000"/>
+          </a:stretch>
+        </a:blipFill>
+        <a:effectLst/>
+      </p:bgPr>
+    </p:bg>
+    <p:spTree>
+      <p:nvGrpSpPr>
+        <p:cNvPr id="1" name=""/>
+        <p:cNvGrpSpPr/>
+        <p:nvPr/>
+      </p:nvGrpSpPr>
+      <p:grpSpPr>
+        <a:xfrm>
+          <a:off x="0" y="0"/>
+          <a:ext cx="0" cy="0"/>
+          <a:chOff x="0" y="0"/>
+          <a:chExt cx="0" cy="0"/>
+        </a:xfrm>
+      </p:grpSpPr>
+      <p:sp>
+        <p:nvSpPr>
+          <p:cNvPr id="2" name="Title 1"/>
+          <p:cNvSpPr>
+            <a:spLocks noGrp="1"/>
+          </p:cNvSpPr>
+          <p:nvPr>
+            <p:ph type="title"/>
+          </p:nvPr>
+        </p:nvSpPr>
+        <p:spPr/>
+        <p:txBody>
+          <a:bodyPr/>
+          <a:lstStyle/>
+          <a:p>
+            <a:r>
+              <a:rPr lang="en-US" dirty="0"/>
+              <a:t>Definitions</a:t>
+            </a:r>
+          </a:p>
+        </p:txBody>
+      </p:sp>
+      <p:sp>
+        <p:nvSpPr>
+          <p:cNvPr id="3" name="Content Placeholder 2"/>
+          <p:cNvSpPr>
+            <a:spLocks noGrp="1"/>
+          </p:cNvSpPr>
+          <p:nvPr>
+            <p:ph idx="1"/>
+          </p:nvPr>
+        </p:nvSpPr>
+        <p:spPr/>
+        <p:txBody>
+          <a:bodyPr/>
+          <a:lstStyle/>
+          <a:p>
+            <a:r>
+              <a:rPr lang="en-US" dirty="0"/>
+              <a:t>Model</a:t>
+            </a:r>
+          </a:p>
+          <a:p>
+            <a:pPr lvl="1"/>
+            <a:r>
+              <a:rPr lang="en-US" dirty="0"/>
+              <a:t>The classifier that is trained and filled with data.</a:t>
+            </a:r>
+          </a:p>
+          <a:p>
+            <a:pPr lvl="1"/>
+            <a:r>
+              <a:rPr lang="en-US" dirty="0"/>
+              <a:t>This is what will tell us what the “answer” is.</a:t>
+            </a:r>
+          </a:p>
+          <a:p>
+            <a:endParaRPr lang="en-US" dirty="0"/>
+          </a:p>
+          <a:p>
+            <a:pPr lvl="2"/>
+            <a:endParaRPr lang="en-US" dirty="0"/>
+          </a:p>
+          <a:p>
+            <a:endParaRPr lang="en-US" dirty="0"/>
+          </a:p>
+        </p:txBody>
+      </p:sp>
+    </p:spTree>
+    <p:extLst>
+      <p:ext uri="{BB962C8B-B14F-4D97-AF65-F5344CB8AC3E}">
+        <p14:creationId xmlns:p14="http://schemas.microsoft.com/office/powerpoint/2010/main" val="4212275978"/>
+      </p:ext>
+    </p:extLst>
+  </p:cSld>
+  <p:clrMapOvr>
+    <a:masterClrMapping/>
+  </p:clrMapOvr>
+</p:sld>
+</file>
+
+<file path=ppt/slides/slide6.xml><?xml version="1.0" encoding="utf-8"?>
+<p:sld xmlns:a="http://schemas.openxmlformats.org/drawingml/2006/main" xmlns:r="http://schemas.openxmlformats.org/officeDocument/2006/relationships" xmlns:p="http://schemas.openxmlformats.org/presentationml/2006/main">
+  <p:cSld>
+    <p:bg>
+      <p:bgPr>
+        <a:blipFill dpi="0" rotWithShape="1">
+          <a:blip r:embed="rId2">
+            <a:lum/>
+          </a:blip>
+          <a:srcRect/>
+          <a:stretch>
+            <a:fillRect l="-10000" r="-10000"/>
+          </a:stretch>
+        </a:blipFill>
+        <a:effectLst/>
+      </p:bgPr>
+    </p:bg>
+    <p:spTree>
+      <p:nvGrpSpPr>
+        <p:cNvPr id="1" name=""/>
+        <p:cNvGrpSpPr/>
+        <p:nvPr/>
+      </p:nvGrpSpPr>
+      <p:grpSpPr>
+        <a:xfrm>
+          <a:off x="0" y="0"/>
+          <a:ext cx="0" cy="0"/>
+          <a:chOff x="0" y="0"/>
+          <a:chExt cx="0" cy="0"/>
+        </a:xfrm>
+      </p:grpSpPr>
+      <p:sp>
+        <p:nvSpPr>
+          <p:cNvPr id="2" name="Title 1"/>
+          <p:cNvSpPr>
+            <a:spLocks noGrp="1"/>
+          </p:cNvSpPr>
+          <p:nvPr>
+            <p:ph type="title"/>
+          </p:nvPr>
+        </p:nvSpPr>
+        <p:spPr/>
+        <p:txBody>
+          <a:bodyPr/>
+          <a:lstStyle/>
+          <a:p>
+            <a:r>
+              <a:rPr lang="en-US" dirty="0"/>
+              <a:t>Definitions</a:t>
+            </a:r>
+          </a:p>
+        </p:txBody>
+      </p:sp>
+      <p:sp>
+        <p:nvSpPr>
+          <p:cNvPr id="3" name="Content Placeholder 2"/>
+          <p:cNvSpPr>
+            <a:spLocks noGrp="1"/>
+          </p:cNvSpPr>
+          <p:nvPr>
+            <p:ph idx="1"/>
+          </p:nvPr>
+        </p:nvSpPr>
+        <p:spPr/>
+        <p:txBody>
+          <a:bodyPr/>
+          <a:lstStyle/>
+          <a:p>
+            <a:r>
+              <a:rPr lang="en-US" dirty="0"/>
+              <a:t>Classifier vs Model</a:t>
+            </a:r>
+          </a:p>
+          <a:p>
+            <a:pPr lvl="1"/>
+            <a:r>
+              <a:rPr lang="en-US" dirty="0"/>
+              <a:t>The classifier is like a class, where the model is like an object.</a:t>
+            </a:r>
+          </a:p>
+          <a:p>
+            <a:endParaRPr lang="en-US" dirty="0"/>
+          </a:p>
+          <a:p>
+            <a:pPr lvl="2"/>
+            <a:endParaRPr lang="en-US" dirty="0"/>
+          </a:p>
+          <a:p>
+            <a:endParaRPr lang="en-US" dirty="0"/>
+          </a:p>
+        </p:txBody>
+      </p:sp>
+    </p:spTree>
+    <p:extLst>
+      <p:ext uri="{BB962C8B-B14F-4D97-AF65-F5344CB8AC3E}">
+        <p14:creationId xmlns:p14="http://schemas.microsoft.com/office/powerpoint/2010/main" val="3444231323"/>
+      </p:ext>
+    </p:extLst>
+  </p:cSld>
+  <p:clrMapOvr>
+    <a:masterClrMapping/>
+  </p:clrMapOvr>
+</p:sld>
+</file>
+
+<file path=ppt/slides/slide7.xml><?xml version="1.0" encoding="utf-8"?>
+<p:sld xmlns:a="http://schemas.openxmlformats.org/drawingml/2006/main" xmlns:r="http://schemas.openxmlformats.org/officeDocument/2006/relationships" xmlns:p="http://schemas.openxmlformats.org/presentationml/2006/main">
+  <p:cSld>
+    <p:bg>
+      <p:bgPr>
+        <a:blipFill dpi="0" rotWithShape="1">
+          <a:blip r:embed="rId2">
+            <a:lum/>
+          </a:blip>
+          <a:srcRect/>
+          <a:stretch>
+            <a:fillRect l="-10000" r="-10000"/>
+          </a:stretch>
+        </a:blipFill>
+        <a:effectLst/>
+      </p:bgPr>
+    </p:bg>
+    <p:spTree>
+      <p:nvGrpSpPr>
+        <p:cNvPr id="1" name=""/>
+        <p:cNvGrpSpPr/>
+        <p:nvPr/>
+      </p:nvGrpSpPr>
+      <p:grpSpPr>
+        <a:xfrm>
+          <a:off x="0" y="0"/>
+          <a:ext cx="0" cy="0"/>
+          <a:chOff x="0" y="0"/>
+          <a:chExt cx="0" cy="0"/>
+        </a:xfrm>
+      </p:grpSpPr>
+      <p:sp>
+        <p:nvSpPr>
+          <p:cNvPr id="2" name="Title 1"/>
+          <p:cNvSpPr>
+            <a:spLocks noGrp="1"/>
+          </p:cNvSpPr>
+          <p:nvPr>
+            <p:ph type="title"/>
+          </p:nvPr>
+        </p:nvSpPr>
+        <p:spPr/>
+        <p:txBody>
+          <a:bodyPr/>
+          <a:lstStyle/>
+          <a:p>
+            <a:r>
+              <a:rPr lang="en-US" dirty="0"/>
+              <a:t>Definition</a:t>
+            </a:r>
+          </a:p>
+        </p:txBody>
+      </p:sp>
+      <p:sp>
+        <p:nvSpPr>
+          <p:cNvPr id="3" name="Content Placeholder 2"/>
+          <p:cNvSpPr>
+            <a:spLocks noGrp="1"/>
+          </p:cNvSpPr>
+          <p:nvPr>
+            <p:ph idx="1"/>
+          </p:nvPr>
+        </p:nvSpPr>
+        <p:spPr/>
+        <p:txBody>
+          <a:bodyPr/>
+          <a:lstStyle/>
+          <a:p>
+            <a:r>
+              <a:rPr lang="en-US" dirty="0"/>
+              <a:t>Experience</a:t>
+            </a:r>
+          </a:p>
+          <a:p>
+            <a:pPr lvl="1"/>
+            <a:r>
+              <a:rPr lang="en-US" dirty="0"/>
+              <a:t>The data used to increase the effectiveness of the model’s predictions</a:t>
+            </a:r>
+          </a:p>
+          <a:p>
+            <a:endParaRPr lang="en-US" dirty="0"/>
+          </a:p>
+          <a:p>
+            <a:pPr lvl="2"/>
+            <a:endParaRPr lang="en-US" dirty="0"/>
+          </a:p>
+          <a:p>
+            <a:endParaRPr lang="en-US" dirty="0"/>
+          </a:p>
+        </p:txBody>
+      </p:sp>
+    </p:spTree>
+    <p:extLst>
+      <p:ext uri="{BB962C8B-B14F-4D97-AF65-F5344CB8AC3E}">
+        <p14:creationId xmlns:p14="http://schemas.microsoft.com/office/powerpoint/2010/main" val="2979209538"/>
+      </p:ext>
+    </p:extLst>
+  </p:cSld>
+  <p:clrMapOvr>
+    <a:masterClrMapping/>
+  </p:clrMapOvr>
+</p:sld>
+</file>
+
+<file path=ppt/slides/slide8.xml><?xml version="1.0" encoding="utf-8"?>
+<p:sld xmlns:a="http://schemas.openxmlformats.org/drawingml/2006/main" xmlns:r="http://schemas.openxmlformats.org/officeDocument/2006/relationships" xmlns:p="http://schemas.openxmlformats.org/presentationml/2006/main">
+  <p:cSld>
+    <p:bg>
+      <p:bgPr>
+        <a:blipFill dpi="0" rotWithShape="1">
+          <a:blip r:embed="rId2">
+            <a:lum/>
+          </a:blip>
+          <a:srcRect/>
+          <a:stretch>
+            <a:fillRect l="-10000" r="-10000"/>
+          </a:stretch>
+        </a:blipFill>
+        <a:effectLst/>
+      </p:bgPr>
+    </p:bg>
+    <p:spTree>
+      <p:nvGrpSpPr>
+        <p:cNvPr id="1" name=""/>
+        <p:cNvGrpSpPr/>
+        <p:nvPr/>
+      </p:nvGrpSpPr>
+      <p:grpSpPr>
+        <a:xfrm>
+          <a:off x="0" y="0"/>
+          <a:ext cx="0" cy="0"/>
+          <a:chOff x="0" y="0"/>
+          <a:chExt cx="0" cy="0"/>
+        </a:xfrm>
+      </p:grpSpPr>
+      <p:sp>
+        <p:nvSpPr>
+          <p:cNvPr id="2" name="Title 1"/>
+          <p:cNvSpPr>
+            <a:spLocks noGrp="1"/>
+          </p:cNvSpPr>
+          <p:nvPr>
+            <p:ph type="title"/>
+          </p:nvPr>
+        </p:nvSpPr>
+        <p:spPr/>
+        <p:txBody>
+          <a:bodyPr/>
+          <a:lstStyle/>
+          <a:p>
+            <a:r>
+              <a:rPr lang="en-US" dirty="0"/>
+              <a:t>Definition</a:t>
+            </a:r>
+          </a:p>
+        </p:txBody>
+      </p:sp>
+      <p:sp>
+        <p:nvSpPr>
+          <p:cNvPr id="3" name="Content Placeholder 2"/>
+          <p:cNvSpPr>
+            <a:spLocks noGrp="1"/>
+          </p:cNvSpPr>
+          <p:nvPr>
+            <p:ph idx="1"/>
+          </p:nvPr>
+        </p:nvSpPr>
+        <p:spPr/>
+        <p:txBody>
+          <a:bodyPr/>
+          <a:lstStyle/>
+          <a:p>
+            <a:r>
+              <a:rPr lang="en-US" dirty="0"/>
+              <a:t>Feature</a:t>
+            </a:r>
+          </a:p>
+          <a:p>
+            <a:pPr lvl="1"/>
+            <a:r>
+              <a:rPr lang="en-US" dirty="0"/>
+              <a:t>A description of a set of like-data.</a:t>
+            </a:r>
+          </a:p>
+          <a:p>
+            <a:pPr lvl="1"/>
+            <a:r>
+              <a:rPr lang="en-US" dirty="0"/>
+              <a:t>This is usually represented as a column in a data table.</a:t>
+            </a:r>
+          </a:p>
+          <a:p>
+            <a:endParaRPr lang="en-US" dirty="0"/>
+          </a:p>
+          <a:p>
+            <a:pPr lvl="2"/>
+            <a:endParaRPr lang="en-US" dirty="0"/>
+          </a:p>
+          <a:p>
+            <a:endParaRPr lang="en-US" dirty="0"/>
+          </a:p>
+        </p:txBody>
+      </p:sp>
+    </p:spTree>
+    <p:extLst>
+      <p:ext uri="{BB962C8B-B14F-4D97-AF65-F5344CB8AC3E}">
+        <p14:creationId xmlns:p14="http://schemas.microsoft.com/office/powerpoint/2010/main" val="2289988101"/>
+      </p:ext>
+    </p:extLst>
+  </p:cSld>
+  <p:clrMapOvr>
+    <a:masterClrMapping/>
+  </p:clrMapOvr>
+</p:sld>
+</file>
+
+<file path=ppt/slides/slide9.xml><?xml version="1.0" encoding="utf-8"?>
+<p:sld xmlns:a="http://schemas.openxmlformats.org/drawingml/2006/main" xmlns:r="http://schemas.openxmlformats.org/officeDocument/2006/relationships" xmlns:p="http://schemas.openxmlformats.org/presentationml/2006/main">
+  <p:cSld>
+    <p:bg>
+      <p:bgPr>
+        <a:blipFill dpi="0" rotWithShape="1">
+          <a:blip r:embed="rId2">
+            <a:lum/>
+          </a:blip>
+          <a:srcRect/>
+          <a:stretch>
+            <a:fillRect l="-10000" r="-10000"/>
+          </a:stretch>
+        </a:blipFill>
+        <a:effectLst/>
+      </p:bgPr>
+    </p:bg>
+    <p:spTree>
+      <p:nvGrpSpPr>
+        <p:cNvPr id="1" name=""/>
+        <p:cNvGrpSpPr/>
+        <p:nvPr/>
+      </p:nvGrpSpPr>
+      <p:grpSpPr>
+        <a:xfrm>
+          <a:off x="0" y="0"/>
+          <a:ext cx="0" cy="0"/>
+          <a:chOff x="0" y="0"/>
+          <a:chExt cx="0" cy="0"/>
+        </a:xfrm>
+      </p:grpSpPr>
+      <p:sp>
+        <p:nvSpPr>
+          <p:cNvPr id="2" name="Title 1"/>
+          <p:cNvSpPr>
+            <a:spLocks noGrp="1"/>
+          </p:cNvSpPr>
+          <p:nvPr>
+            <p:ph type="title"/>
+          </p:nvPr>
+        </p:nvSpPr>
+        <p:spPr/>
+        <p:txBody>
+          <a:bodyPr/>
+          <a:lstStyle/>
+          <a:p>
+            <a:r>
+              <a:rPr lang="en-US" dirty="0"/>
+              <a:t>Definition</a:t>
+            </a:r>
+          </a:p>
+        </p:txBody>
+      </p:sp>
+      <p:sp>
+        <p:nvSpPr>
+          <p:cNvPr id="3" name="Content Placeholder 2"/>
+          <p:cNvSpPr>
+            <a:spLocks noGrp="1"/>
+          </p:cNvSpPr>
+          <p:nvPr>
+            <p:ph idx="1"/>
+          </p:nvPr>
+        </p:nvSpPr>
+        <p:spPr/>
+        <p:txBody>
+          <a:bodyPr/>
+          <a:lstStyle/>
+          <a:p>
+            <a:r>
+              <a:rPr lang="en-US" dirty="0"/>
+              <a:t>Sample</a:t>
+            </a:r>
+          </a:p>
+          <a:p>
+            <a:pPr lvl="1"/>
+            <a:r>
+              <a:rPr lang="en-US" dirty="0"/>
+              <a:t>A single set of data, or a data point.</a:t>
+            </a:r>
+          </a:p>
+          <a:p>
+            <a:pPr lvl="1"/>
+            <a:r>
+              <a:rPr lang="en-US" dirty="0"/>
+              <a:t>This is usually a row in a data table.</a:t>
+            </a:r>
+          </a:p>
+          <a:p>
+            <a:endParaRPr lang="en-US" dirty="0"/>
+          </a:p>
+          <a:p>
+            <a:pPr lvl="2"/>
+            <a:endParaRPr lang="en-US" dirty="0"/>
+          </a:p>
+          <a:p>
+            <a:endParaRPr lang="en-US" dirty="0"/>
+          </a:p>
+        </p:txBody>
+      </p:sp>
+    </p:spTree>
+    <p:extLst>
+      <p:ext uri="{BB962C8B-B14F-4D97-AF65-F5344CB8AC3E}">
+        <p14:creationId xmlns:p14="http://schemas.microsoft.com/office/powerpoint/2010/main" val="1110144452"/>
       </p:ext>
     </p:extLst>
   </p:cSld>
@@ -7305,4 +10668,262 @@
   <a:objectDefaults/>
   <a:extraClrSchemeLst/>
 </a:theme>
+</file>
+
+<file path=ppt/theme/themeOverride1.xml><?xml version="1.0" encoding="utf-8"?>
+<a:themeOverride xmlns:a="http://schemas.openxmlformats.org/drawingml/2006/main">
+  <a:clrScheme name="Custom 2">
+    <a:dk1>
+      <a:srgbClr val="EFEFEF"/>
+    </a:dk1>
+    <a:lt1>
+      <a:srgbClr val="EFEFEF"/>
+    </a:lt1>
+    <a:dk2>
+      <a:srgbClr val="053E7D"/>
+    </a:dk2>
+    <a:lt2>
+      <a:srgbClr val="FFFFFF"/>
+    </a:lt2>
+    <a:accent1>
+      <a:srgbClr val="EFEFEF"/>
+    </a:accent1>
+    <a:accent2>
+      <a:srgbClr val="EFEFEF"/>
+    </a:accent2>
+    <a:accent3>
+      <a:srgbClr val="EFEFEF"/>
+    </a:accent3>
+    <a:accent4>
+      <a:srgbClr val="808080"/>
+    </a:accent4>
+    <a:accent5>
+      <a:srgbClr val="5F5F5F"/>
+    </a:accent5>
+    <a:accent6>
+      <a:srgbClr val="4D4D4D"/>
+    </a:accent6>
+    <a:hlink>
+      <a:srgbClr val="B5D7FC"/>
+    </a:hlink>
+    <a:folHlink>
+      <a:srgbClr val="919191"/>
+    </a:folHlink>
+  </a:clrScheme>
+</a:themeOverride>
+</file>
+
+<file path=ppt/theme/themeOverride2.xml><?xml version="1.0" encoding="utf-8"?>
+<a:themeOverride xmlns:a="http://schemas.openxmlformats.org/drawingml/2006/main">
+  <a:clrScheme name="Custom 2">
+    <a:dk1>
+      <a:srgbClr val="EFEFEF"/>
+    </a:dk1>
+    <a:lt1>
+      <a:srgbClr val="EFEFEF"/>
+    </a:lt1>
+    <a:dk2>
+      <a:srgbClr val="053E7D"/>
+    </a:dk2>
+    <a:lt2>
+      <a:srgbClr val="FFFFFF"/>
+    </a:lt2>
+    <a:accent1>
+      <a:srgbClr val="EFEFEF"/>
+    </a:accent1>
+    <a:accent2>
+      <a:srgbClr val="EFEFEF"/>
+    </a:accent2>
+    <a:accent3>
+      <a:srgbClr val="EFEFEF"/>
+    </a:accent3>
+    <a:accent4>
+      <a:srgbClr val="808080"/>
+    </a:accent4>
+    <a:accent5>
+      <a:srgbClr val="5F5F5F"/>
+    </a:accent5>
+    <a:accent6>
+      <a:srgbClr val="4D4D4D"/>
+    </a:accent6>
+    <a:hlink>
+      <a:srgbClr val="B5D7FC"/>
+    </a:hlink>
+    <a:folHlink>
+      <a:srgbClr val="919191"/>
+    </a:folHlink>
+  </a:clrScheme>
+</a:themeOverride>
+</file>
+
+<file path=ppt/theme/themeOverride3.xml><?xml version="1.0" encoding="utf-8"?>
+<a:themeOverride xmlns:a="http://schemas.openxmlformats.org/drawingml/2006/main">
+  <a:clrScheme name="Custom 2">
+    <a:dk1>
+      <a:srgbClr val="EFEFEF"/>
+    </a:dk1>
+    <a:lt1>
+      <a:srgbClr val="EFEFEF"/>
+    </a:lt1>
+    <a:dk2>
+      <a:srgbClr val="053E7D"/>
+    </a:dk2>
+    <a:lt2>
+      <a:srgbClr val="FFFFFF"/>
+    </a:lt2>
+    <a:accent1>
+      <a:srgbClr val="EFEFEF"/>
+    </a:accent1>
+    <a:accent2>
+      <a:srgbClr val="EFEFEF"/>
+    </a:accent2>
+    <a:accent3>
+      <a:srgbClr val="EFEFEF"/>
+    </a:accent3>
+    <a:accent4>
+      <a:srgbClr val="808080"/>
+    </a:accent4>
+    <a:accent5>
+      <a:srgbClr val="5F5F5F"/>
+    </a:accent5>
+    <a:accent6>
+      <a:srgbClr val="4D4D4D"/>
+    </a:accent6>
+    <a:hlink>
+      <a:srgbClr val="B5D7FC"/>
+    </a:hlink>
+    <a:folHlink>
+      <a:srgbClr val="919191"/>
+    </a:folHlink>
+  </a:clrScheme>
+</a:themeOverride>
+</file>
+
+<file path=ppt/theme/themeOverride4.xml><?xml version="1.0" encoding="utf-8"?>
+<a:themeOverride xmlns:a="http://schemas.openxmlformats.org/drawingml/2006/main">
+  <a:clrScheme name="Custom 2">
+    <a:dk1>
+      <a:srgbClr val="EFEFEF"/>
+    </a:dk1>
+    <a:lt1>
+      <a:srgbClr val="EFEFEF"/>
+    </a:lt1>
+    <a:dk2>
+      <a:srgbClr val="053E7D"/>
+    </a:dk2>
+    <a:lt2>
+      <a:srgbClr val="FFFFFF"/>
+    </a:lt2>
+    <a:accent1>
+      <a:srgbClr val="EFEFEF"/>
+    </a:accent1>
+    <a:accent2>
+      <a:srgbClr val="EFEFEF"/>
+    </a:accent2>
+    <a:accent3>
+      <a:srgbClr val="EFEFEF"/>
+    </a:accent3>
+    <a:accent4>
+      <a:srgbClr val="808080"/>
+    </a:accent4>
+    <a:accent5>
+      <a:srgbClr val="5F5F5F"/>
+    </a:accent5>
+    <a:accent6>
+      <a:srgbClr val="4D4D4D"/>
+    </a:accent6>
+    <a:hlink>
+      <a:srgbClr val="B5D7FC"/>
+    </a:hlink>
+    <a:folHlink>
+      <a:srgbClr val="919191"/>
+    </a:folHlink>
+  </a:clrScheme>
+</a:themeOverride>
+</file>
+
+<file path=ppt/theme/themeOverride5.xml><?xml version="1.0" encoding="utf-8"?>
+<a:themeOverride xmlns:a="http://schemas.openxmlformats.org/drawingml/2006/main">
+  <a:clrScheme name="Custom 2">
+    <a:dk1>
+      <a:srgbClr val="EFEFEF"/>
+    </a:dk1>
+    <a:lt1>
+      <a:srgbClr val="EFEFEF"/>
+    </a:lt1>
+    <a:dk2>
+      <a:srgbClr val="053E7D"/>
+    </a:dk2>
+    <a:lt2>
+      <a:srgbClr val="FFFFFF"/>
+    </a:lt2>
+    <a:accent1>
+      <a:srgbClr val="EFEFEF"/>
+    </a:accent1>
+    <a:accent2>
+      <a:srgbClr val="EFEFEF"/>
+    </a:accent2>
+    <a:accent3>
+      <a:srgbClr val="EFEFEF"/>
+    </a:accent3>
+    <a:accent4>
+      <a:srgbClr val="808080"/>
+    </a:accent4>
+    <a:accent5>
+      <a:srgbClr val="5F5F5F"/>
+    </a:accent5>
+    <a:accent6>
+      <a:srgbClr val="4D4D4D"/>
+    </a:accent6>
+    <a:hlink>
+      <a:srgbClr val="B5D7FC"/>
+    </a:hlink>
+    <a:folHlink>
+      <a:srgbClr val="919191"/>
+    </a:folHlink>
+  </a:clrScheme>
+</a:themeOverride>
+</file>
+
+<file path=ppt/theme/themeOverride6.xml><?xml version="1.0" encoding="utf-8"?>
+<a:themeOverride xmlns:a="http://schemas.openxmlformats.org/drawingml/2006/main">
+  <a:clrScheme name="Custom 2">
+    <a:dk1>
+      <a:srgbClr val="EFEFEF"/>
+    </a:dk1>
+    <a:lt1>
+      <a:srgbClr val="EFEFEF"/>
+    </a:lt1>
+    <a:dk2>
+      <a:srgbClr val="053E7D"/>
+    </a:dk2>
+    <a:lt2>
+      <a:srgbClr val="FFFFFF"/>
+    </a:lt2>
+    <a:accent1>
+      <a:srgbClr val="EFEFEF"/>
+    </a:accent1>
+    <a:accent2>
+      <a:srgbClr val="EFEFEF"/>
+    </a:accent2>
+    <a:accent3>
+      <a:srgbClr val="EFEFEF"/>
+    </a:accent3>
+    <a:accent4>
+      <a:srgbClr val="808080"/>
+    </a:accent4>
+    <a:accent5>
+      <a:srgbClr val="5F5F5F"/>
+    </a:accent5>
+    <a:accent6>
+      <a:srgbClr val="4D4D4D"/>
+    </a:accent6>
+    <a:hlink>
+      <a:srgbClr val="B5D7FC"/>
+    </a:hlink>
+    <a:folHlink>
+      <a:srgbClr val="919191"/>
+    </a:folHlink>
+  </a:clrScheme>
+</a:themeOverride>
 </file>
</xml_diff>

<commit_message>
Clarified classifier vs regressor.
</commit_message>
<xml_diff>
--- a/Session 7 - Python/Instructional Material/Session 7 - Python Brief Intro to Machine Learning with Scikit Learn.pptx
+++ b/Session 7 - Python/Instructional Material/Session 7 - Python Brief Intro to Machine Learning with Scikit Learn.pptx
@@ -10,35 +10,36 @@
     <p:sldId id="283" r:id="rId4"/>
     <p:sldId id="379" r:id="rId5"/>
     <p:sldId id="408" r:id="rId6"/>
-    <p:sldId id="381" r:id="rId7"/>
-    <p:sldId id="409" r:id="rId8"/>
-    <p:sldId id="380" r:id="rId9"/>
-    <p:sldId id="383" r:id="rId10"/>
-    <p:sldId id="382" r:id="rId11"/>
-    <p:sldId id="407" r:id="rId12"/>
-    <p:sldId id="378" r:id="rId13"/>
-    <p:sldId id="388" r:id="rId14"/>
-    <p:sldId id="387" r:id="rId15"/>
-    <p:sldId id="389" r:id="rId16"/>
-    <p:sldId id="401" r:id="rId17"/>
-    <p:sldId id="403" r:id="rId18"/>
-    <p:sldId id="402" r:id="rId19"/>
-    <p:sldId id="406" r:id="rId20"/>
-    <p:sldId id="404" r:id="rId21"/>
-    <p:sldId id="377" r:id="rId22"/>
-    <p:sldId id="390" r:id="rId23"/>
-    <p:sldId id="391" r:id="rId24"/>
-    <p:sldId id="396" r:id="rId25"/>
-    <p:sldId id="397" r:id="rId26"/>
-    <p:sldId id="398" r:id="rId27"/>
-    <p:sldId id="399" r:id="rId28"/>
-    <p:sldId id="376" r:id="rId29"/>
-    <p:sldId id="405" r:id="rId30"/>
-    <p:sldId id="385" r:id="rId31"/>
-    <p:sldId id="386" r:id="rId32"/>
-    <p:sldId id="400" r:id="rId33"/>
-    <p:sldId id="384" r:id="rId34"/>
-    <p:sldId id="375" r:id="rId35"/>
+    <p:sldId id="410" r:id="rId7"/>
+    <p:sldId id="381" r:id="rId8"/>
+    <p:sldId id="409" r:id="rId9"/>
+    <p:sldId id="380" r:id="rId10"/>
+    <p:sldId id="383" r:id="rId11"/>
+    <p:sldId id="382" r:id="rId12"/>
+    <p:sldId id="407" r:id="rId13"/>
+    <p:sldId id="378" r:id="rId14"/>
+    <p:sldId id="388" r:id="rId15"/>
+    <p:sldId id="387" r:id="rId16"/>
+    <p:sldId id="389" r:id="rId17"/>
+    <p:sldId id="401" r:id="rId18"/>
+    <p:sldId id="403" r:id="rId19"/>
+    <p:sldId id="402" r:id="rId20"/>
+    <p:sldId id="406" r:id="rId21"/>
+    <p:sldId id="404" r:id="rId22"/>
+    <p:sldId id="377" r:id="rId23"/>
+    <p:sldId id="390" r:id="rId24"/>
+    <p:sldId id="391" r:id="rId25"/>
+    <p:sldId id="396" r:id="rId26"/>
+    <p:sldId id="397" r:id="rId27"/>
+    <p:sldId id="398" r:id="rId28"/>
+    <p:sldId id="399" r:id="rId29"/>
+    <p:sldId id="376" r:id="rId30"/>
+    <p:sldId id="405" r:id="rId31"/>
+    <p:sldId id="385" r:id="rId32"/>
+    <p:sldId id="386" r:id="rId33"/>
+    <p:sldId id="400" r:id="rId34"/>
+    <p:sldId id="384" r:id="rId35"/>
+    <p:sldId id="375" r:id="rId36"/>
   </p:sldIdLst>
   <p:sldSz cx="9144000" cy="6858000" type="screen4x3"/>
   <p:notesSz cx="6858000" cy="9144000"/>
@@ -335,7 +336,7 @@
           <a:p>
             <a:fld id="{547641E8-73DF-4AD2-848E-3103064331B1}" type="datetimeFigureOut">
               <a:rPr lang="en-US" smtClean="0"/>
-              <a:t>11/22/2021</a:t>
+              <a:t>11/24/2021</a:t>
             </a:fld>
             <a:endParaRPr lang="en-US"/>
           </a:p>
@@ -503,7 +504,7 @@
           <a:p>
             <a:fld id="{547641E8-73DF-4AD2-848E-3103064331B1}" type="datetimeFigureOut">
               <a:rPr lang="en-US" smtClean="0"/>
-              <a:t>11/22/2021</a:t>
+              <a:t>11/24/2021</a:t>
             </a:fld>
             <a:endParaRPr lang="en-US"/>
           </a:p>
@@ -681,7 +682,7 @@
           <a:p>
             <a:fld id="{547641E8-73DF-4AD2-848E-3103064331B1}" type="datetimeFigureOut">
               <a:rPr lang="en-US" smtClean="0"/>
-              <a:t>11/22/2021</a:t>
+              <a:t>11/24/2021</a:t>
             </a:fld>
             <a:endParaRPr lang="en-US"/>
           </a:p>
@@ -928,7 +929,7 @@
                 </a:solidFill>
               </a:rPr>
               <a:pPr/>
-              <a:t>11/22/2021</a:t>
+              <a:t>11/24/2021</a:t>
             </a:fld>
             <a:endParaRPr lang="en-US">
               <a:solidFill>
@@ -1128,7 +1129,7 @@
                 </a:solidFill>
               </a:rPr>
               <a:pPr/>
-              <a:t>11/22/2021</a:t>
+              <a:t>11/24/2021</a:t>
             </a:fld>
             <a:endParaRPr lang="en-US">
               <a:solidFill>
@@ -1405,7 +1406,7 @@
                 </a:solidFill>
               </a:rPr>
               <a:pPr/>
-              <a:t>11/22/2021</a:t>
+              <a:t>11/24/2021</a:t>
             </a:fld>
             <a:endParaRPr lang="en-US">
               <a:solidFill>
@@ -1722,7 +1723,7 @@
                 </a:solidFill>
               </a:rPr>
               <a:pPr/>
-              <a:t>11/22/2021</a:t>
+              <a:t>11/24/2021</a:t>
             </a:fld>
             <a:endParaRPr lang="en-US">
               <a:solidFill>
@@ -2173,7 +2174,7 @@
                 </a:solidFill>
               </a:rPr>
               <a:pPr/>
-              <a:t>11/22/2021</a:t>
+              <a:t>11/24/2021</a:t>
             </a:fld>
             <a:endParaRPr lang="en-US">
               <a:solidFill>
@@ -2322,7 +2323,7 @@
                 </a:solidFill>
               </a:rPr>
               <a:pPr/>
-              <a:t>11/22/2021</a:t>
+              <a:t>11/24/2021</a:t>
             </a:fld>
             <a:endParaRPr lang="en-US">
               <a:solidFill>
@@ -2449,7 +2450,7 @@
                 </a:solidFill>
               </a:rPr>
               <a:pPr/>
-              <a:t>11/22/2021</a:t>
+              <a:t>11/24/2021</a:t>
             </a:fld>
             <a:endParaRPr lang="en-US">
               <a:solidFill>
@@ -2756,7 +2757,7 @@
                 </a:solidFill>
               </a:rPr>
               <a:pPr/>
-              <a:t>11/22/2021</a:t>
+              <a:t>11/24/2021</a:t>
             </a:fld>
             <a:endParaRPr lang="en-US">
               <a:solidFill>
@@ -2949,7 +2950,7 @@
           <a:p>
             <a:fld id="{547641E8-73DF-4AD2-848E-3103064331B1}" type="datetimeFigureOut">
               <a:rPr lang="en-US" smtClean="0"/>
-              <a:t>11/22/2021</a:t>
+              <a:t>11/24/2021</a:t>
             </a:fld>
             <a:endParaRPr lang="en-US"/>
           </a:p>
@@ -3208,7 +3209,7 @@
                 </a:solidFill>
               </a:rPr>
               <a:pPr/>
-              <a:t>11/22/2021</a:t>
+              <a:t>11/24/2021</a:t>
             </a:fld>
             <a:endParaRPr lang="en-US">
               <a:solidFill>
@@ -3408,7 +3409,7 @@
                 </a:solidFill>
               </a:rPr>
               <a:pPr/>
-              <a:t>11/22/2021</a:t>
+              <a:t>11/24/2021</a:t>
             </a:fld>
             <a:endParaRPr lang="en-US">
               <a:solidFill>
@@ -3618,7 +3619,7 @@
                 </a:solidFill>
               </a:rPr>
               <a:pPr/>
-              <a:t>11/22/2021</a:t>
+              <a:t>11/24/2021</a:t>
             </a:fld>
             <a:endParaRPr lang="en-US">
               <a:solidFill>
@@ -3888,7 +3889,7 @@
           <a:p>
             <a:fld id="{547641E8-73DF-4AD2-848E-3103064331B1}" type="datetimeFigureOut">
               <a:rPr lang="en-US" smtClean="0"/>
-              <a:t>11/22/2021</a:t>
+              <a:t>11/24/2021</a:t>
             </a:fld>
             <a:endParaRPr lang="en-US"/>
           </a:p>
@@ -4173,7 +4174,7 @@
           <a:p>
             <a:fld id="{547641E8-73DF-4AD2-848E-3103064331B1}" type="datetimeFigureOut">
               <a:rPr lang="en-US" smtClean="0"/>
-              <a:t>11/22/2021</a:t>
+              <a:t>11/24/2021</a:t>
             </a:fld>
             <a:endParaRPr lang="en-US"/>
           </a:p>
@@ -4592,7 +4593,7 @@
           <a:p>
             <a:fld id="{547641E8-73DF-4AD2-848E-3103064331B1}" type="datetimeFigureOut">
               <a:rPr lang="en-US" smtClean="0"/>
-              <a:t>11/22/2021</a:t>
+              <a:t>11/24/2021</a:t>
             </a:fld>
             <a:endParaRPr lang="en-US"/>
           </a:p>
@@ -4709,7 +4710,7 @@
           <a:p>
             <a:fld id="{547641E8-73DF-4AD2-848E-3103064331B1}" type="datetimeFigureOut">
               <a:rPr lang="en-US" smtClean="0"/>
-              <a:t>11/22/2021</a:t>
+              <a:t>11/24/2021</a:t>
             </a:fld>
             <a:endParaRPr lang="en-US"/>
           </a:p>
@@ -4804,7 +4805,7 @@
           <a:p>
             <a:fld id="{547641E8-73DF-4AD2-848E-3103064331B1}" type="datetimeFigureOut">
               <a:rPr lang="en-US" smtClean="0"/>
-              <a:t>11/22/2021</a:t>
+              <a:t>11/24/2021</a:t>
             </a:fld>
             <a:endParaRPr lang="en-US"/>
           </a:p>
@@ -5079,7 +5080,7 @@
           <a:p>
             <a:fld id="{547641E8-73DF-4AD2-848E-3103064331B1}" type="datetimeFigureOut">
               <a:rPr lang="en-US" smtClean="0"/>
-              <a:t>11/22/2021</a:t>
+              <a:t>11/24/2021</a:t>
             </a:fld>
             <a:endParaRPr lang="en-US"/>
           </a:p>
@@ -5331,7 +5332,7 @@
           <a:p>
             <a:fld id="{547641E8-73DF-4AD2-848E-3103064331B1}" type="datetimeFigureOut">
               <a:rPr lang="en-US" smtClean="0"/>
-              <a:t>11/22/2021</a:t>
+              <a:t>11/24/2021</a:t>
             </a:fld>
             <a:endParaRPr lang="en-US"/>
           </a:p>
@@ -5545,7 +5546,7 @@
           <a:p>
             <a:fld id="{547641E8-73DF-4AD2-848E-3103064331B1}" type="datetimeFigureOut">
               <a:rPr lang="en-US" smtClean="0"/>
-              <a:t>11/22/2021</a:t>
+              <a:t>11/24/2021</a:t>
             </a:fld>
             <a:endParaRPr lang="en-US"/>
           </a:p>
@@ -6060,7 +6061,7 @@
                 </a:solidFill>
               </a:rPr>
               <a:pPr/>
-              <a:t>11/22/2021</a:t>
+              <a:t>11/24/2021</a:t>
             </a:fld>
             <a:endParaRPr lang="en-US">
               <a:solidFill>
@@ -6484,7 +6485,12 @@
             <p:ph type="ctrTitle"/>
           </p:nvPr>
         </p:nvSpPr>
-        <p:spPr/>
+        <p:spPr>
+          <a:xfrm>
+            <a:off x="685800" y="914400"/>
+            <a:ext cx="7772400" cy="1470025"/>
+          </a:xfrm>
+        </p:spPr>
         <p:txBody>
           <a:bodyPr>
             <a:normAutofit fontScale="90000"/>
@@ -6493,17 +6499,8 @@
           <a:p>
             <a:r>
               <a:rPr lang="en-US" dirty="0"/>
-              <a:t>Session 7 – Python Brief Intro to Machine Learning with </a:t>
-            </a:r>
-            <a:r>
-              <a:rPr lang="en-US" dirty="0" err="1"/>
-              <a:t>Scikit</a:t>
-            </a:r>
-            <a:r>
-              <a:rPr lang="en-US"/>
-              <a:t> Learn</a:t>
-            </a:r>
-            <a:endParaRPr lang="en-US" dirty="0"/>
+              <a:t>Session 7 – Python Brief Intro to Machine Learning with Scikit Learn</a:t>
+            </a:r>
           </a:p>
         </p:txBody>
       </p:sp>
@@ -6517,12 +6514,20 @@
             <p:ph type="subTitle" idx="1"/>
           </p:nvPr>
         </p:nvSpPr>
-        <p:spPr/>
-        <p:txBody>
-          <a:bodyPr/>
-          <a:lstStyle/>
-          <a:p>
-            <a:endParaRPr lang="en-US"/>
+        <p:spPr>
+          <a:xfrm>
+            <a:off x="1371600" y="4506967"/>
+            <a:ext cx="6400800" cy="1752600"/>
+          </a:xfrm>
+        </p:spPr>
+        <p:txBody>
+          <a:bodyPr/>
+          <a:lstStyle/>
+          <a:p>
+            <a:r>
+              <a:rPr lang="en-US" dirty="0"/>
+              <a:t>Douglas Bowman</a:t>
+            </a:r>
           </a:p>
         </p:txBody>
       </p:sp>
@@ -6609,21 +6614,21 @@
           <a:p>
             <a:r>
               <a:rPr lang="en-US" dirty="0"/>
-              <a:t>Label (Classification Problems)</a:t>
+              <a:t>Sample</a:t>
             </a:r>
           </a:p>
           <a:p>
             <a:pPr lvl="1"/>
             <a:r>
               <a:rPr lang="en-US" dirty="0"/>
-              <a:t>The name associated with data point (row) for classification problems.  </a:t>
+              <a:t>A single set of data, or a data point.</a:t>
             </a:r>
           </a:p>
           <a:p>
             <a:pPr lvl="1"/>
             <a:r>
               <a:rPr lang="en-US" dirty="0"/>
-              <a:t>This is generally the thing we are trying to predict.</a:t>
+              <a:t>This is usually a row in a data table.</a:t>
             </a:r>
           </a:p>
           <a:p>
@@ -6641,7 +6646,7 @@
     </p:spTree>
     <p:extLst>
       <p:ext uri="{BB962C8B-B14F-4D97-AF65-F5344CB8AC3E}">
-        <p14:creationId xmlns:p14="http://schemas.microsoft.com/office/powerpoint/2010/main" val="3114704726"/>
+        <p14:creationId xmlns:p14="http://schemas.microsoft.com/office/powerpoint/2010/main" val="1110144452"/>
       </p:ext>
     </p:extLst>
   </p:cSld>
@@ -6694,14 +6699,12 @@
         </p:nvSpPr>
         <p:spPr/>
         <p:txBody>
-          <a:bodyPr>
-            <a:normAutofit/>
-          </a:bodyPr>
-          <a:lstStyle/>
-          <a:p>
-            <a:r>
-              <a:rPr lang="en-US" dirty="0"/>
-              <a:t>General Model Types</a:t>
+          <a:bodyPr/>
+          <a:lstStyle/>
+          <a:p>
+            <a:r>
+              <a:rPr lang="en-US" dirty="0"/>
+              <a:t>Definition</a:t>
             </a:r>
           </a:p>
         </p:txBody>
@@ -6718,32 +6721,29 @@
         </p:nvSpPr>
         <p:spPr/>
         <p:txBody>
-          <a:bodyPr>
-            <a:normAutofit/>
-          </a:bodyPr>
-          <a:lstStyle/>
-          <a:p>
-            <a:r>
-              <a:rPr lang="en-US" dirty="0"/>
-              <a:t>Supervised</a:t>
+          <a:bodyPr/>
+          <a:lstStyle/>
+          <a:p>
+            <a:r>
+              <a:rPr lang="en-US" dirty="0"/>
+              <a:t>Label (Classification Problems)</a:t>
             </a:r>
           </a:p>
           <a:p>
             <a:pPr lvl="1"/>
             <a:r>
               <a:rPr lang="en-US" dirty="0"/>
-              <a:t>Machine learning model is given a set of data to build experience with.</a:t>
+              <a:t>The name associated with data point (row) for classification problems.  </a:t>
             </a:r>
           </a:p>
           <a:p>
             <a:pPr lvl="1"/>
             <a:r>
               <a:rPr lang="en-US" dirty="0"/>
-              <a:t>Data is given with features, and an algorithm is given to the model on how to best categorize and group the data.</a:t>
-            </a:r>
-          </a:p>
-          <a:p>
-            <a:pPr lvl="1"/>
+              <a:t>This is generally the thing we are trying to predict.</a:t>
+            </a:r>
+          </a:p>
+          <a:p>
             <a:endParaRPr lang="en-US" dirty="0"/>
           </a:p>
           <a:p>
@@ -6758,7 +6758,7 @@
     </p:spTree>
     <p:extLst>
       <p:ext uri="{BB962C8B-B14F-4D97-AF65-F5344CB8AC3E}">
-        <p14:creationId xmlns:p14="http://schemas.microsoft.com/office/powerpoint/2010/main" val="3051561418"/>
+        <p14:creationId xmlns:p14="http://schemas.microsoft.com/office/powerpoint/2010/main" val="3114704726"/>
       </p:ext>
     </p:extLst>
   </p:cSld>
@@ -6842,21 +6842,21 @@
           <a:p>
             <a:r>
               <a:rPr lang="en-US" dirty="0"/>
-              <a:t>Unsupervised</a:t>
+              <a:t>Supervised</a:t>
             </a:r>
           </a:p>
           <a:p>
             <a:pPr lvl="1"/>
             <a:r>
               <a:rPr lang="en-US" dirty="0"/>
-              <a:t>The model determines the data for itself, and builds the model accordingly.</a:t>
+              <a:t>Machine learning model is given a set of data to build experience with.</a:t>
             </a:r>
           </a:p>
           <a:p>
             <a:pPr lvl="1"/>
             <a:r>
               <a:rPr lang="en-US" dirty="0"/>
-              <a:t>Features and grouping data is done by the algorithm.</a:t>
+              <a:t>Data is given with features, and an algorithm is given to the model on how to best categorize and group the data.</a:t>
             </a:r>
           </a:p>
           <a:p>
@@ -6875,7 +6875,7 @@
     </p:spTree>
     <p:extLst>
       <p:ext uri="{BB962C8B-B14F-4D97-AF65-F5344CB8AC3E}">
-        <p14:creationId xmlns:p14="http://schemas.microsoft.com/office/powerpoint/2010/main" val="843243868"/>
+        <p14:creationId xmlns:p14="http://schemas.microsoft.com/office/powerpoint/2010/main" val="3051561418"/>
       </p:ext>
     </p:extLst>
   </p:cSld>
@@ -6959,28 +6959,21 @@
           <a:p>
             <a:r>
               <a:rPr lang="en-US" dirty="0"/>
-              <a:t>Reinforcement</a:t>
+              <a:t>Unsupervised</a:t>
             </a:r>
           </a:p>
           <a:p>
             <a:pPr lvl="1"/>
             <a:r>
               <a:rPr lang="en-US" dirty="0"/>
-              <a:t>The algorithm “learns” from making mistakes.</a:t>
+              <a:t>The model determines the data for itself, and builds the model accordingly.</a:t>
             </a:r>
           </a:p>
           <a:p>
             <a:pPr lvl="1"/>
             <a:r>
               <a:rPr lang="en-US" dirty="0"/>
-              <a:t>There must be some sort of way to tell the algorithm when it makes a correction in the right direction, and a way to tell the algorithm a correction was made in the wrong direction.</a:t>
-            </a:r>
-          </a:p>
-          <a:p>
-            <a:pPr lvl="1"/>
-            <a:r>
-              <a:rPr lang="en-US" dirty="0"/>
-              <a:t>Initially, the model built is very inaccurate, but gets better with time.</a:t>
+              <a:t>Features and grouping data is done by the algorithm.</a:t>
             </a:r>
           </a:p>
           <a:p>
@@ -6999,7 +6992,7 @@
     </p:spTree>
     <p:extLst>
       <p:ext uri="{BB962C8B-B14F-4D97-AF65-F5344CB8AC3E}">
-        <p14:creationId xmlns:p14="http://schemas.microsoft.com/office/powerpoint/2010/main" val="3389942429"/>
+        <p14:creationId xmlns:p14="http://schemas.microsoft.com/office/powerpoint/2010/main" val="843243868"/>
       </p:ext>
     </p:extLst>
   </p:cSld>
@@ -7083,7 +7076,28 @@
           <a:p>
             <a:r>
               <a:rPr lang="en-US" dirty="0"/>
-              <a:t>This part of the Python course will focus on supervised learning, as this is all I know.</a:t>
+              <a:t>Reinforcement</a:t>
+            </a:r>
+          </a:p>
+          <a:p>
+            <a:pPr lvl="1"/>
+            <a:r>
+              <a:rPr lang="en-US" dirty="0"/>
+              <a:t>The algorithm “learns” from making mistakes.</a:t>
+            </a:r>
+          </a:p>
+          <a:p>
+            <a:pPr lvl="1"/>
+            <a:r>
+              <a:rPr lang="en-US" dirty="0"/>
+              <a:t>There must be some sort of way to tell the algorithm when it makes a correction in the right direction, and a way to tell the algorithm a correction was made in the wrong direction.</a:t>
+            </a:r>
+          </a:p>
+          <a:p>
+            <a:pPr lvl="1"/>
+            <a:r>
+              <a:rPr lang="en-US" dirty="0"/>
+              <a:t>Initially, the model built is very inaccurate, but gets better with time.</a:t>
             </a:r>
           </a:p>
           <a:p>
@@ -7102,7 +7116,7 @@
     </p:spTree>
     <p:extLst>
       <p:ext uri="{BB962C8B-B14F-4D97-AF65-F5344CB8AC3E}">
-        <p14:creationId xmlns:p14="http://schemas.microsoft.com/office/powerpoint/2010/main" val="2610853396"/>
+        <p14:creationId xmlns:p14="http://schemas.microsoft.com/office/powerpoint/2010/main" val="3389942429"/>
       </p:ext>
     </p:extLst>
   </p:cSld>
@@ -7162,7 +7176,7 @@
           <a:p>
             <a:r>
               <a:rPr lang="en-US" dirty="0"/>
-              <a:t>General Workflow</a:t>
+              <a:t>General Model Types</a:t>
             </a:r>
           </a:p>
         </p:txBody>
@@ -7186,22 +7200,12 @@
           <a:p>
             <a:r>
               <a:rPr lang="en-US" dirty="0"/>
-              <a:t>Get data</a:t>
+              <a:t>This part of the Python course will focus on supervised learning, as this is all I know.</a:t>
             </a:r>
           </a:p>
           <a:p>
             <a:pPr lvl="1"/>
-            <a:r>
-              <a:rPr lang="en-US" dirty="0"/>
-              <a:t>Get set of data about what we wish to predict.</a:t>
-            </a:r>
-          </a:p>
-          <a:p>
-            <a:pPr lvl="1"/>
-            <a:r>
-              <a:rPr lang="en-US" dirty="0"/>
-              <a:t>Include the labels.</a:t>
-            </a:r>
+            <a:endParaRPr lang="en-US" dirty="0"/>
           </a:p>
           <a:p>
             <a:pPr lvl="2"/>
@@ -7215,7 +7219,7 @@
     </p:spTree>
     <p:extLst>
       <p:ext uri="{BB962C8B-B14F-4D97-AF65-F5344CB8AC3E}">
-        <p14:creationId xmlns:p14="http://schemas.microsoft.com/office/powerpoint/2010/main" val="504396564"/>
+        <p14:creationId xmlns:p14="http://schemas.microsoft.com/office/powerpoint/2010/main" val="2610853396"/>
       </p:ext>
     </p:extLst>
   </p:cSld>
@@ -7299,33 +7303,22 @@
           <a:p>
             <a:r>
               <a:rPr lang="en-US" dirty="0"/>
-              <a:t>Build model</a:t>
+              <a:t>Get data</a:t>
             </a:r>
           </a:p>
           <a:p>
             <a:pPr lvl="1"/>
             <a:r>
               <a:rPr lang="en-US" dirty="0"/>
-              <a:t>Select an appropriate classifier.</a:t>
+              <a:t>Get set of data about what we wish to predict.</a:t>
             </a:r>
           </a:p>
           <a:p>
             <a:pPr lvl="1"/>
             <a:r>
               <a:rPr lang="en-US" dirty="0"/>
-              <a:t>The model should be trained with a majority of the data we gathered, say with 75% of the data.</a:t>
-            </a:r>
-          </a:p>
-          <a:p>
-            <a:pPr lvl="1"/>
-            <a:r>
-              <a:rPr lang="en-US" dirty="0"/>
-              <a:t>The other 25% can be used to test how good our model can predict.</a:t>
-            </a:r>
-          </a:p>
-          <a:p>
-            <a:pPr lvl="1"/>
-            <a:endParaRPr lang="en-US" dirty="0"/>
+              <a:t>Include the labels.</a:t>
+            </a:r>
           </a:p>
           <a:p>
             <a:pPr lvl="2"/>
@@ -7339,7 +7332,7 @@
     </p:spTree>
     <p:extLst>
       <p:ext uri="{BB962C8B-B14F-4D97-AF65-F5344CB8AC3E}">
-        <p14:creationId xmlns:p14="http://schemas.microsoft.com/office/powerpoint/2010/main" val="823098654"/>
+        <p14:creationId xmlns:p14="http://schemas.microsoft.com/office/powerpoint/2010/main" val="504396564"/>
       </p:ext>
     </p:extLst>
   </p:cSld>
@@ -7423,21 +7416,28 @@
           <a:p>
             <a:r>
               <a:rPr lang="en-US" dirty="0"/>
-              <a:t>Evaluate accuracy</a:t>
+              <a:t>Build model</a:t>
             </a:r>
           </a:p>
           <a:p>
             <a:pPr lvl="1"/>
             <a:r>
               <a:rPr lang="en-US" dirty="0"/>
-              <a:t>The model needs to be evaluated for accuracy to ensure our predictions will have a high degree of correctness.</a:t>
+              <a:t>Select an appropriate classifier.</a:t>
             </a:r>
           </a:p>
           <a:p>
             <a:pPr lvl="1"/>
             <a:r>
               <a:rPr lang="en-US" dirty="0"/>
-              <a:t>This is usually done using the 25% of data that we did not use for training.</a:t>
+              <a:t>The model should be trained with a majority of the data we gathered, say with 75% of the data.</a:t>
+            </a:r>
+          </a:p>
+          <a:p>
+            <a:pPr lvl="1"/>
+            <a:r>
+              <a:rPr lang="en-US" dirty="0"/>
+              <a:t>The other 25% can be used to test how good our model can predict.</a:t>
             </a:r>
           </a:p>
           <a:p>
@@ -7456,7 +7456,7 @@
     </p:spTree>
     <p:extLst>
       <p:ext uri="{BB962C8B-B14F-4D97-AF65-F5344CB8AC3E}">
-        <p14:creationId xmlns:p14="http://schemas.microsoft.com/office/powerpoint/2010/main" val="3005493130"/>
+        <p14:creationId xmlns:p14="http://schemas.microsoft.com/office/powerpoint/2010/main" val="823098654"/>
       </p:ext>
     </p:extLst>
   </p:cSld>
@@ -7547,28 +7547,15 @@
             <a:pPr lvl="1"/>
             <a:r>
               <a:rPr lang="en-US" dirty="0"/>
-              <a:t>There is no such thing as 100% accuracy unless you have toy data, or a completely defined system that does not need machine learning.</a:t>
+              <a:t>The model needs to be evaluated for accuracy to ensure our predictions will have a high degree of correctness.</a:t>
             </a:r>
           </a:p>
           <a:p>
             <a:pPr lvl="1"/>
             <a:r>
               <a:rPr lang="en-US" dirty="0"/>
-              <a:t>If we get 100% accuracy, and the above are not true, we have most likely over-fitted our model, possibly by using training data as test data.</a:t>
-            </a:r>
-          </a:p>
-          <a:p>
-            <a:pPr lvl="2"/>
-            <a:r>
-              <a:rPr lang="en-US" dirty="0"/>
-              <a:t>Leads to inaccurate predictions on new data without known labels</a:t>
-            </a:r>
-          </a:p>
-          <a:p>
-            <a:pPr marL="457200" lvl="1" indent="0">
-              <a:buNone/>
-            </a:pPr>
-            <a:endParaRPr lang="en-US" dirty="0"/>
+              <a:t>This is usually done using the 25% of data that we did not use for training.</a:t>
+            </a:r>
           </a:p>
           <a:p>
             <a:pPr lvl="1"/>
@@ -7586,7 +7573,7 @@
     </p:spTree>
     <p:extLst>
       <p:ext uri="{BB962C8B-B14F-4D97-AF65-F5344CB8AC3E}">
-        <p14:creationId xmlns:p14="http://schemas.microsoft.com/office/powerpoint/2010/main" val="140326188"/>
+        <p14:creationId xmlns:p14="http://schemas.microsoft.com/office/powerpoint/2010/main" val="3005493130"/>
       </p:ext>
     </p:extLst>
   </p:cSld>
@@ -7670,15 +7657,35 @@
           <a:p>
             <a:r>
               <a:rPr lang="en-US" dirty="0"/>
-              <a:t>Predict real-world outcomes</a:t>
+              <a:t>Evaluate accuracy</a:t>
             </a:r>
           </a:p>
           <a:p>
             <a:pPr lvl="1"/>
             <a:r>
               <a:rPr lang="en-US" dirty="0"/>
-              <a:t>Once the model is as accurate as we want, the model can be used to predict real-world outcomes that are unknown.</a:t>
-            </a:r>
+              <a:t>There is no such thing as 100% accuracy unless you have toy data, or a completely defined system that does not need machine learning.</a:t>
+            </a:r>
+          </a:p>
+          <a:p>
+            <a:pPr lvl="1"/>
+            <a:r>
+              <a:rPr lang="en-US" dirty="0"/>
+              <a:t>If we get 100% accuracy, and the above are not true, we have most likely over-fitted our model, possibly by using training data as test data.</a:t>
+            </a:r>
+          </a:p>
+          <a:p>
+            <a:pPr lvl="2"/>
+            <a:r>
+              <a:rPr lang="en-US" dirty="0"/>
+              <a:t>Leads to inaccurate predictions on new data without known labels</a:t>
+            </a:r>
+          </a:p>
+          <a:p>
+            <a:pPr marL="457200" lvl="1" indent="0">
+              <a:buNone/>
+            </a:pPr>
+            <a:endParaRPr lang="en-US" dirty="0"/>
           </a:p>
           <a:p>
             <a:pPr lvl="1"/>
@@ -7696,7 +7703,7 @@
     </p:spTree>
     <p:extLst>
       <p:ext uri="{BB962C8B-B14F-4D97-AF65-F5344CB8AC3E}">
-        <p14:creationId xmlns:p14="http://schemas.microsoft.com/office/powerpoint/2010/main" val="293541596"/>
+        <p14:creationId xmlns:p14="http://schemas.microsoft.com/office/powerpoint/2010/main" val="140326188"/>
       </p:ext>
     </p:extLst>
   </p:cSld>
@@ -7879,12 +7886,14 @@
         </p:nvSpPr>
         <p:spPr/>
         <p:txBody>
-          <a:bodyPr/>
-          <a:lstStyle/>
-          <a:p>
-            <a:r>
-              <a:rPr lang="en-US" dirty="0"/>
-              <a:t>Linear Classifiers</a:t>
+          <a:bodyPr>
+            <a:normAutofit/>
+          </a:bodyPr>
+          <a:lstStyle/>
+          <a:p>
+            <a:r>
+              <a:rPr lang="en-US" dirty="0"/>
+              <a:t>General Workflow</a:t>
             </a:r>
           </a:p>
         </p:txBody>
@@ -7901,55 +7910,26 @@
         </p:nvSpPr>
         <p:spPr/>
         <p:txBody>
-          <a:bodyPr/>
-          <a:lstStyle/>
-          <a:p>
-            <a:r>
-              <a:rPr lang="en-US" dirty="0"/>
-              <a:t>List of some Types we will Cover</a:t>
+          <a:bodyPr>
+            <a:normAutofit/>
+          </a:bodyPr>
+          <a:lstStyle/>
+          <a:p>
+            <a:r>
+              <a:rPr lang="en-US" dirty="0"/>
+              <a:t>Predict real-world outcomes</a:t>
             </a:r>
           </a:p>
           <a:p>
             <a:pPr lvl="1"/>
             <a:r>
               <a:rPr lang="en-US" dirty="0"/>
-              <a:t>K-Nearest Neighbors</a:t>
+              <a:t>Once the model is as accurate as we want, the model can be used to predict real-world outcomes that are unknown.</a:t>
             </a:r>
           </a:p>
           <a:p>
             <a:pPr lvl="1"/>
-            <a:r>
-              <a:rPr lang="en-US" dirty="0"/>
-              <a:t>Lasso</a:t>
-            </a:r>
-          </a:p>
-          <a:p>
-            <a:pPr lvl="1"/>
-            <a:r>
-              <a:rPr lang="en-US" dirty="0"/>
-              <a:t>Regression</a:t>
-            </a:r>
-          </a:p>
-          <a:p>
-            <a:pPr lvl="1"/>
-            <a:r>
-              <a:rPr lang="en-US" dirty="0"/>
-              <a:t>Tree</a:t>
-            </a:r>
-          </a:p>
-          <a:p>
-            <a:pPr lvl="1"/>
-            <a:r>
-              <a:rPr lang="en-US" dirty="0"/>
-              <a:t>Forest</a:t>
-            </a:r>
-          </a:p>
-          <a:p>
-            <a:pPr lvl="1"/>
-            <a:r>
-              <a:rPr lang="en-US" dirty="0"/>
-              <a:t>Gradient-Boosted Forest</a:t>
-            </a:r>
+            <a:endParaRPr lang="en-US" dirty="0"/>
           </a:p>
           <a:p>
             <a:pPr lvl="2"/>
@@ -7963,7 +7943,7 @@
     </p:spTree>
     <p:extLst>
       <p:ext uri="{BB962C8B-B14F-4D97-AF65-F5344CB8AC3E}">
-        <p14:creationId xmlns:p14="http://schemas.microsoft.com/office/powerpoint/2010/main" val="3895443771"/>
+        <p14:creationId xmlns:p14="http://schemas.microsoft.com/office/powerpoint/2010/main" val="293541596"/>
       </p:ext>
     </p:extLst>
   </p:cSld>
@@ -7979,7 +7959,7 @@
     <p:bg>
       <p:bgPr>
         <a:blipFill dpi="0" rotWithShape="1">
-          <a:blip r:embed="rId3">
+          <a:blip r:embed="rId2">
             <a:lum/>
           </a:blip>
           <a:srcRect/>
@@ -8021,7 +8001,7 @@
           <a:p>
             <a:r>
               <a:rPr lang="en-US" dirty="0"/>
-              <a:t>Linear Models</a:t>
+              <a:t>Linear Classifiers</a:t>
             </a:r>
           </a:p>
         </p:txBody>
@@ -8043,6 +8023,13 @@
           <a:p>
             <a:r>
               <a:rPr lang="en-US" dirty="0"/>
+              <a:t>List of some Types we will Cover</a:t>
+            </a:r>
+          </a:p>
+          <a:p>
+            <a:pPr lvl="1"/>
+            <a:r>
+              <a:rPr lang="en-US" dirty="0"/>
               <a:t>K-Nearest Neighbors</a:t>
             </a:r>
           </a:p>
@@ -8050,7 +8037,35 @@
             <a:pPr lvl="1"/>
             <a:r>
               <a:rPr lang="en-US" dirty="0"/>
-              <a:t>Predicts outcome by finding the closest matching data point.</a:t>
+              <a:t>Lasso</a:t>
+            </a:r>
+          </a:p>
+          <a:p>
+            <a:pPr lvl="1"/>
+            <a:r>
+              <a:rPr lang="en-US" dirty="0"/>
+              <a:t>Regression</a:t>
+            </a:r>
+          </a:p>
+          <a:p>
+            <a:pPr lvl="1"/>
+            <a:r>
+              <a:rPr lang="en-US" dirty="0"/>
+              <a:t>Tree</a:t>
+            </a:r>
+          </a:p>
+          <a:p>
+            <a:pPr lvl="1"/>
+            <a:r>
+              <a:rPr lang="en-US" dirty="0"/>
+              <a:t>Forest</a:t>
+            </a:r>
+          </a:p>
+          <a:p>
+            <a:pPr lvl="1"/>
+            <a:r>
+              <a:rPr lang="en-US" dirty="0"/>
+              <a:t>Gradient-Boosted Forest</a:t>
             </a:r>
           </a:p>
           <a:p>
@@ -8065,12 +8080,12 @@
     </p:spTree>
     <p:extLst>
       <p:ext uri="{BB962C8B-B14F-4D97-AF65-F5344CB8AC3E}">
-        <p14:creationId xmlns:p14="http://schemas.microsoft.com/office/powerpoint/2010/main" val="76902119"/>
+        <p14:creationId xmlns:p14="http://schemas.microsoft.com/office/powerpoint/2010/main" val="3895443771"/>
       </p:ext>
     </p:extLst>
   </p:cSld>
   <p:clrMapOvr>
-    <a:overrideClrMapping bg1="lt1" tx1="dk1" bg2="lt2" tx2="dk2" accent1="accent1" accent2="accent2" accent3="accent3" accent4="accent4" accent5="accent5" accent6="accent6" hlink="hlink" folHlink="folHlink"/>
+    <a:masterClrMapping/>
   </p:clrMapOvr>
 </p:sld>
 </file>
@@ -8145,7 +8160,14 @@
           <a:p>
             <a:r>
               <a:rPr lang="en-US" dirty="0"/>
-              <a:t>Lasso</a:t>
+              <a:t>K-Nearest Neighbors</a:t>
+            </a:r>
+          </a:p>
+          <a:p>
+            <a:pPr lvl="1"/>
+            <a:r>
+              <a:rPr lang="en-US" dirty="0"/>
+              <a:t>Predicts outcome by finding the closest matching data point.</a:t>
             </a:r>
           </a:p>
           <a:p>
@@ -8160,7 +8182,7 @@
     </p:spTree>
     <p:extLst>
       <p:ext uri="{BB962C8B-B14F-4D97-AF65-F5344CB8AC3E}">
-        <p14:creationId xmlns:p14="http://schemas.microsoft.com/office/powerpoint/2010/main" val="1469044682"/>
+        <p14:creationId xmlns:p14="http://schemas.microsoft.com/office/powerpoint/2010/main" val="76902119"/>
       </p:ext>
     </p:extLst>
   </p:cSld>
@@ -8240,7 +8262,7 @@
           <a:p>
             <a:r>
               <a:rPr lang="en-US" dirty="0"/>
-              <a:t>Regression</a:t>
+              <a:t>Lasso</a:t>
             </a:r>
           </a:p>
           <a:p>
@@ -8255,7 +8277,7 @@
     </p:spTree>
     <p:extLst>
       <p:ext uri="{BB962C8B-B14F-4D97-AF65-F5344CB8AC3E}">
-        <p14:creationId xmlns:p14="http://schemas.microsoft.com/office/powerpoint/2010/main" val="474133971"/>
+        <p14:creationId xmlns:p14="http://schemas.microsoft.com/office/powerpoint/2010/main" val="1469044682"/>
       </p:ext>
     </p:extLst>
   </p:cSld>
@@ -8335,7 +8357,7 @@
           <a:p>
             <a:r>
               <a:rPr lang="en-US" dirty="0"/>
-              <a:t>Tree</a:t>
+              <a:t>Regression</a:t>
             </a:r>
           </a:p>
           <a:p>
@@ -8350,7 +8372,7 @@
     </p:spTree>
     <p:extLst>
       <p:ext uri="{BB962C8B-B14F-4D97-AF65-F5344CB8AC3E}">
-        <p14:creationId xmlns:p14="http://schemas.microsoft.com/office/powerpoint/2010/main" val="1924952010"/>
+        <p14:creationId xmlns:p14="http://schemas.microsoft.com/office/powerpoint/2010/main" val="474133971"/>
       </p:ext>
     </p:extLst>
   </p:cSld>
@@ -8430,7 +8452,7 @@
           <a:p>
             <a:r>
               <a:rPr lang="en-US" dirty="0"/>
-              <a:t>Forest</a:t>
+              <a:t>Tree</a:t>
             </a:r>
           </a:p>
           <a:p>
@@ -8445,7 +8467,7 @@
     </p:spTree>
     <p:extLst>
       <p:ext uri="{BB962C8B-B14F-4D97-AF65-F5344CB8AC3E}">
-        <p14:creationId xmlns:p14="http://schemas.microsoft.com/office/powerpoint/2010/main" val="358457677"/>
+        <p14:creationId xmlns:p14="http://schemas.microsoft.com/office/powerpoint/2010/main" val="1924952010"/>
       </p:ext>
     </p:extLst>
   </p:cSld>
@@ -8525,7 +8547,7 @@
           <a:p>
             <a:r>
               <a:rPr lang="en-US" dirty="0"/>
-              <a:t>Gradient-Boosted Forest</a:t>
+              <a:t>Forest</a:t>
             </a:r>
           </a:p>
           <a:p>
@@ -8540,7 +8562,7 @@
     </p:spTree>
     <p:extLst>
       <p:ext uri="{BB962C8B-B14F-4D97-AF65-F5344CB8AC3E}">
-        <p14:creationId xmlns:p14="http://schemas.microsoft.com/office/powerpoint/2010/main" val="1436682753"/>
+        <p14:creationId xmlns:p14="http://schemas.microsoft.com/office/powerpoint/2010/main" val="358457677"/>
       </p:ext>
     </p:extLst>
   </p:cSld>
@@ -8556,7 +8578,7 @@
     <p:bg>
       <p:bgPr>
         <a:blipFill dpi="0" rotWithShape="1">
-          <a:blip r:embed="rId2">
+          <a:blip r:embed="rId3">
             <a:lum/>
           </a:blip>
           <a:srcRect/>
@@ -8598,7 +8620,7 @@
           <a:p>
             <a:r>
               <a:rPr lang="en-US" dirty="0"/>
-              <a:t>Evaluating Accuracy</a:t>
+              <a:t>Linear Models</a:t>
             </a:r>
           </a:p>
         </p:txBody>
@@ -8620,32 +8642,8 @@
           <a:p>
             <a:r>
               <a:rPr lang="en-US" dirty="0"/>
-              <a:t>Overview</a:t>
-            </a:r>
-          </a:p>
-          <a:p>
-            <a:pPr lvl="1"/>
-            <a:r>
-              <a:rPr lang="en-US" dirty="0"/>
-              <a:t>&lt;model&gt;.score(</a:t>
-            </a:r>
-            <a:r>
-              <a:rPr lang="en-US" dirty="0" err="1"/>
-              <a:t>test_data</a:t>
-            </a:r>
-            <a:r>
-              <a:rPr lang="en-US" dirty="0"/>
-              <a:t>, </a:t>
-            </a:r>
-            <a:r>
-              <a:rPr lang="en-US" dirty="0" err="1"/>
-              <a:t>test_labels</a:t>
-            </a:r>
-            <a:r>
-              <a:rPr lang="en-US"/>
-              <a:t>)</a:t>
-            </a:r>
-            <a:endParaRPr lang="en-US" dirty="0"/>
+              <a:t>Gradient-Boosted Forest</a:t>
+            </a:r>
           </a:p>
           <a:p>
             <a:pPr lvl="2"/>
@@ -8659,12 +8657,12 @@
     </p:spTree>
     <p:extLst>
       <p:ext uri="{BB962C8B-B14F-4D97-AF65-F5344CB8AC3E}">
-        <p14:creationId xmlns:p14="http://schemas.microsoft.com/office/powerpoint/2010/main" val="4053921630"/>
+        <p14:creationId xmlns:p14="http://schemas.microsoft.com/office/powerpoint/2010/main" val="1436682753"/>
       </p:ext>
     </p:extLst>
   </p:cSld>
   <p:clrMapOvr>
-    <a:masterClrMapping/>
+    <a:overrideClrMapping bg1="lt1" tx1="dk1" bg2="lt2" tx2="dk2" accent1="accent1" accent2="accent2" accent3="accent3" accent4="accent4" accent5="accent5" accent6="accent6" hlink="hlink" folHlink="folHlink"/>
   </p:clrMapOvr>
 </p:sld>
 </file>
@@ -8716,70 +8714,55 @@
           <a:lstStyle/>
           <a:p>
             <a:r>
+              <a:rPr lang="en-US" dirty="0"/>
+              <a:t>Evaluating Accuracy</a:t>
+            </a:r>
+          </a:p>
+        </p:txBody>
+      </p:sp>
+      <p:sp>
+        <p:nvSpPr>
+          <p:cNvPr id="3" name="Content Placeholder 2"/>
+          <p:cNvSpPr>
+            <a:spLocks noGrp="1"/>
+          </p:cNvSpPr>
+          <p:nvPr>
+            <p:ph idx="1"/>
+          </p:nvPr>
+        </p:nvSpPr>
+        <p:spPr/>
+        <p:txBody>
+          <a:bodyPr/>
+          <a:lstStyle/>
+          <a:p>
+            <a:r>
+              <a:rPr lang="en-US" dirty="0"/>
+              <a:t>Overview</a:t>
+            </a:r>
+          </a:p>
+          <a:p>
+            <a:pPr lvl="1"/>
+            <a:r>
+              <a:rPr lang="en-US" dirty="0"/>
+              <a:t>&lt;model&gt;.score(</a:t>
+            </a:r>
+            <a:r>
               <a:rPr lang="en-US" dirty="0" err="1"/>
-              <a:t>Scikit</a:t>
-            </a:r>
-            <a:r>
-              <a:rPr lang="en-US" dirty="0"/>
-              <a:t>-Learn Machine Learning</a:t>
-            </a:r>
-          </a:p>
-        </p:txBody>
-      </p:sp>
-      <p:sp>
-        <p:nvSpPr>
-          <p:cNvPr id="3" name="Content Placeholder 2"/>
-          <p:cNvSpPr>
-            <a:spLocks noGrp="1"/>
-          </p:cNvSpPr>
-          <p:nvPr>
-            <p:ph idx="1"/>
-          </p:nvPr>
-        </p:nvSpPr>
-        <p:spPr/>
-        <p:txBody>
-          <a:bodyPr/>
-          <a:lstStyle/>
-          <a:p>
-            <a:r>
-              <a:rPr lang="en-US" dirty="0"/>
-              <a:t>Overview</a:t>
-            </a:r>
-          </a:p>
-          <a:p>
-            <a:pPr lvl="1"/>
-            <a:r>
-              <a:rPr lang="en-US" dirty="0"/>
-              <a:t>Definition</a:t>
-            </a:r>
-          </a:p>
-          <a:p>
-            <a:pPr lvl="1"/>
-            <a:r>
-              <a:rPr lang="en-US" dirty="0"/>
-              <a:t>General Types</a:t>
-            </a:r>
-          </a:p>
-          <a:p>
-            <a:pPr lvl="1"/>
-            <a:r>
-              <a:rPr lang="en-US" dirty="0"/>
-              <a:t>Basic Linear Models</a:t>
-            </a:r>
-          </a:p>
-          <a:p>
-            <a:pPr lvl="1"/>
-            <a:r>
-              <a:rPr lang="en-US" dirty="0"/>
-              <a:t>Algorithm Types</a:t>
-            </a:r>
-          </a:p>
-          <a:p>
-            <a:pPr lvl="1"/>
-            <a:r>
-              <a:rPr lang="en-US" dirty="0"/>
-              <a:t>Tuning</a:t>
-            </a:r>
+              <a:t>test_data</a:t>
+            </a:r>
+            <a:r>
+              <a:rPr lang="en-US" dirty="0"/>
+              <a:t>, </a:t>
+            </a:r>
+            <a:r>
+              <a:rPr lang="en-US" dirty="0" err="1"/>
+              <a:t>test_labels</a:t>
+            </a:r>
+            <a:r>
+              <a:rPr lang="en-US"/>
+              <a:t>)</a:t>
+            </a:r>
+            <a:endParaRPr lang="en-US" dirty="0"/>
           </a:p>
           <a:p>
             <a:pPr lvl="2"/>
@@ -8793,7 +8776,7 @@
     </p:spTree>
     <p:extLst>
       <p:ext uri="{BB962C8B-B14F-4D97-AF65-F5344CB8AC3E}">
-        <p14:creationId xmlns:p14="http://schemas.microsoft.com/office/powerpoint/2010/main" val="754999196"/>
+        <p14:creationId xmlns:p14="http://schemas.microsoft.com/office/powerpoint/2010/main" val="4053921630"/>
       </p:ext>
     </p:extLst>
   </p:cSld>
@@ -8850,30 +8833,69 @@
           <a:lstStyle/>
           <a:p>
             <a:r>
+              <a:rPr lang="en-US" dirty="0" err="1"/>
+              <a:t>Scikit</a:t>
+            </a:r>
+            <a:r>
+              <a:rPr lang="en-US" dirty="0"/>
+              <a:t>-Learn Machine Learning</a:t>
+            </a:r>
+          </a:p>
+        </p:txBody>
+      </p:sp>
+      <p:sp>
+        <p:nvSpPr>
+          <p:cNvPr id="3" name="Content Placeholder 2"/>
+          <p:cNvSpPr>
+            <a:spLocks noGrp="1"/>
+          </p:cNvSpPr>
+          <p:nvPr>
+            <p:ph idx="1"/>
+          </p:nvPr>
+        </p:nvSpPr>
+        <p:spPr/>
+        <p:txBody>
+          <a:bodyPr/>
+          <a:lstStyle/>
+          <a:p>
+            <a:r>
+              <a:rPr lang="en-US" dirty="0"/>
+              <a:t>Overview</a:t>
+            </a:r>
+          </a:p>
+          <a:p>
+            <a:pPr lvl="1"/>
+            <a:r>
+              <a:rPr lang="en-US" dirty="0"/>
+              <a:t>Definition</a:t>
+            </a:r>
+          </a:p>
+          <a:p>
+            <a:pPr lvl="1"/>
+            <a:r>
+              <a:rPr lang="en-US" dirty="0"/>
+              <a:t>General Types</a:t>
+            </a:r>
+          </a:p>
+          <a:p>
+            <a:pPr lvl="1"/>
+            <a:r>
+              <a:rPr lang="en-US" dirty="0"/>
+              <a:t>Basic Linear Models</a:t>
+            </a:r>
+          </a:p>
+          <a:p>
+            <a:pPr lvl="1"/>
+            <a:r>
+              <a:rPr lang="en-US" dirty="0"/>
+              <a:t>Algorithm Types</a:t>
+            </a:r>
+          </a:p>
+          <a:p>
+            <a:pPr lvl="1"/>
+            <a:r>
               <a:rPr lang="en-US" dirty="0"/>
               <a:t>Tuning</a:t>
-            </a:r>
-          </a:p>
-        </p:txBody>
-      </p:sp>
-      <p:sp>
-        <p:nvSpPr>
-          <p:cNvPr id="3" name="Content Placeholder 2"/>
-          <p:cNvSpPr>
-            <a:spLocks noGrp="1"/>
-          </p:cNvSpPr>
-          <p:nvPr>
-            <p:ph idx="1"/>
-          </p:nvPr>
-        </p:nvSpPr>
-        <p:spPr/>
-        <p:txBody>
-          <a:bodyPr/>
-          <a:lstStyle/>
-          <a:p>
-            <a:r>
-              <a:rPr lang="en-US" dirty="0"/>
-              <a:t>Determining what features matter</a:t>
             </a:r>
           </a:p>
           <a:p>
@@ -8888,7 +8910,7 @@
     </p:spTree>
     <p:extLst>
       <p:ext uri="{BB962C8B-B14F-4D97-AF65-F5344CB8AC3E}">
-        <p14:creationId xmlns:p14="http://schemas.microsoft.com/office/powerpoint/2010/main" val="3393037686"/>
+        <p14:creationId xmlns:p14="http://schemas.microsoft.com/office/powerpoint/2010/main" val="754999196"/>
       </p:ext>
     </p:extLst>
   </p:cSld>
@@ -9080,7 +9102,7 @@
           <a:p>
             <a:r>
               <a:rPr lang="en-US" dirty="0"/>
-              <a:t>Parameters to Play with</a:t>
+              <a:t>Determining what features matter</a:t>
             </a:r>
           </a:p>
           <a:p>
@@ -9095,7 +9117,7 @@
     </p:spTree>
     <p:extLst>
       <p:ext uri="{BB962C8B-B14F-4D97-AF65-F5344CB8AC3E}">
-        <p14:creationId xmlns:p14="http://schemas.microsoft.com/office/powerpoint/2010/main" val="274238177"/>
+        <p14:creationId xmlns:p14="http://schemas.microsoft.com/office/powerpoint/2010/main" val="3393037686"/>
       </p:ext>
     </p:extLst>
   </p:cSld>
@@ -9175,7 +9197,7 @@
           <a:p>
             <a:r>
               <a:rPr lang="en-US" dirty="0"/>
-              <a:t>Grid Search</a:t>
+              <a:t>Parameters to Play with</a:t>
             </a:r>
           </a:p>
           <a:p>
@@ -9190,7 +9212,7 @@
     </p:spTree>
     <p:extLst>
       <p:ext uri="{BB962C8B-B14F-4D97-AF65-F5344CB8AC3E}">
-        <p14:creationId xmlns:p14="http://schemas.microsoft.com/office/powerpoint/2010/main" val="2622179278"/>
+        <p14:creationId xmlns:p14="http://schemas.microsoft.com/office/powerpoint/2010/main" val="274238177"/>
       </p:ext>
     </p:extLst>
   </p:cSld>
@@ -9247,6 +9269,101 @@
           <a:lstStyle/>
           <a:p>
             <a:r>
+              <a:rPr lang="en-US" dirty="0"/>
+              <a:t>Tuning</a:t>
+            </a:r>
+          </a:p>
+        </p:txBody>
+      </p:sp>
+      <p:sp>
+        <p:nvSpPr>
+          <p:cNvPr id="3" name="Content Placeholder 2"/>
+          <p:cNvSpPr>
+            <a:spLocks noGrp="1"/>
+          </p:cNvSpPr>
+          <p:nvPr>
+            <p:ph idx="1"/>
+          </p:nvPr>
+        </p:nvSpPr>
+        <p:spPr/>
+        <p:txBody>
+          <a:bodyPr/>
+          <a:lstStyle/>
+          <a:p>
+            <a:r>
+              <a:rPr lang="en-US" dirty="0"/>
+              <a:t>Grid Search</a:t>
+            </a:r>
+          </a:p>
+          <a:p>
+            <a:pPr lvl="2"/>
+            <a:endParaRPr lang="en-US" dirty="0"/>
+          </a:p>
+          <a:p>
+            <a:endParaRPr lang="en-US" dirty="0"/>
+          </a:p>
+        </p:txBody>
+      </p:sp>
+    </p:spTree>
+    <p:extLst>
+      <p:ext uri="{BB962C8B-B14F-4D97-AF65-F5344CB8AC3E}">
+        <p14:creationId xmlns:p14="http://schemas.microsoft.com/office/powerpoint/2010/main" val="2622179278"/>
+      </p:ext>
+    </p:extLst>
+  </p:cSld>
+  <p:clrMapOvr>
+    <a:masterClrMapping/>
+  </p:clrMapOvr>
+</p:sld>
+</file>
+
+<file path=ppt/slides/slide33.xml><?xml version="1.0" encoding="utf-8"?>
+<p:sld xmlns:a="http://schemas.openxmlformats.org/drawingml/2006/main" xmlns:r="http://schemas.openxmlformats.org/officeDocument/2006/relationships" xmlns:p="http://schemas.openxmlformats.org/presentationml/2006/main">
+  <p:cSld>
+    <p:bg>
+      <p:bgPr>
+        <a:blipFill dpi="0" rotWithShape="1">
+          <a:blip r:embed="rId2">
+            <a:lum/>
+          </a:blip>
+          <a:srcRect/>
+          <a:stretch>
+            <a:fillRect l="-10000" r="-10000"/>
+          </a:stretch>
+        </a:blipFill>
+        <a:effectLst/>
+      </p:bgPr>
+    </p:bg>
+    <p:spTree>
+      <p:nvGrpSpPr>
+        <p:cNvPr id="1" name=""/>
+        <p:cNvGrpSpPr/>
+        <p:nvPr/>
+      </p:nvGrpSpPr>
+      <p:grpSpPr>
+        <a:xfrm>
+          <a:off x="0" y="0"/>
+          <a:ext cx="0" cy="0"/>
+          <a:chOff x="0" y="0"/>
+          <a:chExt cx="0" cy="0"/>
+        </a:xfrm>
+      </p:grpSpPr>
+      <p:sp>
+        <p:nvSpPr>
+          <p:cNvPr id="2" name="Title 1"/>
+          <p:cNvSpPr>
+            <a:spLocks noGrp="1"/>
+          </p:cNvSpPr>
+          <p:nvPr>
+            <p:ph type="title"/>
+          </p:nvPr>
+        </p:nvSpPr>
+        <p:spPr/>
+        <p:txBody>
+          <a:bodyPr/>
+          <a:lstStyle/>
+          <a:p>
+            <a:r>
               <a:rPr lang="en-US" dirty="0" err="1"/>
               <a:t>Scikit</a:t>
             </a:r>
@@ -9334,7 +9451,7 @@
 </p:sld>
 </file>
 
-<file path=ppt/slides/slide33.xml><?xml version="1.0" encoding="utf-8"?>
+<file path=ppt/slides/slide34.xml><?xml version="1.0" encoding="utf-8"?>
 <p:sld xmlns:a="http://schemas.openxmlformats.org/drawingml/2006/main" xmlns:r="http://schemas.openxmlformats.org/officeDocument/2006/relationships" xmlns:p="http://schemas.openxmlformats.org/presentationml/2006/main">
   <p:cSld>
     <p:bg>
@@ -9519,7 +9636,21 @@
             <a:pPr lvl="1"/>
             <a:r>
               <a:rPr lang="en-US" dirty="0"/>
-              <a:t>The mathematical equation, set of equations, and/or algorithm that a computer uses to predict outcomes.</a:t>
+              <a:t>The mathematical equation, set of equations, and/or algorithm that a computer uses to predict outcomes for classification problems.</a:t>
+            </a:r>
+          </a:p>
+          <a:p>
+            <a:pPr lvl="1"/>
+            <a:r>
+              <a:rPr lang="en-US" dirty="0"/>
+              <a:t>For problems where we are trying to determine an exact value or name of something.</a:t>
+            </a:r>
+          </a:p>
+          <a:p>
+            <a:pPr lvl="2"/>
+            <a:r>
+              <a:rPr lang="en-US" dirty="0"/>
+              <a:t>i.e. trying to determine what kind of fruit something is.</a:t>
             </a:r>
           </a:p>
           <a:p>
@@ -9624,21 +9755,35 @@
           <a:p>
             <a:r>
               <a:rPr lang="en-US" dirty="0"/>
-              <a:t>Model</a:t>
+              <a:t>Regressor</a:t>
             </a:r>
           </a:p>
           <a:p>
             <a:pPr lvl="1"/>
             <a:r>
               <a:rPr lang="en-US" dirty="0"/>
-              <a:t>The classifier that is trained and filled with data.</a:t>
+              <a:t>The mathematical equation, set of equations, and/or algorithm that a computer uses to predict outcomes for regression problems.</a:t>
             </a:r>
           </a:p>
           <a:p>
             <a:pPr lvl="1"/>
             <a:r>
               <a:rPr lang="en-US" dirty="0"/>
-              <a:t>This is what will tell us what the “answer” is.</a:t>
+              <a:t>Problems were we are predicting within range of values.</a:t>
+            </a:r>
+          </a:p>
+          <a:p>
+            <a:pPr lvl="2"/>
+            <a:r>
+              <a:rPr lang="en-US" dirty="0"/>
+              <a:t>i.e. Predicting the median household income in the future.</a:t>
+            </a:r>
+          </a:p>
+          <a:p>
+            <a:pPr lvl="1"/>
+            <a:r>
+              <a:rPr lang="en-US" dirty="0"/>
+              <a:t>This is the scaffolding for our model.</a:t>
             </a:r>
           </a:p>
           <a:p>
@@ -9656,7 +9801,7 @@
     </p:spTree>
     <p:extLst>
       <p:ext uri="{BB962C8B-B14F-4D97-AF65-F5344CB8AC3E}">
-        <p14:creationId xmlns:p14="http://schemas.microsoft.com/office/powerpoint/2010/main" val="4212275978"/>
+        <p14:creationId xmlns:p14="http://schemas.microsoft.com/office/powerpoint/2010/main" val="528904592"/>
       </p:ext>
     </p:extLst>
   </p:cSld>
@@ -9736,14 +9881,21 @@
           <a:p>
             <a:r>
               <a:rPr lang="en-US" dirty="0"/>
-              <a:t>Classifier vs Model</a:t>
+              <a:t>Model</a:t>
             </a:r>
           </a:p>
           <a:p>
             <a:pPr lvl="1"/>
             <a:r>
               <a:rPr lang="en-US" dirty="0"/>
-              <a:t>The classifier is like a class, where the model is like an object.</a:t>
+              <a:t>The classifier that is trained and filled with data.</a:t>
+            </a:r>
+          </a:p>
+          <a:p>
+            <a:pPr lvl="1"/>
+            <a:r>
+              <a:rPr lang="en-US" dirty="0"/>
+              <a:t>This is what will tell us what the “answer” is.</a:t>
             </a:r>
           </a:p>
           <a:p>
@@ -9761,7 +9913,7 @@
     </p:spTree>
     <p:extLst>
       <p:ext uri="{BB962C8B-B14F-4D97-AF65-F5344CB8AC3E}">
-        <p14:creationId xmlns:p14="http://schemas.microsoft.com/office/powerpoint/2010/main" val="3444231323"/>
+        <p14:creationId xmlns:p14="http://schemas.microsoft.com/office/powerpoint/2010/main" val="4212275978"/>
       </p:ext>
     </p:extLst>
   </p:cSld>
@@ -9819,7 +9971,7 @@
           <a:p>
             <a:r>
               <a:rPr lang="en-US" dirty="0"/>
-              <a:t>Definition</a:t>
+              <a:t>Definitions</a:t>
             </a:r>
           </a:p>
         </p:txBody>
@@ -9841,14 +9993,14 @@
           <a:p>
             <a:r>
               <a:rPr lang="en-US" dirty="0"/>
-              <a:t>Experience</a:t>
+              <a:t>Classifier vs Model</a:t>
             </a:r>
           </a:p>
           <a:p>
             <a:pPr lvl="1"/>
             <a:r>
               <a:rPr lang="en-US" dirty="0"/>
-              <a:t>The data used to increase the effectiveness of the model’s predictions</a:t>
+              <a:t>The classifier is like a class, where the model is like an object.</a:t>
             </a:r>
           </a:p>
           <a:p>
@@ -9866,7 +10018,7 @@
     </p:spTree>
     <p:extLst>
       <p:ext uri="{BB962C8B-B14F-4D97-AF65-F5344CB8AC3E}">
-        <p14:creationId xmlns:p14="http://schemas.microsoft.com/office/powerpoint/2010/main" val="2979209538"/>
+        <p14:creationId xmlns:p14="http://schemas.microsoft.com/office/powerpoint/2010/main" val="3444231323"/>
       </p:ext>
     </p:extLst>
   </p:cSld>
@@ -9946,21 +10098,14 @@
           <a:p>
             <a:r>
               <a:rPr lang="en-US" dirty="0"/>
-              <a:t>Feature</a:t>
+              <a:t>Experience</a:t>
             </a:r>
           </a:p>
           <a:p>
             <a:pPr lvl="1"/>
             <a:r>
               <a:rPr lang="en-US" dirty="0"/>
-              <a:t>A description of a set of like-data.</a:t>
-            </a:r>
-          </a:p>
-          <a:p>
-            <a:pPr lvl="1"/>
-            <a:r>
-              <a:rPr lang="en-US" dirty="0"/>
-              <a:t>This is usually represented as a column in a data table.</a:t>
+              <a:t>The data used to increase the effectiveness of the model’s predictions</a:t>
             </a:r>
           </a:p>
           <a:p>
@@ -9978,7 +10123,7 @@
     </p:spTree>
     <p:extLst>
       <p:ext uri="{BB962C8B-B14F-4D97-AF65-F5344CB8AC3E}">
-        <p14:creationId xmlns:p14="http://schemas.microsoft.com/office/powerpoint/2010/main" val="2289988101"/>
+        <p14:creationId xmlns:p14="http://schemas.microsoft.com/office/powerpoint/2010/main" val="2979209538"/>
       </p:ext>
     </p:extLst>
   </p:cSld>
@@ -10058,21 +10203,21 @@
           <a:p>
             <a:r>
               <a:rPr lang="en-US" dirty="0"/>
-              <a:t>Sample</a:t>
+              <a:t>Feature</a:t>
             </a:r>
           </a:p>
           <a:p>
             <a:pPr lvl="1"/>
             <a:r>
               <a:rPr lang="en-US" dirty="0"/>
-              <a:t>A single set of data, or a data point.</a:t>
+              <a:t>A description of a set of like-data.</a:t>
             </a:r>
           </a:p>
           <a:p>
             <a:pPr lvl="1"/>
             <a:r>
               <a:rPr lang="en-US" dirty="0"/>
-              <a:t>This is usually a row in a data table.</a:t>
+              <a:t>This is usually represented as a column in a data table.</a:t>
             </a:r>
           </a:p>
           <a:p>
@@ -10090,7 +10235,7 @@
     </p:spTree>
     <p:extLst>
       <p:ext uri="{BB962C8B-B14F-4D97-AF65-F5344CB8AC3E}">
-        <p14:creationId xmlns:p14="http://schemas.microsoft.com/office/powerpoint/2010/main" val="1110144452"/>
+        <p14:creationId xmlns:p14="http://schemas.microsoft.com/office/powerpoint/2010/main" val="2289988101"/>
       </p:ext>
     </p:extLst>
   </p:cSld>

</xml_diff>

<commit_message>
Added descriptions for some model types.
</commit_message>
<xml_diff>
--- a/Session 7 - Python/Instructional Material/Session 7 - Python Brief Intro to Machine Learning with Scikit Learn.pptx
+++ b/Session 7 - Python/Instructional Material/Session 7 - Python Brief Intro to Machine Learning with Scikit Learn.pptx
@@ -5,6 +5,9 @@
     <p:sldMasterId id="2147483648" r:id="rId1"/>
     <p:sldMasterId id="2147483660" r:id="rId2"/>
   </p:sldMasterIdLst>
+  <p:notesMasterIdLst>
+    <p:notesMasterId r:id="rId42"/>
+  </p:notesMasterIdLst>
   <p:sldIdLst>
     <p:sldId id="256" r:id="rId3"/>
     <p:sldId id="283" r:id="rId4"/>
@@ -28,18 +31,23 @@
     <p:sldId id="404" r:id="rId22"/>
     <p:sldId id="377" r:id="rId23"/>
     <p:sldId id="390" r:id="rId24"/>
-    <p:sldId id="391" r:id="rId25"/>
-    <p:sldId id="396" r:id="rId26"/>
-    <p:sldId id="397" r:id="rId27"/>
-    <p:sldId id="398" r:id="rId28"/>
-    <p:sldId id="399" r:id="rId29"/>
-    <p:sldId id="376" r:id="rId30"/>
-    <p:sldId id="405" r:id="rId31"/>
-    <p:sldId id="385" r:id="rId32"/>
-    <p:sldId id="386" r:id="rId33"/>
-    <p:sldId id="400" r:id="rId34"/>
-    <p:sldId id="384" r:id="rId35"/>
-    <p:sldId id="375" r:id="rId36"/>
+    <p:sldId id="412" r:id="rId25"/>
+    <p:sldId id="415" r:id="rId26"/>
+    <p:sldId id="413" r:id="rId27"/>
+    <p:sldId id="391" r:id="rId28"/>
+    <p:sldId id="414" r:id="rId29"/>
+    <p:sldId id="396" r:id="rId30"/>
+    <p:sldId id="397" r:id="rId31"/>
+    <p:sldId id="398" r:id="rId32"/>
+    <p:sldId id="399" r:id="rId33"/>
+    <p:sldId id="376" r:id="rId34"/>
+    <p:sldId id="405" r:id="rId35"/>
+    <p:sldId id="385" r:id="rId36"/>
+    <p:sldId id="386" r:id="rId37"/>
+    <p:sldId id="400" r:id="rId38"/>
+    <p:sldId id="384" r:id="rId39"/>
+    <p:sldId id="375" r:id="rId40"/>
+    <p:sldId id="411" r:id="rId41"/>
   </p:sldIdLst>
   <p:sldSz cx="9144000" cy="6858000" type="screen4x3"/>
   <p:notesSz cx="6858000" cy="9144000"/>
@@ -157,6 +165,691 @@
 </p:presentation>
 </file>
 
+<file path=ppt/notesMasters/notesMaster1.xml><?xml version="1.0" encoding="utf-8"?>
+<p:notesMaster xmlns:a="http://schemas.openxmlformats.org/drawingml/2006/main" xmlns:r="http://schemas.openxmlformats.org/officeDocument/2006/relationships" xmlns:p="http://schemas.openxmlformats.org/presentationml/2006/main">
+  <p:cSld>
+    <p:bg>
+      <p:bgRef idx="1001">
+        <a:schemeClr val="bg1"/>
+      </p:bgRef>
+    </p:bg>
+    <p:spTree>
+      <p:nvGrpSpPr>
+        <p:cNvPr id="1" name=""/>
+        <p:cNvGrpSpPr/>
+        <p:nvPr/>
+      </p:nvGrpSpPr>
+      <p:grpSpPr>
+        <a:xfrm>
+          <a:off x="0" y="0"/>
+          <a:ext cx="0" cy="0"/>
+          <a:chOff x="0" y="0"/>
+          <a:chExt cx="0" cy="0"/>
+        </a:xfrm>
+      </p:grpSpPr>
+      <p:sp>
+        <p:nvSpPr>
+          <p:cNvPr id="2" name="Header Placeholder 1"/>
+          <p:cNvSpPr>
+            <a:spLocks noGrp="1"/>
+          </p:cNvSpPr>
+          <p:nvPr>
+            <p:ph type="hdr" sz="quarter"/>
+          </p:nvPr>
+        </p:nvSpPr>
+        <p:spPr>
+          <a:xfrm>
+            <a:off x="0" y="0"/>
+            <a:ext cx="2971800" cy="458788"/>
+          </a:xfrm>
+          <a:prstGeom prst="rect">
+            <a:avLst/>
+          </a:prstGeom>
+        </p:spPr>
+        <p:txBody>
+          <a:bodyPr vert="horz" lIns="91440" tIns="45720" rIns="91440" bIns="45720" rtlCol="0"/>
+          <a:lstStyle>
+            <a:lvl1pPr algn="l">
+              <a:defRPr sz="1200"/>
+            </a:lvl1pPr>
+          </a:lstStyle>
+          <a:p>
+            <a:endParaRPr lang="en-US"/>
+          </a:p>
+        </p:txBody>
+      </p:sp>
+      <p:sp>
+        <p:nvSpPr>
+          <p:cNvPr id="3" name="Date Placeholder 2"/>
+          <p:cNvSpPr>
+            <a:spLocks noGrp="1"/>
+          </p:cNvSpPr>
+          <p:nvPr>
+            <p:ph type="dt" idx="1"/>
+          </p:nvPr>
+        </p:nvSpPr>
+        <p:spPr>
+          <a:xfrm>
+            <a:off x="3884613" y="0"/>
+            <a:ext cx="2971800" cy="458788"/>
+          </a:xfrm>
+          <a:prstGeom prst="rect">
+            <a:avLst/>
+          </a:prstGeom>
+        </p:spPr>
+        <p:txBody>
+          <a:bodyPr vert="horz" lIns="91440" tIns="45720" rIns="91440" bIns="45720" rtlCol="0"/>
+          <a:lstStyle>
+            <a:lvl1pPr algn="r">
+              <a:defRPr sz="1200"/>
+            </a:lvl1pPr>
+          </a:lstStyle>
+          <a:p>
+            <a:fld id="{CD3A85A8-362A-422C-AAFE-FA6D3B9BF6BA}" type="datetimeFigureOut">
+              <a:rPr lang="en-US" smtClean="0"/>
+              <a:t>11/26/2021</a:t>
+            </a:fld>
+            <a:endParaRPr lang="en-US"/>
+          </a:p>
+        </p:txBody>
+      </p:sp>
+      <p:sp>
+        <p:nvSpPr>
+          <p:cNvPr id="4" name="Slide Image Placeholder 3"/>
+          <p:cNvSpPr>
+            <a:spLocks noGrp="1" noRot="1" noChangeAspect="1"/>
+          </p:cNvSpPr>
+          <p:nvPr>
+            <p:ph type="sldImg" idx="2"/>
+          </p:nvPr>
+        </p:nvSpPr>
+        <p:spPr>
+          <a:xfrm>
+            <a:off x="1371600" y="1143000"/>
+            <a:ext cx="4114800" cy="3086100"/>
+          </a:xfrm>
+          <a:prstGeom prst="rect">
+            <a:avLst/>
+          </a:prstGeom>
+          <a:noFill/>
+          <a:ln w="12700">
+            <a:solidFill>
+              <a:prstClr val="black"/>
+            </a:solidFill>
+          </a:ln>
+        </p:spPr>
+        <p:txBody>
+          <a:bodyPr vert="horz" lIns="91440" tIns="45720" rIns="91440" bIns="45720" rtlCol="0" anchor="ctr"/>
+          <a:lstStyle/>
+          <a:p>
+            <a:endParaRPr lang="en-US"/>
+          </a:p>
+        </p:txBody>
+      </p:sp>
+      <p:sp>
+        <p:nvSpPr>
+          <p:cNvPr id="5" name="Notes Placeholder 4"/>
+          <p:cNvSpPr>
+            <a:spLocks noGrp="1"/>
+          </p:cNvSpPr>
+          <p:nvPr>
+            <p:ph type="body" sz="quarter" idx="3"/>
+          </p:nvPr>
+        </p:nvSpPr>
+        <p:spPr>
+          <a:xfrm>
+            <a:off x="685800" y="4400550"/>
+            <a:ext cx="5486400" cy="3600450"/>
+          </a:xfrm>
+          <a:prstGeom prst="rect">
+            <a:avLst/>
+          </a:prstGeom>
+        </p:spPr>
+        <p:txBody>
+          <a:bodyPr vert="horz" lIns="91440" tIns="45720" rIns="91440" bIns="45720" rtlCol="0"/>
+          <a:lstStyle/>
+          <a:p>
+            <a:pPr lvl="0"/>
+            <a:r>
+              <a:rPr lang="en-US"/>
+              <a:t>Click to edit Master text styles</a:t>
+            </a:r>
+          </a:p>
+          <a:p>
+            <a:pPr lvl="1"/>
+            <a:r>
+              <a:rPr lang="en-US"/>
+              <a:t>Second level</a:t>
+            </a:r>
+          </a:p>
+          <a:p>
+            <a:pPr lvl="2"/>
+            <a:r>
+              <a:rPr lang="en-US"/>
+              <a:t>Third level</a:t>
+            </a:r>
+          </a:p>
+          <a:p>
+            <a:pPr lvl="3"/>
+            <a:r>
+              <a:rPr lang="en-US"/>
+              <a:t>Fourth level</a:t>
+            </a:r>
+          </a:p>
+          <a:p>
+            <a:pPr lvl="4"/>
+            <a:r>
+              <a:rPr lang="en-US"/>
+              <a:t>Fifth level</a:t>
+            </a:r>
+          </a:p>
+        </p:txBody>
+      </p:sp>
+      <p:sp>
+        <p:nvSpPr>
+          <p:cNvPr id="6" name="Footer Placeholder 5"/>
+          <p:cNvSpPr>
+            <a:spLocks noGrp="1"/>
+          </p:cNvSpPr>
+          <p:nvPr>
+            <p:ph type="ftr" sz="quarter" idx="4"/>
+          </p:nvPr>
+        </p:nvSpPr>
+        <p:spPr>
+          <a:xfrm>
+            <a:off x="0" y="8685213"/>
+            <a:ext cx="2971800" cy="458787"/>
+          </a:xfrm>
+          <a:prstGeom prst="rect">
+            <a:avLst/>
+          </a:prstGeom>
+        </p:spPr>
+        <p:txBody>
+          <a:bodyPr vert="horz" lIns="91440" tIns="45720" rIns="91440" bIns="45720" rtlCol="0" anchor="b"/>
+          <a:lstStyle>
+            <a:lvl1pPr algn="l">
+              <a:defRPr sz="1200"/>
+            </a:lvl1pPr>
+          </a:lstStyle>
+          <a:p>
+            <a:endParaRPr lang="en-US"/>
+          </a:p>
+        </p:txBody>
+      </p:sp>
+      <p:sp>
+        <p:nvSpPr>
+          <p:cNvPr id="7" name="Slide Number Placeholder 6"/>
+          <p:cNvSpPr>
+            <a:spLocks noGrp="1"/>
+          </p:cNvSpPr>
+          <p:nvPr>
+            <p:ph type="sldNum" sz="quarter" idx="5"/>
+          </p:nvPr>
+        </p:nvSpPr>
+        <p:spPr>
+          <a:xfrm>
+            <a:off x="3884613" y="8685213"/>
+            <a:ext cx="2971800" cy="458787"/>
+          </a:xfrm>
+          <a:prstGeom prst="rect">
+            <a:avLst/>
+          </a:prstGeom>
+        </p:spPr>
+        <p:txBody>
+          <a:bodyPr vert="horz" lIns="91440" tIns="45720" rIns="91440" bIns="45720" rtlCol="0" anchor="b"/>
+          <a:lstStyle>
+            <a:lvl1pPr algn="r">
+              <a:defRPr sz="1200"/>
+            </a:lvl1pPr>
+          </a:lstStyle>
+          <a:p>
+            <a:fld id="{3E7B21C4-CE7A-4258-91FF-8CBB981279E1}" type="slidenum">
+              <a:rPr lang="en-US" smtClean="0"/>
+              <a:t>‹#›</a:t>
+            </a:fld>
+            <a:endParaRPr lang="en-US"/>
+          </a:p>
+        </p:txBody>
+      </p:sp>
+    </p:spTree>
+    <p:extLst>
+      <p:ext uri="{BB962C8B-B14F-4D97-AF65-F5344CB8AC3E}">
+        <p14:creationId xmlns:p14="http://schemas.microsoft.com/office/powerpoint/2010/main" val="3700431773"/>
+      </p:ext>
+    </p:extLst>
+  </p:cSld>
+  <p:clrMap bg1="lt1" tx1="dk1" bg2="lt2" tx2="dk2" accent1="accent1" accent2="accent2" accent3="accent3" accent4="accent4" accent5="accent5" accent6="accent6" hlink="hlink" folHlink="folHlink"/>
+  <p:notesStyle>
+    <a:lvl1pPr marL="0" algn="l" defTabSz="914400" rtl="0" eaLnBrk="1" latinLnBrk="0" hangingPunct="1">
+      <a:defRPr sz="1200" kern="1200">
+        <a:solidFill>
+          <a:schemeClr val="tx1"/>
+        </a:solidFill>
+        <a:latin typeface="+mn-lt"/>
+        <a:ea typeface="+mn-ea"/>
+        <a:cs typeface="+mn-cs"/>
+      </a:defRPr>
+    </a:lvl1pPr>
+    <a:lvl2pPr marL="457200" algn="l" defTabSz="914400" rtl="0" eaLnBrk="1" latinLnBrk="0" hangingPunct="1">
+      <a:defRPr sz="1200" kern="1200">
+        <a:solidFill>
+          <a:schemeClr val="tx1"/>
+        </a:solidFill>
+        <a:latin typeface="+mn-lt"/>
+        <a:ea typeface="+mn-ea"/>
+        <a:cs typeface="+mn-cs"/>
+      </a:defRPr>
+    </a:lvl2pPr>
+    <a:lvl3pPr marL="914400" algn="l" defTabSz="914400" rtl="0" eaLnBrk="1" latinLnBrk="0" hangingPunct="1">
+      <a:defRPr sz="1200" kern="1200">
+        <a:solidFill>
+          <a:schemeClr val="tx1"/>
+        </a:solidFill>
+        <a:latin typeface="+mn-lt"/>
+        <a:ea typeface="+mn-ea"/>
+        <a:cs typeface="+mn-cs"/>
+      </a:defRPr>
+    </a:lvl3pPr>
+    <a:lvl4pPr marL="1371600" algn="l" defTabSz="914400" rtl="0" eaLnBrk="1" latinLnBrk="0" hangingPunct="1">
+      <a:defRPr sz="1200" kern="1200">
+        <a:solidFill>
+          <a:schemeClr val="tx1"/>
+        </a:solidFill>
+        <a:latin typeface="+mn-lt"/>
+        <a:ea typeface="+mn-ea"/>
+        <a:cs typeface="+mn-cs"/>
+      </a:defRPr>
+    </a:lvl4pPr>
+    <a:lvl5pPr marL="1828800" algn="l" defTabSz="914400" rtl="0" eaLnBrk="1" latinLnBrk="0" hangingPunct="1">
+      <a:defRPr sz="1200" kern="1200">
+        <a:solidFill>
+          <a:schemeClr val="tx1"/>
+        </a:solidFill>
+        <a:latin typeface="+mn-lt"/>
+        <a:ea typeface="+mn-ea"/>
+        <a:cs typeface="+mn-cs"/>
+      </a:defRPr>
+    </a:lvl5pPr>
+    <a:lvl6pPr marL="2286000" algn="l" defTabSz="914400" rtl="0" eaLnBrk="1" latinLnBrk="0" hangingPunct="1">
+      <a:defRPr sz="1200" kern="1200">
+        <a:solidFill>
+          <a:schemeClr val="tx1"/>
+        </a:solidFill>
+        <a:latin typeface="+mn-lt"/>
+        <a:ea typeface="+mn-ea"/>
+        <a:cs typeface="+mn-cs"/>
+      </a:defRPr>
+    </a:lvl6pPr>
+    <a:lvl7pPr marL="2743200" algn="l" defTabSz="914400" rtl="0" eaLnBrk="1" latinLnBrk="0" hangingPunct="1">
+      <a:defRPr sz="1200" kern="1200">
+        <a:solidFill>
+          <a:schemeClr val="tx1"/>
+        </a:solidFill>
+        <a:latin typeface="+mn-lt"/>
+        <a:ea typeface="+mn-ea"/>
+        <a:cs typeface="+mn-cs"/>
+      </a:defRPr>
+    </a:lvl7pPr>
+    <a:lvl8pPr marL="3200400" algn="l" defTabSz="914400" rtl="0" eaLnBrk="1" latinLnBrk="0" hangingPunct="1">
+      <a:defRPr sz="1200" kern="1200">
+        <a:solidFill>
+          <a:schemeClr val="tx1"/>
+        </a:solidFill>
+        <a:latin typeface="+mn-lt"/>
+        <a:ea typeface="+mn-ea"/>
+        <a:cs typeface="+mn-cs"/>
+      </a:defRPr>
+    </a:lvl8pPr>
+    <a:lvl9pPr marL="3657600" algn="l" defTabSz="914400" rtl="0" eaLnBrk="1" latinLnBrk="0" hangingPunct="1">
+      <a:defRPr sz="1200" kern="1200">
+        <a:solidFill>
+          <a:schemeClr val="tx1"/>
+        </a:solidFill>
+        <a:latin typeface="+mn-lt"/>
+        <a:ea typeface="+mn-ea"/>
+        <a:cs typeface="+mn-cs"/>
+      </a:defRPr>
+    </a:lvl9pPr>
+  </p:notesStyle>
+</p:notesMaster>
+</file>
+
+<file path=ppt/notesSlides/notesSlide1.xml><?xml version="1.0" encoding="utf-8"?>
+<p:notes xmlns:a="http://schemas.openxmlformats.org/drawingml/2006/main" xmlns:r="http://schemas.openxmlformats.org/officeDocument/2006/relationships" xmlns:p="http://schemas.openxmlformats.org/presentationml/2006/main">
+  <p:cSld>
+    <p:spTree>
+      <p:nvGrpSpPr>
+        <p:cNvPr id="1" name=""/>
+        <p:cNvGrpSpPr/>
+        <p:nvPr/>
+      </p:nvGrpSpPr>
+      <p:grpSpPr>
+        <a:xfrm>
+          <a:off x="0" y="0"/>
+          <a:ext cx="0" cy="0"/>
+          <a:chOff x="0" y="0"/>
+          <a:chExt cx="0" cy="0"/>
+        </a:xfrm>
+      </p:grpSpPr>
+      <p:sp>
+        <p:nvSpPr>
+          <p:cNvPr id="2" name="Slide Image Placeholder 1"/>
+          <p:cNvSpPr>
+            <a:spLocks noGrp="1" noRot="1" noChangeAspect="1"/>
+          </p:cNvSpPr>
+          <p:nvPr>
+            <p:ph type="sldImg"/>
+          </p:nvPr>
+        </p:nvSpPr>
+        <p:spPr/>
+      </p:sp>
+      <p:sp>
+        <p:nvSpPr>
+          <p:cNvPr id="3" name="Notes Placeholder 2"/>
+          <p:cNvSpPr>
+            <a:spLocks noGrp="1"/>
+          </p:cNvSpPr>
+          <p:nvPr>
+            <p:ph type="body" idx="1"/>
+          </p:nvPr>
+        </p:nvSpPr>
+        <p:spPr/>
+        <p:txBody>
+          <a:bodyPr/>
+          <a:lstStyle/>
+          <a:p>
+            <a:endParaRPr lang="en-US" dirty="0"/>
+          </a:p>
+        </p:txBody>
+      </p:sp>
+      <p:sp>
+        <p:nvSpPr>
+          <p:cNvPr id="4" name="Slide Number Placeholder 3"/>
+          <p:cNvSpPr>
+            <a:spLocks noGrp="1"/>
+          </p:cNvSpPr>
+          <p:nvPr>
+            <p:ph type="sldNum" sz="quarter" idx="5"/>
+          </p:nvPr>
+        </p:nvSpPr>
+        <p:spPr/>
+        <p:txBody>
+          <a:bodyPr/>
+          <a:lstStyle/>
+          <a:p>
+            <a:fld id="{3E7B21C4-CE7A-4258-91FF-8CBB981279E1}" type="slidenum">
+              <a:rPr lang="en-US" smtClean="0"/>
+              <a:t>22</a:t>
+            </a:fld>
+            <a:endParaRPr lang="en-US"/>
+          </a:p>
+        </p:txBody>
+      </p:sp>
+    </p:spTree>
+    <p:extLst>
+      <p:ext uri="{BB962C8B-B14F-4D97-AF65-F5344CB8AC3E}">
+        <p14:creationId xmlns:p14="http://schemas.microsoft.com/office/powerpoint/2010/main" val="1638362377"/>
+      </p:ext>
+    </p:extLst>
+  </p:cSld>
+  <p:clrMapOvr>
+    <a:masterClrMapping/>
+  </p:clrMapOvr>
+</p:notes>
+</file>
+
+<file path=ppt/notesSlides/notesSlide2.xml><?xml version="1.0" encoding="utf-8"?>
+<p:notes xmlns:a="http://schemas.openxmlformats.org/drawingml/2006/main" xmlns:r="http://schemas.openxmlformats.org/officeDocument/2006/relationships" xmlns:p="http://schemas.openxmlformats.org/presentationml/2006/main">
+  <p:cSld>
+    <p:spTree>
+      <p:nvGrpSpPr>
+        <p:cNvPr id="1" name=""/>
+        <p:cNvGrpSpPr/>
+        <p:nvPr/>
+      </p:nvGrpSpPr>
+      <p:grpSpPr>
+        <a:xfrm>
+          <a:off x="0" y="0"/>
+          <a:ext cx="0" cy="0"/>
+          <a:chOff x="0" y="0"/>
+          <a:chExt cx="0" cy="0"/>
+        </a:xfrm>
+      </p:grpSpPr>
+      <p:sp>
+        <p:nvSpPr>
+          <p:cNvPr id="2" name="Slide Image Placeholder 1"/>
+          <p:cNvSpPr>
+            <a:spLocks noGrp="1" noRot="1" noChangeAspect="1"/>
+          </p:cNvSpPr>
+          <p:nvPr>
+            <p:ph type="sldImg"/>
+          </p:nvPr>
+        </p:nvSpPr>
+        <p:spPr/>
+      </p:sp>
+      <p:sp>
+        <p:nvSpPr>
+          <p:cNvPr id="3" name="Notes Placeholder 2"/>
+          <p:cNvSpPr>
+            <a:spLocks noGrp="1"/>
+          </p:cNvSpPr>
+          <p:nvPr>
+            <p:ph type="body" idx="1"/>
+          </p:nvPr>
+        </p:nvSpPr>
+        <p:spPr/>
+        <p:txBody>
+          <a:bodyPr/>
+          <a:lstStyle/>
+          <a:p>
+            <a:endParaRPr lang="en-US" dirty="0"/>
+          </a:p>
+        </p:txBody>
+      </p:sp>
+      <p:sp>
+        <p:nvSpPr>
+          <p:cNvPr id="4" name="Slide Number Placeholder 3"/>
+          <p:cNvSpPr>
+            <a:spLocks noGrp="1"/>
+          </p:cNvSpPr>
+          <p:nvPr>
+            <p:ph type="sldNum" sz="quarter" idx="5"/>
+          </p:nvPr>
+        </p:nvSpPr>
+        <p:spPr/>
+        <p:txBody>
+          <a:bodyPr/>
+          <a:lstStyle/>
+          <a:p>
+            <a:fld id="{3E7B21C4-CE7A-4258-91FF-8CBB981279E1}" type="slidenum">
+              <a:rPr lang="en-US" smtClean="0"/>
+              <a:t>23</a:t>
+            </a:fld>
+            <a:endParaRPr lang="en-US"/>
+          </a:p>
+        </p:txBody>
+      </p:sp>
+    </p:spTree>
+    <p:extLst>
+      <p:ext uri="{BB962C8B-B14F-4D97-AF65-F5344CB8AC3E}">
+        <p14:creationId xmlns:p14="http://schemas.microsoft.com/office/powerpoint/2010/main" val="3496575575"/>
+      </p:ext>
+    </p:extLst>
+  </p:cSld>
+  <p:clrMapOvr>
+    <a:masterClrMapping/>
+  </p:clrMapOvr>
+</p:notes>
+</file>
+
+<file path=ppt/notesSlides/notesSlide3.xml><?xml version="1.0" encoding="utf-8"?>
+<p:notes xmlns:a="http://schemas.openxmlformats.org/drawingml/2006/main" xmlns:r="http://schemas.openxmlformats.org/officeDocument/2006/relationships" xmlns:p="http://schemas.openxmlformats.org/presentationml/2006/main">
+  <p:cSld>
+    <p:spTree>
+      <p:nvGrpSpPr>
+        <p:cNvPr id="1" name=""/>
+        <p:cNvGrpSpPr/>
+        <p:nvPr/>
+      </p:nvGrpSpPr>
+      <p:grpSpPr>
+        <a:xfrm>
+          <a:off x="0" y="0"/>
+          <a:ext cx="0" cy="0"/>
+          <a:chOff x="0" y="0"/>
+          <a:chExt cx="0" cy="0"/>
+        </a:xfrm>
+      </p:grpSpPr>
+      <p:sp>
+        <p:nvSpPr>
+          <p:cNvPr id="2" name="Slide Image Placeholder 1"/>
+          <p:cNvSpPr>
+            <a:spLocks noGrp="1" noRot="1" noChangeAspect="1"/>
+          </p:cNvSpPr>
+          <p:nvPr>
+            <p:ph type="sldImg"/>
+          </p:nvPr>
+        </p:nvSpPr>
+        <p:spPr/>
+      </p:sp>
+      <p:sp>
+        <p:nvSpPr>
+          <p:cNvPr id="3" name="Notes Placeholder 2"/>
+          <p:cNvSpPr>
+            <a:spLocks noGrp="1"/>
+          </p:cNvSpPr>
+          <p:nvPr>
+            <p:ph type="body" idx="1"/>
+          </p:nvPr>
+        </p:nvSpPr>
+        <p:spPr/>
+        <p:txBody>
+          <a:bodyPr/>
+          <a:lstStyle/>
+          <a:p>
+            <a:endParaRPr lang="en-US" dirty="0"/>
+          </a:p>
+        </p:txBody>
+      </p:sp>
+      <p:sp>
+        <p:nvSpPr>
+          <p:cNvPr id="4" name="Slide Number Placeholder 3"/>
+          <p:cNvSpPr>
+            <a:spLocks noGrp="1"/>
+          </p:cNvSpPr>
+          <p:nvPr>
+            <p:ph type="sldNum" sz="quarter" idx="5"/>
+          </p:nvPr>
+        </p:nvSpPr>
+        <p:spPr/>
+        <p:txBody>
+          <a:bodyPr/>
+          <a:lstStyle/>
+          <a:p>
+            <a:fld id="{3E7B21C4-CE7A-4258-91FF-8CBB981279E1}" type="slidenum">
+              <a:rPr lang="en-US" smtClean="0"/>
+              <a:t>24</a:t>
+            </a:fld>
+            <a:endParaRPr lang="en-US"/>
+          </a:p>
+        </p:txBody>
+      </p:sp>
+    </p:spTree>
+    <p:extLst>
+      <p:ext uri="{BB962C8B-B14F-4D97-AF65-F5344CB8AC3E}">
+        <p14:creationId xmlns:p14="http://schemas.microsoft.com/office/powerpoint/2010/main" val="2013407036"/>
+      </p:ext>
+    </p:extLst>
+  </p:cSld>
+  <p:clrMapOvr>
+    <a:masterClrMapping/>
+  </p:clrMapOvr>
+</p:notes>
+</file>
+
+<file path=ppt/notesSlides/notesSlide4.xml><?xml version="1.0" encoding="utf-8"?>
+<p:notes xmlns:a="http://schemas.openxmlformats.org/drawingml/2006/main" xmlns:r="http://schemas.openxmlformats.org/officeDocument/2006/relationships" xmlns:p="http://schemas.openxmlformats.org/presentationml/2006/main">
+  <p:cSld>
+    <p:spTree>
+      <p:nvGrpSpPr>
+        <p:cNvPr id="1" name=""/>
+        <p:cNvGrpSpPr/>
+        <p:nvPr/>
+      </p:nvGrpSpPr>
+      <p:grpSpPr>
+        <a:xfrm>
+          <a:off x="0" y="0"/>
+          <a:ext cx="0" cy="0"/>
+          <a:chOff x="0" y="0"/>
+          <a:chExt cx="0" cy="0"/>
+        </a:xfrm>
+      </p:grpSpPr>
+      <p:sp>
+        <p:nvSpPr>
+          <p:cNvPr id="2" name="Slide Image Placeholder 1"/>
+          <p:cNvSpPr>
+            <a:spLocks noGrp="1" noRot="1" noChangeAspect="1"/>
+          </p:cNvSpPr>
+          <p:nvPr>
+            <p:ph type="sldImg"/>
+          </p:nvPr>
+        </p:nvSpPr>
+        <p:spPr/>
+      </p:sp>
+      <p:sp>
+        <p:nvSpPr>
+          <p:cNvPr id="3" name="Notes Placeholder 2"/>
+          <p:cNvSpPr>
+            <a:spLocks noGrp="1"/>
+          </p:cNvSpPr>
+          <p:nvPr>
+            <p:ph type="body" idx="1"/>
+          </p:nvPr>
+        </p:nvSpPr>
+        <p:spPr/>
+        <p:txBody>
+          <a:bodyPr/>
+          <a:lstStyle/>
+          <a:p>
+            <a:endParaRPr lang="en-US" dirty="0"/>
+          </a:p>
+        </p:txBody>
+      </p:sp>
+      <p:sp>
+        <p:nvSpPr>
+          <p:cNvPr id="4" name="Slide Number Placeholder 3"/>
+          <p:cNvSpPr>
+            <a:spLocks noGrp="1"/>
+          </p:cNvSpPr>
+          <p:nvPr>
+            <p:ph type="sldNum" sz="quarter" idx="5"/>
+          </p:nvPr>
+        </p:nvSpPr>
+        <p:spPr/>
+        <p:txBody>
+          <a:bodyPr/>
+          <a:lstStyle/>
+          <a:p>
+            <a:fld id="{3E7B21C4-CE7A-4258-91FF-8CBB981279E1}" type="slidenum">
+              <a:rPr lang="en-US" smtClean="0"/>
+              <a:t>25</a:t>
+            </a:fld>
+            <a:endParaRPr lang="en-US"/>
+          </a:p>
+        </p:txBody>
+      </p:sp>
+    </p:spTree>
+    <p:extLst>
+      <p:ext uri="{BB962C8B-B14F-4D97-AF65-F5344CB8AC3E}">
+        <p14:creationId xmlns:p14="http://schemas.microsoft.com/office/powerpoint/2010/main" val="2302798330"/>
+      </p:ext>
+    </p:extLst>
+  </p:cSld>
+  <p:clrMapOvr>
+    <a:masterClrMapping/>
+  </p:clrMapOvr>
+</p:notes>
+</file>
+
 <file path=ppt/slideLayouts/slideLayout1.xml><?xml version="1.0" encoding="utf-8"?>
 <p:sldLayout xmlns:a="http://schemas.openxmlformats.org/drawingml/2006/main" xmlns:r="http://schemas.openxmlformats.org/officeDocument/2006/relationships" xmlns:p="http://schemas.openxmlformats.org/presentationml/2006/main" type="title" preserve="1">
   <p:cSld name="Title Slide">
@@ -336,7 +1029,7 @@
           <a:p>
             <a:fld id="{547641E8-73DF-4AD2-848E-3103064331B1}" type="datetimeFigureOut">
               <a:rPr lang="en-US" smtClean="0"/>
-              <a:t>11/24/2021</a:t>
+              <a:t>11/26/2021</a:t>
             </a:fld>
             <a:endParaRPr lang="en-US"/>
           </a:p>
@@ -504,7 +1197,7 @@
           <a:p>
             <a:fld id="{547641E8-73DF-4AD2-848E-3103064331B1}" type="datetimeFigureOut">
               <a:rPr lang="en-US" smtClean="0"/>
-              <a:t>11/24/2021</a:t>
+              <a:t>11/26/2021</a:t>
             </a:fld>
             <a:endParaRPr lang="en-US"/>
           </a:p>
@@ -682,7 +1375,7 @@
           <a:p>
             <a:fld id="{547641E8-73DF-4AD2-848E-3103064331B1}" type="datetimeFigureOut">
               <a:rPr lang="en-US" smtClean="0"/>
-              <a:t>11/24/2021</a:t>
+              <a:t>11/26/2021</a:t>
             </a:fld>
             <a:endParaRPr lang="en-US"/>
           </a:p>
@@ -929,7 +1622,7 @@
                 </a:solidFill>
               </a:rPr>
               <a:pPr/>
-              <a:t>11/24/2021</a:t>
+              <a:t>11/26/2021</a:t>
             </a:fld>
             <a:endParaRPr lang="en-US">
               <a:solidFill>
@@ -1129,7 +1822,7 @@
                 </a:solidFill>
               </a:rPr>
               <a:pPr/>
-              <a:t>11/24/2021</a:t>
+              <a:t>11/26/2021</a:t>
             </a:fld>
             <a:endParaRPr lang="en-US">
               <a:solidFill>
@@ -1406,7 +2099,7 @@
                 </a:solidFill>
               </a:rPr>
               <a:pPr/>
-              <a:t>11/24/2021</a:t>
+              <a:t>11/26/2021</a:t>
             </a:fld>
             <a:endParaRPr lang="en-US">
               <a:solidFill>
@@ -1723,7 +2416,7 @@
                 </a:solidFill>
               </a:rPr>
               <a:pPr/>
-              <a:t>11/24/2021</a:t>
+              <a:t>11/26/2021</a:t>
             </a:fld>
             <a:endParaRPr lang="en-US">
               <a:solidFill>
@@ -2174,7 +2867,7 @@
                 </a:solidFill>
               </a:rPr>
               <a:pPr/>
-              <a:t>11/24/2021</a:t>
+              <a:t>11/26/2021</a:t>
             </a:fld>
             <a:endParaRPr lang="en-US">
               <a:solidFill>
@@ -2323,7 +3016,7 @@
                 </a:solidFill>
               </a:rPr>
               <a:pPr/>
-              <a:t>11/24/2021</a:t>
+              <a:t>11/26/2021</a:t>
             </a:fld>
             <a:endParaRPr lang="en-US">
               <a:solidFill>
@@ -2450,7 +3143,7 @@
                 </a:solidFill>
               </a:rPr>
               <a:pPr/>
-              <a:t>11/24/2021</a:t>
+              <a:t>11/26/2021</a:t>
             </a:fld>
             <a:endParaRPr lang="en-US">
               <a:solidFill>
@@ -2757,7 +3450,7 @@
                 </a:solidFill>
               </a:rPr>
               <a:pPr/>
-              <a:t>11/24/2021</a:t>
+              <a:t>11/26/2021</a:t>
             </a:fld>
             <a:endParaRPr lang="en-US">
               <a:solidFill>
@@ -2950,7 +3643,7 @@
           <a:p>
             <a:fld id="{547641E8-73DF-4AD2-848E-3103064331B1}" type="datetimeFigureOut">
               <a:rPr lang="en-US" smtClean="0"/>
-              <a:t>11/24/2021</a:t>
+              <a:t>11/26/2021</a:t>
             </a:fld>
             <a:endParaRPr lang="en-US"/>
           </a:p>
@@ -3209,7 +3902,7 @@
                 </a:solidFill>
               </a:rPr>
               <a:pPr/>
-              <a:t>11/24/2021</a:t>
+              <a:t>11/26/2021</a:t>
             </a:fld>
             <a:endParaRPr lang="en-US">
               <a:solidFill>
@@ -3409,7 +4102,7 @@
                 </a:solidFill>
               </a:rPr>
               <a:pPr/>
-              <a:t>11/24/2021</a:t>
+              <a:t>11/26/2021</a:t>
             </a:fld>
             <a:endParaRPr lang="en-US">
               <a:solidFill>
@@ -3619,7 +4312,7 @@
                 </a:solidFill>
               </a:rPr>
               <a:pPr/>
-              <a:t>11/24/2021</a:t>
+              <a:t>11/26/2021</a:t>
             </a:fld>
             <a:endParaRPr lang="en-US">
               <a:solidFill>
@@ -3889,7 +4582,7 @@
           <a:p>
             <a:fld id="{547641E8-73DF-4AD2-848E-3103064331B1}" type="datetimeFigureOut">
               <a:rPr lang="en-US" smtClean="0"/>
-              <a:t>11/24/2021</a:t>
+              <a:t>11/26/2021</a:t>
             </a:fld>
             <a:endParaRPr lang="en-US"/>
           </a:p>
@@ -4174,7 +4867,7 @@
           <a:p>
             <a:fld id="{547641E8-73DF-4AD2-848E-3103064331B1}" type="datetimeFigureOut">
               <a:rPr lang="en-US" smtClean="0"/>
-              <a:t>11/24/2021</a:t>
+              <a:t>11/26/2021</a:t>
             </a:fld>
             <a:endParaRPr lang="en-US"/>
           </a:p>
@@ -4593,7 +5286,7 @@
           <a:p>
             <a:fld id="{547641E8-73DF-4AD2-848E-3103064331B1}" type="datetimeFigureOut">
               <a:rPr lang="en-US" smtClean="0"/>
-              <a:t>11/24/2021</a:t>
+              <a:t>11/26/2021</a:t>
             </a:fld>
             <a:endParaRPr lang="en-US"/>
           </a:p>
@@ -4710,7 +5403,7 @@
           <a:p>
             <a:fld id="{547641E8-73DF-4AD2-848E-3103064331B1}" type="datetimeFigureOut">
               <a:rPr lang="en-US" smtClean="0"/>
-              <a:t>11/24/2021</a:t>
+              <a:t>11/26/2021</a:t>
             </a:fld>
             <a:endParaRPr lang="en-US"/>
           </a:p>
@@ -4805,7 +5498,7 @@
           <a:p>
             <a:fld id="{547641E8-73DF-4AD2-848E-3103064331B1}" type="datetimeFigureOut">
               <a:rPr lang="en-US" smtClean="0"/>
-              <a:t>11/24/2021</a:t>
+              <a:t>11/26/2021</a:t>
             </a:fld>
             <a:endParaRPr lang="en-US"/>
           </a:p>
@@ -5080,7 +5773,7 @@
           <a:p>
             <a:fld id="{547641E8-73DF-4AD2-848E-3103064331B1}" type="datetimeFigureOut">
               <a:rPr lang="en-US" smtClean="0"/>
-              <a:t>11/24/2021</a:t>
+              <a:t>11/26/2021</a:t>
             </a:fld>
             <a:endParaRPr lang="en-US"/>
           </a:p>
@@ -5332,7 +6025,7 @@
           <a:p>
             <a:fld id="{547641E8-73DF-4AD2-848E-3103064331B1}" type="datetimeFigureOut">
               <a:rPr lang="en-US" smtClean="0"/>
-              <a:t>11/24/2021</a:t>
+              <a:t>11/26/2021</a:t>
             </a:fld>
             <a:endParaRPr lang="en-US"/>
           </a:p>
@@ -5546,7 +6239,7 @@
           <a:p>
             <a:fld id="{547641E8-73DF-4AD2-848E-3103064331B1}" type="datetimeFigureOut">
               <a:rPr lang="en-US" smtClean="0"/>
-              <a:t>11/24/2021</a:t>
+              <a:t>11/26/2021</a:t>
             </a:fld>
             <a:endParaRPr lang="en-US"/>
           </a:p>
@@ -6061,7 +6754,7 @@
                 </a:solidFill>
               </a:rPr>
               <a:pPr/>
-              <a:t>11/24/2021</a:t>
+              <a:t>11/26/2021</a:t>
             </a:fld>
             <a:endParaRPr lang="en-US">
               <a:solidFill>
@@ -6516,8 +7209,8 @@
         </p:nvSpPr>
         <p:spPr>
           <a:xfrm>
-            <a:off x="1371600" y="4506967"/>
-            <a:ext cx="6400800" cy="1752600"/>
+            <a:off x="1371600" y="5029200"/>
+            <a:ext cx="6400800" cy="674633"/>
           </a:xfrm>
         </p:spPr>
         <p:txBody>
@@ -8001,68 +8694,105 @@
           <a:p>
             <a:r>
               <a:rPr lang="en-US" dirty="0"/>
+              <a:t>Linear Models</a:t>
+            </a:r>
+          </a:p>
+        </p:txBody>
+      </p:sp>
+      <p:sp>
+        <p:nvSpPr>
+          <p:cNvPr id="3" name="Content Placeholder 2"/>
+          <p:cNvSpPr>
+            <a:spLocks noGrp="1"/>
+          </p:cNvSpPr>
+          <p:nvPr>
+            <p:ph idx="1"/>
+          </p:nvPr>
+        </p:nvSpPr>
+        <p:spPr/>
+        <p:txBody>
+          <a:bodyPr>
+            <a:normAutofit fontScale="92500" lnSpcReduction="20000"/>
+          </a:bodyPr>
+          <a:lstStyle/>
+          <a:p>
+            <a:r>
+              <a:rPr lang="en-US" dirty="0"/>
+              <a:t>List of some Types we will Cover</a:t>
+            </a:r>
+          </a:p>
+          <a:p>
+            <a:pPr lvl="1"/>
+            <a:r>
+              <a:rPr lang="en-US" dirty="0"/>
               <a:t>Linear Classifiers</a:t>
             </a:r>
           </a:p>
-        </p:txBody>
-      </p:sp>
-      <p:sp>
-        <p:nvSpPr>
-          <p:cNvPr id="3" name="Content Placeholder 2"/>
-          <p:cNvSpPr>
-            <a:spLocks noGrp="1"/>
-          </p:cNvSpPr>
-          <p:nvPr>
-            <p:ph idx="1"/>
-          </p:nvPr>
-        </p:nvSpPr>
-        <p:spPr/>
-        <p:txBody>
-          <a:bodyPr/>
-          <a:lstStyle/>
-          <a:p>
-            <a:r>
-              <a:rPr lang="en-US" dirty="0"/>
-              <a:t>List of some Types we will Cover</a:t>
+          <a:p>
+            <a:pPr lvl="2"/>
+            <a:r>
+              <a:rPr lang="en-US" dirty="0"/>
+              <a:t>K-Nearest Neighbors</a:t>
+            </a:r>
+          </a:p>
+          <a:p>
+            <a:pPr lvl="2"/>
+            <a:r>
+              <a:rPr lang="en-US" dirty="0"/>
+              <a:t>Decision Tree</a:t>
             </a:r>
           </a:p>
           <a:p>
             <a:pPr lvl="1"/>
             <a:r>
               <a:rPr lang="en-US" dirty="0"/>
+              <a:t>Linear Regressors</a:t>
+            </a:r>
+          </a:p>
+          <a:p>
+            <a:pPr lvl="2"/>
+            <a:r>
+              <a:rPr lang="en-US" dirty="0"/>
               <a:t>K-Nearest Neighbors</a:t>
             </a:r>
           </a:p>
           <a:p>
-            <a:pPr lvl="1"/>
+            <a:pPr lvl="2"/>
+            <a:r>
+              <a:rPr lang="en-US" dirty="0"/>
+              <a:t>Linear Regression</a:t>
+            </a:r>
+          </a:p>
+          <a:p>
+            <a:pPr lvl="2"/>
             <a:r>
               <a:rPr lang="en-US" dirty="0"/>
               <a:t>Lasso</a:t>
             </a:r>
           </a:p>
           <a:p>
-            <a:pPr lvl="1"/>
+            <a:pPr lvl="2"/>
             <a:r>
               <a:rPr lang="en-US" dirty="0"/>
               <a:t>Regression</a:t>
             </a:r>
           </a:p>
           <a:p>
-            <a:pPr lvl="1"/>
-            <a:r>
-              <a:rPr lang="en-US" dirty="0"/>
-              <a:t>Tree</a:t>
-            </a:r>
-          </a:p>
-          <a:p>
-            <a:pPr lvl="1"/>
+            <a:pPr lvl="2"/>
+            <a:r>
+              <a:rPr lang="en-US" dirty="0"/>
+              <a:t>Decision Tree</a:t>
+            </a:r>
+          </a:p>
+          <a:p>
+            <a:pPr lvl="2"/>
             <a:r>
               <a:rPr lang="en-US" dirty="0"/>
               <a:t>Forest</a:t>
             </a:r>
           </a:p>
           <a:p>
-            <a:pPr lvl="1"/>
+            <a:pPr lvl="2"/>
             <a:r>
               <a:rPr lang="en-US" dirty="0"/>
               <a:t>Gradient-Boosted Forest</a:t>
@@ -8096,7 +8826,7 @@
     <p:bg>
       <p:bgPr>
         <a:blipFill dpi="0" rotWithShape="1">
-          <a:blip r:embed="rId3">
+          <a:blip r:embed="rId4">
             <a:lum/>
           </a:blip>
           <a:srcRect/>
@@ -8138,7 +8868,7 @@
           <a:p>
             <a:r>
               <a:rPr lang="en-US" dirty="0"/>
-              <a:t>Linear Models</a:t>
+              <a:t>Linear Models - Classifiers</a:t>
             </a:r>
           </a:p>
         </p:txBody>
@@ -8167,7 +8897,14 @@
             <a:pPr lvl="1"/>
             <a:r>
               <a:rPr lang="en-US" dirty="0"/>
-              <a:t>Predicts outcome by finding the closest matching data point.</a:t>
+              <a:t>Predicts outcome by finding the closest matching data point neighbor(s) to the target point.</a:t>
+            </a:r>
+          </a:p>
+          <a:p>
+            <a:pPr lvl="1"/>
+            <a:r>
+              <a:rPr lang="en-US" dirty="0"/>
+              <a:t>When multiple neighbors are used, the classification with the most neighbors is what the target point is classified as.</a:t>
             </a:r>
           </a:p>
           <a:p>
@@ -8198,7 +8935,7 @@
     <p:bg>
       <p:bgPr>
         <a:blipFill dpi="0" rotWithShape="1">
-          <a:blip r:embed="rId3">
+          <a:blip r:embed="rId5">
             <a:lum/>
           </a:blip>
           <a:srcRect/>
@@ -8240,7 +8977,7 @@
           <a:p>
             <a:r>
               <a:rPr lang="en-US" dirty="0"/>
-              <a:t>Linear Models</a:t>
+              <a:t>Linear Models - Classifiers</a:t>
             </a:r>
           </a:p>
         </p:txBody>
@@ -8262,7 +8999,14 @@
           <a:p>
             <a:r>
               <a:rPr lang="en-US" dirty="0"/>
-              <a:t>Lasso</a:t>
+              <a:t>K-Nearest Neighbors</a:t>
+            </a:r>
+          </a:p>
+          <a:p>
+            <a:pPr lvl="1"/>
+            <a:r>
+              <a:rPr lang="en-US" dirty="0"/>
+              <a:t>Graphs below show decision, generated in source (1).  The stars are the test data, and the model is predicting whether they are blue or red.</a:t>
             </a:r>
           </a:p>
           <a:p>
@@ -8274,10 +9018,109 @@
           </a:p>
         </p:txBody>
       </p:sp>
+      <p:graphicFrame>
+        <p:nvGraphicFramePr>
+          <p:cNvPr id="4" name="Object 3">
+            <a:extLst>
+              <a:ext uri="{FF2B5EF4-FFF2-40B4-BE49-F238E27FC236}">
+                <a16:creationId xmlns:a16="http://schemas.microsoft.com/office/drawing/2014/main" id="{6FEA90EB-FF26-44D7-8936-27E2CDD4F15A}"/>
+              </a:ext>
+            </a:extLst>
+          </p:cNvPr>
+          <p:cNvGraphicFramePr>
+            <a:graphicFrameLocks noChangeAspect="1"/>
+          </p:cNvGraphicFramePr>
+          <p:nvPr>
+            <p:extLst>
+              <p:ext uri="{D42A27DB-BD31-4B8C-83A1-F6EECF244321}">
+                <p14:modId xmlns:p14="http://schemas.microsoft.com/office/powerpoint/2010/main" val="2494815372"/>
+              </p:ext>
+            </p:extLst>
+          </p:nvPr>
+        </p:nvGraphicFramePr>
+        <p:xfrm>
+          <a:off x="4806488" y="3558479"/>
+          <a:ext cx="3743325" cy="3024187"/>
+        </p:xfrm>
+        <a:graphic>
+          <a:graphicData uri="http://schemas.openxmlformats.org/presentationml/2006/ole">
+            <mc:AlternateContent xmlns:mc="http://schemas.openxmlformats.org/markup-compatibility/2006">
+              <mc:Choice xmlns:v="urn:schemas-microsoft-com:vml" Requires="v">
+                <p:oleObj spid="_x0000_s2060" name="Bitmap Image" r:id="rId6" imgW="3743280" imgH="3024360" progId="Paint.Picture">
+                  <p:embed/>
+                </p:oleObj>
+              </mc:Choice>
+              <mc:Fallback>
+                <p:oleObj name="Bitmap Image" r:id="rId6" imgW="3743280" imgH="3024360" progId="Paint.Picture">
+                  <p:embed/>
+                  <p:pic>
+                    <p:nvPicPr>
+                      <p:cNvPr id="4" name="Object 3">
+                        <a:extLst>
+                          <a:ext uri="{FF2B5EF4-FFF2-40B4-BE49-F238E27FC236}">
+                            <a16:creationId xmlns:a16="http://schemas.microsoft.com/office/drawing/2014/main" id="{6FEA90EB-FF26-44D7-8936-27E2CDD4F15A}"/>
+                          </a:ext>
+                        </a:extLst>
+                      </p:cNvPr>
+                      <p:cNvPicPr/>
+                      <p:nvPr/>
+                    </p:nvPicPr>
+                    <p:blipFill>
+                      <a:blip r:embed="rId7"/>
+                      <a:stretch>
+                        <a:fillRect/>
+                      </a:stretch>
+                    </p:blipFill>
+                    <p:spPr>
+                      <a:xfrm>
+                        <a:off x="4806488" y="3558479"/>
+                        <a:ext cx="3743325" cy="3024187"/>
+                      </a:xfrm>
+                      <a:prstGeom prst="rect">
+                        <a:avLst/>
+                      </a:prstGeom>
+                    </p:spPr>
+                  </p:pic>
+                </p:oleObj>
+              </mc:Fallback>
+            </mc:AlternateContent>
+          </a:graphicData>
+        </a:graphic>
+      </p:graphicFrame>
+      <p:pic>
+        <p:nvPicPr>
+          <p:cNvPr id="6" name="Picture 5">
+            <a:extLst>
+              <a:ext uri="{FF2B5EF4-FFF2-40B4-BE49-F238E27FC236}">
+                <a16:creationId xmlns:a16="http://schemas.microsoft.com/office/drawing/2014/main" id="{46E5B26D-14FD-4A0C-A7FD-2C739D14445F}"/>
+              </a:ext>
+            </a:extLst>
+          </p:cNvPr>
+          <p:cNvPicPr>
+            <a:picLocks noChangeAspect="1"/>
+          </p:cNvPicPr>
+          <p:nvPr/>
+        </p:nvPicPr>
+        <p:blipFill>
+          <a:blip r:embed="rId8"/>
+          <a:stretch>
+            <a:fillRect/>
+          </a:stretch>
+        </p:blipFill>
+        <p:spPr>
+          <a:xfrm>
+            <a:off x="622764" y="3562760"/>
+            <a:ext cx="3680510" cy="3019906"/>
+          </a:xfrm>
+          <a:prstGeom prst="rect">
+            <a:avLst/>
+          </a:prstGeom>
+        </p:spPr>
+      </p:pic>
     </p:spTree>
     <p:extLst>
       <p:ext uri="{BB962C8B-B14F-4D97-AF65-F5344CB8AC3E}">
-        <p14:creationId xmlns:p14="http://schemas.microsoft.com/office/powerpoint/2010/main" val="1469044682"/>
+        <p14:creationId xmlns:p14="http://schemas.microsoft.com/office/powerpoint/2010/main" val="735927294"/>
       </p:ext>
     </p:extLst>
   </p:cSld>
@@ -8293,7 +9136,7 @@
     <p:bg>
       <p:bgPr>
         <a:blipFill dpi="0" rotWithShape="1">
-          <a:blip r:embed="rId3">
+          <a:blip r:embed="rId4">
             <a:lum/>
           </a:blip>
           <a:srcRect/>
@@ -8335,7 +9178,7 @@
           <a:p>
             <a:r>
               <a:rPr lang="en-US" dirty="0"/>
-              <a:t>Linear Models</a:t>
+              <a:t>Linear Models - Classifiers</a:t>
             </a:r>
           </a:p>
         </p:txBody>
@@ -8357,7 +9200,28 @@
           <a:p>
             <a:r>
               <a:rPr lang="en-US" dirty="0"/>
-              <a:t>Regression</a:t>
+              <a:t>Decision Tree</a:t>
+            </a:r>
+          </a:p>
+          <a:p>
+            <a:pPr lvl="1"/>
+            <a:r>
+              <a:rPr lang="en-US" dirty="0"/>
+              <a:t>Builds a series of if-statements to classify test points.</a:t>
+            </a:r>
+          </a:p>
+          <a:p>
+            <a:pPr lvl="1"/>
+            <a:r>
+              <a:rPr lang="en-US" dirty="0"/>
+              <a:t>Boundaries around classifications are built based on the data.</a:t>
+            </a:r>
+          </a:p>
+          <a:p>
+            <a:pPr lvl="1"/>
+            <a:r>
+              <a:rPr lang="en-US" dirty="0"/>
+              <a:t>The number of if statement groups, or boundaries created, is known as the depth.</a:t>
             </a:r>
           </a:p>
           <a:p>
@@ -8372,7 +9236,7 @@
     </p:spTree>
     <p:extLst>
       <p:ext uri="{BB962C8B-B14F-4D97-AF65-F5344CB8AC3E}">
-        <p14:creationId xmlns:p14="http://schemas.microsoft.com/office/powerpoint/2010/main" val="474133971"/>
+        <p14:creationId xmlns:p14="http://schemas.microsoft.com/office/powerpoint/2010/main" val="31895842"/>
       </p:ext>
     </p:extLst>
   </p:cSld>
@@ -8388,7 +9252,7 @@
     <p:bg>
       <p:bgPr>
         <a:blipFill dpi="0" rotWithShape="1">
-          <a:blip r:embed="rId3">
+          <a:blip r:embed="rId4">
             <a:lum/>
           </a:blip>
           <a:srcRect/>
@@ -8430,7 +9294,7 @@
           <a:p>
             <a:r>
               <a:rPr lang="en-US" dirty="0"/>
-              <a:t>Linear Models</a:t>
+              <a:t>Linear Models - Classifiers</a:t>
             </a:r>
           </a:p>
         </p:txBody>
@@ -8452,7 +9316,7 @@
           <a:p>
             <a:r>
               <a:rPr lang="en-US" dirty="0"/>
-              <a:t>Tree</a:t>
+              <a:t>Decision Tree</a:t>
             </a:r>
           </a:p>
           <a:p>
@@ -8467,7 +9331,7 @@
     </p:spTree>
     <p:extLst>
       <p:ext uri="{BB962C8B-B14F-4D97-AF65-F5344CB8AC3E}">
-        <p14:creationId xmlns:p14="http://schemas.microsoft.com/office/powerpoint/2010/main" val="1924952010"/>
+        <p14:creationId xmlns:p14="http://schemas.microsoft.com/office/powerpoint/2010/main" val="2487683877"/>
       </p:ext>
     </p:extLst>
   </p:cSld>
@@ -8525,7 +9389,7 @@
           <a:p>
             <a:r>
               <a:rPr lang="en-US" dirty="0"/>
-              <a:t>Linear Models</a:t>
+              <a:t>Linear Models - Regressors</a:t>
             </a:r>
           </a:p>
         </p:txBody>
@@ -8547,7 +9411,7 @@
           <a:p>
             <a:r>
               <a:rPr lang="en-US" dirty="0"/>
-              <a:t>Forest</a:t>
+              <a:t>Linear Regression</a:t>
             </a:r>
           </a:p>
           <a:p>
@@ -8562,7 +9426,7 @@
     </p:spTree>
     <p:extLst>
       <p:ext uri="{BB962C8B-B14F-4D97-AF65-F5344CB8AC3E}">
-        <p14:creationId xmlns:p14="http://schemas.microsoft.com/office/powerpoint/2010/main" val="358457677"/>
+        <p14:creationId xmlns:p14="http://schemas.microsoft.com/office/powerpoint/2010/main" val="1469044682"/>
       </p:ext>
     </p:extLst>
   </p:cSld>
@@ -8620,7 +9484,7 @@
           <a:p>
             <a:r>
               <a:rPr lang="en-US" dirty="0"/>
-              <a:t>Linear Models</a:t>
+              <a:t>Linear Models - Regressors</a:t>
             </a:r>
           </a:p>
         </p:txBody>
@@ -8642,7 +9506,7 @@
           <a:p>
             <a:r>
               <a:rPr lang="en-US" dirty="0"/>
-              <a:t>Gradient-Boosted Forest</a:t>
+              <a:t>Lasso</a:t>
             </a:r>
           </a:p>
           <a:p>
@@ -8657,7 +9521,7 @@
     </p:spTree>
     <p:extLst>
       <p:ext uri="{BB962C8B-B14F-4D97-AF65-F5344CB8AC3E}">
-        <p14:creationId xmlns:p14="http://schemas.microsoft.com/office/powerpoint/2010/main" val="1436682753"/>
+        <p14:creationId xmlns:p14="http://schemas.microsoft.com/office/powerpoint/2010/main" val="2833183138"/>
       </p:ext>
     </p:extLst>
   </p:cSld>
@@ -8673,7 +9537,7 @@
     <p:bg>
       <p:bgPr>
         <a:blipFill dpi="0" rotWithShape="1">
-          <a:blip r:embed="rId2">
+          <a:blip r:embed="rId3">
             <a:lum/>
           </a:blip>
           <a:srcRect/>
@@ -8715,7 +9579,7 @@
           <a:p>
             <a:r>
               <a:rPr lang="en-US" dirty="0"/>
-              <a:t>Evaluating Accuracy</a:t>
+              <a:t>Linear Models - Regressors</a:t>
             </a:r>
           </a:p>
         </p:txBody>
@@ -8737,32 +9601,8 @@
           <a:p>
             <a:r>
               <a:rPr lang="en-US" dirty="0"/>
-              <a:t>Overview</a:t>
-            </a:r>
-          </a:p>
-          <a:p>
-            <a:pPr lvl="1"/>
-            <a:r>
-              <a:rPr lang="en-US" dirty="0"/>
-              <a:t>&lt;model&gt;.score(</a:t>
-            </a:r>
-            <a:r>
-              <a:rPr lang="en-US" dirty="0" err="1"/>
-              <a:t>test_data</a:t>
-            </a:r>
-            <a:r>
-              <a:rPr lang="en-US" dirty="0"/>
-              <a:t>, </a:t>
-            </a:r>
-            <a:r>
-              <a:rPr lang="en-US" dirty="0" err="1"/>
-              <a:t>test_labels</a:t>
-            </a:r>
-            <a:r>
-              <a:rPr lang="en-US"/>
-              <a:t>)</a:t>
-            </a:r>
-            <a:endParaRPr lang="en-US" dirty="0"/>
+              <a:t>Regression</a:t>
+            </a:r>
           </a:p>
           <a:p>
             <a:pPr lvl="2"/>
@@ -8776,12 +9616,12 @@
     </p:spTree>
     <p:extLst>
       <p:ext uri="{BB962C8B-B14F-4D97-AF65-F5344CB8AC3E}">
-        <p14:creationId xmlns:p14="http://schemas.microsoft.com/office/powerpoint/2010/main" val="4053921630"/>
+        <p14:creationId xmlns:p14="http://schemas.microsoft.com/office/powerpoint/2010/main" val="474133971"/>
       </p:ext>
     </p:extLst>
   </p:cSld>
   <p:clrMapOvr>
-    <a:masterClrMapping/>
+    <a:overrideClrMapping bg1="lt1" tx1="dk1" bg2="lt2" tx2="dk2" accent1="accent1" accent2="accent2" accent3="accent3" accent4="accent4" accent5="accent5" accent6="accent6" hlink="hlink" folHlink="folHlink"/>
   </p:clrMapOvr>
 </p:sld>
 </file>
@@ -8792,7 +9632,7 @@
     <p:bg>
       <p:bgPr>
         <a:blipFill dpi="0" rotWithShape="1">
-          <a:blip r:embed="rId2">
+          <a:blip r:embed="rId3">
             <a:lum/>
           </a:blip>
           <a:srcRect/>
@@ -8833,12 +9673,8 @@
           <a:lstStyle/>
           <a:p>
             <a:r>
-              <a:rPr lang="en-US" dirty="0" err="1"/>
-              <a:t>Scikit</a:t>
-            </a:r>
-            <a:r>
-              <a:rPr lang="en-US" dirty="0"/>
-              <a:t>-Learn Machine Learning</a:t>
+              <a:rPr lang="en-US" dirty="0"/>
+              <a:t>Linear Models - Regressors</a:t>
             </a:r>
           </a:p>
         </p:txBody>
@@ -8860,42 +9696,7 @@
           <a:p>
             <a:r>
               <a:rPr lang="en-US" dirty="0"/>
-              <a:t>Overview</a:t>
-            </a:r>
-          </a:p>
-          <a:p>
-            <a:pPr lvl="1"/>
-            <a:r>
-              <a:rPr lang="en-US" dirty="0"/>
-              <a:t>Definition</a:t>
-            </a:r>
-          </a:p>
-          <a:p>
-            <a:pPr lvl="1"/>
-            <a:r>
-              <a:rPr lang="en-US" dirty="0"/>
-              <a:t>General Types</a:t>
-            </a:r>
-          </a:p>
-          <a:p>
-            <a:pPr lvl="1"/>
-            <a:r>
-              <a:rPr lang="en-US" dirty="0"/>
-              <a:t>Basic Linear Models</a:t>
-            </a:r>
-          </a:p>
-          <a:p>
-            <a:pPr lvl="1"/>
-            <a:r>
-              <a:rPr lang="en-US" dirty="0"/>
-              <a:t>Algorithm Types</a:t>
-            </a:r>
-          </a:p>
-          <a:p>
-            <a:pPr lvl="1"/>
-            <a:r>
-              <a:rPr lang="en-US" dirty="0"/>
-              <a:t>Tuning</a:t>
+              <a:t>Decision Tree</a:t>
             </a:r>
           </a:p>
           <a:p>
@@ -8910,12 +9711,12 @@
     </p:spTree>
     <p:extLst>
       <p:ext uri="{BB962C8B-B14F-4D97-AF65-F5344CB8AC3E}">
-        <p14:creationId xmlns:p14="http://schemas.microsoft.com/office/powerpoint/2010/main" val="754999196"/>
+        <p14:creationId xmlns:p14="http://schemas.microsoft.com/office/powerpoint/2010/main" val="1924952010"/>
       </p:ext>
     </p:extLst>
   </p:cSld>
   <p:clrMapOvr>
-    <a:masterClrMapping/>
+    <a:overrideClrMapping bg1="lt1" tx1="dk1" bg2="lt2" tx2="dk2" accent1="accent1" accent2="accent2" accent3="accent3" accent4="accent4" accent5="accent5" accent6="accent6" hlink="hlink" folHlink="folHlink"/>
   </p:clrMapOvr>
 </p:sld>
 </file>
@@ -9038,7 +9839,7 @@
     <p:bg>
       <p:bgPr>
         <a:blipFill dpi="0" rotWithShape="1">
-          <a:blip r:embed="rId2">
+          <a:blip r:embed="rId3">
             <a:lum/>
           </a:blip>
           <a:srcRect/>
@@ -9080,7 +9881,7 @@
           <a:p>
             <a:r>
               <a:rPr lang="en-US" dirty="0"/>
-              <a:t>Tuning</a:t>
+              <a:t>Linear Models - Regressors</a:t>
             </a:r>
           </a:p>
         </p:txBody>
@@ -9102,7 +9903,7 @@
           <a:p>
             <a:r>
               <a:rPr lang="en-US" dirty="0"/>
-              <a:t>Determining what features matter</a:t>
+              <a:t>Forest</a:t>
             </a:r>
           </a:p>
           <a:p>
@@ -9117,12 +9918,12 @@
     </p:spTree>
     <p:extLst>
       <p:ext uri="{BB962C8B-B14F-4D97-AF65-F5344CB8AC3E}">
-        <p14:creationId xmlns:p14="http://schemas.microsoft.com/office/powerpoint/2010/main" val="3393037686"/>
+        <p14:creationId xmlns:p14="http://schemas.microsoft.com/office/powerpoint/2010/main" val="358457677"/>
       </p:ext>
     </p:extLst>
   </p:cSld>
   <p:clrMapOvr>
-    <a:masterClrMapping/>
+    <a:overrideClrMapping bg1="lt1" tx1="dk1" bg2="lt2" tx2="dk2" accent1="accent1" accent2="accent2" accent3="accent3" accent4="accent4" accent5="accent5" accent6="accent6" hlink="hlink" folHlink="folHlink"/>
   </p:clrMapOvr>
 </p:sld>
 </file>
@@ -9133,7 +9934,7 @@
     <p:bg>
       <p:bgPr>
         <a:blipFill dpi="0" rotWithShape="1">
-          <a:blip r:embed="rId2">
+          <a:blip r:embed="rId3">
             <a:lum/>
           </a:blip>
           <a:srcRect/>
@@ -9175,7 +9976,7 @@
           <a:p>
             <a:r>
               <a:rPr lang="en-US" dirty="0"/>
-              <a:t>Tuning</a:t>
+              <a:t>Linear Models - Regressors</a:t>
             </a:r>
           </a:p>
         </p:txBody>
@@ -9197,7 +9998,7 @@
           <a:p>
             <a:r>
               <a:rPr lang="en-US" dirty="0"/>
-              <a:t>Parameters to Play with</a:t>
+              <a:t>Gradient-Boosted Forest</a:t>
             </a:r>
           </a:p>
           <a:p>
@@ -9212,12 +10013,12 @@
     </p:spTree>
     <p:extLst>
       <p:ext uri="{BB962C8B-B14F-4D97-AF65-F5344CB8AC3E}">
-        <p14:creationId xmlns:p14="http://schemas.microsoft.com/office/powerpoint/2010/main" val="274238177"/>
+        <p14:creationId xmlns:p14="http://schemas.microsoft.com/office/powerpoint/2010/main" val="1436682753"/>
       </p:ext>
     </p:extLst>
   </p:cSld>
   <p:clrMapOvr>
-    <a:masterClrMapping/>
+    <a:overrideClrMapping bg1="lt1" tx1="dk1" bg2="lt2" tx2="dk2" accent1="accent1" accent2="accent2" accent3="accent3" accent4="accent4" accent5="accent5" accent6="accent6" hlink="hlink" folHlink="folHlink"/>
   </p:clrMapOvr>
 </p:sld>
 </file>
@@ -9270,7 +10071,7 @@
           <a:p>
             <a:r>
               <a:rPr lang="en-US" dirty="0"/>
-              <a:t>Tuning</a:t>
+              <a:t>Evaluating Accuracy</a:t>
             </a:r>
           </a:p>
         </p:txBody>
@@ -9292,8 +10093,32 @@
           <a:p>
             <a:r>
               <a:rPr lang="en-US" dirty="0"/>
-              <a:t>Grid Search</a:t>
-            </a:r>
+              <a:t>Overview</a:t>
+            </a:r>
+          </a:p>
+          <a:p>
+            <a:pPr lvl="1"/>
+            <a:r>
+              <a:rPr lang="en-US" dirty="0"/>
+              <a:t>&lt;model&gt;.score(</a:t>
+            </a:r>
+            <a:r>
+              <a:rPr lang="en-US" dirty="0" err="1"/>
+              <a:t>test_data</a:t>
+            </a:r>
+            <a:r>
+              <a:rPr lang="en-US" dirty="0"/>
+              <a:t>, </a:t>
+            </a:r>
+            <a:r>
+              <a:rPr lang="en-US" dirty="0" err="1"/>
+              <a:t>test_labels</a:t>
+            </a:r>
+            <a:r>
+              <a:rPr lang="en-US"/>
+              <a:t>)</a:t>
+            </a:r>
+            <a:endParaRPr lang="en-US" dirty="0"/>
           </a:p>
           <a:p>
             <a:pPr lvl="2"/>
@@ -9307,7 +10132,7 @@
     </p:spTree>
     <p:extLst>
       <p:ext uri="{BB962C8B-B14F-4D97-AF65-F5344CB8AC3E}">
-        <p14:creationId xmlns:p14="http://schemas.microsoft.com/office/powerpoint/2010/main" val="2622179278"/>
+        <p14:creationId xmlns:p14="http://schemas.microsoft.com/office/powerpoint/2010/main" val="4053921630"/>
       </p:ext>
     </p:extLst>
   </p:cSld>
@@ -9441,7 +10266,7 @@
     </p:spTree>
     <p:extLst>
       <p:ext uri="{BB962C8B-B14F-4D97-AF65-F5344CB8AC3E}">
-        <p14:creationId xmlns:p14="http://schemas.microsoft.com/office/powerpoint/2010/main" val="2946119377"/>
+        <p14:creationId xmlns:p14="http://schemas.microsoft.com/office/powerpoint/2010/main" val="754999196"/>
       </p:ext>
     </p:extLst>
   </p:cSld>
@@ -9499,7 +10324,7 @@
           <a:p>
             <a:r>
               <a:rPr lang="en-US" dirty="0"/>
-              <a:t>LICENSE</a:t>
+              <a:t>Tuning</a:t>
             </a:r>
           </a:p>
         </p:txBody>
@@ -9516,32 +10341,437 @@
         </p:nvSpPr>
         <p:spPr/>
         <p:txBody>
+          <a:bodyPr/>
+          <a:lstStyle/>
+          <a:p>
+            <a:r>
+              <a:rPr lang="en-US" dirty="0"/>
+              <a:t>Determining what features matter</a:t>
+            </a:r>
+          </a:p>
+          <a:p>
+            <a:pPr lvl="2"/>
+            <a:endParaRPr lang="en-US" dirty="0"/>
+          </a:p>
+          <a:p>
+            <a:endParaRPr lang="en-US" dirty="0"/>
+          </a:p>
+        </p:txBody>
+      </p:sp>
+    </p:spTree>
+    <p:extLst>
+      <p:ext uri="{BB962C8B-B14F-4D97-AF65-F5344CB8AC3E}">
+        <p14:creationId xmlns:p14="http://schemas.microsoft.com/office/powerpoint/2010/main" val="3393037686"/>
+      </p:ext>
+    </p:extLst>
+  </p:cSld>
+  <p:clrMapOvr>
+    <a:masterClrMapping/>
+  </p:clrMapOvr>
+</p:sld>
+</file>
+
+<file path=ppt/slides/slide35.xml><?xml version="1.0" encoding="utf-8"?>
+<p:sld xmlns:a="http://schemas.openxmlformats.org/drawingml/2006/main" xmlns:r="http://schemas.openxmlformats.org/officeDocument/2006/relationships" xmlns:p="http://schemas.openxmlformats.org/presentationml/2006/main">
+  <p:cSld>
+    <p:bg>
+      <p:bgPr>
+        <a:blipFill dpi="0" rotWithShape="1">
+          <a:blip r:embed="rId2">
+            <a:lum/>
+          </a:blip>
+          <a:srcRect/>
+          <a:stretch>
+            <a:fillRect l="-10000" r="-10000"/>
+          </a:stretch>
+        </a:blipFill>
+        <a:effectLst/>
+      </p:bgPr>
+    </p:bg>
+    <p:spTree>
+      <p:nvGrpSpPr>
+        <p:cNvPr id="1" name=""/>
+        <p:cNvGrpSpPr/>
+        <p:nvPr/>
+      </p:nvGrpSpPr>
+      <p:grpSpPr>
+        <a:xfrm>
+          <a:off x="0" y="0"/>
+          <a:ext cx="0" cy="0"/>
+          <a:chOff x="0" y="0"/>
+          <a:chExt cx="0" cy="0"/>
+        </a:xfrm>
+      </p:grpSpPr>
+      <p:sp>
+        <p:nvSpPr>
+          <p:cNvPr id="2" name="Title 1"/>
+          <p:cNvSpPr>
+            <a:spLocks noGrp="1"/>
+          </p:cNvSpPr>
+          <p:nvPr>
+            <p:ph type="title"/>
+          </p:nvPr>
+        </p:nvSpPr>
+        <p:spPr/>
+        <p:txBody>
+          <a:bodyPr/>
+          <a:lstStyle/>
+          <a:p>
+            <a:r>
+              <a:rPr lang="en-US" dirty="0"/>
+              <a:t>Tuning</a:t>
+            </a:r>
+          </a:p>
+        </p:txBody>
+      </p:sp>
+      <p:sp>
+        <p:nvSpPr>
+          <p:cNvPr id="3" name="Content Placeholder 2"/>
+          <p:cNvSpPr>
+            <a:spLocks noGrp="1"/>
+          </p:cNvSpPr>
+          <p:nvPr>
+            <p:ph idx="1"/>
+          </p:nvPr>
+        </p:nvSpPr>
+        <p:spPr/>
+        <p:txBody>
+          <a:bodyPr/>
+          <a:lstStyle/>
+          <a:p>
+            <a:r>
+              <a:rPr lang="en-US" dirty="0"/>
+              <a:t>Parameters to Play with</a:t>
+            </a:r>
+          </a:p>
+          <a:p>
+            <a:pPr lvl="2"/>
+            <a:endParaRPr lang="en-US" dirty="0"/>
+          </a:p>
+          <a:p>
+            <a:endParaRPr lang="en-US" dirty="0"/>
+          </a:p>
+        </p:txBody>
+      </p:sp>
+    </p:spTree>
+    <p:extLst>
+      <p:ext uri="{BB962C8B-B14F-4D97-AF65-F5344CB8AC3E}">
+        <p14:creationId xmlns:p14="http://schemas.microsoft.com/office/powerpoint/2010/main" val="274238177"/>
+      </p:ext>
+    </p:extLst>
+  </p:cSld>
+  <p:clrMapOvr>
+    <a:masterClrMapping/>
+  </p:clrMapOvr>
+</p:sld>
+</file>
+
+<file path=ppt/slides/slide36.xml><?xml version="1.0" encoding="utf-8"?>
+<p:sld xmlns:a="http://schemas.openxmlformats.org/drawingml/2006/main" xmlns:r="http://schemas.openxmlformats.org/officeDocument/2006/relationships" xmlns:p="http://schemas.openxmlformats.org/presentationml/2006/main">
+  <p:cSld>
+    <p:bg>
+      <p:bgPr>
+        <a:blipFill dpi="0" rotWithShape="1">
+          <a:blip r:embed="rId2">
+            <a:lum/>
+          </a:blip>
+          <a:srcRect/>
+          <a:stretch>
+            <a:fillRect l="-10000" r="-10000"/>
+          </a:stretch>
+        </a:blipFill>
+        <a:effectLst/>
+      </p:bgPr>
+    </p:bg>
+    <p:spTree>
+      <p:nvGrpSpPr>
+        <p:cNvPr id="1" name=""/>
+        <p:cNvGrpSpPr/>
+        <p:nvPr/>
+      </p:nvGrpSpPr>
+      <p:grpSpPr>
+        <a:xfrm>
+          <a:off x="0" y="0"/>
+          <a:ext cx="0" cy="0"/>
+          <a:chOff x="0" y="0"/>
+          <a:chExt cx="0" cy="0"/>
+        </a:xfrm>
+      </p:grpSpPr>
+      <p:sp>
+        <p:nvSpPr>
+          <p:cNvPr id="2" name="Title 1"/>
+          <p:cNvSpPr>
+            <a:spLocks noGrp="1"/>
+          </p:cNvSpPr>
+          <p:nvPr>
+            <p:ph type="title"/>
+          </p:nvPr>
+        </p:nvSpPr>
+        <p:spPr/>
+        <p:txBody>
+          <a:bodyPr/>
+          <a:lstStyle/>
+          <a:p>
+            <a:r>
+              <a:rPr lang="en-US" dirty="0"/>
+              <a:t>Tuning</a:t>
+            </a:r>
+          </a:p>
+        </p:txBody>
+      </p:sp>
+      <p:sp>
+        <p:nvSpPr>
+          <p:cNvPr id="3" name="Content Placeholder 2"/>
+          <p:cNvSpPr>
+            <a:spLocks noGrp="1"/>
+          </p:cNvSpPr>
+          <p:nvPr>
+            <p:ph idx="1"/>
+          </p:nvPr>
+        </p:nvSpPr>
+        <p:spPr/>
+        <p:txBody>
+          <a:bodyPr/>
+          <a:lstStyle/>
+          <a:p>
+            <a:r>
+              <a:rPr lang="en-US" dirty="0"/>
+              <a:t>Grid Search</a:t>
+            </a:r>
+          </a:p>
+          <a:p>
+            <a:pPr lvl="2"/>
+            <a:endParaRPr lang="en-US" dirty="0"/>
+          </a:p>
+          <a:p>
+            <a:endParaRPr lang="en-US" dirty="0"/>
+          </a:p>
+        </p:txBody>
+      </p:sp>
+    </p:spTree>
+    <p:extLst>
+      <p:ext uri="{BB962C8B-B14F-4D97-AF65-F5344CB8AC3E}">
+        <p14:creationId xmlns:p14="http://schemas.microsoft.com/office/powerpoint/2010/main" val="2622179278"/>
+      </p:ext>
+    </p:extLst>
+  </p:cSld>
+  <p:clrMapOvr>
+    <a:masterClrMapping/>
+  </p:clrMapOvr>
+</p:sld>
+</file>
+
+<file path=ppt/slides/slide37.xml><?xml version="1.0" encoding="utf-8"?>
+<p:sld xmlns:a="http://schemas.openxmlformats.org/drawingml/2006/main" xmlns:r="http://schemas.openxmlformats.org/officeDocument/2006/relationships" xmlns:p="http://schemas.openxmlformats.org/presentationml/2006/main">
+  <p:cSld>
+    <p:bg>
+      <p:bgPr>
+        <a:blipFill dpi="0" rotWithShape="1">
+          <a:blip r:embed="rId2">
+            <a:lum/>
+          </a:blip>
+          <a:srcRect/>
+          <a:stretch>
+            <a:fillRect l="-10000" r="-10000"/>
+          </a:stretch>
+        </a:blipFill>
+        <a:effectLst/>
+      </p:bgPr>
+    </p:bg>
+    <p:spTree>
+      <p:nvGrpSpPr>
+        <p:cNvPr id="1" name=""/>
+        <p:cNvGrpSpPr/>
+        <p:nvPr/>
+      </p:nvGrpSpPr>
+      <p:grpSpPr>
+        <a:xfrm>
+          <a:off x="0" y="0"/>
+          <a:ext cx="0" cy="0"/>
+          <a:chOff x="0" y="0"/>
+          <a:chExt cx="0" cy="0"/>
+        </a:xfrm>
+      </p:grpSpPr>
+      <p:sp>
+        <p:nvSpPr>
+          <p:cNvPr id="2" name="Title 1"/>
+          <p:cNvSpPr>
+            <a:spLocks noGrp="1"/>
+          </p:cNvSpPr>
+          <p:nvPr>
+            <p:ph type="title"/>
+          </p:nvPr>
+        </p:nvSpPr>
+        <p:spPr/>
+        <p:txBody>
+          <a:bodyPr/>
+          <a:lstStyle/>
+          <a:p>
+            <a:r>
+              <a:rPr lang="en-US" dirty="0" err="1"/>
+              <a:t>Scikit</a:t>
+            </a:r>
+            <a:r>
+              <a:rPr lang="en-US" dirty="0"/>
+              <a:t>-Learn Machine Learning</a:t>
+            </a:r>
+          </a:p>
+        </p:txBody>
+      </p:sp>
+      <p:sp>
+        <p:nvSpPr>
+          <p:cNvPr id="3" name="Content Placeholder 2"/>
+          <p:cNvSpPr>
+            <a:spLocks noGrp="1"/>
+          </p:cNvSpPr>
+          <p:nvPr>
+            <p:ph idx="1"/>
+          </p:nvPr>
+        </p:nvSpPr>
+        <p:spPr/>
+        <p:txBody>
+          <a:bodyPr/>
+          <a:lstStyle/>
+          <a:p>
+            <a:r>
+              <a:rPr lang="en-US" dirty="0"/>
+              <a:t>Overview</a:t>
+            </a:r>
+          </a:p>
+          <a:p>
+            <a:pPr lvl="1"/>
+            <a:r>
+              <a:rPr lang="en-US" dirty="0"/>
+              <a:t>Definition</a:t>
+            </a:r>
+          </a:p>
+          <a:p>
+            <a:pPr lvl="1"/>
+            <a:r>
+              <a:rPr lang="en-US" dirty="0"/>
+              <a:t>General Types</a:t>
+            </a:r>
+          </a:p>
+          <a:p>
+            <a:pPr lvl="1"/>
+            <a:r>
+              <a:rPr lang="en-US" dirty="0"/>
+              <a:t>Basic Linear Models</a:t>
+            </a:r>
+          </a:p>
+          <a:p>
+            <a:pPr lvl="1"/>
+            <a:r>
+              <a:rPr lang="en-US" dirty="0"/>
+              <a:t>Algorithm Types</a:t>
+            </a:r>
+          </a:p>
+          <a:p>
+            <a:pPr lvl="1"/>
+            <a:r>
+              <a:rPr lang="en-US" dirty="0"/>
+              <a:t>Tuning</a:t>
+            </a:r>
+          </a:p>
+          <a:p>
+            <a:pPr lvl="2"/>
+            <a:endParaRPr lang="en-US" dirty="0"/>
+          </a:p>
+          <a:p>
+            <a:endParaRPr lang="en-US" dirty="0"/>
+          </a:p>
+        </p:txBody>
+      </p:sp>
+    </p:spTree>
+    <p:extLst>
+      <p:ext uri="{BB962C8B-B14F-4D97-AF65-F5344CB8AC3E}">
+        <p14:creationId xmlns:p14="http://schemas.microsoft.com/office/powerpoint/2010/main" val="2946119377"/>
+      </p:ext>
+    </p:extLst>
+  </p:cSld>
+  <p:clrMapOvr>
+    <a:masterClrMapping/>
+  </p:clrMapOvr>
+</p:sld>
+</file>
+
+<file path=ppt/slides/slide38.xml><?xml version="1.0" encoding="utf-8"?>
+<p:sld xmlns:a="http://schemas.openxmlformats.org/drawingml/2006/main" xmlns:r="http://schemas.openxmlformats.org/officeDocument/2006/relationships" xmlns:p="http://schemas.openxmlformats.org/presentationml/2006/main">
+  <p:cSld>
+    <p:bg>
+      <p:bgPr>
+        <a:blipFill dpi="0" rotWithShape="1">
+          <a:blip r:embed="rId2">
+            <a:lum/>
+          </a:blip>
+          <a:srcRect/>
+          <a:stretch>
+            <a:fillRect l="-10000" r="-10000"/>
+          </a:stretch>
+        </a:blipFill>
+        <a:effectLst/>
+      </p:bgPr>
+    </p:bg>
+    <p:spTree>
+      <p:nvGrpSpPr>
+        <p:cNvPr id="1" name=""/>
+        <p:cNvGrpSpPr/>
+        <p:nvPr/>
+      </p:nvGrpSpPr>
+      <p:grpSpPr>
+        <a:xfrm>
+          <a:off x="0" y="0"/>
+          <a:ext cx="0" cy="0"/>
+          <a:chOff x="0" y="0"/>
+          <a:chExt cx="0" cy="0"/>
+        </a:xfrm>
+      </p:grpSpPr>
+      <p:sp>
+        <p:nvSpPr>
+          <p:cNvPr id="2" name="Title 1"/>
+          <p:cNvSpPr>
+            <a:spLocks noGrp="1"/>
+          </p:cNvSpPr>
+          <p:nvPr>
+            <p:ph type="title"/>
+          </p:nvPr>
+        </p:nvSpPr>
+        <p:spPr/>
+        <p:txBody>
+          <a:bodyPr/>
+          <a:lstStyle/>
+          <a:p>
+            <a:r>
+              <a:rPr lang="en-US" dirty="0"/>
+              <a:t>Bibliography</a:t>
+            </a:r>
+          </a:p>
+        </p:txBody>
+      </p:sp>
+      <p:sp>
+        <p:nvSpPr>
+          <p:cNvPr id="3" name="Content Placeholder 2"/>
+          <p:cNvSpPr>
+            <a:spLocks noGrp="1"/>
+          </p:cNvSpPr>
+          <p:nvPr>
+            <p:ph idx="1"/>
+          </p:nvPr>
+        </p:nvSpPr>
+        <p:spPr/>
+        <p:txBody>
           <a:bodyPr>
-            <a:normAutofit fontScale="62500" lnSpcReduction="20000"/>
+            <a:normAutofit/>
           </a:bodyPr>
           <a:lstStyle/>
           <a:p>
-            <a:r>
-              <a:rPr lang="en-US" dirty="0"/>
-              <a:t>Copyright 2018 Douglas Bowman</a:t>
-            </a:r>
-          </a:p>
-          <a:p>
-            <a:r>
-              <a:rPr lang="en-US" dirty="0"/>
-              <a:t>Permission is hereby granted, free of charge, to any person obtaining a copy of this software and associated documentation files (the "Software"), to deal in the Software without restriction, including without limitation the rights to use, copy, modify, merge, publish, distribute, sublicense, and/or sell copies of the Software, and to permit persons to whom the Software is furnished to do so, subject to the following conditions:</a:t>
-            </a:r>
-          </a:p>
-          <a:p>
-            <a:r>
-              <a:rPr lang="en-US" dirty="0"/>
-              <a:t>The above copyright notice and this permission notice shall be included in all copies or substantial portions of the Software.</a:t>
-            </a:r>
-          </a:p>
-          <a:p>
-            <a:r>
-              <a:rPr lang="en-US" dirty="0"/>
-              <a:t>THE SOFTWARE IS PROVIDED "AS IS", WITHOUT WARRANTY OF ANY KIND, EXPRESS OR IMPLIED, INCLUDING BUT NOT LIMITED TO THE WARRANTIES OF MERCHANTABILITY, FITNESS FOR A PARTICULAR PURPOSE AND NONINFRINGEMENT. IN NO EVENT SHALL THE AUTHORS OR COPYRIGHT HOLDERS BE LIABLE FOR ANY CLAIM, DAMAGES OR OTHER LIABILITY, WHETHER IN AN ACTION OF CONTRACT, TORT OR OTHERWISE, ARISING FROM, OUT OF OR IN CONNECTION WITH THE SOFTWARE OR THE USE OR OTHER DEALINGS IN THE SOFTWARE.</a:t>
+            <a:pPr marL="514350" indent="-514350">
+              <a:buFont typeface="+mj-lt"/>
+              <a:buAutoNum type="arabicParenR"/>
+            </a:pPr>
+            <a:r>
+              <a:rPr lang="en-US" dirty="0"/>
+              <a:t>https://github.com/amueller/introduction_to_ml_with_python/blob/master/02-supervised-learning.ipynb</a:t>
             </a:r>
           </a:p>
         </p:txBody>
@@ -9550,6 +10780,114 @@
     <p:extLst>
       <p:ext uri="{BB962C8B-B14F-4D97-AF65-F5344CB8AC3E}">
         <p14:creationId xmlns:p14="http://schemas.microsoft.com/office/powerpoint/2010/main" val="3645036191"/>
+      </p:ext>
+    </p:extLst>
+  </p:cSld>
+  <p:clrMapOvr>
+    <a:masterClrMapping/>
+  </p:clrMapOvr>
+</p:sld>
+</file>
+
+<file path=ppt/slides/slide39.xml><?xml version="1.0" encoding="utf-8"?>
+<p:sld xmlns:a="http://schemas.openxmlformats.org/drawingml/2006/main" xmlns:r="http://schemas.openxmlformats.org/officeDocument/2006/relationships" xmlns:p="http://schemas.openxmlformats.org/presentationml/2006/main">
+  <p:cSld>
+    <p:bg>
+      <p:bgPr>
+        <a:blipFill dpi="0" rotWithShape="1">
+          <a:blip r:embed="rId2">
+            <a:lum/>
+          </a:blip>
+          <a:srcRect/>
+          <a:stretch>
+            <a:fillRect l="-10000" r="-10000"/>
+          </a:stretch>
+        </a:blipFill>
+        <a:effectLst/>
+      </p:bgPr>
+    </p:bg>
+    <p:spTree>
+      <p:nvGrpSpPr>
+        <p:cNvPr id="1" name=""/>
+        <p:cNvGrpSpPr/>
+        <p:nvPr/>
+      </p:nvGrpSpPr>
+      <p:grpSpPr>
+        <a:xfrm>
+          <a:off x="0" y="0"/>
+          <a:ext cx="0" cy="0"/>
+          <a:chOff x="0" y="0"/>
+          <a:chExt cx="0" cy="0"/>
+        </a:xfrm>
+      </p:grpSpPr>
+      <p:sp>
+        <p:nvSpPr>
+          <p:cNvPr id="2" name="Title 1"/>
+          <p:cNvSpPr>
+            <a:spLocks noGrp="1"/>
+          </p:cNvSpPr>
+          <p:nvPr>
+            <p:ph type="title"/>
+          </p:nvPr>
+        </p:nvSpPr>
+        <p:spPr/>
+        <p:txBody>
+          <a:bodyPr/>
+          <a:lstStyle/>
+          <a:p>
+            <a:r>
+              <a:rPr lang="en-US" dirty="0"/>
+              <a:t>LICENSE</a:t>
+            </a:r>
+          </a:p>
+        </p:txBody>
+      </p:sp>
+      <p:sp>
+        <p:nvSpPr>
+          <p:cNvPr id="3" name="Content Placeholder 2"/>
+          <p:cNvSpPr>
+            <a:spLocks noGrp="1"/>
+          </p:cNvSpPr>
+          <p:nvPr>
+            <p:ph idx="1"/>
+          </p:nvPr>
+        </p:nvSpPr>
+        <p:spPr/>
+        <p:txBody>
+          <a:bodyPr>
+            <a:normAutofit fontScale="62500" lnSpcReduction="20000"/>
+          </a:bodyPr>
+          <a:lstStyle/>
+          <a:p>
+            <a:r>
+              <a:rPr lang="en-US" dirty="0"/>
+              <a:t>Copyright 2018 Douglas Bowman</a:t>
+            </a:r>
+          </a:p>
+          <a:p>
+            <a:r>
+              <a:rPr lang="en-US" dirty="0"/>
+              <a:t>Permission is hereby granted, free of charge, to any person obtaining a copy of this software and associated documentation files (the "Software"), to deal in the Software without restriction, including without limitation the rights to use, copy, modify, merge, publish, distribute, sublicense, and/or sell copies of the Software, and to permit persons to whom the Software is furnished to do so, subject to the following conditions:</a:t>
+            </a:r>
+          </a:p>
+          <a:p>
+            <a:r>
+              <a:rPr lang="en-US" dirty="0"/>
+              <a:t>The above copyright notice and this permission notice shall be included in all copies or substantial portions of the Software.</a:t>
+            </a:r>
+          </a:p>
+          <a:p>
+            <a:r>
+              <a:rPr lang="en-US" dirty="0"/>
+              <a:t>THE SOFTWARE IS PROVIDED "AS IS", WITHOUT WARRANTY OF ANY KIND, EXPRESS OR IMPLIED, INCLUDING BUT NOT LIMITED TO THE WARRANTIES OF MERCHANTABILITY, FITNESS FOR A PARTICULAR PURPOSE AND NONINFRINGEMENT. IN NO EVENT SHALL THE AUTHORS OR COPYRIGHT HOLDERS BE LIABLE FOR ANY CLAIM, DAMAGES OR OTHER LIABILITY, WHETHER IN AN ACTION OF CONTRACT, TORT OR OTHERWISE, ARISING FROM, OUT OF OR IN CONNECTION WITH THE SOFTWARE OR THE USE OR OTHER DEALINGS IN THE SOFTWARE.</a:t>
+            </a:r>
+          </a:p>
+        </p:txBody>
+      </p:sp>
+    </p:spTree>
+    <p:extLst>
+      <p:ext uri="{BB962C8B-B14F-4D97-AF65-F5344CB8AC3E}">
+        <p14:creationId xmlns:p14="http://schemas.microsoft.com/office/powerpoint/2010/main" val="3405347719"/>
       </p:ext>
     </p:extLst>
   </p:cSld>
@@ -10815,7 +12153,345 @@
 </a:theme>
 </file>
 
+<file path=ppt/theme/theme3.xml><?xml version="1.0" encoding="utf-8"?>
+<a:theme xmlns:a="http://schemas.openxmlformats.org/drawingml/2006/main" name="Office Theme">
+  <a:themeElements>
+    <a:clrScheme name="Office">
+      <a:dk1>
+        <a:sysClr val="windowText" lastClr="000000"/>
+      </a:dk1>
+      <a:lt1>
+        <a:sysClr val="window" lastClr="FFFFFF"/>
+      </a:lt1>
+      <a:dk2>
+        <a:srgbClr val="44546A"/>
+      </a:dk2>
+      <a:lt2>
+        <a:srgbClr val="E7E6E6"/>
+      </a:lt2>
+      <a:accent1>
+        <a:srgbClr val="4472C4"/>
+      </a:accent1>
+      <a:accent2>
+        <a:srgbClr val="ED7D31"/>
+      </a:accent2>
+      <a:accent3>
+        <a:srgbClr val="A5A5A5"/>
+      </a:accent3>
+      <a:accent4>
+        <a:srgbClr val="FFC000"/>
+      </a:accent4>
+      <a:accent5>
+        <a:srgbClr val="5B9BD5"/>
+      </a:accent5>
+      <a:accent6>
+        <a:srgbClr val="70AD47"/>
+      </a:accent6>
+      <a:hlink>
+        <a:srgbClr val="0563C1"/>
+      </a:hlink>
+      <a:folHlink>
+        <a:srgbClr val="954F72"/>
+      </a:folHlink>
+    </a:clrScheme>
+    <a:fontScheme name="Office">
+      <a:majorFont>
+        <a:latin typeface="Calibri Light" panose="020F0302020204030204"/>
+        <a:ea typeface=""/>
+        <a:cs typeface=""/>
+        <a:font script="Jpan" typeface="游ゴシック Light"/>
+        <a:font script="Hang" typeface="맑은 고딕"/>
+        <a:font script="Hans" typeface="等线 Light"/>
+        <a:font script="Hant" typeface="新細明體"/>
+        <a:font script="Arab" typeface="Times New Roman"/>
+        <a:font script="Hebr" typeface="Times New Roman"/>
+        <a:font script="Thai" typeface="Angsana New"/>
+        <a:font script="Ethi" typeface="Nyala"/>
+        <a:font script="Beng" typeface="Vrinda"/>
+        <a:font script="Gujr" typeface="Shruti"/>
+        <a:font script="Khmr" typeface="MoolBoran"/>
+        <a:font script="Knda" typeface="Tunga"/>
+        <a:font script="Guru" typeface="Raavi"/>
+        <a:font script="Cans" typeface="Euphemia"/>
+        <a:font script="Cher" typeface="Plantagenet Cherokee"/>
+        <a:font script="Yiii" typeface="Microsoft Yi Baiti"/>
+        <a:font script="Tibt" typeface="Microsoft Himalaya"/>
+        <a:font script="Thaa" typeface="MV Boli"/>
+        <a:font script="Deva" typeface="Mangal"/>
+        <a:font script="Telu" typeface="Gautami"/>
+        <a:font script="Taml" typeface="Latha"/>
+        <a:font script="Syrc" typeface="Estrangelo Edessa"/>
+        <a:font script="Orya" typeface="Kalinga"/>
+        <a:font script="Mlym" typeface="Kartika"/>
+        <a:font script="Laoo" typeface="DokChampa"/>
+        <a:font script="Sinh" typeface="Iskoola Pota"/>
+        <a:font script="Mong" typeface="Mongolian Baiti"/>
+        <a:font script="Viet" typeface="Times New Roman"/>
+        <a:font script="Uigh" typeface="Microsoft Uighur"/>
+        <a:font script="Geor" typeface="Sylfaen"/>
+        <a:font script="Armn" typeface="Arial"/>
+        <a:font script="Bugi" typeface="Leelawadee UI"/>
+        <a:font script="Bopo" typeface="Microsoft JhengHei"/>
+        <a:font script="Java" typeface="Javanese Text"/>
+        <a:font script="Lisu" typeface="Segoe UI"/>
+        <a:font script="Mymr" typeface="Myanmar Text"/>
+        <a:font script="Nkoo" typeface="Ebrima"/>
+        <a:font script="Olck" typeface="Nirmala UI"/>
+        <a:font script="Osma" typeface="Ebrima"/>
+        <a:font script="Phag" typeface="Phagspa"/>
+        <a:font script="Syrn" typeface="Estrangelo Edessa"/>
+        <a:font script="Syrj" typeface="Estrangelo Edessa"/>
+        <a:font script="Syre" typeface="Estrangelo Edessa"/>
+        <a:font script="Sora" typeface="Nirmala UI"/>
+        <a:font script="Tale" typeface="Microsoft Tai Le"/>
+        <a:font script="Talu" typeface="Microsoft New Tai Lue"/>
+        <a:font script="Tfng" typeface="Ebrima"/>
+      </a:majorFont>
+      <a:minorFont>
+        <a:latin typeface="Calibri" panose="020F0502020204030204"/>
+        <a:ea typeface=""/>
+        <a:cs typeface=""/>
+        <a:font script="Jpan" typeface="游ゴシック"/>
+        <a:font script="Hang" typeface="맑은 고딕"/>
+        <a:font script="Hans" typeface="等线"/>
+        <a:font script="Hant" typeface="新細明體"/>
+        <a:font script="Arab" typeface="Arial"/>
+        <a:font script="Hebr" typeface="Arial"/>
+        <a:font script="Thai" typeface="Cordia New"/>
+        <a:font script="Ethi" typeface="Nyala"/>
+        <a:font script="Beng" typeface="Vrinda"/>
+        <a:font script="Gujr" typeface="Shruti"/>
+        <a:font script="Khmr" typeface="DaunPenh"/>
+        <a:font script="Knda" typeface="Tunga"/>
+        <a:font script="Guru" typeface="Raavi"/>
+        <a:font script="Cans" typeface="Euphemia"/>
+        <a:font script="Cher" typeface="Plantagenet Cherokee"/>
+        <a:font script="Yiii" typeface="Microsoft Yi Baiti"/>
+        <a:font script="Tibt" typeface="Microsoft Himalaya"/>
+        <a:font script="Thaa" typeface="MV Boli"/>
+        <a:font script="Deva" typeface="Mangal"/>
+        <a:font script="Telu" typeface="Gautami"/>
+        <a:font script="Taml" typeface="Latha"/>
+        <a:font script="Syrc" typeface="Estrangelo Edessa"/>
+        <a:font script="Orya" typeface="Kalinga"/>
+        <a:font script="Mlym" typeface="Kartika"/>
+        <a:font script="Laoo" typeface="DokChampa"/>
+        <a:font script="Sinh" typeface="Iskoola Pota"/>
+        <a:font script="Mong" typeface="Mongolian Baiti"/>
+        <a:font script="Viet" typeface="Arial"/>
+        <a:font script="Uigh" typeface="Microsoft Uighur"/>
+        <a:font script="Geor" typeface="Sylfaen"/>
+        <a:font script="Armn" typeface="Arial"/>
+        <a:font script="Bugi" typeface="Leelawadee UI"/>
+        <a:font script="Bopo" typeface="Microsoft JhengHei"/>
+        <a:font script="Java" typeface="Javanese Text"/>
+        <a:font script="Lisu" typeface="Segoe UI"/>
+        <a:font script="Mymr" typeface="Myanmar Text"/>
+        <a:font script="Nkoo" typeface="Ebrima"/>
+        <a:font script="Olck" typeface="Nirmala UI"/>
+        <a:font script="Osma" typeface="Ebrima"/>
+        <a:font script="Phag" typeface="Phagspa"/>
+        <a:font script="Syrn" typeface="Estrangelo Edessa"/>
+        <a:font script="Syrj" typeface="Estrangelo Edessa"/>
+        <a:font script="Syre" typeface="Estrangelo Edessa"/>
+        <a:font script="Sora" typeface="Nirmala UI"/>
+        <a:font script="Tale" typeface="Microsoft Tai Le"/>
+        <a:font script="Talu" typeface="Microsoft New Tai Lue"/>
+        <a:font script="Tfng" typeface="Ebrima"/>
+      </a:minorFont>
+    </a:fontScheme>
+    <a:fmtScheme name="Office">
+      <a:fillStyleLst>
+        <a:solidFill>
+          <a:schemeClr val="phClr"/>
+        </a:solidFill>
+        <a:gradFill rotWithShape="1">
+          <a:gsLst>
+            <a:gs pos="0">
+              <a:schemeClr val="phClr">
+                <a:lumMod val="110000"/>
+                <a:satMod val="105000"/>
+                <a:tint val="67000"/>
+              </a:schemeClr>
+            </a:gs>
+            <a:gs pos="50000">
+              <a:schemeClr val="phClr">
+                <a:lumMod val="105000"/>
+                <a:satMod val="103000"/>
+                <a:tint val="73000"/>
+              </a:schemeClr>
+            </a:gs>
+            <a:gs pos="100000">
+              <a:schemeClr val="phClr">
+                <a:lumMod val="105000"/>
+                <a:satMod val="109000"/>
+                <a:tint val="81000"/>
+              </a:schemeClr>
+            </a:gs>
+          </a:gsLst>
+          <a:lin ang="5400000" scaled="0"/>
+        </a:gradFill>
+        <a:gradFill rotWithShape="1">
+          <a:gsLst>
+            <a:gs pos="0">
+              <a:schemeClr val="phClr">
+                <a:satMod val="103000"/>
+                <a:lumMod val="102000"/>
+                <a:tint val="94000"/>
+              </a:schemeClr>
+            </a:gs>
+            <a:gs pos="50000">
+              <a:schemeClr val="phClr">
+                <a:satMod val="110000"/>
+                <a:lumMod val="100000"/>
+                <a:shade val="100000"/>
+              </a:schemeClr>
+            </a:gs>
+            <a:gs pos="100000">
+              <a:schemeClr val="phClr">
+                <a:lumMod val="99000"/>
+                <a:satMod val="120000"/>
+                <a:shade val="78000"/>
+              </a:schemeClr>
+            </a:gs>
+          </a:gsLst>
+          <a:lin ang="5400000" scaled="0"/>
+        </a:gradFill>
+      </a:fillStyleLst>
+      <a:lnStyleLst>
+        <a:ln w="6350" cap="flat" cmpd="sng" algn="ctr">
+          <a:solidFill>
+            <a:schemeClr val="phClr"/>
+          </a:solidFill>
+          <a:prstDash val="solid"/>
+          <a:miter lim="800000"/>
+        </a:ln>
+        <a:ln w="12700" cap="flat" cmpd="sng" algn="ctr">
+          <a:solidFill>
+            <a:schemeClr val="phClr"/>
+          </a:solidFill>
+          <a:prstDash val="solid"/>
+          <a:miter lim="800000"/>
+        </a:ln>
+        <a:ln w="19050" cap="flat" cmpd="sng" algn="ctr">
+          <a:solidFill>
+            <a:schemeClr val="phClr"/>
+          </a:solidFill>
+          <a:prstDash val="solid"/>
+          <a:miter lim="800000"/>
+        </a:ln>
+      </a:lnStyleLst>
+      <a:effectStyleLst>
+        <a:effectStyle>
+          <a:effectLst/>
+        </a:effectStyle>
+        <a:effectStyle>
+          <a:effectLst/>
+        </a:effectStyle>
+        <a:effectStyle>
+          <a:effectLst>
+            <a:outerShdw blurRad="57150" dist="19050" dir="5400000" algn="ctr" rotWithShape="0">
+              <a:srgbClr val="000000">
+                <a:alpha val="63000"/>
+              </a:srgbClr>
+            </a:outerShdw>
+          </a:effectLst>
+        </a:effectStyle>
+      </a:effectStyleLst>
+      <a:bgFillStyleLst>
+        <a:solidFill>
+          <a:schemeClr val="phClr"/>
+        </a:solidFill>
+        <a:solidFill>
+          <a:schemeClr val="phClr">
+            <a:tint val="95000"/>
+            <a:satMod val="170000"/>
+          </a:schemeClr>
+        </a:solidFill>
+        <a:gradFill rotWithShape="1">
+          <a:gsLst>
+            <a:gs pos="0">
+              <a:schemeClr val="phClr">
+                <a:tint val="93000"/>
+                <a:satMod val="150000"/>
+                <a:shade val="98000"/>
+                <a:lumMod val="102000"/>
+              </a:schemeClr>
+            </a:gs>
+            <a:gs pos="50000">
+              <a:schemeClr val="phClr">
+                <a:tint val="98000"/>
+                <a:satMod val="130000"/>
+                <a:shade val="90000"/>
+                <a:lumMod val="103000"/>
+              </a:schemeClr>
+            </a:gs>
+            <a:gs pos="100000">
+              <a:schemeClr val="phClr">
+                <a:shade val="63000"/>
+                <a:satMod val="120000"/>
+              </a:schemeClr>
+            </a:gs>
+          </a:gsLst>
+          <a:lin ang="5400000" scaled="0"/>
+        </a:gradFill>
+      </a:bgFillStyleLst>
+    </a:fmtScheme>
+  </a:themeElements>
+  <a:objectDefaults/>
+  <a:extraClrSchemeLst/>
+  <a:extLst>
+    <a:ext uri="{05A4C25C-085E-4340-85A3-A5531E510DB2}">
+      <thm15:themeFamily xmlns:thm15="http://schemas.microsoft.com/office/thememl/2012/main" name="Office Theme" id="{62F939B6-93AF-4DB8-9C6B-D6C7DFDC589F}" vid="{4A3C46E8-61CC-4603-A589-7422A47A8E4A}"/>
+    </a:ext>
+  </a:extLst>
+</a:theme>
+</file>
+
 <file path=ppt/theme/themeOverride1.xml><?xml version="1.0" encoding="utf-8"?>
+<a:themeOverride xmlns:a="http://schemas.openxmlformats.org/drawingml/2006/main">
+  <a:clrScheme name="Custom 2">
+    <a:dk1>
+      <a:srgbClr val="EFEFEF"/>
+    </a:dk1>
+    <a:lt1>
+      <a:srgbClr val="EFEFEF"/>
+    </a:lt1>
+    <a:dk2>
+      <a:srgbClr val="053E7D"/>
+    </a:dk2>
+    <a:lt2>
+      <a:srgbClr val="FFFFFF"/>
+    </a:lt2>
+    <a:accent1>
+      <a:srgbClr val="EFEFEF"/>
+    </a:accent1>
+    <a:accent2>
+      <a:srgbClr val="EFEFEF"/>
+    </a:accent2>
+    <a:accent3>
+      <a:srgbClr val="EFEFEF"/>
+    </a:accent3>
+    <a:accent4>
+      <a:srgbClr val="808080"/>
+    </a:accent4>
+    <a:accent5>
+      <a:srgbClr val="5F5F5F"/>
+    </a:accent5>
+    <a:accent6>
+      <a:srgbClr val="4D4D4D"/>
+    </a:accent6>
+    <a:hlink>
+      <a:srgbClr val="B5D7FC"/>
+    </a:hlink>
+    <a:folHlink>
+      <a:srgbClr val="919191"/>
+    </a:folHlink>
+  </a:clrScheme>
+</a:themeOverride>
+</file>
+
+<file path=ppt/theme/themeOverride10.xml><?xml version="1.0" encoding="utf-8"?>
 <a:themeOverride xmlns:a="http://schemas.openxmlformats.org/drawingml/2006/main">
   <a:clrScheme name="Custom 2">
     <a:dk1>
@@ -11071,4 +12747,133 @@
     </a:folHlink>
   </a:clrScheme>
 </a:themeOverride>
+</file>
+
+<file path=ppt/theme/themeOverride7.xml><?xml version="1.0" encoding="utf-8"?>
+<a:themeOverride xmlns:a="http://schemas.openxmlformats.org/drawingml/2006/main">
+  <a:clrScheme name="Custom 2">
+    <a:dk1>
+      <a:srgbClr val="EFEFEF"/>
+    </a:dk1>
+    <a:lt1>
+      <a:srgbClr val="EFEFEF"/>
+    </a:lt1>
+    <a:dk2>
+      <a:srgbClr val="053E7D"/>
+    </a:dk2>
+    <a:lt2>
+      <a:srgbClr val="FFFFFF"/>
+    </a:lt2>
+    <a:accent1>
+      <a:srgbClr val="EFEFEF"/>
+    </a:accent1>
+    <a:accent2>
+      <a:srgbClr val="EFEFEF"/>
+    </a:accent2>
+    <a:accent3>
+      <a:srgbClr val="EFEFEF"/>
+    </a:accent3>
+    <a:accent4>
+      <a:srgbClr val="808080"/>
+    </a:accent4>
+    <a:accent5>
+      <a:srgbClr val="5F5F5F"/>
+    </a:accent5>
+    <a:accent6>
+      <a:srgbClr val="4D4D4D"/>
+    </a:accent6>
+    <a:hlink>
+      <a:srgbClr val="B5D7FC"/>
+    </a:hlink>
+    <a:folHlink>
+      <a:srgbClr val="919191"/>
+    </a:folHlink>
+  </a:clrScheme>
+</a:themeOverride>
+</file>
+
+<file path=ppt/theme/themeOverride8.xml><?xml version="1.0" encoding="utf-8"?>
+<a:themeOverride xmlns:a="http://schemas.openxmlformats.org/drawingml/2006/main">
+  <a:clrScheme name="Custom 2">
+    <a:dk1>
+      <a:srgbClr val="EFEFEF"/>
+    </a:dk1>
+    <a:lt1>
+      <a:srgbClr val="EFEFEF"/>
+    </a:lt1>
+    <a:dk2>
+      <a:srgbClr val="053E7D"/>
+    </a:dk2>
+    <a:lt2>
+      <a:srgbClr val="FFFFFF"/>
+    </a:lt2>
+    <a:accent1>
+      <a:srgbClr val="EFEFEF"/>
+    </a:accent1>
+    <a:accent2>
+      <a:srgbClr val="EFEFEF"/>
+    </a:accent2>
+    <a:accent3>
+      <a:srgbClr val="EFEFEF"/>
+    </a:accent3>
+    <a:accent4>
+      <a:srgbClr val="808080"/>
+    </a:accent4>
+    <a:accent5>
+      <a:srgbClr val="5F5F5F"/>
+    </a:accent5>
+    <a:accent6>
+      <a:srgbClr val="4D4D4D"/>
+    </a:accent6>
+    <a:hlink>
+      <a:srgbClr val="B5D7FC"/>
+    </a:hlink>
+    <a:folHlink>
+      <a:srgbClr val="919191"/>
+    </a:folHlink>
+  </a:clrScheme>
+</a:themeOverride>
+</file>
+
+<file path=ppt/theme/themeOverride9.xml><?xml version="1.0" encoding="utf-8"?>
+<a:themeOverride xmlns:a="http://schemas.openxmlformats.org/drawingml/2006/main">
+  <a:clrScheme name="Custom 2">
+    <a:dk1>
+      <a:srgbClr val="EFEFEF"/>
+    </a:dk1>
+    <a:lt1>
+      <a:srgbClr val="EFEFEF"/>
+    </a:lt1>
+    <a:dk2>
+      <a:srgbClr val="053E7D"/>
+    </a:dk2>
+    <a:lt2>
+      <a:srgbClr val="FFFFFF"/>
+    </a:lt2>
+    <a:accent1>
+      <a:srgbClr val="EFEFEF"/>
+    </a:accent1>
+    <a:accent2>
+      <a:srgbClr val="EFEFEF"/>
+    </a:accent2>
+    <a:accent3>
+      <a:srgbClr val="EFEFEF"/>
+    </a:accent3>
+    <a:accent4>
+      <a:srgbClr val="808080"/>
+    </a:accent4>
+    <a:accent5>
+      <a:srgbClr val="5F5F5F"/>
+    </a:accent5>
+    <a:accent6>
+      <a:srgbClr val="4D4D4D"/>
+    </a:accent6>
+    <a:hlink>
+      <a:srgbClr val="B5D7FC"/>
+    </a:hlink>
+    <a:folHlink>
+      <a:srgbClr val="919191"/>
+    </a:folHlink>
+  </a:clrScheme>
+</a:themeOverride>
 </file>
</xml_diff>

<commit_message>
More info on classifiers, added decision tree graph for decision tree.
</commit_message>
<xml_diff>
--- a/Session 7 - Python/Instructional Material/Session 7 - Python Brief Intro to Machine Learning with Scikit Learn.pptx
+++ b/Session 7 - Python/Instructional Material/Session 7 - Python Brief Intro to Machine Learning with Scikit Learn.pptx
@@ -6,7 +6,7 @@
     <p:sldMasterId id="2147483660" r:id="rId2"/>
   </p:sldMasterIdLst>
   <p:notesMasterIdLst>
-    <p:notesMasterId r:id="rId42"/>
+    <p:notesMasterId r:id="rId43"/>
   </p:notesMasterIdLst>
   <p:sldIdLst>
     <p:sldId id="256" r:id="rId3"/>
@@ -34,20 +34,21 @@
     <p:sldId id="412" r:id="rId25"/>
     <p:sldId id="415" r:id="rId26"/>
     <p:sldId id="413" r:id="rId27"/>
-    <p:sldId id="391" r:id="rId28"/>
-    <p:sldId id="414" r:id="rId29"/>
-    <p:sldId id="396" r:id="rId30"/>
-    <p:sldId id="397" r:id="rId31"/>
-    <p:sldId id="398" r:id="rId32"/>
-    <p:sldId id="399" r:id="rId33"/>
-    <p:sldId id="376" r:id="rId34"/>
-    <p:sldId id="405" r:id="rId35"/>
-    <p:sldId id="385" r:id="rId36"/>
-    <p:sldId id="386" r:id="rId37"/>
-    <p:sldId id="400" r:id="rId38"/>
-    <p:sldId id="384" r:id="rId39"/>
-    <p:sldId id="375" r:id="rId40"/>
-    <p:sldId id="411" r:id="rId41"/>
+    <p:sldId id="416" r:id="rId28"/>
+    <p:sldId id="391" r:id="rId29"/>
+    <p:sldId id="414" r:id="rId30"/>
+    <p:sldId id="396" r:id="rId31"/>
+    <p:sldId id="397" r:id="rId32"/>
+    <p:sldId id="398" r:id="rId33"/>
+    <p:sldId id="399" r:id="rId34"/>
+    <p:sldId id="376" r:id="rId35"/>
+    <p:sldId id="405" r:id="rId36"/>
+    <p:sldId id="385" r:id="rId37"/>
+    <p:sldId id="386" r:id="rId38"/>
+    <p:sldId id="400" r:id="rId39"/>
+    <p:sldId id="384" r:id="rId40"/>
+    <p:sldId id="375" r:id="rId41"/>
+    <p:sldId id="411" r:id="rId42"/>
   </p:sldIdLst>
   <p:sldSz cx="9144000" cy="6858000" type="screen4x3"/>
   <p:notesSz cx="6858000" cy="9144000"/>
@@ -841,6 +842,90 @@
     <p:extLst>
       <p:ext uri="{BB962C8B-B14F-4D97-AF65-F5344CB8AC3E}">
         <p14:creationId xmlns:p14="http://schemas.microsoft.com/office/powerpoint/2010/main" val="2302798330"/>
+      </p:ext>
+    </p:extLst>
+  </p:cSld>
+  <p:clrMapOvr>
+    <a:masterClrMapping/>
+  </p:clrMapOvr>
+</p:notes>
+</file>
+
+<file path=ppt/notesSlides/notesSlide5.xml><?xml version="1.0" encoding="utf-8"?>
+<p:notes xmlns:a="http://schemas.openxmlformats.org/drawingml/2006/main" xmlns:r="http://schemas.openxmlformats.org/officeDocument/2006/relationships" xmlns:p="http://schemas.openxmlformats.org/presentationml/2006/main">
+  <p:cSld>
+    <p:spTree>
+      <p:nvGrpSpPr>
+        <p:cNvPr id="1" name=""/>
+        <p:cNvGrpSpPr/>
+        <p:nvPr/>
+      </p:nvGrpSpPr>
+      <p:grpSpPr>
+        <a:xfrm>
+          <a:off x="0" y="0"/>
+          <a:ext cx="0" cy="0"/>
+          <a:chOff x="0" y="0"/>
+          <a:chExt cx="0" cy="0"/>
+        </a:xfrm>
+      </p:grpSpPr>
+      <p:sp>
+        <p:nvSpPr>
+          <p:cNvPr id="2" name="Slide Image Placeholder 1"/>
+          <p:cNvSpPr>
+            <a:spLocks noGrp="1" noRot="1" noChangeAspect="1"/>
+          </p:cNvSpPr>
+          <p:nvPr>
+            <p:ph type="sldImg"/>
+          </p:nvPr>
+        </p:nvSpPr>
+        <p:spPr/>
+      </p:sp>
+      <p:sp>
+        <p:nvSpPr>
+          <p:cNvPr id="3" name="Notes Placeholder 2"/>
+          <p:cNvSpPr>
+            <a:spLocks noGrp="1"/>
+          </p:cNvSpPr>
+          <p:nvPr>
+            <p:ph type="body" idx="1"/>
+          </p:nvPr>
+        </p:nvSpPr>
+        <p:spPr/>
+        <p:txBody>
+          <a:bodyPr/>
+          <a:lstStyle/>
+          <a:p>
+            <a:endParaRPr lang="en-US" dirty="0"/>
+          </a:p>
+        </p:txBody>
+      </p:sp>
+      <p:sp>
+        <p:nvSpPr>
+          <p:cNvPr id="4" name="Slide Number Placeholder 3"/>
+          <p:cNvSpPr>
+            <a:spLocks noGrp="1"/>
+          </p:cNvSpPr>
+          <p:nvPr>
+            <p:ph type="sldNum" sz="quarter" idx="5"/>
+          </p:nvPr>
+        </p:nvSpPr>
+        <p:spPr/>
+        <p:txBody>
+          <a:bodyPr/>
+          <a:lstStyle/>
+          <a:p>
+            <a:fld id="{3E7B21C4-CE7A-4258-91FF-8CBB981279E1}" type="slidenum">
+              <a:rPr lang="en-US" smtClean="0"/>
+              <a:t>26</a:t>
+            </a:fld>
+            <a:endParaRPr lang="en-US"/>
+          </a:p>
+        </p:txBody>
+      </p:sp>
+    </p:spTree>
+    <p:extLst>
+      <p:ext uri="{BB962C8B-B14F-4D97-AF65-F5344CB8AC3E}">
+        <p14:creationId xmlns:p14="http://schemas.microsoft.com/office/powerpoint/2010/main" val="4141967506"/>
       </p:ext>
     </p:extLst>
   </p:cSld>
@@ -9046,7 +9131,7 @@
           <a:graphicData uri="http://schemas.openxmlformats.org/presentationml/2006/ole">
             <mc:AlternateContent xmlns:mc="http://schemas.openxmlformats.org/markup-compatibility/2006">
               <mc:Choice xmlns:v="urn:schemas-microsoft-com:vml" Requires="v">
-                <p:oleObj spid="_x0000_s2060" name="Bitmap Image" r:id="rId6" imgW="3743280" imgH="3024360" progId="Paint.Picture">
+                <p:oleObj spid="_x0000_s2066" name="Bitmap Image" r:id="rId6" imgW="3743280" imgH="3024360" progId="Paint.Picture">
                   <p:embed/>
                 </p:oleObj>
               </mc:Choice>
@@ -9320,8 +9405,25 @@
             </a:r>
           </a:p>
           <a:p>
+            <a:pPr lvl="1"/>
+            <a:r>
+              <a:rPr lang="en-US" dirty="0"/>
+              <a:t>See file “./Session 7 – Python/Instructional Material/Class Examples/Scikit-Learn/decision_tree_graph.html“ for the produced image.  </a:t>
+            </a:r>
+          </a:p>
+          <a:p>
             <a:pPr lvl="2"/>
-            <a:endParaRPr lang="en-US" dirty="0"/>
+            <a:r>
+              <a:rPr lang="en-US" dirty="0"/>
+              <a:t>Generated from iris data set</a:t>
+            </a:r>
+          </a:p>
+          <a:p>
+            <a:pPr lvl="2"/>
+            <a:r>
+              <a:rPr lang="en-US" dirty="0"/>
+              <a:t>Code can be found in class example code under the decision tree section</a:t>
+            </a:r>
           </a:p>
           <a:p>
             <a:endParaRPr lang="en-US" dirty="0"/>
@@ -9347,7 +9449,7 @@
     <p:bg>
       <p:bgPr>
         <a:blipFill dpi="0" rotWithShape="1">
-          <a:blip r:embed="rId3">
+          <a:blip r:embed="rId4">
             <a:lum/>
           </a:blip>
           <a:srcRect/>
@@ -9389,7 +9491,7 @@
           <a:p>
             <a:r>
               <a:rPr lang="en-US" dirty="0"/>
-              <a:t>Linear Models - Regressors</a:t>
+              <a:t>Linear Models - Classifiers</a:t>
             </a:r>
           </a:p>
         </p:txBody>
@@ -9411,7 +9513,7 @@
           <a:p>
             <a:r>
               <a:rPr lang="en-US" dirty="0"/>
-              <a:t>Linear Regression</a:t>
+              <a:t>Decision Tree</a:t>
             </a:r>
           </a:p>
           <a:p>
@@ -9423,10 +9525,40 @@
           </a:p>
         </p:txBody>
       </p:sp>
+      <p:pic>
+        <p:nvPicPr>
+          <p:cNvPr id="5" name="Picture 4">
+            <a:extLst>
+              <a:ext uri="{FF2B5EF4-FFF2-40B4-BE49-F238E27FC236}">
+                <a16:creationId xmlns:a16="http://schemas.microsoft.com/office/drawing/2014/main" id="{AEE9C498-C33F-4F9D-A693-50DA2A30C0BE}"/>
+              </a:ext>
+            </a:extLst>
+          </p:cNvPr>
+          <p:cNvPicPr>
+            <a:picLocks noChangeAspect="1"/>
+          </p:cNvPicPr>
+          <p:nvPr/>
+        </p:nvPicPr>
+        <p:blipFill>
+          <a:blip r:embed="rId5"/>
+          <a:stretch>
+            <a:fillRect/>
+          </a:stretch>
+        </p:blipFill>
+        <p:spPr>
+          <a:xfrm>
+            <a:off x="1524000" y="2209800"/>
+            <a:ext cx="6096000" cy="4304313"/>
+          </a:xfrm>
+          <a:prstGeom prst="rect">
+            <a:avLst/>
+          </a:prstGeom>
+        </p:spPr>
+      </p:pic>
     </p:spTree>
     <p:extLst>
       <p:ext uri="{BB962C8B-B14F-4D97-AF65-F5344CB8AC3E}">
-        <p14:creationId xmlns:p14="http://schemas.microsoft.com/office/powerpoint/2010/main" val="1469044682"/>
+        <p14:creationId xmlns:p14="http://schemas.microsoft.com/office/powerpoint/2010/main" val="3675808278"/>
       </p:ext>
     </p:extLst>
   </p:cSld>
@@ -9506,7 +9638,7 @@
           <a:p>
             <a:r>
               <a:rPr lang="en-US" dirty="0"/>
-              <a:t>Lasso</a:t>
+              <a:t>Linear Regression</a:t>
             </a:r>
           </a:p>
           <a:p>
@@ -9521,7 +9653,7 @@
     </p:spTree>
     <p:extLst>
       <p:ext uri="{BB962C8B-B14F-4D97-AF65-F5344CB8AC3E}">
-        <p14:creationId xmlns:p14="http://schemas.microsoft.com/office/powerpoint/2010/main" val="2833183138"/>
+        <p14:creationId xmlns:p14="http://schemas.microsoft.com/office/powerpoint/2010/main" val="1469044682"/>
       </p:ext>
     </p:extLst>
   </p:cSld>
@@ -9601,7 +9733,7 @@
           <a:p>
             <a:r>
               <a:rPr lang="en-US" dirty="0"/>
-              <a:t>Regression</a:t>
+              <a:t>Lasso</a:t>
             </a:r>
           </a:p>
           <a:p>
@@ -9616,7 +9748,7 @@
     </p:spTree>
     <p:extLst>
       <p:ext uri="{BB962C8B-B14F-4D97-AF65-F5344CB8AC3E}">
-        <p14:creationId xmlns:p14="http://schemas.microsoft.com/office/powerpoint/2010/main" val="474133971"/>
+        <p14:creationId xmlns:p14="http://schemas.microsoft.com/office/powerpoint/2010/main" val="2833183138"/>
       </p:ext>
     </p:extLst>
   </p:cSld>
@@ -9696,7 +9828,7 @@
           <a:p>
             <a:r>
               <a:rPr lang="en-US" dirty="0"/>
-              <a:t>Decision Tree</a:t>
+              <a:t>Regression</a:t>
             </a:r>
           </a:p>
           <a:p>
@@ -9711,7 +9843,7 @@
     </p:spTree>
     <p:extLst>
       <p:ext uri="{BB962C8B-B14F-4D97-AF65-F5344CB8AC3E}">
-        <p14:creationId xmlns:p14="http://schemas.microsoft.com/office/powerpoint/2010/main" val="1924952010"/>
+        <p14:creationId xmlns:p14="http://schemas.microsoft.com/office/powerpoint/2010/main" val="474133971"/>
       </p:ext>
     </p:extLst>
   </p:cSld>
@@ -9903,7 +10035,7 @@
           <a:p>
             <a:r>
               <a:rPr lang="en-US" dirty="0"/>
-              <a:t>Forest</a:t>
+              <a:t>Decision Tree</a:t>
             </a:r>
           </a:p>
           <a:p>
@@ -9918,7 +10050,7 @@
     </p:spTree>
     <p:extLst>
       <p:ext uri="{BB962C8B-B14F-4D97-AF65-F5344CB8AC3E}">
-        <p14:creationId xmlns:p14="http://schemas.microsoft.com/office/powerpoint/2010/main" val="358457677"/>
+        <p14:creationId xmlns:p14="http://schemas.microsoft.com/office/powerpoint/2010/main" val="1924952010"/>
       </p:ext>
     </p:extLst>
   </p:cSld>
@@ -9998,7 +10130,7 @@
           <a:p>
             <a:r>
               <a:rPr lang="en-US" dirty="0"/>
-              <a:t>Gradient-Boosted Forest</a:t>
+              <a:t>Forest</a:t>
             </a:r>
           </a:p>
           <a:p>
@@ -10013,7 +10145,7 @@
     </p:spTree>
     <p:extLst>
       <p:ext uri="{BB962C8B-B14F-4D97-AF65-F5344CB8AC3E}">
-        <p14:creationId xmlns:p14="http://schemas.microsoft.com/office/powerpoint/2010/main" val="1436682753"/>
+        <p14:creationId xmlns:p14="http://schemas.microsoft.com/office/powerpoint/2010/main" val="358457677"/>
       </p:ext>
     </p:extLst>
   </p:cSld>
@@ -10029,7 +10161,7 @@
     <p:bg>
       <p:bgPr>
         <a:blipFill dpi="0" rotWithShape="1">
-          <a:blip r:embed="rId2">
+          <a:blip r:embed="rId3">
             <a:lum/>
           </a:blip>
           <a:srcRect/>
@@ -10071,7 +10203,7 @@
           <a:p>
             <a:r>
               <a:rPr lang="en-US" dirty="0"/>
-              <a:t>Evaluating Accuracy</a:t>
+              <a:t>Linear Models - Regressors</a:t>
             </a:r>
           </a:p>
         </p:txBody>
@@ -10093,32 +10225,8 @@
           <a:p>
             <a:r>
               <a:rPr lang="en-US" dirty="0"/>
-              <a:t>Overview</a:t>
-            </a:r>
-          </a:p>
-          <a:p>
-            <a:pPr lvl="1"/>
-            <a:r>
-              <a:rPr lang="en-US" dirty="0"/>
-              <a:t>&lt;model&gt;.score(</a:t>
-            </a:r>
-            <a:r>
-              <a:rPr lang="en-US" dirty="0" err="1"/>
-              <a:t>test_data</a:t>
-            </a:r>
-            <a:r>
-              <a:rPr lang="en-US" dirty="0"/>
-              <a:t>, </a:t>
-            </a:r>
-            <a:r>
-              <a:rPr lang="en-US" dirty="0" err="1"/>
-              <a:t>test_labels</a:t>
-            </a:r>
-            <a:r>
-              <a:rPr lang="en-US"/>
-              <a:t>)</a:t>
-            </a:r>
-            <a:endParaRPr lang="en-US" dirty="0"/>
+              <a:t>Gradient-Boosted Forest</a:t>
+            </a:r>
           </a:p>
           <a:p>
             <a:pPr lvl="2"/>
@@ -10132,12 +10240,12 @@
     </p:spTree>
     <p:extLst>
       <p:ext uri="{BB962C8B-B14F-4D97-AF65-F5344CB8AC3E}">
-        <p14:creationId xmlns:p14="http://schemas.microsoft.com/office/powerpoint/2010/main" val="4053921630"/>
+        <p14:creationId xmlns:p14="http://schemas.microsoft.com/office/powerpoint/2010/main" val="1436682753"/>
       </p:ext>
     </p:extLst>
   </p:cSld>
   <p:clrMapOvr>
-    <a:masterClrMapping/>
+    <a:overrideClrMapping bg1="lt1" tx1="dk1" bg2="lt2" tx2="dk2" accent1="accent1" accent2="accent2" accent3="accent3" accent4="accent4" accent5="accent5" accent6="accent6" hlink="hlink" folHlink="folHlink"/>
   </p:clrMapOvr>
 </p:sld>
 </file>
@@ -10189,70 +10297,55 @@
           <a:lstStyle/>
           <a:p>
             <a:r>
+              <a:rPr lang="en-US" dirty="0"/>
+              <a:t>Evaluating Accuracy</a:t>
+            </a:r>
+          </a:p>
+        </p:txBody>
+      </p:sp>
+      <p:sp>
+        <p:nvSpPr>
+          <p:cNvPr id="3" name="Content Placeholder 2"/>
+          <p:cNvSpPr>
+            <a:spLocks noGrp="1"/>
+          </p:cNvSpPr>
+          <p:nvPr>
+            <p:ph idx="1"/>
+          </p:nvPr>
+        </p:nvSpPr>
+        <p:spPr/>
+        <p:txBody>
+          <a:bodyPr/>
+          <a:lstStyle/>
+          <a:p>
+            <a:r>
+              <a:rPr lang="en-US" dirty="0"/>
+              <a:t>Overview</a:t>
+            </a:r>
+          </a:p>
+          <a:p>
+            <a:pPr lvl="1"/>
+            <a:r>
+              <a:rPr lang="en-US" dirty="0"/>
+              <a:t>&lt;model&gt;.score(</a:t>
+            </a:r>
+            <a:r>
               <a:rPr lang="en-US" dirty="0" err="1"/>
-              <a:t>Scikit</a:t>
-            </a:r>
-            <a:r>
-              <a:rPr lang="en-US" dirty="0"/>
-              <a:t>-Learn Machine Learning</a:t>
-            </a:r>
-          </a:p>
-        </p:txBody>
-      </p:sp>
-      <p:sp>
-        <p:nvSpPr>
-          <p:cNvPr id="3" name="Content Placeholder 2"/>
-          <p:cNvSpPr>
-            <a:spLocks noGrp="1"/>
-          </p:cNvSpPr>
-          <p:nvPr>
-            <p:ph idx="1"/>
-          </p:nvPr>
-        </p:nvSpPr>
-        <p:spPr/>
-        <p:txBody>
-          <a:bodyPr/>
-          <a:lstStyle/>
-          <a:p>
-            <a:r>
-              <a:rPr lang="en-US" dirty="0"/>
-              <a:t>Overview</a:t>
-            </a:r>
-          </a:p>
-          <a:p>
-            <a:pPr lvl="1"/>
-            <a:r>
-              <a:rPr lang="en-US" dirty="0"/>
-              <a:t>Definition</a:t>
-            </a:r>
-          </a:p>
-          <a:p>
-            <a:pPr lvl="1"/>
-            <a:r>
-              <a:rPr lang="en-US" dirty="0"/>
-              <a:t>General Types</a:t>
-            </a:r>
-          </a:p>
-          <a:p>
-            <a:pPr lvl="1"/>
-            <a:r>
-              <a:rPr lang="en-US" dirty="0"/>
-              <a:t>Basic Linear Models</a:t>
-            </a:r>
-          </a:p>
-          <a:p>
-            <a:pPr lvl="1"/>
-            <a:r>
-              <a:rPr lang="en-US" dirty="0"/>
-              <a:t>Algorithm Types</a:t>
-            </a:r>
-          </a:p>
-          <a:p>
-            <a:pPr lvl="1"/>
-            <a:r>
-              <a:rPr lang="en-US" dirty="0"/>
-              <a:t>Tuning</a:t>
-            </a:r>
+              <a:t>test_data</a:t>
+            </a:r>
+            <a:r>
+              <a:rPr lang="en-US" dirty="0"/>
+              <a:t>, </a:t>
+            </a:r>
+            <a:r>
+              <a:rPr lang="en-US" dirty="0" err="1"/>
+              <a:t>test_labels</a:t>
+            </a:r>
+            <a:r>
+              <a:rPr lang="en-US"/>
+              <a:t>)</a:t>
+            </a:r>
+            <a:endParaRPr lang="en-US" dirty="0"/>
           </a:p>
           <a:p>
             <a:pPr lvl="2"/>
@@ -10266,7 +10359,7 @@
     </p:spTree>
     <p:extLst>
       <p:ext uri="{BB962C8B-B14F-4D97-AF65-F5344CB8AC3E}">
-        <p14:creationId xmlns:p14="http://schemas.microsoft.com/office/powerpoint/2010/main" val="754999196"/>
+        <p14:creationId xmlns:p14="http://schemas.microsoft.com/office/powerpoint/2010/main" val="4053921630"/>
       </p:ext>
     </p:extLst>
   </p:cSld>
@@ -10323,30 +10416,69 @@
           <a:lstStyle/>
           <a:p>
             <a:r>
+              <a:rPr lang="en-US" dirty="0" err="1"/>
+              <a:t>Scikit</a:t>
+            </a:r>
+            <a:r>
+              <a:rPr lang="en-US" dirty="0"/>
+              <a:t>-Learn Machine Learning</a:t>
+            </a:r>
+          </a:p>
+        </p:txBody>
+      </p:sp>
+      <p:sp>
+        <p:nvSpPr>
+          <p:cNvPr id="3" name="Content Placeholder 2"/>
+          <p:cNvSpPr>
+            <a:spLocks noGrp="1"/>
+          </p:cNvSpPr>
+          <p:nvPr>
+            <p:ph idx="1"/>
+          </p:nvPr>
+        </p:nvSpPr>
+        <p:spPr/>
+        <p:txBody>
+          <a:bodyPr/>
+          <a:lstStyle/>
+          <a:p>
+            <a:r>
+              <a:rPr lang="en-US" dirty="0"/>
+              <a:t>Overview</a:t>
+            </a:r>
+          </a:p>
+          <a:p>
+            <a:pPr lvl="1"/>
+            <a:r>
+              <a:rPr lang="en-US" dirty="0"/>
+              <a:t>Definition</a:t>
+            </a:r>
+          </a:p>
+          <a:p>
+            <a:pPr lvl="1"/>
+            <a:r>
+              <a:rPr lang="en-US" dirty="0"/>
+              <a:t>General Types</a:t>
+            </a:r>
+          </a:p>
+          <a:p>
+            <a:pPr lvl="1"/>
+            <a:r>
+              <a:rPr lang="en-US" dirty="0"/>
+              <a:t>Basic Linear Models</a:t>
+            </a:r>
+          </a:p>
+          <a:p>
+            <a:pPr lvl="1"/>
+            <a:r>
+              <a:rPr lang="en-US" dirty="0"/>
+              <a:t>Algorithm Types</a:t>
+            </a:r>
+          </a:p>
+          <a:p>
+            <a:pPr lvl="1"/>
+            <a:r>
               <a:rPr lang="en-US" dirty="0"/>
               <a:t>Tuning</a:t>
-            </a:r>
-          </a:p>
-        </p:txBody>
-      </p:sp>
-      <p:sp>
-        <p:nvSpPr>
-          <p:cNvPr id="3" name="Content Placeholder 2"/>
-          <p:cNvSpPr>
-            <a:spLocks noGrp="1"/>
-          </p:cNvSpPr>
-          <p:nvPr>
-            <p:ph idx="1"/>
-          </p:nvPr>
-        </p:nvSpPr>
-        <p:spPr/>
-        <p:txBody>
-          <a:bodyPr/>
-          <a:lstStyle/>
-          <a:p>
-            <a:r>
-              <a:rPr lang="en-US" dirty="0"/>
-              <a:t>Determining what features matter</a:t>
             </a:r>
           </a:p>
           <a:p>
@@ -10361,7 +10493,7 @@
     </p:spTree>
     <p:extLst>
       <p:ext uri="{BB962C8B-B14F-4D97-AF65-F5344CB8AC3E}">
-        <p14:creationId xmlns:p14="http://schemas.microsoft.com/office/powerpoint/2010/main" val="3393037686"/>
+        <p14:creationId xmlns:p14="http://schemas.microsoft.com/office/powerpoint/2010/main" val="754999196"/>
       </p:ext>
     </p:extLst>
   </p:cSld>
@@ -10441,7 +10573,7 @@
           <a:p>
             <a:r>
               <a:rPr lang="en-US" dirty="0"/>
-              <a:t>Parameters to Play with</a:t>
+              <a:t>Determining what features matter</a:t>
             </a:r>
           </a:p>
           <a:p>
@@ -10456,7 +10588,7 @@
     </p:spTree>
     <p:extLst>
       <p:ext uri="{BB962C8B-B14F-4D97-AF65-F5344CB8AC3E}">
-        <p14:creationId xmlns:p14="http://schemas.microsoft.com/office/powerpoint/2010/main" val="274238177"/>
+        <p14:creationId xmlns:p14="http://schemas.microsoft.com/office/powerpoint/2010/main" val="3393037686"/>
       </p:ext>
     </p:extLst>
   </p:cSld>
@@ -10536,7 +10668,28 @@
           <a:p>
             <a:r>
               <a:rPr lang="en-US" dirty="0"/>
-              <a:t>Grid Search</a:t>
+              <a:t>Parameters to Play with</a:t>
+            </a:r>
+          </a:p>
+          <a:p>
+            <a:pPr lvl="1"/>
+            <a:r>
+              <a:rPr lang="en-US" dirty="0"/>
+              <a:t>K-Nearest Neighbors</a:t>
+            </a:r>
+          </a:p>
+          <a:p>
+            <a:pPr lvl="2"/>
+            <a:r>
+              <a:rPr lang="en-US" dirty="0"/>
+              <a:t>Number of neighbors to test point</a:t>
+            </a:r>
+          </a:p>
+          <a:p>
+            <a:pPr lvl="2"/>
+            <a:r>
+              <a:rPr lang="en-US" dirty="0"/>
+              <a:t>Algorithm to evaluate distance test point is from data points</a:t>
             </a:r>
           </a:p>
           <a:p>
@@ -10551,7 +10704,7 @@
     </p:spTree>
     <p:extLst>
       <p:ext uri="{BB962C8B-B14F-4D97-AF65-F5344CB8AC3E}">
-        <p14:creationId xmlns:p14="http://schemas.microsoft.com/office/powerpoint/2010/main" val="2622179278"/>
+        <p14:creationId xmlns:p14="http://schemas.microsoft.com/office/powerpoint/2010/main" val="274238177"/>
       </p:ext>
     </p:extLst>
   </p:cSld>
@@ -10608,12 +10761,8 @@
           <a:lstStyle/>
           <a:p>
             <a:r>
-              <a:rPr lang="en-US" dirty="0" err="1"/>
-              <a:t>Scikit</a:t>
-            </a:r>
-            <a:r>
-              <a:rPr lang="en-US" dirty="0"/>
-              <a:t>-Learn Machine Learning</a:t>
+              <a:rPr lang="en-US" dirty="0"/>
+              <a:t>Tuning</a:t>
             </a:r>
           </a:p>
         </p:txBody>
@@ -10635,42 +10784,7 @@
           <a:p>
             <a:r>
               <a:rPr lang="en-US" dirty="0"/>
-              <a:t>Overview</a:t>
-            </a:r>
-          </a:p>
-          <a:p>
-            <a:pPr lvl="1"/>
-            <a:r>
-              <a:rPr lang="en-US" dirty="0"/>
-              <a:t>Definition</a:t>
-            </a:r>
-          </a:p>
-          <a:p>
-            <a:pPr lvl="1"/>
-            <a:r>
-              <a:rPr lang="en-US" dirty="0"/>
-              <a:t>General Types</a:t>
-            </a:r>
-          </a:p>
-          <a:p>
-            <a:pPr lvl="1"/>
-            <a:r>
-              <a:rPr lang="en-US" dirty="0"/>
-              <a:t>Basic Linear Models</a:t>
-            </a:r>
-          </a:p>
-          <a:p>
-            <a:pPr lvl="1"/>
-            <a:r>
-              <a:rPr lang="en-US" dirty="0"/>
-              <a:t>Algorithm Types</a:t>
-            </a:r>
-          </a:p>
-          <a:p>
-            <a:pPr lvl="1"/>
-            <a:r>
-              <a:rPr lang="en-US" dirty="0"/>
-              <a:t>Tuning</a:t>
+              <a:t>Grid Search</a:t>
             </a:r>
           </a:p>
           <a:p>
@@ -10685,7 +10799,7 @@
     </p:spTree>
     <p:extLst>
       <p:ext uri="{BB962C8B-B14F-4D97-AF65-F5344CB8AC3E}">
-        <p14:creationId xmlns:p14="http://schemas.microsoft.com/office/powerpoint/2010/main" val="2946119377"/>
+        <p14:creationId xmlns:p14="http://schemas.microsoft.com/office/powerpoint/2010/main" val="2622179278"/>
       </p:ext>
     </p:extLst>
   </p:cSld>
@@ -10742,8 +10856,12 @@
           <a:lstStyle/>
           <a:p>
             <a:r>
-              <a:rPr lang="en-US" dirty="0"/>
-              <a:t>Bibliography</a:t>
+              <a:rPr lang="en-US" dirty="0" err="1"/>
+              <a:t>Scikit</a:t>
+            </a:r>
+            <a:r>
+              <a:rPr lang="en-US" dirty="0"/>
+              <a:t>-Learn Machine Learning</a:t>
             </a:r>
           </a:p>
         </p:txBody>
@@ -10760,26 +10878,62 @@
         </p:nvSpPr>
         <p:spPr/>
         <p:txBody>
-          <a:bodyPr>
-            <a:normAutofit/>
-          </a:bodyPr>
-          <a:lstStyle/>
-          <a:p>
-            <a:pPr marL="514350" indent="-514350">
-              <a:buFont typeface="+mj-lt"/>
-              <a:buAutoNum type="arabicParenR"/>
-            </a:pPr>
-            <a:r>
-              <a:rPr lang="en-US" dirty="0"/>
-              <a:t>https://github.com/amueller/introduction_to_ml_with_python/blob/master/02-supervised-learning.ipynb</a:t>
-            </a:r>
+          <a:bodyPr/>
+          <a:lstStyle/>
+          <a:p>
+            <a:r>
+              <a:rPr lang="en-US" dirty="0"/>
+              <a:t>Overview</a:t>
+            </a:r>
+          </a:p>
+          <a:p>
+            <a:pPr lvl="1"/>
+            <a:r>
+              <a:rPr lang="en-US" dirty="0"/>
+              <a:t>Definition</a:t>
+            </a:r>
+          </a:p>
+          <a:p>
+            <a:pPr lvl="1"/>
+            <a:r>
+              <a:rPr lang="en-US" dirty="0"/>
+              <a:t>General Types</a:t>
+            </a:r>
+          </a:p>
+          <a:p>
+            <a:pPr lvl="1"/>
+            <a:r>
+              <a:rPr lang="en-US" dirty="0"/>
+              <a:t>Basic Linear Models</a:t>
+            </a:r>
+          </a:p>
+          <a:p>
+            <a:pPr lvl="1"/>
+            <a:r>
+              <a:rPr lang="en-US" dirty="0"/>
+              <a:t>Algorithm Types</a:t>
+            </a:r>
+          </a:p>
+          <a:p>
+            <a:pPr lvl="1"/>
+            <a:r>
+              <a:rPr lang="en-US" dirty="0"/>
+              <a:t>Tuning</a:t>
+            </a:r>
+          </a:p>
+          <a:p>
+            <a:pPr lvl="2"/>
+            <a:endParaRPr lang="en-US" dirty="0"/>
+          </a:p>
+          <a:p>
+            <a:endParaRPr lang="en-US" dirty="0"/>
           </a:p>
         </p:txBody>
       </p:sp>
     </p:spTree>
     <p:extLst>
       <p:ext uri="{BB962C8B-B14F-4D97-AF65-F5344CB8AC3E}">
-        <p14:creationId xmlns:p14="http://schemas.microsoft.com/office/powerpoint/2010/main" val="3645036191"/>
+        <p14:creationId xmlns:p14="http://schemas.microsoft.com/office/powerpoint/2010/main" val="2946119377"/>
       </p:ext>
     </p:extLst>
   </p:cSld>
@@ -10837,7 +10991,7 @@
           <a:p>
             <a:r>
               <a:rPr lang="en-US" dirty="0"/>
-              <a:t>LICENSE</a:t>
+              <a:t>Bibliography</a:t>
             </a:r>
           </a:p>
         </p:txBody>
@@ -10855,31 +11009,17 @@
         <p:spPr/>
         <p:txBody>
           <a:bodyPr>
-            <a:normAutofit fontScale="62500" lnSpcReduction="20000"/>
+            <a:normAutofit/>
           </a:bodyPr>
           <a:lstStyle/>
           <a:p>
-            <a:r>
-              <a:rPr lang="en-US" dirty="0"/>
-              <a:t>Copyright 2018 Douglas Bowman</a:t>
-            </a:r>
-          </a:p>
-          <a:p>
-            <a:r>
-              <a:rPr lang="en-US" dirty="0"/>
-              <a:t>Permission is hereby granted, free of charge, to any person obtaining a copy of this software and associated documentation files (the "Software"), to deal in the Software without restriction, including without limitation the rights to use, copy, modify, merge, publish, distribute, sublicense, and/or sell copies of the Software, and to permit persons to whom the Software is furnished to do so, subject to the following conditions:</a:t>
-            </a:r>
-          </a:p>
-          <a:p>
-            <a:r>
-              <a:rPr lang="en-US" dirty="0"/>
-              <a:t>The above copyright notice and this permission notice shall be included in all copies or substantial portions of the Software.</a:t>
-            </a:r>
-          </a:p>
-          <a:p>
-            <a:r>
-              <a:rPr lang="en-US" dirty="0"/>
-              <a:t>THE SOFTWARE IS PROVIDED "AS IS", WITHOUT WARRANTY OF ANY KIND, EXPRESS OR IMPLIED, INCLUDING BUT NOT LIMITED TO THE WARRANTIES OF MERCHANTABILITY, FITNESS FOR A PARTICULAR PURPOSE AND NONINFRINGEMENT. IN NO EVENT SHALL THE AUTHORS OR COPYRIGHT HOLDERS BE LIABLE FOR ANY CLAIM, DAMAGES OR OTHER LIABILITY, WHETHER IN AN ACTION OF CONTRACT, TORT OR OTHERWISE, ARISING FROM, OUT OF OR IN CONNECTION WITH THE SOFTWARE OR THE USE OR OTHER DEALINGS IN THE SOFTWARE.</a:t>
+            <a:pPr marL="514350" indent="-514350">
+              <a:buFont typeface="+mj-lt"/>
+              <a:buAutoNum type="arabicParenR"/>
+            </a:pPr>
+            <a:r>
+              <a:rPr lang="en-US" dirty="0"/>
+              <a:t>https://github.com/amueller/introduction_to_ml_with_python/blob/master/02-supervised-learning.ipynb</a:t>
             </a:r>
           </a:p>
         </p:txBody>
@@ -10887,7 +11027,7 @@
     </p:spTree>
     <p:extLst>
       <p:ext uri="{BB962C8B-B14F-4D97-AF65-F5344CB8AC3E}">
-        <p14:creationId xmlns:p14="http://schemas.microsoft.com/office/powerpoint/2010/main" val="3405347719"/>
+        <p14:creationId xmlns:p14="http://schemas.microsoft.com/office/powerpoint/2010/main" val="3645036191"/>
       </p:ext>
     </p:extLst>
   </p:cSld>
@@ -11014,6 +11154,114 @@
     <p:extLst>
       <p:ext uri="{BB962C8B-B14F-4D97-AF65-F5344CB8AC3E}">
         <p14:creationId xmlns:p14="http://schemas.microsoft.com/office/powerpoint/2010/main" val="789975062"/>
+      </p:ext>
+    </p:extLst>
+  </p:cSld>
+  <p:clrMapOvr>
+    <a:masterClrMapping/>
+  </p:clrMapOvr>
+</p:sld>
+</file>
+
+<file path=ppt/slides/slide40.xml><?xml version="1.0" encoding="utf-8"?>
+<p:sld xmlns:a="http://schemas.openxmlformats.org/drawingml/2006/main" xmlns:r="http://schemas.openxmlformats.org/officeDocument/2006/relationships" xmlns:p="http://schemas.openxmlformats.org/presentationml/2006/main">
+  <p:cSld>
+    <p:bg>
+      <p:bgPr>
+        <a:blipFill dpi="0" rotWithShape="1">
+          <a:blip r:embed="rId2">
+            <a:lum/>
+          </a:blip>
+          <a:srcRect/>
+          <a:stretch>
+            <a:fillRect l="-10000" r="-10000"/>
+          </a:stretch>
+        </a:blipFill>
+        <a:effectLst/>
+      </p:bgPr>
+    </p:bg>
+    <p:spTree>
+      <p:nvGrpSpPr>
+        <p:cNvPr id="1" name=""/>
+        <p:cNvGrpSpPr/>
+        <p:nvPr/>
+      </p:nvGrpSpPr>
+      <p:grpSpPr>
+        <a:xfrm>
+          <a:off x="0" y="0"/>
+          <a:ext cx="0" cy="0"/>
+          <a:chOff x="0" y="0"/>
+          <a:chExt cx="0" cy="0"/>
+        </a:xfrm>
+      </p:grpSpPr>
+      <p:sp>
+        <p:nvSpPr>
+          <p:cNvPr id="2" name="Title 1"/>
+          <p:cNvSpPr>
+            <a:spLocks noGrp="1"/>
+          </p:cNvSpPr>
+          <p:nvPr>
+            <p:ph type="title"/>
+          </p:nvPr>
+        </p:nvSpPr>
+        <p:spPr/>
+        <p:txBody>
+          <a:bodyPr/>
+          <a:lstStyle/>
+          <a:p>
+            <a:r>
+              <a:rPr lang="en-US" dirty="0"/>
+              <a:t>LICENSE</a:t>
+            </a:r>
+          </a:p>
+        </p:txBody>
+      </p:sp>
+      <p:sp>
+        <p:nvSpPr>
+          <p:cNvPr id="3" name="Content Placeholder 2"/>
+          <p:cNvSpPr>
+            <a:spLocks noGrp="1"/>
+          </p:cNvSpPr>
+          <p:nvPr>
+            <p:ph idx="1"/>
+          </p:nvPr>
+        </p:nvSpPr>
+        <p:spPr/>
+        <p:txBody>
+          <a:bodyPr>
+            <a:normAutofit fontScale="62500" lnSpcReduction="20000"/>
+          </a:bodyPr>
+          <a:lstStyle/>
+          <a:p>
+            <a:r>
+              <a:rPr lang="en-US" dirty="0"/>
+              <a:t>Copyright 2018 Douglas Bowman</a:t>
+            </a:r>
+          </a:p>
+          <a:p>
+            <a:r>
+              <a:rPr lang="en-US" dirty="0"/>
+              <a:t>Permission is hereby granted, free of charge, to any person obtaining a copy of this software and associated documentation files (the "Software"), to deal in the Software without restriction, including without limitation the rights to use, copy, modify, merge, publish, distribute, sublicense, and/or sell copies of the Software, and to permit persons to whom the Software is furnished to do so, subject to the following conditions:</a:t>
+            </a:r>
+          </a:p>
+          <a:p>
+            <a:r>
+              <a:rPr lang="en-US" dirty="0"/>
+              <a:t>The above copyright notice and this permission notice shall be included in all copies or substantial portions of the Software.</a:t>
+            </a:r>
+          </a:p>
+          <a:p>
+            <a:r>
+              <a:rPr lang="en-US" dirty="0"/>
+              <a:t>THE SOFTWARE IS PROVIDED "AS IS", WITHOUT WARRANTY OF ANY KIND, EXPRESS OR IMPLIED, INCLUDING BUT NOT LIMITED TO THE WARRANTIES OF MERCHANTABILITY, FITNESS FOR A PARTICULAR PURPOSE AND NONINFRINGEMENT. IN NO EVENT SHALL THE AUTHORS OR COPYRIGHT HOLDERS BE LIABLE FOR ANY CLAIM, DAMAGES OR OTHER LIABILITY, WHETHER IN AN ACTION OF CONTRACT, TORT OR OTHERWISE, ARISING FROM, OUT OF OR IN CONNECTION WITH THE SOFTWARE OR THE USE OR OTHER DEALINGS IN THE SOFTWARE.</a:t>
+            </a:r>
+          </a:p>
+        </p:txBody>
+      </p:sp>
+    </p:spTree>
+    <p:extLst>
+      <p:ext uri="{BB962C8B-B14F-4D97-AF65-F5344CB8AC3E}">
+        <p14:creationId xmlns:p14="http://schemas.microsoft.com/office/powerpoint/2010/main" val="3405347719"/>
       </p:ext>
     </p:extLst>
   </p:cSld>
@@ -12534,6 +12782,49 @@
 </a:themeOverride>
 </file>
 
+<file path=ppt/theme/themeOverride11.xml><?xml version="1.0" encoding="utf-8"?>
+<a:themeOverride xmlns:a="http://schemas.openxmlformats.org/drawingml/2006/main">
+  <a:clrScheme name="Custom 2">
+    <a:dk1>
+      <a:srgbClr val="EFEFEF"/>
+    </a:dk1>
+    <a:lt1>
+      <a:srgbClr val="EFEFEF"/>
+    </a:lt1>
+    <a:dk2>
+      <a:srgbClr val="053E7D"/>
+    </a:dk2>
+    <a:lt2>
+      <a:srgbClr val="FFFFFF"/>
+    </a:lt2>
+    <a:accent1>
+      <a:srgbClr val="EFEFEF"/>
+    </a:accent1>
+    <a:accent2>
+      <a:srgbClr val="EFEFEF"/>
+    </a:accent2>
+    <a:accent3>
+      <a:srgbClr val="EFEFEF"/>
+    </a:accent3>
+    <a:accent4>
+      <a:srgbClr val="808080"/>
+    </a:accent4>
+    <a:accent5>
+      <a:srgbClr val="5F5F5F"/>
+    </a:accent5>
+    <a:accent6>
+      <a:srgbClr val="4D4D4D"/>
+    </a:accent6>
+    <a:hlink>
+      <a:srgbClr val="B5D7FC"/>
+    </a:hlink>
+    <a:folHlink>
+      <a:srgbClr val="919191"/>
+    </a:folHlink>
+  </a:clrScheme>
+</a:themeOverride>
+</file>
+
 <file path=ppt/theme/themeOverride2.xml><?xml version="1.0" encoding="utf-8"?>
 <a:themeOverride xmlns:a="http://schemas.openxmlformats.org/drawingml/2006/main">
   <a:clrScheme name="Custom 2">

</xml_diff>

<commit_message>
Added additional in-class exercise slides.
</commit_message>
<xml_diff>
--- a/Session 7 - Python/Instructional Material/Session 7 - Python Brief Intro to Machine Learning with Scikit Learn.pptx
+++ b/Session 7 - Python/Instructional Material/Session 7 - Python Brief Intro to Machine Learning with Scikit Learn.pptx
@@ -6,7 +6,7 @@
     <p:sldMasterId id="2147483660" r:id="rId2"/>
   </p:sldMasterIdLst>
   <p:notesMasterIdLst>
-    <p:notesMasterId r:id="rId67"/>
+    <p:notesMasterId r:id="rId68"/>
   </p:notesMasterIdLst>
   <p:sldIdLst>
     <p:sldId id="256" r:id="rId3"/>
@@ -41,38 +41,39 @@
     <p:sldId id="390" r:id="rId32"/>
     <p:sldId id="426" r:id="rId33"/>
     <p:sldId id="412" r:id="rId34"/>
-    <p:sldId id="415" r:id="rId35"/>
-    <p:sldId id="413" r:id="rId36"/>
-    <p:sldId id="416" r:id="rId37"/>
-    <p:sldId id="436" r:id="rId38"/>
-    <p:sldId id="437" r:id="rId39"/>
-    <p:sldId id="438" r:id="rId40"/>
-    <p:sldId id="391" r:id="rId41"/>
-    <p:sldId id="428" r:id="rId42"/>
-    <p:sldId id="427" r:id="rId43"/>
-    <p:sldId id="441" r:id="rId44"/>
-    <p:sldId id="396" r:id="rId45"/>
-    <p:sldId id="432" r:id="rId46"/>
-    <p:sldId id="431" r:id="rId47"/>
-    <p:sldId id="430" r:id="rId48"/>
-    <p:sldId id="434" r:id="rId49"/>
-    <p:sldId id="439" r:id="rId50"/>
-    <p:sldId id="440" r:id="rId51"/>
-    <p:sldId id="414" r:id="rId52"/>
-    <p:sldId id="433" r:id="rId53"/>
-    <p:sldId id="442" r:id="rId54"/>
-    <p:sldId id="443" r:id="rId55"/>
-    <p:sldId id="397" r:id="rId56"/>
-    <p:sldId id="398" r:id="rId57"/>
-    <p:sldId id="399" r:id="rId58"/>
-    <p:sldId id="376" r:id="rId59"/>
-    <p:sldId id="405" r:id="rId60"/>
-    <p:sldId id="385" r:id="rId61"/>
-    <p:sldId id="386" r:id="rId62"/>
-    <p:sldId id="400" r:id="rId63"/>
-    <p:sldId id="384" r:id="rId64"/>
-    <p:sldId id="375" r:id="rId65"/>
-    <p:sldId id="411" r:id="rId66"/>
+    <p:sldId id="444" r:id="rId35"/>
+    <p:sldId id="415" r:id="rId36"/>
+    <p:sldId id="413" r:id="rId37"/>
+    <p:sldId id="416" r:id="rId38"/>
+    <p:sldId id="436" r:id="rId39"/>
+    <p:sldId id="437" r:id="rId40"/>
+    <p:sldId id="438" r:id="rId41"/>
+    <p:sldId id="391" r:id="rId42"/>
+    <p:sldId id="428" r:id="rId43"/>
+    <p:sldId id="427" r:id="rId44"/>
+    <p:sldId id="441" r:id="rId45"/>
+    <p:sldId id="396" r:id="rId46"/>
+    <p:sldId id="432" r:id="rId47"/>
+    <p:sldId id="431" r:id="rId48"/>
+    <p:sldId id="430" r:id="rId49"/>
+    <p:sldId id="434" r:id="rId50"/>
+    <p:sldId id="439" r:id="rId51"/>
+    <p:sldId id="440" r:id="rId52"/>
+    <p:sldId id="414" r:id="rId53"/>
+    <p:sldId id="433" r:id="rId54"/>
+    <p:sldId id="442" r:id="rId55"/>
+    <p:sldId id="443" r:id="rId56"/>
+    <p:sldId id="397" r:id="rId57"/>
+    <p:sldId id="398" r:id="rId58"/>
+    <p:sldId id="399" r:id="rId59"/>
+    <p:sldId id="376" r:id="rId60"/>
+    <p:sldId id="405" r:id="rId61"/>
+    <p:sldId id="385" r:id="rId62"/>
+    <p:sldId id="386" r:id="rId63"/>
+    <p:sldId id="400" r:id="rId64"/>
+    <p:sldId id="384" r:id="rId65"/>
+    <p:sldId id="375" r:id="rId66"/>
+    <p:sldId id="411" r:id="rId67"/>
   </p:sldIdLst>
   <p:sldSz cx="9144000" cy="6858000" type="screen4x3"/>
   <p:notesSz cx="6858000" cy="9144000"/>
@@ -272,7 +273,7 @@
           <a:p>
             <a:fld id="{CD3A85A8-362A-422C-AAFE-FA6D3B9BF6BA}" type="datetimeFigureOut">
               <a:rPr lang="en-US" smtClean="0"/>
-              <a:t>12/6/2021</a:t>
+              <a:t>12/7/2021</a:t>
             </a:fld>
             <a:endParaRPr lang="en-US"/>
           </a:p>
@@ -856,7 +857,7 @@
           <a:p>
             <a:fld id="{3E7B21C4-CE7A-4258-91FF-8CBB981279E1}" type="slidenum">
               <a:rPr lang="en-US" smtClean="0"/>
-              <a:t>33</a:t>
+              <a:t>34</a:t>
             </a:fld>
             <a:endParaRPr lang="en-US"/>
           </a:p>
@@ -940,7 +941,7 @@
           <a:p>
             <a:fld id="{3E7B21C4-CE7A-4258-91FF-8CBB981279E1}" type="slidenum">
               <a:rPr lang="en-US" smtClean="0"/>
-              <a:t>34</a:t>
+              <a:t>35</a:t>
             </a:fld>
             <a:endParaRPr lang="en-US"/>
           </a:p>
@@ -1024,7 +1025,7 @@
           <a:p>
             <a:fld id="{3E7B21C4-CE7A-4258-91FF-8CBB981279E1}" type="slidenum">
               <a:rPr lang="en-US" smtClean="0"/>
-              <a:t>35</a:t>
+              <a:t>36</a:t>
             </a:fld>
             <a:endParaRPr lang="en-US"/>
           </a:p>
@@ -1108,7 +1109,7 @@
           <a:p>
             <a:fld id="{3E7B21C4-CE7A-4258-91FF-8CBB981279E1}" type="slidenum">
               <a:rPr lang="en-US" smtClean="0"/>
-              <a:t>36</a:t>
+              <a:t>37</a:t>
             </a:fld>
             <a:endParaRPr lang="en-US"/>
           </a:p>
@@ -1192,7 +1193,7 @@
           <a:p>
             <a:fld id="{3E7B21C4-CE7A-4258-91FF-8CBB981279E1}" type="slidenum">
               <a:rPr lang="en-US" smtClean="0"/>
-              <a:t>37</a:t>
+              <a:t>38</a:t>
             </a:fld>
             <a:endParaRPr lang="en-US"/>
           </a:p>
@@ -1390,7 +1391,7 @@
           <a:p>
             <a:fld id="{547641E8-73DF-4AD2-848E-3103064331B1}" type="datetimeFigureOut">
               <a:rPr lang="en-US" smtClean="0"/>
-              <a:t>12/6/2021</a:t>
+              <a:t>12/7/2021</a:t>
             </a:fld>
             <a:endParaRPr lang="en-US"/>
           </a:p>
@@ -1558,7 +1559,7 @@
           <a:p>
             <a:fld id="{547641E8-73DF-4AD2-848E-3103064331B1}" type="datetimeFigureOut">
               <a:rPr lang="en-US" smtClean="0"/>
-              <a:t>12/6/2021</a:t>
+              <a:t>12/7/2021</a:t>
             </a:fld>
             <a:endParaRPr lang="en-US"/>
           </a:p>
@@ -1736,7 +1737,7 @@
           <a:p>
             <a:fld id="{547641E8-73DF-4AD2-848E-3103064331B1}" type="datetimeFigureOut">
               <a:rPr lang="en-US" smtClean="0"/>
-              <a:t>12/6/2021</a:t>
+              <a:t>12/7/2021</a:t>
             </a:fld>
             <a:endParaRPr lang="en-US"/>
           </a:p>
@@ -1983,7 +1984,7 @@
                 </a:solidFill>
               </a:rPr>
               <a:pPr/>
-              <a:t>12/6/2021</a:t>
+              <a:t>12/7/2021</a:t>
             </a:fld>
             <a:endParaRPr lang="en-US">
               <a:solidFill>
@@ -2183,7 +2184,7 @@
                 </a:solidFill>
               </a:rPr>
               <a:pPr/>
-              <a:t>12/6/2021</a:t>
+              <a:t>12/7/2021</a:t>
             </a:fld>
             <a:endParaRPr lang="en-US">
               <a:solidFill>
@@ -2460,7 +2461,7 @@
                 </a:solidFill>
               </a:rPr>
               <a:pPr/>
-              <a:t>12/6/2021</a:t>
+              <a:t>12/7/2021</a:t>
             </a:fld>
             <a:endParaRPr lang="en-US">
               <a:solidFill>
@@ -2777,7 +2778,7 @@
                 </a:solidFill>
               </a:rPr>
               <a:pPr/>
-              <a:t>12/6/2021</a:t>
+              <a:t>12/7/2021</a:t>
             </a:fld>
             <a:endParaRPr lang="en-US">
               <a:solidFill>
@@ -3228,7 +3229,7 @@
                 </a:solidFill>
               </a:rPr>
               <a:pPr/>
-              <a:t>12/6/2021</a:t>
+              <a:t>12/7/2021</a:t>
             </a:fld>
             <a:endParaRPr lang="en-US">
               <a:solidFill>
@@ -3377,7 +3378,7 @@
                 </a:solidFill>
               </a:rPr>
               <a:pPr/>
-              <a:t>12/6/2021</a:t>
+              <a:t>12/7/2021</a:t>
             </a:fld>
             <a:endParaRPr lang="en-US">
               <a:solidFill>
@@ -3504,7 +3505,7 @@
                 </a:solidFill>
               </a:rPr>
               <a:pPr/>
-              <a:t>12/6/2021</a:t>
+              <a:t>12/7/2021</a:t>
             </a:fld>
             <a:endParaRPr lang="en-US">
               <a:solidFill>
@@ -3811,7 +3812,7 @@
                 </a:solidFill>
               </a:rPr>
               <a:pPr/>
-              <a:t>12/6/2021</a:t>
+              <a:t>12/7/2021</a:t>
             </a:fld>
             <a:endParaRPr lang="en-US">
               <a:solidFill>
@@ -4004,7 +4005,7 @@
           <a:p>
             <a:fld id="{547641E8-73DF-4AD2-848E-3103064331B1}" type="datetimeFigureOut">
               <a:rPr lang="en-US" smtClean="0"/>
-              <a:t>12/6/2021</a:t>
+              <a:t>12/7/2021</a:t>
             </a:fld>
             <a:endParaRPr lang="en-US"/>
           </a:p>
@@ -4263,7 +4264,7 @@
                 </a:solidFill>
               </a:rPr>
               <a:pPr/>
-              <a:t>12/6/2021</a:t>
+              <a:t>12/7/2021</a:t>
             </a:fld>
             <a:endParaRPr lang="en-US">
               <a:solidFill>
@@ -4463,7 +4464,7 @@
                 </a:solidFill>
               </a:rPr>
               <a:pPr/>
-              <a:t>12/6/2021</a:t>
+              <a:t>12/7/2021</a:t>
             </a:fld>
             <a:endParaRPr lang="en-US">
               <a:solidFill>
@@ -4673,7 +4674,7 @@
                 </a:solidFill>
               </a:rPr>
               <a:pPr/>
-              <a:t>12/6/2021</a:t>
+              <a:t>12/7/2021</a:t>
             </a:fld>
             <a:endParaRPr lang="en-US">
               <a:solidFill>
@@ -4943,7 +4944,7 @@
           <a:p>
             <a:fld id="{547641E8-73DF-4AD2-848E-3103064331B1}" type="datetimeFigureOut">
               <a:rPr lang="en-US" smtClean="0"/>
-              <a:t>12/6/2021</a:t>
+              <a:t>12/7/2021</a:t>
             </a:fld>
             <a:endParaRPr lang="en-US"/>
           </a:p>
@@ -5228,7 +5229,7 @@
           <a:p>
             <a:fld id="{547641E8-73DF-4AD2-848E-3103064331B1}" type="datetimeFigureOut">
               <a:rPr lang="en-US" smtClean="0"/>
-              <a:t>12/6/2021</a:t>
+              <a:t>12/7/2021</a:t>
             </a:fld>
             <a:endParaRPr lang="en-US"/>
           </a:p>
@@ -5647,7 +5648,7 @@
           <a:p>
             <a:fld id="{547641E8-73DF-4AD2-848E-3103064331B1}" type="datetimeFigureOut">
               <a:rPr lang="en-US" smtClean="0"/>
-              <a:t>12/6/2021</a:t>
+              <a:t>12/7/2021</a:t>
             </a:fld>
             <a:endParaRPr lang="en-US"/>
           </a:p>
@@ -5764,7 +5765,7 @@
           <a:p>
             <a:fld id="{547641E8-73DF-4AD2-848E-3103064331B1}" type="datetimeFigureOut">
               <a:rPr lang="en-US" smtClean="0"/>
-              <a:t>12/6/2021</a:t>
+              <a:t>12/7/2021</a:t>
             </a:fld>
             <a:endParaRPr lang="en-US"/>
           </a:p>
@@ -5859,7 +5860,7 @@
           <a:p>
             <a:fld id="{547641E8-73DF-4AD2-848E-3103064331B1}" type="datetimeFigureOut">
               <a:rPr lang="en-US" smtClean="0"/>
-              <a:t>12/6/2021</a:t>
+              <a:t>12/7/2021</a:t>
             </a:fld>
             <a:endParaRPr lang="en-US"/>
           </a:p>
@@ -6134,7 +6135,7 @@
           <a:p>
             <a:fld id="{547641E8-73DF-4AD2-848E-3103064331B1}" type="datetimeFigureOut">
               <a:rPr lang="en-US" smtClean="0"/>
-              <a:t>12/6/2021</a:t>
+              <a:t>12/7/2021</a:t>
             </a:fld>
             <a:endParaRPr lang="en-US"/>
           </a:p>
@@ -6386,7 +6387,7 @@
           <a:p>
             <a:fld id="{547641E8-73DF-4AD2-848E-3103064331B1}" type="datetimeFigureOut">
               <a:rPr lang="en-US" smtClean="0"/>
-              <a:t>12/6/2021</a:t>
+              <a:t>12/7/2021</a:t>
             </a:fld>
             <a:endParaRPr lang="en-US"/>
           </a:p>
@@ -6600,7 +6601,7 @@
           <a:p>
             <a:fld id="{547641E8-73DF-4AD2-848E-3103064331B1}" type="datetimeFigureOut">
               <a:rPr lang="en-US" smtClean="0"/>
-              <a:t>12/6/2021</a:t>
+              <a:t>12/7/2021</a:t>
             </a:fld>
             <a:endParaRPr lang="en-US"/>
           </a:p>
@@ -7115,7 +7116,7 @@
                 </a:solidFill>
               </a:rPr>
               <a:pPr/>
-              <a:t>12/6/2021</a:t>
+              <a:t>12/7/2021</a:t>
             </a:fld>
             <a:endParaRPr lang="en-US">
               <a:solidFill>
@@ -11123,7 +11124,7 @@
           <a:graphicData uri="http://schemas.openxmlformats.org/presentationml/2006/ole">
             <mc:AlternateContent xmlns:mc="http://schemas.openxmlformats.org/markup-compatibility/2006">
               <mc:Choice xmlns:v="urn:schemas-microsoft-com:vml" Requires="v">
-                <p:oleObj spid="_x0000_s2126" name="Bitmap Image" r:id="rId7" imgW="3743280" imgH="3024360" progId="Paint.Picture">
+                <p:oleObj spid="_x0000_s2128" name="Bitmap Image" r:id="rId7" imgW="3743280" imgH="3024360" progId="Paint.Picture">
                   <p:embed/>
                 </p:oleObj>
               </mc:Choice>
@@ -11213,11 +11214,11 @@
     <p:bg>
       <p:bgPr>
         <a:blipFill dpi="0" rotWithShape="1">
-          <a:blip r:embed="rId4">
+          <a:blip r:embed="rId3">
             <a:extLst>
               <a:ext uri="{BEBA8EAE-BF5A-486C-A8C5-ECC9F3942E4B}">
                 <a14:imgProps xmlns:a14="http://schemas.microsoft.com/office/drawing/2010/main">
-                  <a14:imgLayer r:embed="rId5">
+                  <a14:imgLayer r:embed="rId4">
                     <a14:imgEffect>
                       <a14:brightnessContrast bright="-50000"/>
                     </a14:imgEffect>
@@ -11287,29 +11288,42 @@
           <a:p>
             <a:r>
               <a:rPr lang="en-US" dirty="0"/>
-              <a:t>Decision Tree</a:t>
+              <a:t>In-Class Exercise</a:t>
             </a:r>
           </a:p>
           <a:p>
             <a:pPr lvl="1"/>
             <a:r>
               <a:rPr lang="en-US" dirty="0"/>
-              <a:t>Builds a series of if-statements to classify test points.</a:t>
-            </a:r>
+              <a:t>Run the </a:t>
+            </a:r>
+            <a:r>
+              <a:rPr lang="en-US" dirty="0" err="1"/>
+              <a:t>classifer</a:t>
+            </a:r>
+            <a:r>
+              <a:rPr lang="en-US"/>
+              <a:t> example </a:t>
+            </a:r>
+            <a:r>
+              <a:rPr lang="en-US" dirty="0"/>
+              <a:t>with k-nearest neighbors and optimize based on number of neighbors</a:t>
+            </a:r>
+          </a:p>
+          <a:p>
+            <a:pPr lvl="2"/>
+            <a:endParaRPr lang="en-US" dirty="0"/>
+          </a:p>
+          <a:p>
+            <a:endParaRPr lang="en-US" dirty="0"/>
           </a:p>
           <a:p>
             <a:pPr lvl="1"/>
-            <a:r>
-              <a:rPr lang="en-US" dirty="0"/>
-              <a:t>Boundaries around classifications are built based on the data.</a:t>
-            </a:r>
-          </a:p>
-          <a:p>
-            <a:pPr lvl="1"/>
-            <a:r>
-              <a:rPr lang="en-US" dirty="0"/>
-              <a:t>The number of if statement groups, or boundaries created, is known as the depth.</a:t>
-            </a:r>
+            <a:endParaRPr lang="en-US" dirty="0"/>
+          </a:p>
+          <a:p>
+            <a:pPr lvl="2"/>
+            <a:endParaRPr lang="en-US" dirty="0"/>
           </a:p>
           <a:p>
             <a:pPr lvl="2"/>
@@ -11323,7 +11337,7 @@
     </p:spTree>
     <p:extLst>
       <p:ext uri="{BB962C8B-B14F-4D97-AF65-F5344CB8AC3E}">
-        <p14:creationId xmlns:p14="http://schemas.microsoft.com/office/powerpoint/2010/main" val="31895842"/>
+        <p14:creationId xmlns:p14="http://schemas.microsoft.com/office/powerpoint/2010/main" val="3634293830"/>
       </p:ext>
     </p:extLst>
   </p:cSld>
@@ -11420,22 +11434,26 @@
             <a:pPr lvl="1"/>
             <a:r>
               <a:rPr lang="en-US" dirty="0"/>
-              <a:t>See file “./Session 7 – Python/Instructional Material/Class Examples/Scikit-Learn/decision_tree_graph.html“ for the produced image.  </a:t>
+              <a:t>Builds a series of if-statements to classify test points.</a:t>
+            </a:r>
+          </a:p>
+          <a:p>
+            <a:pPr lvl="1"/>
+            <a:r>
+              <a:rPr lang="en-US" dirty="0"/>
+              <a:t>Boundaries around classifications are built based on the data.</a:t>
+            </a:r>
+          </a:p>
+          <a:p>
+            <a:pPr lvl="1"/>
+            <a:r>
+              <a:rPr lang="en-US" dirty="0"/>
+              <a:t>The number of if statement groups, or boundaries created, is known as the depth.</a:t>
             </a:r>
           </a:p>
           <a:p>
             <a:pPr lvl="2"/>
-            <a:r>
-              <a:rPr lang="en-US" dirty="0"/>
-              <a:t>Generated from iris data set</a:t>
-            </a:r>
-          </a:p>
-          <a:p>
-            <a:pPr lvl="2"/>
-            <a:r>
-              <a:rPr lang="en-US" dirty="0"/>
-              <a:t>Code can be found in class example code under the decision tree section</a:t>
-            </a:r>
+            <a:endParaRPr lang="en-US" dirty="0"/>
           </a:p>
           <a:p>
             <a:endParaRPr lang="en-US" dirty="0"/>
@@ -11445,7 +11463,7 @@
     </p:spTree>
     <p:extLst>
       <p:ext uri="{BB962C8B-B14F-4D97-AF65-F5344CB8AC3E}">
-        <p14:creationId xmlns:p14="http://schemas.microsoft.com/office/powerpoint/2010/main" val="2487683877"/>
+        <p14:creationId xmlns:p14="http://schemas.microsoft.com/office/powerpoint/2010/main" val="31895842"/>
       </p:ext>
     </p:extLst>
   </p:cSld>
@@ -11539,48 +11557,35 @@
             </a:r>
           </a:p>
           <a:p>
+            <a:pPr lvl="1"/>
+            <a:r>
+              <a:rPr lang="en-US" dirty="0"/>
+              <a:t>See file “./Session 7 – Python/Instructional Material/Class Examples/Scikit-Learn/decision_tree_graph.html“ for the produced image.  </a:t>
+            </a:r>
+          </a:p>
+          <a:p>
             <a:pPr lvl="2"/>
+            <a:r>
+              <a:rPr lang="en-US" dirty="0"/>
+              <a:t>Generated from iris data set</a:t>
+            </a:r>
+          </a:p>
+          <a:p>
+            <a:pPr lvl="2"/>
+            <a:r>
+              <a:rPr lang="en-US" dirty="0"/>
+              <a:t>Code can be found in class example code under the decision tree section</a:t>
+            </a:r>
+          </a:p>
+          <a:p>
             <a:endParaRPr lang="en-US" dirty="0"/>
           </a:p>
-          <a:p>
-            <a:endParaRPr lang="en-US" dirty="0"/>
-          </a:p>
-        </p:txBody>
-      </p:sp>
-      <p:pic>
-        <p:nvPicPr>
-          <p:cNvPr id="5" name="Picture 4">
-            <a:extLst>
-              <a:ext uri="{FF2B5EF4-FFF2-40B4-BE49-F238E27FC236}">
-                <a16:creationId xmlns:a16="http://schemas.microsoft.com/office/drawing/2014/main" id="{AEE9C498-C33F-4F9D-A693-50DA2A30C0BE}"/>
-              </a:ext>
-            </a:extLst>
-          </p:cNvPr>
-          <p:cNvPicPr>
-            <a:picLocks noChangeAspect="1"/>
-          </p:cNvPicPr>
-          <p:nvPr/>
-        </p:nvPicPr>
-        <p:blipFill>
-          <a:blip r:embed="rId6"/>
-          <a:stretch>
-            <a:fillRect/>
-          </a:stretch>
-        </p:blipFill>
-        <p:spPr>
-          <a:xfrm>
-            <a:off x="1524000" y="2209800"/>
-            <a:ext cx="6096000" cy="4304313"/>
-          </a:xfrm>
-          <a:prstGeom prst="rect">
-            <a:avLst/>
-          </a:prstGeom>
-        </p:spPr>
-      </p:pic>
+        </p:txBody>
+      </p:sp>
     </p:spTree>
     <p:extLst>
       <p:ext uri="{BB962C8B-B14F-4D97-AF65-F5344CB8AC3E}">
-        <p14:creationId xmlns:p14="http://schemas.microsoft.com/office/powerpoint/2010/main" val="3675808278"/>
+        <p14:creationId xmlns:p14="http://schemas.microsoft.com/office/powerpoint/2010/main" val="2487683877"/>
       </p:ext>
     </p:extLst>
   </p:cSld>
@@ -11670,7 +11675,7 @@
           <a:p>
             <a:r>
               <a:rPr lang="en-US" dirty="0"/>
-              <a:t>Logistic Regression</a:t>
+              <a:t>Decision Tree</a:t>
             </a:r>
           </a:p>
           <a:p>
@@ -11682,10 +11687,40 @@
           </a:p>
         </p:txBody>
       </p:sp>
+      <p:pic>
+        <p:nvPicPr>
+          <p:cNvPr id="5" name="Picture 4">
+            <a:extLst>
+              <a:ext uri="{FF2B5EF4-FFF2-40B4-BE49-F238E27FC236}">
+                <a16:creationId xmlns:a16="http://schemas.microsoft.com/office/drawing/2014/main" id="{AEE9C498-C33F-4F9D-A693-50DA2A30C0BE}"/>
+              </a:ext>
+            </a:extLst>
+          </p:cNvPr>
+          <p:cNvPicPr>
+            <a:picLocks noChangeAspect="1"/>
+          </p:cNvPicPr>
+          <p:nvPr/>
+        </p:nvPicPr>
+        <p:blipFill>
+          <a:blip r:embed="rId6"/>
+          <a:stretch>
+            <a:fillRect/>
+          </a:stretch>
+        </p:blipFill>
+        <p:spPr>
+          <a:xfrm>
+            <a:off x="1524000" y="2209800"/>
+            <a:ext cx="6096000" cy="4304313"/>
+          </a:xfrm>
+          <a:prstGeom prst="rect">
+            <a:avLst/>
+          </a:prstGeom>
+        </p:spPr>
+      </p:pic>
     </p:spTree>
     <p:extLst>
       <p:ext uri="{BB962C8B-B14F-4D97-AF65-F5344CB8AC3E}">
-        <p14:creationId xmlns:p14="http://schemas.microsoft.com/office/powerpoint/2010/main" val="578164379"/>
+        <p14:creationId xmlns:p14="http://schemas.microsoft.com/office/powerpoint/2010/main" val="3675808278"/>
       </p:ext>
     </p:extLst>
   </p:cSld>
@@ -11775,7 +11810,7 @@
           <a:p>
             <a:r>
               <a:rPr lang="en-US" dirty="0"/>
-              <a:t>Support Vector Classifier</a:t>
+              <a:t>Logistic Regression</a:t>
             </a:r>
           </a:p>
           <a:p>
@@ -11790,7 +11825,7 @@
     </p:spTree>
     <p:extLst>
       <p:ext uri="{BB962C8B-B14F-4D97-AF65-F5344CB8AC3E}">
-        <p14:creationId xmlns:p14="http://schemas.microsoft.com/office/powerpoint/2010/main" val="3528512833"/>
+        <p14:creationId xmlns:p14="http://schemas.microsoft.com/office/powerpoint/2010/main" val="578164379"/>
       </p:ext>
     </p:extLst>
   </p:cSld>
@@ -11806,11 +11841,11 @@
     <p:bg>
       <p:bgPr>
         <a:blipFill dpi="0" rotWithShape="1">
-          <a:blip r:embed="rId3">
+          <a:blip r:embed="rId4">
             <a:extLst>
               <a:ext uri="{BEBA8EAE-BF5A-486C-A8C5-ECC9F3942E4B}">
                 <a14:imgProps xmlns:a14="http://schemas.microsoft.com/office/drawing/2010/main">
-                  <a14:imgLayer r:embed="rId4">
+                  <a14:imgLayer r:embed="rId5">
                     <a14:imgEffect>
                       <a14:brightnessContrast bright="-50000"/>
                     </a14:imgEffect>
@@ -11858,7 +11893,7 @@
           <a:p>
             <a:r>
               <a:rPr lang="en-US" dirty="0"/>
-              <a:t>Linear Models - Regressors</a:t>
+              <a:t>Linear Models - Classifiers</a:t>
             </a:r>
           </a:p>
         </p:txBody>
@@ -11880,7 +11915,7 @@
           <a:p>
             <a:r>
               <a:rPr lang="en-US" dirty="0"/>
-              <a:t>K-Nearest Neighbors Regression</a:t>
+              <a:t>Support Vector Classifier</a:t>
             </a:r>
           </a:p>
           <a:p>
@@ -11895,7 +11930,7 @@
     </p:spTree>
     <p:extLst>
       <p:ext uri="{BB962C8B-B14F-4D97-AF65-F5344CB8AC3E}">
-        <p14:creationId xmlns:p14="http://schemas.microsoft.com/office/powerpoint/2010/main" val="3048577779"/>
+        <p14:creationId xmlns:p14="http://schemas.microsoft.com/office/powerpoint/2010/main" val="3528512833"/>
       </p:ext>
     </p:extLst>
   </p:cSld>
@@ -11980,158 +12015,12 @@
         </p:nvSpPr>
         <p:spPr/>
         <p:txBody>
-          <a:bodyPr>
-            <a:normAutofit/>
-          </a:bodyPr>
-          <a:lstStyle/>
-          <a:p>
-            <a:r>
-              <a:rPr lang="en-US" dirty="0"/>
-              <a:t>Regressors</a:t>
-            </a:r>
-          </a:p>
-          <a:p>
-            <a:pPr lvl="1"/>
-            <a:r>
-              <a:rPr lang="en-US" dirty="0"/>
-              <a:t>Tries to predict as close to a value as possible.</a:t>
-            </a:r>
-          </a:p>
-          <a:p>
-            <a:pPr lvl="1"/>
-            <a:r>
-              <a:rPr lang="en-US" dirty="0"/>
-              <a:t>Creates a linear equation to predict outcomes:</a:t>
-            </a:r>
-          </a:p>
-          <a:p>
-            <a:pPr lvl="2"/>
-            <a:r>
-              <a:rPr lang="en-US" dirty="0" err="1"/>
-              <a:t>Y</a:t>
-            </a:r>
-            <a:r>
-              <a:rPr lang="en-US" baseline="-25000" dirty="0" err="1"/>
-              <a:t>predict</a:t>
-            </a:r>
-            <a:r>
-              <a:rPr lang="en-US" dirty="0"/>
-              <a:t> = w</a:t>
-            </a:r>
-            <a:r>
-              <a:rPr lang="en-US" baseline="-25000" dirty="0"/>
-              <a:t>1</a:t>
-            </a:r>
-            <a:r>
-              <a:rPr lang="en-US" dirty="0"/>
-              <a:t>*f</a:t>
-            </a:r>
-            <a:r>
-              <a:rPr lang="en-US" baseline="-25000" dirty="0"/>
-              <a:t>1</a:t>
-            </a:r>
-            <a:r>
-              <a:rPr lang="en-US" dirty="0"/>
-              <a:t> + w</a:t>
-            </a:r>
-            <a:r>
-              <a:rPr lang="en-US" baseline="-25000" dirty="0"/>
-              <a:t>2</a:t>
-            </a:r>
-            <a:r>
-              <a:rPr lang="en-US" dirty="0"/>
-              <a:t>*f</a:t>
-            </a:r>
-            <a:r>
-              <a:rPr lang="en-US" baseline="-25000" dirty="0"/>
-              <a:t>2</a:t>
-            </a:r>
-            <a:r>
-              <a:rPr lang="en-US" dirty="0"/>
-              <a:t> + w</a:t>
-            </a:r>
-            <a:r>
-              <a:rPr lang="en-US" baseline="-25000" dirty="0"/>
-              <a:t>3</a:t>
-            </a:r>
-            <a:r>
-              <a:rPr lang="en-US" dirty="0"/>
-              <a:t>*f</a:t>
-            </a:r>
-            <a:r>
-              <a:rPr lang="en-US" baseline="-25000" dirty="0"/>
-              <a:t>3</a:t>
-            </a:r>
-            <a:r>
-              <a:rPr lang="en-US" dirty="0"/>
-              <a:t> + … + </a:t>
-            </a:r>
-            <a:r>
-              <a:rPr lang="en-US" dirty="0" err="1"/>
-              <a:t>w</a:t>
-            </a:r>
-            <a:r>
-              <a:rPr lang="en-US" baseline="-25000" dirty="0" err="1"/>
-              <a:t>n</a:t>
-            </a:r>
-            <a:r>
-              <a:rPr lang="en-US" dirty="0"/>
-              <a:t>*</a:t>
-            </a:r>
-            <a:r>
-              <a:rPr lang="en-US" dirty="0" err="1"/>
-              <a:t>f</a:t>
-            </a:r>
-            <a:r>
-              <a:rPr lang="en-US" baseline="-25000" dirty="0" err="1"/>
-              <a:t>n</a:t>
-            </a:r>
-            <a:r>
-              <a:rPr lang="en-US" dirty="0"/>
-              <a:t> + b</a:t>
-            </a:r>
-          </a:p>
-          <a:p>
-            <a:pPr lvl="3"/>
-            <a:r>
-              <a:rPr lang="en-US" dirty="0" err="1"/>
-              <a:t>Y</a:t>
-            </a:r>
-            <a:r>
-              <a:rPr lang="en-US" baseline="-25000" dirty="0" err="1"/>
-              <a:t>predict</a:t>
-            </a:r>
-            <a:r>
-              <a:rPr lang="en-US" dirty="0"/>
-              <a:t> = prediction value</a:t>
-            </a:r>
-          </a:p>
-          <a:p>
-            <a:pPr lvl="3"/>
-            <a:r>
-              <a:rPr lang="en-US" dirty="0"/>
-              <a:t>w = weights</a:t>
-            </a:r>
-          </a:p>
-          <a:p>
-            <a:pPr lvl="3"/>
-            <a:r>
-              <a:rPr lang="en-US" dirty="0"/>
-              <a:t>f = feature value</a:t>
-            </a:r>
-          </a:p>
-          <a:p>
-            <a:pPr lvl="3"/>
-            <a:r>
-              <a:rPr lang="en-US" dirty="0"/>
-              <a:t>b = intercept of linear line</a:t>
-            </a:r>
-          </a:p>
-          <a:p>
-            <a:pPr lvl="3"/>
-            <a:r>
-              <a:rPr lang="en-US" dirty="0"/>
-              <a:t>n = number of features</a:t>
+          <a:bodyPr/>
+          <a:lstStyle/>
+          <a:p>
+            <a:r>
+              <a:rPr lang="en-US" dirty="0"/>
+              <a:t>K-Nearest Neighbors Regression</a:t>
             </a:r>
           </a:p>
           <a:p>
@@ -12146,7 +12035,7 @@
     </p:spTree>
     <p:extLst>
       <p:ext uri="{BB962C8B-B14F-4D97-AF65-F5344CB8AC3E}">
-        <p14:creationId xmlns:p14="http://schemas.microsoft.com/office/powerpoint/2010/main" val="1469044682"/>
+        <p14:creationId xmlns:p14="http://schemas.microsoft.com/office/powerpoint/2010/main" val="3048577779"/>
       </p:ext>
     </p:extLst>
   </p:cSld>
@@ -12376,7 +12265,77 @@
             <a:pPr lvl="1"/>
             <a:r>
               <a:rPr lang="en-US" dirty="0"/>
-              <a:t>The models we train adjust the values of </a:t>
+              <a:t>Tries to predict as close to a value as possible.</a:t>
+            </a:r>
+          </a:p>
+          <a:p>
+            <a:pPr lvl="1"/>
+            <a:r>
+              <a:rPr lang="en-US" dirty="0"/>
+              <a:t>Creates a linear equation to predict outcomes:</a:t>
+            </a:r>
+          </a:p>
+          <a:p>
+            <a:pPr lvl="2"/>
+            <a:r>
+              <a:rPr lang="en-US" dirty="0" err="1"/>
+              <a:t>Y</a:t>
+            </a:r>
+            <a:r>
+              <a:rPr lang="en-US" baseline="-25000" dirty="0" err="1"/>
+              <a:t>predict</a:t>
+            </a:r>
+            <a:r>
+              <a:rPr lang="en-US" dirty="0"/>
+              <a:t> = w</a:t>
+            </a:r>
+            <a:r>
+              <a:rPr lang="en-US" baseline="-25000" dirty="0"/>
+              <a:t>1</a:t>
+            </a:r>
+            <a:r>
+              <a:rPr lang="en-US" dirty="0"/>
+              <a:t>*f</a:t>
+            </a:r>
+            <a:r>
+              <a:rPr lang="en-US" baseline="-25000" dirty="0"/>
+              <a:t>1</a:t>
+            </a:r>
+            <a:r>
+              <a:rPr lang="en-US" dirty="0"/>
+              <a:t> + w</a:t>
+            </a:r>
+            <a:r>
+              <a:rPr lang="en-US" baseline="-25000" dirty="0"/>
+              <a:t>2</a:t>
+            </a:r>
+            <a:r>
+              <a:rPr lang="en-US" dirty="0"/>
+              <a:t>*f</a:t>
+            </a:r>
+            <a:r>
+              <a:rPr lang="en-US" baseline="-25000" dirty="0"/>
+              <a:t>2</a:t>
+            </a:r>
+            <a:r>
+              <a:rPr lang="en-US" dirty="0"/>
+              <a:t> + w</a:t>
+            </a:r>
+            <a:r>
+              <a:rPr lang="en-US" baseline="-25000" dirty="0"/>
+              <a:t>3</a:t>
+            </a:r>
+            <a:r>
+              <a:rPr lang="en-US" dirty="0"/>
+              <a:t>*f</a:t>
+            </a:r>
+            <a:r>
+              <a:rPr lang="en-US" baseline="-25000" dirty="0"/>
+              <a:t>3</a:t>
+            </a:r>
+            <a:r>
+              <a:rPr lang="en-US" dirty="0"/>
+              <a:t> + … + </a:t>
             </a:r>
             <a:r>
               <a:rPr lang="en-US" dirty="0" err="1"/>
@@ -12384,33 +12343,66 @@
             </a:r>
             <a:r>
               <a:rPr lang="en-US" baseline="-25000" dirty="0" err="1"/>
-              <a:t>x</a:t>
-            </a:r>
-            <a:r>
-              <a:rPr lang="en-US" dirty="0"/>
-              <a:t> and b.</a:t>
-            </a:r>
-            <a:endParaRPr lang="en-US" baseline="-25000" dirty="0"/>
-          </a:p>
-          <a:p>
-            <a:pPr lvl="1"/>
-            <a:r>
-              <a:rPr lang="en-US" dirty="0"/>
-              <a:t>Examples:</a:t>
-            </a:r>
-          </a:p>
-          <a:p>
-            <a:pPr lvl="2"/>
-            <a:r>
-              <a:rPr lang="en-US" dirty="0"/>
-              <a:t>Trying to predict median household income of an area.</a:t>
-            </a:r>
-          </a:p>
-          <a:p>
-            <a:pPr lvl="2"/>
-            <a:r>
-              <a:rPr lang="en-US" dirty="0"/>
-              <a:t>Trying to predict the value a stock will rise to.</a:t>
+              <a:t>n</a:t>
+            </a:r>
+            <a:r>
+              <a:rPr lang="en-US" dirty="0"/>
+              <a:t>*</a:t>
+            </a:r>
+            <a:r>
+              <a:rPr lang="en-US" dirty="0" err="1"/>
+              <a:t>f</a:t>
+            </a:r>
+            <a:r>
+              <a:rPr lang="en-US" baseline="-25000" dirty="0" err="1"/>
+              <a:t>n</a:t>
+            </a:r>
+            <a:r>
+              <a:rPr lang="en-US" dirty="0"/>
+              <a:t> + b</a:t>
+            </a:r>
+          </a:p>
+          <a:p>
+            <a:pPr lvl="3"/>
+            <a:r>
+              <a:rPr lang="en-US" dirty="0" err="1"/>
+              <a:t>Y</a:t>
+            </a:r>
+            <a:r>
+              <a:rPr lang="en-US" baseline="-25000" dirty="0" err="1"/>
+              <a:t>predict</a:t>
+            </a:r>
+            <a:r>
+              <a:rPr lang="en-US" dirty="0"/>
+              <a:t> = prediction value</a:t>
+            </a:r>
+          </a:p>
+          <a:p>
+            <a:pPr lvl="3"/>
+            <a:r>
+              <a:rPr lang="en-US" dirty="0"/>
+              <a:t>w = weights</a:t>
+            </a:r>
+          </a:p>
+          <a:p>
+            <a:pPr lvl="3"/>
+            <a:r>
+              <a:rPr lang="en-US" dirty="0"/>
+              <a:t>f = feature value</a:t>
+            </a:r>
+          </a:p>
+          <a:p>
+            <a:pPr lvl="3"/>
+            <a:r>
+              <a:rPr lang="en-US" dirty="0"/>
+              <a:t>b = intercept of linear line</a:t>
+            </a:r>
+          </a:p>
+          <a:p>
+            <a:pPr lvl="3"/>
+            <a:r>
+              <a:rPr lang="en-US" dirty="0"/>
+              <a:t>n = number of features</a:t>
             </a:r>
           </a:p>
           <a:p>
@@ -12425,7 +12417,7 @@
     </p:spTree>
     <p:extLst>
       <p:ext uri="{BB962C8B-B14F-4D97-AF65-F5344CB8AC3E}">
-        <p14:creationId xmlns:p14="http://schemas.microsoft.com/office/powerpoint/2010/main" val="3393903202"/>
+        <p14:creationId xmlns:p14="http://schemas.microsoft.com/office/powerpoint/2010/main" val="1469044682"/>
       </p:ext>
     </p:extLst>
   </p:cSld>
@@ -12510,34 +12502,60 @@
         </p:nvSpPr>
         <p:spPr/>
         <p:txBody>
-          <a:bodyPr/>
-          <a:lstStyle/>
-          <a:p>
-            <a:r>
-              <a:rPr lang="en-US" dirty="0"/>
-              <a:t>Linear Regression (Ordinary Least Squares)</a:t>
+          <a:bodyPr>
+            <a:normAutofit/>
+          </a:bodyPr>
+          <a:lstStyle/>
+          <a:p>
+            <a:r>
+              <a:rPr lang="en-US" dirty="0"/>
+              <a:t>Regressors</a:t>
             </a:r>
           </a:p>
           <a:p>
             <a:pPr lvl="1"/>
             <a:r>
               <a:rPr lang="en-US" dirty="0"/>
-              <a:t>Attempts to minimize the mean squared error between the prediction and the target values.</a:t>
-            </a:r>
+              <a:t>The models we train adjust the values of </a:t>
+            </a:r>
+            <a:r>
+              <a:rPr lang="en-US" dirty="0" err="1"/>
+              <a:t>w</a:t>
+            </a:r>
+            <a:r>
+              <a:rPr lang="en-US" baseline="-25000" dirty="0" err="1"/>
+              <a:t>x</a:t>
+            </a:r>
+            <a:r>
+              <a:rPr lang="en-US" dirty="0"/>
+              <a:t> and b.</a:t>
+            </a:r>
+            <a:endParaRPr lang="en-US" baseline="-25000" dirty="0"/>
           </a:p>
           <a:p>
             <a:pPr lvl="1"/>
             <a:r>
               <a:rPr lang="en-US" dirty="0"/>
-              <a:t>The error of this trainer is calculated by adding the squared differences between the predicted value with the actual target value.</a:t>
-            </a:r>
-          </a:p>
-          <a:p>
-            <a:pPr lvl="1"/>
-            <a:r>
-              <a:rPr lang="en-US" dirty="0"/>
-              <a:t>No regularization parameters to adjust the accuracy of this trainer</a:t>
-            </a:r>
+              <a:t>Examples:</a:t>
+            </a:r>
+          </a:p>
+          <a:p>
+            <a:pPr lvl="2"/>
+            <a:r>
+              <a:rPr lang="en-US" dirty="0"/>
+              <a:t>Trying to predict median household income of an area.</a:t>
+            </a:r>
+          </a:p>
+          <a:p>
+            <a:pPr lvl="2"/>
+            <a:r>
+              <a:rPr lang="en-US" dirty="0"/>
+              <a:t>Trying to predict the value a stock will rise to.</a:t>
+            </a:r>
+          </a:p>
+          <a:p>
+            <a:pPr lvl="2"/>
+            <a:endParaRPr lang="en-US" dirty="0"/>
           </a:p>
           <a:p>
             <a:endParaRPr lang="en-US" dirty="0"/>
@@ -12547,7 +12565,7 @@
     </p:spTree>
     <p:extLst>
       <p:ext uri="{BB962C8B-B14F-4D97-AF65-F5344CB8AC3E}">
-        <p14:creationId xmlns:p14="http://schemas.microsoft.com/office/powerpoint/2010/main" val="2836403428"/>
+        <p14:creationId xmlns:p14="http://schemas.microsoft.com/office/powerpoint/2010/main" val="3393903202"/>
       </p:ext>
     </p:extLst>
   </p:cSld>
@@ -12637,31 +12655,29 @@
           <a:p>
             <a:r>
               <a:rPr lang="en-US" dirty="0"/>
-              <a:t>In-Class Example – Linear Regression</a:t>
+              <a:t>Linear Regression (Ordinary Least Squares)</a:t>
             </a:r>
           </a:p>
           <a:p>
             <a:pPr lvl="1"/>
-            <a:endParaRPr lang="en-US" dirty="0"/>
-          </a:p>
-          <a:p>
-            <a:pPr lvl="2"/>
-            <a:endParaRPr lang="en-US" dirty="0"/>
-          </a:p>
-          <a:p>
-            <a:endParaRPr lang="en-US" dirty="0"/>
+            <a:r>
+              <a:rPr lang="en-US" dirty="0"/>
+              <a:t>Attempts to minimize the mean squared error between the prediction and the target values.</a:t>
+            </a:r>
           </a:p>
           <a:p>
             <a:pPr lvl="1"/>
-            <a:endParaRPr lang="en-US" dirty="0"/>
-          </a:p>
-          <a:p>
-            <a:pPr lvl="2"/>
-            <a:endParaRPr lang="en-US" dirty="0"/>
-          </a:p>
-          <a:p>
-            <a:pPr lvl="2"/>
-            <a:endParaRPr lang="en-US" dirty="0"/>
+            <a:r>
+              <a:rPr lang="en-US" dirty="0"/>
+              <a:t>The error of this trainer is calculated by adding the squared differences between the predicted value with the actual target value.</a:t>
+            </a:r>
+          </a:p>
+          <a:p>
+            <a:pPr lvl="1"/>
+            <a:r>
+              <a:rPr lang="en-US" dirty="0"/>
+              <a:t>No regularization parameters to adjust the accuracy of this trainer</a:t>
+            </a:r>
           </a:p>
           <a:p>
             <a:endParaRPr lang="en-US" dirty="0"/>
@@ -12671,7 +12687,7 @@
     </p:spTree>
     <p:extLst>
       <p:ext uri="{BB962C8B-B14F-4D97-AF65-F5344CB8AC3E}">
-        <p14:creationId xmlns:p14="http://schemas.microsoft.com/office/powerpoint/2010/main" val="3636144303"/>
+        <p14:creationId xmlns:p14="http://schemas.microsoft.com/office/powerpoint/2010/main" val="2836403428"/>
       </p:ext>
     </p:extLst>
   </p:cSld>
@@ -12756,22 +12772,32 @@
         </p:nvSpPr>
         <p:spPr/>
         <p:txBody>
-          <a:bodyPr>
-            <a:normAutofit/>
-          </a:bodyPr>
-          <a:lstStyle/>
-          <a:p>
-            <a:r>
-              <a:rPr lang="en-US" dirty="0"/>
-              <a:t>Ridge Regression</a:t>
+          <a:bodyPr/>
+          <a:lstStyle/>
+          <a:p>
+            <a:r>
+              <a:rPr lang="en-US" dirty="0"/>
+              <a:t>In-Class Example – Linear Regression</a:t>
             </a:r>
           </a:p>
           <a:p>
             <a:pPr lvl="1"/>
-            <a:r>
-              <a:rPr lang="en-US" dirty="0"/>
-              <a:t>Uses OLS to fit the data, with the additional constraint of attempting to minimize the magnitude of the weight coefficients for each feature without eliminating the feature.</a:t>
-            </a:r>
+            <a:endParaRPr lang="en-US" dirty="0"/>
+          </a:p>
+          <a:p>
+            <a:pPr lvl="2"/>
+            <a:endParaRPr lang="en-US" dirty="0"/>
+          </a:p>
+          <a:p>
+            <a:endParaRPr lang="en-US" dirty="0"/>
+          </a:p>
+          <a:p>
+            <a:pPr lvl="1"/>
+            <a:endParaRPr lang="en-US" dirty="0"/>
+          </a:p>
+          <a:p>
+            <a:pPr lvl="2"/>
+            <a:endParaRPr lang="en-US" dirty="0"/>
           </a:p>
           <a:p>
             <a:pPr lvl="2"/>
@@ -12785,7 +12811,7 @@
     </p:spTree>
     <p:extLst>
       <p:ext uri="{BB962C8B-B14F-4D97-AF65-F5344CB8AC3E}">
-        <p14:creationId xmlns:p14="http://schemas.microsoft.com/office/powerpoint/2010/main" val="474133971"/>
+        <p14:creationId xmlns:p14="http://schemas.microsoft.com/office/powerpoint/2010/main" val="3636144303"/>
       </p:ext>
     </p:extLst>
   </p:cSld>
@@ -12884,21 +12910,7 @@
             <a:pPr lvl="1"/>
             <a:r>
               <a:rPr lang="en-US" dirty="0"/>
-              <a:t>Each weight should be as close to zero as possible.</a:t>
-            </a:r>
-          </a:p>
-          <a:p>
-            <a:pPr lvl="1"/>
-            <a:r>
-              <a:rPr lang="en-US" dirty="0"/>
-              <a:t>Each feature will have as little affect on the prediction as possible.</a:t>
-            </a:r>
-          </a:p>
-          <a:p>
-            <a:pPr lvl="1"/>
-            <a:r>
-              <a:rPr lang="en-US" dirty="0"/>
-              <a:t>Note that the feature weights will not be exactly zero using this trainer, so each feature still affects the prediction.</a:t>
+              <a:t>Uses OLS to fit the data, with the additional constraint of attempting to minimize the magnitude of the weight coefficients for each feature without eliminating the feature.</a:t>
             </a:r>
           </a:p>
           <a:p>
@@ -12913,7 +12925,7 @@
     </p:spTree>
     <p:extLst>
       <p:ext uri="{BB962C8B-B14F-4D97-AF65-F5344CB8AC3E}">
-        <p14:creationId xmlns:p14="http://schemas.microsoft.com/office/powerpoint/2010/main" val="3620252848"/>
+        <p14:creationId xmlns:p14="http://schemas.microsoft.com/office/powerpoint/2010/main" val="474133971"/>
       </p:ext>
     </p:extLst>
   </p:cSld>
@@ -12998,7 +13010,9 @@
         </p:nvSpPr>
         <p:spPr/>
         <p:txBody>
-          <a:bodyPr/>
+          <a:bodyPr>
+            <a:normAutofit/>
+          </a:bodyPr>
           <a:lstStyle/>
           <a:p>
             <a:r>
@@ -13010,28 +13024,21 @@
             <a:pPr lvl="1"/>
             <a:r>
               <a:rPr lang="en-US" dirty="0"/>
-              <a:t>Attempting to minimize the weight magnitudes is a form of regularization.</a:t>
-            </a:r>
-          </a:p>
-          <a:p>
-            <a:pPr lvl="2"/>
-            <a:r>
-              <a:rPr lang="en-US" dirty="0"/>
-              <a:t>Regularization is used to attempt to prevent overfitting.</a:t>
+              <a:t>Each weight should be as close to zero as possible.</a:t>
             </a:r>
           </a:p>
           <a:p>
             <a:pPr lvl="1"/>
             <a:r>
               <a:rPr lang="en-US" dirty="0"/>
-              <a:t>This trainer uses L2 regularization</a:t>
-            </a:r>
-          </a:p>
-          <a:p>
-            <a:pPr lvl="2"/>
-            <a:r>
-              <a:rPr lang="en-US" dirty="0"/>
-              <a:t>The sum of the square of the weight coefficient for each feature is used as a penalty term in determining model accuracy.</a:t>
+              <a:t>Each feature will have as little affect on the prediction as possible.</a:t>
+            </a:r>
+          </a:p>
+          <a:p>
+            <a:pPr lvl="1"/>
+            <a:r>
+              <a:rPr lang="en-US" dirty="0"/>
+              <a:t>Note that the feature weights will not be exactly zero using this trainer, so each feature still affects the prediction.</a:t>
             </a:r>
           </a:p>
           <a:p>
@@ -13046,7 +13053,7 @@
     </p:spTree>
     <p:extLst>
       <p:ext uri="{BB962C8B-B14F-4D97-AF65-F5344CB8AC3E}">
-        <p14:creationId xmlns:p14="http://schemas.microsoft.com/office/powerpoint/2010/main" val="1031170893"/>
+        <p14:creationId xmlns:p14="http://schemas.microsoft.com/office/powerpoint/2010/main" val="3620252848"/>
       </p:ext>
     </p:extLst>
   </p:cSld>
@@ -13143,40 +13150,29 @@
             <a:pPr lvl="1"/>
             <a:r>
               <a:rPr lang="en-US" dirty="0"/>
-              <a:t>For this Scikit-Learn trainer, the alpha term is used for regularization.</a:t>
+              <a:t>Attempting to minimize the weight magnitudes is a form of regularization.</a:t>
+            </a:r>
+          </a:p>
+          <a:p>
+            <a:pPr lvl="2"/>
+            <a:r>
+              <a:rPr lang="en-US" dirty="0"/>
+              <a:t>Regularization is used to attempt to prevent overfitting.</a:t>
             </a:r>
           </a:p>
           <a:p>
             <a:pPr lvl="1"/>
             <a:r>
               <a:rPr lang="en-US" dirty="0"/>
-              <a:t>Increasing alpha moves each feature’s weight more towards zero.</a:t>
+              <a:t>This trainer uses L2 regularization</a:t>
             </a:r>
           </a:p>
           <a:p>
             <a:pPr lvl="2"/>
             <a:r>
               <a:rPr lang="en-US" dirty="0"/>
-              <a:t>This may help make the model more generalized, which will help overfitting.</a:t>
-            </a:r>
-          </a:p>
-          <a:p>
-            <a:pPr lvl="2"/>
-            <a:r>
-              <a:rPr lang="en-US" dirty="0"/>
-              <a:t>This will decrease training set performance.</a:t>
-            </a:r>
-          </a:p>
-          <a:p>
-            <a:endParaRPr lang="en-US" dirty="0"/>
-          </a:p>
-          <a:p>
-            <a:pPr lvl="1"/>
-            <a:endParaRPr lang="en-US" dirty="0"/>
-          </a:p>
-          <a:p>
-            <a:pPr lvl="2"/>
-            <a:endParaRPr lang="en-US" dirty="0"/>
+              <a:t>The sum of the square of the weight coefficient for each feature is used as a penalty term in determining model accuracy.</a:t>
+            </a:r>
           </a:p>
           <a:p>
             <a:pPr lvl="2"/>
@@ -13190,7 +13186,7 @@
     </p:spTree>
     <p:extLst>
       <p:ext uri="{BB962C8B-B14F-4D97-AF65-F5344CB8AC3E}">
-        <p14:creationId xmlns:p14="http://schemas.microsoft.com/office/powerpoint/2010/main" val="4041600192"/>
+        <p14:creationId xmlns:p14="http://schemas.microsoft.com/office/powerpoint/2010/main" val="1031170893"/>
       </p:ext>
     </p:extLst>
   </p:cSld>
@@ -13287,19 +13283,29 @@
             <a:pPr lvl="1"/>
             <a:r>
               <a:rPr lang="en-US" dirty="0"/>
-              <a:t>Increasing alpha more and more will not necessarily make the model more predictive.</a:t>
+              <a:t>For this Scikit-Learn trainer, the alpha term is used for regularization.</a:t>
             </a:r>
           </a:p>
           <a:p>
             <a:pPr lvl="1"/>
             <a:r>
               <a:rPr lang="en-US" dirty="0"/>
-              <a:t>Alpha will need tuned for an optimal model.</a:t>
+              <a:t>Increasing alpha moves each feature’s weight more towards zero.</a:t>
             </a:r>
           </a:p>
           <a:p>
             <a:pPr lvl="2"/>
-            <a:endParaRPr lang="en-US" dirty="0"/>
+            <a:r>
+              <a:rPr lang="en-US" dirty="0"/>
+              <a:t>This may help make the model more generalized, which will help overfitting.</a:t>
+            </a:r>
+          </a:p>
+          <a:p>
+            <a:pPr lvl="2"/>
+            <a:r>
+              <a:rPr lang="en-US" dirty="0"/>
+              <a:t>This will decrease training set performance.</a:t>
+            </a:r>
           </a:p>
           <a:p>
             <a:endParaRPr lang="en-US" dirty="0"/>
@@ -13324,7 +13330,7 @@
     </p:spTree>
     <p:extLst>
       <p:ext uri="{BB962C8B-B14F-4D97-AF65-F5344CB8AC3E}">
-        <p14:creationId xmlns:p14="http://schemas.microsoft.com/office/powerpoint/2010/main" val="52183678"/>
+        <p14:creationId xmlns:p14="http://schemas.microsoft.com/office/powerpoint/2010/main" val="4041600192"/>
       </p:ext>
     </p:extLst>
   </p:cSld>
@@ -13414,12 +13420,22 @@
           <a:p>
             <a:r>
               <a:rPr lang="en-US" dirty="0"/>
-              <a:t>In-Class Example – Ridge Regression</a:t>
+              <a:t>Ridge Regression</a:t>
             </a:r>
           </a:p>
           <a:p>
             <a:pPr lvl="1"/>
-            <a:endParaRPr lang="en-US" dirty="0"/>
+            <a:r>
+              <a:rPr lang="en-US" dirty="0"/>
+              <a:t>Increasing alpha more and more will not necessarily make the model more predictive.</a:t>
+            </a:r>
+          </a:p>
+          <a:p>
+            <a:pPr lvl="1"/>
+            <a:r>
+              <a:rPr lang="en-US" dirty="0"/>
+              <a:t>Alpha will need tuned for an optimal model.</a:t>
+            </a:r>
           </a:p>
           <a:p>
             <a:pPr lvl="2"/>
@@ -13448,7 +13464,7 @@
     </p:spTree>
     <p:extLst>
       <p:ext uri="{BB962C8B-B14F-4D97-AF65-F5344CB8AC3E}">
-        <p14:creationId xmlns:p14="http://schemas.microsoft.com/office/powerpoint/2010/main" val="1030170644"/>
+        <p14:creationId xmlns:p14="http://schemas.microsoft.com/office/powerpoint/2010/main" val="52183678"/>
       </p:ext>
     </p:extLst>
   </p:cSld>
@@ -13538,15 +13554,12 @@
           <a:p>
             <a:r>
               <a:rPr lang="en-US" dirty="0"/>
-              <a:t>In-Class Exercise</a:t>
+              <a:t>In-Class Example – Ridge Regression</a:t>
             </a:r>
           </a:p>
           <a:p>
             <a:pPr lvl="1"/>
-            <a:r>
-              <a:rPr lang="en-US" dirty="0"/>
-              <a:t>Run the example with ridge regression, attempting to optimize the test prediction data set by adjusting alpha.</a:t>
-            </a:r>
+            <a:endParaRPr lang="en-US" dirty="0"/>
           </a:p>
           <a:p>
             <a:pPr lvl="2"/>
@@ -13575,7 +13588,7 @@
     </p:spTree>
     <p:extLst>
       <p:ext uri="{BB962C8B-B14F-4D97-AF65-F5344CB8AC3E}">
-        <p14:creationId xmlns:p14="http://schemas.microsoft.com/office/powerpoint/2010/main" val="2651109508"/>
+        <p14:creationId xmlns:p14="http://schemas.microsoft.com/office/powerpoint/2010/main" val="1030170644"/>
       </p:ext>
     </p:extLst>
   </p:cSld>
@@ -13801,39 +13814,29 @@
           <a:p>
             <a:r>
               <a:rPr lang="en-US" dirty="0"/>
-              <a:t>LASSO Regression</a:t>
+              <a:t>In-Class Exercise</a:t>
             </a:r>
           </a:p>
           <a:p>
             <a:pPr lvl="1"/>
             <a:r>
               <a:rPr lang="en-US" dirty="0"/>
-              <a:t>Similar to ridge regression, uses a modified OLS algorithm that attempts to make each weight close to zero.</a:t>
-            </a:r>
+              <a:t>Run the example with ridge regression, attempting to optimize the test prediction data set by adjusting alpha.</a:t>
+            </a:r>
+          </a:p>
+          <a:p>
+            <a:pPr lvl="2"/>
+            <a:endParaRPr lang="en-US" dirty="0"/>
+          </a:p>
+          <a:p>
+            <a:endParaRPr lang="en-US" dirty="0"/>
           </a:p>
           <a:p>
             <a:pPr lvl="1"/>
-            <a:r>
-              <a:rPr lang="en-US" dirty="0"/>
-              <a:t>In this trainer, a weight value can be zero, so that a feature will not affect the prediction.</a:t>
-            </a:r>
-          </a:p>
-          <a:p>
-            <a:pPr lvl="1"/>
-            <a:r>
-              <a:rPr lang="en-US" dirty="0"/>
-              <a:t>This trainer uses L1 regularization.</a:t>
-            </a:r>
+            <a:endParaRPr lang="en-US" dirty="0"/>
           </a:p>
           <a:p>
             <a:pPr lvl="2"/>
-            <a:r>
-              <a:rPr lang="en-US" dirty="0"/>
-              <a:t>The sum of the weight coefficient for each feature is used as a penalty term in determining model accuracy.</a:t>
-            </a:r>
-          </a:p>
-          <a:p>
-            <a:pPr lvl="1"/>
             <a:endParaRPr lang="en-US" dirty="0"/>
           </a:p>
           <a:p>
@@ -13848,7 +13851,7 @@
     </p:spTree>
     <p:extLst>
       <p:ext uri="{BB962C8B-B14F-4D97-AF65-F5344CB8AC3E}">
-        <p14:creationId xmlns:p14="http://schemas.microsoft.com/office/powerpoint/2010/main" val="2833183138"/>
+        <p14:creationId xmlns:p14="http://schemas.microsoft.com/office/powerpoint/2010/main" val="2651109508"/>
       </p:ext>
     </p:extLst>
   </p:cSld>
@@ -13945,7 +13948,28 @@
             <a:pPr lvl="1"/>
             <a:r>
               <a:rPr lang="en-US" dirty="0"/>
-              <a:t>For this Scikit-Learn trainer, the alpha term is also used for regularization.</a:t>
+              <a:t>Similar to ridge regression, uses a modified OLS algorithm that attempts to make each weight close to zero.</a:t>
+            </a:r>
+          </a:p>
+          <a:p>
+            <a:pPr lvl="1"/>
+            <a:r>
+              <a:rPr lang="en-US" dirty="0"/>
+              <a:t>In this trainer, a weight value can be zero, so that a feature will not affect the prediction.</a:t>
+            </a:r>
+          </a:p>
+          <a:p>
+            <a:pPr lvl="1"/>
+            <a:r>
+              <a:rPr lang="en-US" dirty="0"/>
+              <a:t>This trainer uses L1 regularization.</a:t>
+            </a:r>
+          </a:p>
+          <a:p>
+            <a:pPr lvl="2"/>
+            <a:r>
+              <a:rPr lang="en-US" dirty="0"/>
+              <a:t>The sum of the weight coefficient for each feature is used as a penalty term in determining model accuracy.</a:t>
             </a:r>
           </a:p>
           <a:p>
@@ -13964,7 +13988,7 @@
     </p:spTree>
     <p:extLst>
       <p:ext uri="{BB962C8B-B14F-4D97-AF65-F5344CB8AC3E}">
-        <p14:creationId xmlns:p14="http://schemas.microsoft.com/office/powerpoint/2010/main" val="2503353380"/>
+        <p14:creationId xmlns:p14="http://schemas.microsoft.com/office/powerpoint/2010/main" val="2833183138"/>
       </p:ext>
     </p:extLst>
   </p:cSld>
@@ -14054,26 +14078,18 @@
           <a:p>
             <a:r>
               <a:rPr lang="en-US" dirty="0"/>
-              <a:t>In-Class Example – LASSO Regression</a:t>
+              <a:t>LASSO Regression</a:t>
             </a:r>
           </a:p>
           <a:p>
             <a:pPr lvl="1"/>
-            <a:endParaRPr lang="en-US" dirty="0"/>
-          </a:p>
-          <a:p>
-            <a:pPr lvl="2"/>
-            <a:endParaRPr lang="en-US" dirty="0"/>
-          </a:p>
-          <a:p>
-            <a:endParaRPr lang="en-US" dirty="0"/>
+            <a:r>
+              <a:rPr lang="en-US" dirty="0"/>
+              <a:t>For this Scikit-Learn trainer, the alpha term is also used for regularization.</a:t>
+            </a:r>
           </a:p>
           <a:p>
             <a:pPr lvl="1"/>
-            <a:endParaRPr lang="en-US" dirty="0"/>
-          </a:p>
-          <a:p>
-            <a:pPr lvl="2"/>
             <a:endParaRPr lang="en-US" dirty="0"/>
           </a:p>
           <a:p>
@@ -14088,7 +14104,7 @@
     </p:spTree>
     <p:extLst>
       <p:ext uri="{BB962C8B-B14F-4D97-AF65-F5344CB8AC3E}">
-        <p14:creationId xmlns:p14="http://schemas.microsoft.com/office/powerpoint/2010/main" val="1318670462"/>
+        <p14:creationId xmlns:p14="http://schemas.microsoft.com/office/powerpoint/2010/main" val="2503353380"/>
       </p:ext>
     </p:extLst>
   </p:cSld>
@@ -14178,30 +14194,12 @@
           <a:p>
             <a:r>
               <a:rPr lang="en-US" dirty="0"/>
-              <a:t>In-Class Exercise</a:t>
+              <a:t>In-Class Example – LASSO Regression</a:t>
             </a:r>
           </a:p>
           <a:p>
             <a:pPr lvl="1"/>
-            <a:r>
-              <a:rPr lang="en-US" dirty="0"/>
-              <a:t>Generate models for the </a:t>
-            </a:r>
-            <a:r>
-              <a:rPr lang="en-US" dirty="0" err="1"/>
-              <a:t>boston</a:t>
-            </a:r>
-            <a:r>
-              <a:rPr lang="en-US" dirty="0"/>
-              <a:t> housing data using linear, ridge, and LASSO regressors.  For models that use regularization, attempt to optimize the predictions (can use previous example code).</a:t>
-            </a:r>
-          </a:p>
-          <a:p>
-            <a:pPr lvl="1"/>
-            <a:r>
-              <a:rPr lang="en-US" dirty="0"/>
-              <a:t>Which model is the most accurate with respect to test data predictions?  Are there benefits to the models that are less accurate?</a:t>
-            </a:r>
+            <a:endParaRPr lang="en-US" dirty="0"/>
           </a:p>
           <a:p>
             <a:pPr lvl="2"/>
@@ -14230,7 +14228,7 @@
     </p:spTree>
     <p:extLst>
       <p:ext uri="{BB962C8B-B14F-4D97-AF65-F5344CB8AC3E}">
-        <p14:creationId xmlns:p14="http://schemas.microsoft.com/office/powerpoint/2010/main" val="2777821716"/>
+        <p14:creationId xmlns:p14="http://schemas.microsoft.com/office/powerpoint/2010/main" val="1318670462"/>
       </p:ext>
     </p:extLst>
   </p:cSld>
@@ -14320,8 +14318,45 @@
           <a:p>
             <a:r>
               <a:rPr lang="en-US" dirty="0"/>
-              <a:t>Decision Tree</a:t>
-            </a:r>
+              <a:t>In-Class Exercise</a:t>
+            </a:r>
+          </a:p>
+          <a:p>
+            <a:pPr lvl="1"/>
+            <a:r>
+              <a:rPr lang="en-US" dirty="0"/>
+              <a:t>Generate models for the </a:t>
+            </a:r>
+            <a:r>
+              <a:rPr lang="en-US" dirty="0" err="1"/>
+              <a:t>boston</a:t>
+            </a:r>
+            <a:r>
+              <a:rPr lang="en-US" dirty="0"/>
+              <a:t> housing data using linear, ridge, and LASSO regressors.  For models that use regularization, attempt to optimize the predictions (can use previous example code).</a:t>
+            </a:r>
+          </a:p>
+          <a:p>
+            <a:pPr lvl="1"/>
+            <a:r>
+              <a:rPr lang="en-US" dirty="0"/>
+              <a:t>Which model is the most accurate with respect to test data predictions?  Are there benefits to the models that are less accurate?</a:t>
+            </a:r>
+          </a:p>
+          <a:p>
+            <a:pPr lvl="2"/>
+            <a:endParaRPr lang="en-US" dirty="0"/>
+          </a:p>
+          <a:p>
+            <a:endParaRPr lang="en-US" dirty="0"/>
+          </a:p>
+          <a:p>
+            <a:pPr lvl="1"/>
+            <a:endParaRPr lang="en-US" dirty="0"/>
+          </a:p>
+          <a:p>
+            <a:pPr lvl="2"/>
+            <a:endParaRPr lang="en-US" dirty="0"/>
           </a:p>
           <a:p>
             <a:pPr lvl="2"/>
@@ -14335,7 +14370,7 @@
     </p:spTree>
     <p:extLst>
       <p:ext uri="{BB962C8B-B14F-4D97-AF65-F5344CB8AC3E}">
-        <p14:creationId xmlns:p14="http://schemas.microsoft.com/office/powerpoint/2010/main" val="1924952010"/>
+        <p14:creationId xmlns:p14="http://schemas.microsoft.com/office/powerpoint/2010/main" val="2777821716"/>
       </p:ext>
     </p:extLst>
   </p:cSld>
@@ -14425,7 +14460,7 @@
           <a:p>
             <a:r>
               <a:rPr lang="en-US" dirty="0"/>
-              <a:t>Forest</a:t>
+              <a:t>Decision Tree</a:t>
             </a:r>
           </a:p>
           <a:p>
@@ -14440,7 +14475,7 @@
     </p:spTree>
     <p:extLst>
       <p:ext uri="{BB962C8B-B14F-4D97-AF65-F5344CB8AC3E}">
-        <p14:creationId xmlns:p14="http://schemas.microsoft.com/office/powerpoint/2010/main" val="358457677"/>
+        <p14:creationId xmlns:p14="http://schemas.microsoft.com/office/powerpoint/2010/main" val="1924952010"/>
       </p:ext>
     </p:extLst>
   </p:cSld>
@@ -14530,7 +14565,7 @@
           <a:p>
             <a:r>
               <a:rPr lang="en-US" dirty="0"/>
-              <a:t>Gradient-Boosted Forest</a:t>
+              <a:t>Forest</a:t>
             </a:r>
           </a:p>
           <a:p>
@@ -14545,7 +14580,7 @@
     </p:spTree>
     <p:extLst>
       <p:ext uri="{BB962C8B-B14F-4D97-AF65-F5344CB8AC3E}">
-        <p14:creationId xmlns:p14="http://schemas.microsoft.com/office/powerpoint/2010/main" val="1436682753"/>
+        <p14:creationId xmlns:p14="http://schemas.microsoft.com/office/powerpoint/2010/main" val="358457677"/>
       </p:ext>
     </p:extLst>
   </p:cSld>
@@ -14613,7 +14648,7 @@
           <a:p>
             <a:r>
               <a:rPr lang="en-US" dirty="0"/>
-              <a:t>Evaluating Accuracy</a:t>
+              <a:t>Linear Models - Regressors</a:t>
             </a:r>
           </a:p>
         </p:txBody>
@@ -14635,32 +14670,8 @@
           <a:p>
             <a:r>
               <a:rPr lang="en-US" dirty="0"/>
-              <a:t>Overview</a:t>
-            </a:r>
-          </a:p>
-          <a:p>
-            <a:pPr lvl="1"/>
-            <a:r>
-              <a:rPr lang="en-US" dirty="0"/>
-              <a:t>&lt;model&gt;.score(</a:t>
-            </a:r>
-            <a:r>
-              <a:rPr lang="en-US" dirty="0" err="1"/>
-              <a:t>test_data</a:t>
-            </a:r>
-            <a:r>
-              <a:rPr lang="en-US" dirty="0"/>
-              <a:t>, </a:t>
-            </a:r>
-            <a:r>
-              <a:rPr lang="en-US" dirty="0" err="1"/>
-              <a:t>test_labels</a:t>
-            </a:r>
-            <a:r>
-              <a:rPr lang="en-US"/>
-              <a:t>)</a:t>
-            </a:r>
-            <a:endParaRPr lang="en-US" dirty="0"/>
+              <a:t>Gradient-Boosted Forest</a:t>
+            </a:r>
           </a:p>
           <a:p>
             <a:pPr lvl="2"/>
@@ -14674,7 +14685,7 @@
     </p:spTree>
     <p:extLst>
       <p:ext uri="{BB962C8B-B14F-4D97-AF65-F5344CB8AC3E}">
-        <p14:creationId xmlns:p14="http://schemas.microsoft.com/office/powerpoint/2010/main" val="4053921630"/>
+        <p14:creationId xmlns:p14="http://schemas.microsoft.com/office/powerpoint/2010/main" val="1436682753"/>
       </p:ext>
     </p:extLst>
   </p:cSld>
@@ -14741,70 +14752,55 @@
           <a:lstStyle/>
           <a:p>
             <a:r>
+              <a:rPr lang="en-US" dirty="0"/>
+              <a:t>Evaluating Accuracy</a:t>
+            </a:r>
+          </a:p>
+        </p:txBody>
+      </p:sp>
+      <p:sp>
+        <p:nvSpPr>
+          <p:cNvPr id="3" name="Content Placeholder 2"/>
+          <p:cNvSpPr>
+            <a:spLocks noGrp="1"/>
+          </p:cNvSpPr>
+          <p:nvPr>
+            <p:ph idx="1"/>
+          </p:nvPr>
+        </p:nvSpPr>
+        <p:spPr/>
+        <p:txBody>
+          <a:bodyPr/>
+          <a:lstStyle/>
+          <a:p>
+            <a:r>
+              <a:rPr lang="en-US" dirty="0"/>
+              <a:t>Overview</a:t>
+            </a:r>
+          </a:p>
+          <a:p>
+            <a:pPr lvl="1"/>
+            <a:r>
+              <a:rPr lang="en-US" dirty="0"/>
+              <a:t>&lt;model&gt;.score(</a:t>
+            </a:r>
+            <a:r>
               <a:rPr lang="en-US" dirty="0" err="1"/>
-              <a:t>Scikit</a:t>
-            </a:r>
-            <a:r>
-              <a:rPr lang="en-US" dirty="0"/>
-              <a:t>-Learn Machine Learning</a:t>
-            </a:r>
-          </a:p>
-        </p:txBody>
-      </p:sp>
-      <p:sp>
-        <p:nvSpPr>
-          <p:cNvPr id="3" name="Content Placeholder 2"/>
-          <p:cNvSpPr>
-            <a:spLocks noGrp="1"/>
-          </p:cNvSpPr>
-          <p:nvPr>
-            <p:ph idx="1"/>
-          </p:nvPr>
-        </p:nvSpPr>
-        <p:spPr/>
-        <p:txBody>
-          <a:bodyPr/>
-          <a:lstStyle/>
-          <a:p>
-            <a:r>
-              <a:rPr lang="en-US" dirty="0"/>
-              <a:t>Overview</a:t>
-            </a:r>
-          </a:p>
-          <a:p>
-            <a:pPr lvl="1"/>
-            <a:r>
-              <a:rPr lang="en-US" dirty="0"/>
-              <a:t>Definition</a:t>
-            </a:r>
-          </a:p>
-          <a:p>
-            <a:pPr lvl="1"/>
-            <a:r>
-              <a:rPr lang="en-US" dirty="0"/>
-              <a:t>General Types</a:t>
-            </a:r>
-          </a:p>
-          <a:p>
-            <a:pPr lvl="1"/>
-            <a:r>
-              <a:rPr lang="en-US" dirty="0"/>
-              <a:t>Basic Linear Models</a:t>
-            </a:r>
-          </a:p>
-          <a:p>
-            <a:pPr lvl="1"/>
-            <a:r>
-              <a:rPr lang="en-US" dirty="0"/>
-              <a:t>Algorithm Types</a:t>
-            </a:r>
-          </a:p>
-          <a:p>
-            <a:pPr lvl="1"/>
-            <a:r>
-              <a:rPr lang="en-US" dirty="0"/>
-              <a:t>Tuning</a:t>
-            </a:r>
+              <a:t>test_data</a:t>
+            </a:r>
+            <a:r>
+              <a:rPr lang="en-US" dirty="0"/>
+              <a:t>, </a:t>
+            </a:r>
+            <a:r>
+              <a:rPr lang="en-US" dirty="0" err="1"/>
+              <a:t>test_labels</a:t>
+            </a:r>
+            <a:r>
+              <a:rPr lang="en-US"/>
+              <a:t>)</a:t>
+            </a:r>
+            <a:endParaRPr lang="en-US" dirty="0"/>
           </a:p>
           <a:p>
             <a:pPr lvl="2"/>
@@ -14818,7 +14814,7 @@
     </p:spTree>
     <p:extLst>
       <p:ext uri="{BB962C8B-B14F-4D97-AF65-F5344CB8AC3E}">
-        <p14:creationId xmlns:p14="http://schemas.microsoft.com/office/powerpoint/2010/main" val="754999196"/>
+        <p14:creationId xmlns:p14="http://schemas.microsoft.com/office/powerpoint/2010/main" val="4053921630"/>
       </p:ext>
     </p:extLst>
   </p:cSld>
@@ -14885,42 +14881,69 @@
           <a:lstStyle/>
           <a:p>
             <a:r>
+              <a:rPr lang="en-US" dirty="0" err="1"/>
+              <a:t>Scikit</a:t>
+            </a:r>
+            <a:r>
+              <a:rPr lang="en-US" dirty="0"/>
+              <a:t>-Learn Machine Learning</a:t>
+            </a:r>
+          </a:p>
+        </p:txBody>
+      </p:sp>
+      <p:sp>
+        <p:nvSpPr>
+          <p:cNvPr id="3" name="Content Placeholder 2"/>
+          <p:cNvSpPr>
+            <a:spLocks noGrp="1"/>
+          </p:cNvSpPr>
+          <p:nvPr>
+            <p:ph idx="1"/>
+          </p:nvPr>
+        </p:nvSpPr>
+        <p:spPr/>
+        <p:txBody>
+          <a:bodyPr/>
+          <a:lstStyle/>
+          <a:p>
+            <a:r>
+              <a:rPr lang="en-US" dirty="0"/>
+              <a:t>Overview</a:t>
+            </a:r>
+          </a:p>
+          <a:p>
+            <a:pPr lvl="1"/>
+            <a:r>
+              <a:rPr lang="en-US" dirty="0"/>
+              <a:t>Definition</a:t>
+            </a:r>
+          </a:p>
+          <a:p>
+            <a:pPr lvl="1"/>
+            <a:r>
+              <a:rPr lang="en-US" dirty="0"/>
+              <a:t>General Types</a:t>
+            </a:r>
+          </a:p>
+          <a:p>
+            <a:pPr lvl="1"/>
+            <a:r>
+              <a:rPr lang="en-US" dirty="0"/>
+              <a:t>Basic Linear Models</a:t>
+            </a:r>
+          </a:p>
+          <a:p>
+            <a:pPr lvl="1"/>
+            <a:r>
+              <a:rPr lang="en-US" dirty="0"/>
+              <a:t>Algorithm Types</a:t>
+            </a:r>
+          </a:p>
+          <a:p>
+            <a:pPr lvl="1"/>
+            <a:r>
               <a:rPr lang="en-US" dirty="0"/>
               <a:t>Tuning</a:t>
-            </a:r>
-          </a:p>
-        </p:txBody>
-      </p:sp>
-      <p:sp>
-        <p:nvSpPr>
-          <p:cNvPr id="3" name="Content Placeholder 2"/>
-          <p:cNvSpPr>
-            <a:spLocks noGrp="1"/>
-          </p:cNvSpPr>
-          <p:nvPr>
-            <p:ph idx="1"/>
-          </p:nvPr>
-        </p:nvSpPr>
-        <p:spPr/>
-        <p:txBody>
-          <a:bodyPr/>
-          <a:lstStyle/>
-          <a:p>
-            <a:r>
-              <a:rPr lang="en-US" dirty="0"/>
-              <a:t>Determining what features matter</a:t>
-            </a:r>
-          </a:p>
-          <a:p>
-            <a:r>
-              <a:rPr lang="en-US" dirty="0"/>
-              <a:t>If both prediction test scores and training scores are low, then the model is suffering from underfitting.</a:t>
-            </a:r>
-          </a:p>
-          <a:p>
-            <a:r>
-              <a:rPr lang="en-US" dirty="0"/>
-              <a:t>If the model has extremely high training scores, but not nearly as high prediction test scores, the model is suffering from overfitting.</a:t>
             </a:r>
           </a:p>
           <a:p>
@@ -14935,7 +14958,7 @@
     </p:spTree>
     <p:extLst>
       <p:ext uri="{BB962C8B-B14F-4D97-AF65-F5344CB8AC3E}">
-        <p14:creationId xmlns:p14="http://schemas.microsoft.com/office/powerpoint/2010/main" val="3393037686"/>
+        <p14:creationId xmlns:p14="http://schemas.microsoft.com/office/powerpoint/2010/main" val="754999196"/>
       </p:ext>
     </p:extLst>
   </p:cSld>
@@ -15161,28 +15184,19 @@
           <a:p>
             <a:r>
               <a:rPr lang="en-US" dirty="0"/>
-              <a:t>Parameters to Play with</a:t>
-            </a:r>
-          </a:p>
-          <a:p>
-            <a:pPr lvl="1"/>
-            <a:r>
-              <a:rPr lang="en-US" dirty="0"/>
-              <a:t>K-Nearest Neighbors</a:t>
-            </a:r>
-          </a:p>
-          <a:p>
-            <a:pPr lvl="2"/>
-            <a:r>
-              <a:rPr lang="en-US" dirty="0"/>
-              <a:t>Number of neighbors to test point</a:t>
-            </a:r>
-          </a:p>
-          <a:p>
-            <a:pPr lvl="2"/>
-            <a:r>
-              <a:rPr lang="en-US" dirty="0"/>
-              <a:t>Algorithm to evaluate distance test point is from data points</a:t>
+              <a:t>Determining what features matter</a:t>
+            </a:r>
+          </a:p>
+          <a:p>
+            <a:r>
+              <a:rPr lang="en-US" dirty="0"/>
+              <a:t>If both prediction test scores and training scores are low, then the model is suffering from underfitting.</a:t>
+            </a:r>
+          </a:p>
+          <a:p>
+            <a:r>
+              <a:rPr lang="en-US" dirty="0"/>
+              <a:t>If the model has extremely high training scores, but not nearly as high prediction test scores, the model is suffering from overfitting.</a:t>
             </a:r>
           </a:p>
           <a:p>
@@ -15197,7 +15211,7 @@
     </p:spTree>
     <p:extLst>
       <p:ext uri="{BB962C8B-B14F-4D97-AF65-F5344CB8AC3E}">
-        <p14:creationId xmlns:p14="http://schemas.microsoft.com/office/powerpoint/2010/main" val="274238177"/>
+        <p14:creationId xmlns:p14="http://schemas.microsoft.com/office/powerpoint/2010/main" val="3393037686"/>
       </p:ext>
     </p:extLst>
   </p:cSld>
@@ -15287,7 +15301,28 @@
           <a:p>
             <a:r>
               <a:rPr lang="en-US" dirty="0"/>
-              <a:t>Grid Search</a:t>
+              <a:t>Parameters to Play with</a:t>
+            </a:r>
+          </a:p>
+          <a:p>
+            <a:pPr lvl="1"/>
+            <a:r>
+              <a:rPr lang="en-US" dirty="0"/>
+              <a:t>K-Nearest Neighbors</a:t>
+            </a:r>
+          </a:p>
+          <a:p>
+            <a:pPr lvl="2"/>
+            <a:r>
+              <a:rPr lang="en-US" dirty="0"/>
+              <a:t>Number of neighbors to test point</a:t>
+            </a:r>
+          </a:p>
+          <a:p>
+            <a:pPr lvl="2"/>
+            <a:r>
+              <a:rPr lang="en-US" dirty="0"/>
+              <a:t>Algorithm to evaluate distance test point is from data points</a:t>
             </a:r>
           </a:p>
           <a:p>
@@ -15302,7 +15337,7 @@
     </p:spTree>
     <p:extLst>
       <p:ext uri="{BB962C8B-B14F-4D97-AF65-F5344CB8AC3E}">
-        <p14:creationId xmlns:p14="http://schemas.microsoft.com/office/powerpoint/2010/main" val="2622179278"/>
+        <p14:creationId xmlns:p14="http://schemas.microsoft.com/office/powerpoint/2010/main" val="274238177"/>
       </p:ext>
     </p:extLst>
   </p:cSld>
@@ -15369,6 +15404,111 @@
           <a:lstStyle/>
           <a:p>
             <a:r>
+              <a:rPr lang="en-US" dirty="0"/>
+              <a:t>Tuning</a:t>
+            </a:r>
+          </a:p>
+        </p:txBody>
+      </p:sp>
+      <p:sp>
+        <p:nvSpPr>
+          <p:cNvPr id="3" name="Content Placeholder 2"/>
+          <p:cNvSpPr>
+            <a:spLocks noGrp="1"/>
+          </p:cNvSpPr>
+          <p:nvPr>
+            <p:ph idx="1"/>
+          </p:nvPr>
+        </p:nvSpPr>
+        <p:spPr/>
+        <p:txBody>
+          <a:bodyPr/>
+          <a:lstStyle/>
+          <a:p>
+            <a:r>
+              <a:rPr lang="en-US" dirty="0"/>
+              <a:t>Grid Search</a:t>
+            </a:r>
+          </a:p>
+          <a:p>
+            <a:pPr lvl="2"/>
+            <a:endParaRPr lang="en-US" dirty="0"/>
+          </a:p>
+          <a:p>
+            <a:endParaRPr lang="en-US" dirty="0"/>
+          </a:p>
+        </p:txBody>
+      </p:sp>
+    </p:spTree>
+    <p:extLst>
+      <p:ext uri="{BB962C8B-B14F-4D97-AF65-F5344CB8AC3E}">
+        <p14:creationId xmlns:p14="http://schemas.microsoft.com/office/powerpoint/2010/main" val="2622179278"/>
+      </p:ext>
+    </p:extLst>
+  </p:cSld>
+  <p:clrMapOvr>
+    <a:overrideClrMapping bg1="lt1" tx1="dk1" bg2="lt2" tx2="dk2" accent1="accent1" accent2="accent2" accent3="accent3" accent4="accent4" accent5="accent5" accent6="accent6" hlink="hlink" folHlink="folHlink"/>
+  </p:clrMapOvr>
+</p:sld>
+</file>
+
+<file path=ppt/slides/slide63.xml><?xml version="1.0" encoding="utf-8"?>
+<p:sld xmlns:a="http://schemas.openxmlformats.org/drawingml/2006/main" xmlns:r="http://schemas.openxmlformats.org/officeDocument/2006/relationships" xmlns:p="http://schemas.openxmlformats.org/presentationml/2006/main">
+  <p:cSld>
+    <p:bg>
+      <p:bgPr>
+        <a:blipFill dpi="0" rotWithShape="1">
+          <a:blip r:embed="rId3">
+            <a:extLst>
+              <a:ext uri="{BEBA8EAE-BF5A-486C-A8C5-ECC9F3942E4B}">
+                <a14:imgProps xmlns:a14="http://schemas.microsoft.com/office/drawing/2010/main">
+                  <a14:imgLayer r:embed="rId4">
+                    <a14:imgEffect>
+                      <a14:brightnessContrast bright="-50000"/>
+                    </a14:imgEffect>
+                  </a14:imgLayer>
+                </a14:imgProps>
+              </a:ext>
+            </a:extLst>
+          </a:blip>
+          <a:srcRect/>
+          <a:stretch>
+            <a:fillRect l="-10000" r="-10000"/>
+          </a:stretch>
+        </a:blipFill>
+        <a:effectLst/>
+      </p:bgPr>
+    </p:bg>
+    <p:spTree>
+      <p:nvGrpSpPr>
+        <p:cNvPr id="1" name=""/>
+        <p:cNvGrpSpPr/>
+        <p:nvPr/>
+      </p:nvGrpSpPr>
+      <p:grpSpPr>
+        <a:xfrm>
+          <a:off x="0" y="0"/>
+          <a:ext cx="0" cy="0"/>
+          <a:chOff x="0" y="0"/>
+          <a:chExt cx="0" cy="0"/>
+        </a:xfrm>
+      </p:grpSpPr>
+      <p:sp>
+        <p:nvSpPr>
+          <p:cNvPr id="2" name="Title 1"/>
+          <p:cNvSpPr>
+            <a:spLocks noGrp="1"/>
+          </p:cNvSpPr>
+          <p:nvPr>
+            <p:ph type="title"/>
+          </p:nvPr>
+        </p:nvSpPr>
+        <p:spPr/>
+        <p:txBody>
+          <a:bodyPr/>
+          <a:lstStyle/>
+          <a:p>
+            <a:r>
               <a:rPr lang="en-US" dirty="0" err="1"/>
               <a:t>Scikit</a:t>
             </a:r>
@@ -15456,7 +15596,7 @@
 </p:sld>
 </file>
 
-<file path=ppt/slides/slide63.xml><?xml version="1.0" encoding="utf-8"?>
+<file path=ppt/slides/slide64.xml><?xml version="1.0" encoding="utf-8"?>
 <p:sld xmlns:a="http://schemas.openxmlformats.org/drawingml/2006/main" xmlns:r="http://schemas.openxmlformats.org/officeDocument/2006/relationships" xmlns:p="http://schemas.openxmlformats.org/presentationml/2006/main">
   <p:cSld>
     <p:bg>
@@ -15550,7 +15690,7 @@
 </p:sld>
 </file>
 
-<file path=ppt/slides/slide64.xml><?xml version="1.0" encoding="utf-8"?>
+<file path=ppt/slides/slide65.xml><?xml version="1.0" encoding="utf-8"?>
 <p:sld xmlns:a="http://schemas.openxmlformats.org/drawingml/2006/main" xmlns:r="http://schemas.openxmlformats.org/officeDocument/2006/relationships" xmlns:p="http://schemas.openxmlformats.org/presentationml/2006/main">
   <p:cSld>
     <p:bg>
@@ -19404,6 +19544,49 @@
 </a:themeOverride>
 </file>
 
+<file path=ppt/theme/themeOverride62.xml><?xml version="1.0" encoding="utf-8"?>
+<a:themeOverride xmlns:a="http://schemas.openxmlformats.org/drawingml/2006/main">
+  <a:clrScheme name="Custom 2">
+    <a:dk1>
+      <a:srgbClr val="EFEFEF"/>
+    </a:dk1>
+    <a:lt1>
+      <a:srgbClr val="EFEFEF"/>
+    </a:lt1>
+    <a:dk2>
+      <a:srgbClr val="053E7D"/>
+    </a:dk2>
+    <a:lt2>
+      <a:srgbClr val="FFFFFF"/>
+    </a:lt2>
+    <a:accent1>
+      <a:srgbClr val="EFEFEF"/>
+    </a:accent1>
+    <a:accent2>
+      <a:srgbClr val="EFEFEF"/>
+    </a:accent2>
+    <a:accent3>
+      <a:srgbClr val="EFEFEF"/>
+    </a:accent3>
+    <a:accent4>
+      <a:srgbClr val="808080"/>
+    </a:accent4>
+    <a:accent5>
+      <a:srgbClr val="5F5F5F"/>
+    </a:accent5>
+    <a:accent6>
+      <a:srgbClr val="4D4D4D"/>
+    </a:accent6>
+    <a:hlink>
+      <a:srgbClr val="B5D7FC"/>
+    </a:hlink>
+    <a:folHlink>
+      <a:srgbClr val="919191"/>
+    </a:folHlink>
+  </a:clrScheme>
+</a:themeOverride>
+</file>
+
 <file path=ppt/theme/themeOverride7.xml><?xml version="1.0" encoding="utf-8"?>
 <a:themeOverride xmlns:a="http://schemas.openxmlformats.org/drawingml/2006/main">
   <a:clrScheme name="Custom 2">

</xml_diff>

<commit_message>
Cleaned up code, added kernelized SVM slides.
</commit_message>
<xml_diff>
--- a/Session 7 - Python/Instructional Material/Session 7 - Python Brief Intro to Machine Learning with Scikit Learn.pptx
+++ b/Session 7 - Python/Instructional Material/Session 7 - Python Brief Intro to Machine Learning with Scikit Learn.pptx
@@ -6,7 +6,7 @@
     <p:sldMasterId id="2147483660" r:id="rId2"/>
   </p:sldMasterIdLst>
   <p:notesMasterIdLst>
-    <p:notesMasterId r:id="rId90"/>
+    <p:notesMasterId r:id="rId92"/>
   </p:notesMasterIdLst>
   <p:sldIdLst>
     <p:sldId id="256" r:id="rId3"/>
@@ -67,35 +67,37 @@
     <p:sldId id="437" r:id="rId58"/>
     <p:sldId id="451" r:id="rId59"/>
     <p:sldId id="452" r:id="rId60"/>
-    <p:sldId id="391" r:id="rId61"/>
-    <p:sldId id="428" r:id="rId62"/>
-    <p:sldId id="438" r:id="rId63"/>
-    <p:sldId id="427" r:id="rId64"/>
-    <p:sldId id="441" r:id="rId65"/>
-    <p:sldId id="396" r:id="rId66"/>
-    <p:sldId id="432" r:id="rId67"/>
-    <p:sldId id="431" r:id="rId68"/>
-    <p:sldId id="430" r:id="rId69"/>
-    <p:sldId id="434" r:id="rId70"/>
-    <p:sldId id="439" r:id="rId71"/>
-    <p:sldId id="440" r:id="rId72"/>
-    <p:sldId id="414" r:id="rId73"/>
-    <p:sldId id="433" r:id="rId74"/>
-    <p:sldId id="442" r:id="rId75"/>
-    <p:sldId id="443" r:id="rId76"/>
-    <p:sldId id="397" r:id="rId77"/>
-    <p:sldId id="398" r:id="rId78"/>
-    <p:sldId id="399" r:id="rId79"/>
-    <p:sldId id="376" r:id="rId80"/>
-    <p:sldId id="445" r:id="rId81"/>
-    <p:sldId id="405" r:id="rId82"/>
-    <p:sldId id="385" r:id="rId83"/>
-    <p:sldId id="386" r:id="rId84"/>
-    <p:sldId id="400" r:id="rId85"/>
-    <p:sldId id="384" r:id="rId86"/>
-    <p:sldId id="375" r:id="rId87"/>
-    <p:sldId id="460" r:id="rId88"/>
-    <p:sldId id="411" r:id="rId89"/>
+    <p:sldId id="468" r:id="rId61"/>
+    <p:sldId id="469" r:id="rId62"/>
+    <p:sldId id="391" r:id="rId63"/>
+    <p:sldId id="428" r:id="rId64"/>
+    <p:sldId id="438" r:id="rId65"/>
+    <p:sldId id="427" r:id="rId66"/>
+    <p:sldId id="441" r:id="rId67"/>
+    <p:sldId id="396" r:id="rId68"/>
+    <p:sldId id="432" r:id="rId69"/>
+    <p:sldId id="431" r:id="rId70"/>
+    <p:sldId id="430" r:id="rId71"/>
+    <p:sldId id="434" r:id="rId72"/>
+    <p:sldId id="439" r:id="rId73"/>
+    <p:sldId id="440" r:id="rId74"/>
+    <p:sldId id="414" r:id="rId75"/>
+    <p:sldId id="433" r:id="rId76"/>
+    <p:sldId id="442" r:id="rId77"/>
+    <p:sldId id="443" r:id="rId78"/>
+    <p:sldId id="397" r:id="rId79"/>
+    <p:sldId id="398" r:id="rId80"/>
+    <p:sldId id="399" r:id="rId81"/>
+    <p:sldId id="376" r:id="rId82"/>
+    <p:sldId id="445" r:id="rId83"/>
+    <p:sldId id="405" r:id="rId84"/>
+    <p:sldId id="385" r:id="rId85"/>
+    <p:sldId id="386" r:id="rId86"/>
+    <p:sldId id="400" r:id="rId87"/>
+    <p:sldId id="384" r:id="rId88"/>
+    <p:sldId id="375" r:id="rId89"/>
+    <p:sldId id="460" r:id="rId90"/>
+    <p:sldId id="411" r:id="rId91"/>
   </p:sldIdLst>
   <p:sldSz cx="9144000" cy="6858000" type="screen4x3"/>
   <p:notesSz cx="6858000" cy="9144000"/>
@@ -1066,6 +1068,177 @@
     <p:extLst>
       <p:ext uri="{BB962C8B-B14F-4D97-AF65-F5344CB8AC3E}">
         <p14:creationId xmlns:p14="http://schemas.microsoft.com/office/powerpoint/2010/main" val="3723214472"/>
+      </p:ext>
+    </p:extLst>
+  </p:cSld>
+  <p:clrMapOvr>
+    <a:masterClrMapping/>
+  </p:clrMapOvr>
+</p:notes>
+</file>
+
+<file path=ppt/notesSlides/notesSlide15.xml><?xml version="1.0" encoding="utf-8"?>
+<p:notes xmlns:a="http://schemas.openxmlformats.org/drawingml/2006/main" xmlns:r="http://schemas.openxmlformats.org/officeDocument/2006/relationships" xmlns:p="http://schemas.openxmlformats.org/presentationml/2006/main">
+  <p:cSld>
+    <p:spTree>
+      <p:nvGrpSpPr>
+        <p:cNvPr id="1" name=""/>
+        <p:cNvGrpSpPr/>
+        <p:nvPr/>
+      </p:nvGrpSpPr>
+      <p:grpSpPr>
+        <a:xfrm>
+          <a:off x="0" y="0"/>
+          <a:ext cx="0" cy="0"/>
+          <a:chOff x="0" y="0"/>
+          <a:chExt cx="0" cy="0"/>
+        </a:xfrm>
+      </p:grpSpPr>
+      <p:sp>
+        <p:nvSpPr>
+          <p:cNvPr id="2" name="Slide Image Placeholder 1"/>
+          <p:cNvSpPr>
+            <a:spLocks noGrp="1" noRot="1" noChangeAspect="1"/>
+          </p:cNvSpPr>
+          <p:nvPr>
+            <p:ph type="sldImg"/>
+          </p:nvPr>
+        </p:nvSpPr>
+        <p:spPr/>
+      </p:sp>
+      <p:sp>
+        <p:nvSpPr>
+          <p:cNvPr id="3" name="Notes Placeholder 2"/>
+          <p:cNvSpPr>
+            <a:spLocks noGrp="1"/>
+          </p:cNvSpPr>
+          <p:nvPr>
+            <p:ph type="body" idx="1"/>
+          </p:nvPr>
+        </p:nvSpPr>
+        <p:spPr/>
+        <p:txBody>
+          <a:bodyPr/>
+          <a:lstStyle/>
+          <a:p>
+            <a:endParaRPr lang="en-US" dirty="0"/>
+          </a:p>
+        </p:txBody>
+      </p:sp>
+      <p:sp>
+        <p:nvSpPr>
+          <p:cNvPr id="4" name="Slide Number Placeholder 3"/>
+          <p:cNvSpPr>
+            <a:spLocks noGrp="1"/>
+          </p:cNvSpPr>
+          <p:nvPr>
+            <p:ph type="sldNum" sz="quarter" idx="5"/>
+          </p:nvPr>
+        </p:nvSpPr>
+        <p:spPr/>
+        <p:txBody>
+          <a:bodyPr/>
+          <a:lstStyle/>
+          <a:p>
+            <a:fld id="{3E7B21C4-CE7A-4258-91FF-8CBB981279E1}" type="slidenum">
+              <a:rPr lang="en-US" smtClean="0"/>
+              <a:t>59</a:t>
+            </a:fld>
+            <a:endParaRPr lang="en-US"/>
+          </a:p>
+        </p:txBody>
+      </p:sp>
+    </p:spTree>
+    <p:extLst>
+      <p:ext uri="{BB962C8B-B14F-4D97-AF65-F5344CB8AC3E}">
+        <p14:creationId xmlns:p14="http://schemas.microsoft.com/office/powerpoint/2010/main" val="2794178512"/>
+      </p:ext>
+    </p:extLst>
+  </p:cSld>
+  <p:clrMapOvr>
+    <a:masterClrMapping/>
+  </p:clrMapOvr>
+</p:notes>
+</file>
+
+<file path=ppt/notesSlides/notesSlide16.xml><?xml version="1.0" encoding="utf-8"?>
+<p:notes xmlns:a="http://schemas.openxmlformats.org/drawingml/2006/main" xmlns:r="http://schemas.openxmlformats.org/officeDocument/2006/relationships" xmlns:p="http://schemas.openxmlformats.org/presentationml/2006/main">
+  <p:cSld>
+    <p:spTree>
+      <p:nvGrpSpPr>
+        <p:cNvPr id="1" name=""/>
+        <p:cNvGrpSpPr/>
+        <p:nvPr/>
+      </p:nvGrpSpPr>
+      <p:grpSpPr>
+        <a:xfrm>
+          <a:off x="0" y="0"/>
+          <a:ext cx="0" cy="0"/>
+          <a:chOff x="0" y="0"/>
+          <a:chExt cx="0" cy="0"/>
+        </a:xfrm>
+      </p:grpSpPr>
+      <p:sp>
+        <p:nvSpPr>
+          <p:cNvPr id="2" name="Slide Image Placeholder 1"/>
+          <p:cNvSpPr>
+            <a:spLocks noGrp="1" noRot="1" noChangeAspect="1"/>
+          </p:cNvSpPr>
+          <p:nvPr>
+            <p:ph type="sldImg"/>
+          </p:nvPr>
+        </p:nvSpPr>
+        <p:spPr/>
+      </p:sp>
+      <p:sp>
+        <p:nvSpPr>
+          <p:cNvPr id="3" name="Notes Placeholder 2"/>
+          <p:cNvSpPr>
+            <a:spLocks noGrp="1"/>
+          </p:cNvSpPr>
+          <p:nvPr>
+            <p:ph type="body" idx="1"/>
+          </p:nvPr>
+        </p:nvSpPr>
+        <p:spPr/>
+        <p:txBody>
+          <a:bodyPr/>
+          <a:lstStyle/>
+          <a:p>
+            <a:r>
+              <a:rPr lang="en-US" dirty="0"/>
+              <a:t>It is almost like the previous slide is showing a projection of this graph along just the feauture1-feature0 plane.</a:t>
+            </a:r>
+          </a:p>
+        </p:txBody>
+      </p:sp>
+      <p:sp>
+        <p:nvSpPr>
+          <p:cNvPr id="4" name="Slide Number Placeholder 3"/>
+          <p:cNvSpPr>
+            <a:spLocks noGrp="1"/>
+          </p:cNvSpPr>
+          <p:nvPr>
+            <p:ph type="sldNum" sz="quarter" idx="5"/>
+          </p:nvPr>
+        </p:nvSpPr>
+        <p:spPr/>
+        <p:txBody>
+          <a:bodyPr/>
+          <a:lstStyle/>
+          <a:p>
+            <a:fld id="{3E7B21C4-CE7A-4258-91FF-8CBB981279E1}" type="slidenum">
+              <a:rPr lang="en-US" smtClean="0"/>
+              <a:t>60</a:t>
+            </a:fld>
+            <a:endParaRPr lang="en-US"/>
+          </a:p>
+        </p:txBody>
+      </p:sp>
+    </p:spTree>
+    <p:extLst>
+      <p:ext uri="{BB962C8B-B14F-4D97-AF65-F5344CB8AC3E}">
+        <p14:creationId xmlns:p14="http://schemas.microsoft.com/office/powerpoint/2010/main" val="3859055155"/>
       </p:ext>
     </p:extLst>
   </p:cSld>
@@ -12747,7 +12920,7 @@
           <a:graphicData uri="http://schemas.openxmlformats.org/presentationml/2006/ole">
             <mc:AlternateContent xmlns:mc="http://schemas.openxmlformats.org/markup-compatibility/2006">
               <mc:Choice xmlns:v="urn:schemas-microsoft-com:vml" Requires="v">
-                <p:oleObj spid="_x0000_s2211" name="Bitmap Image" r:id="rId7" imgW="3743280" imgH="3024360" progId="Paint.Picture">
+                <p:oleObj spid="_x0000_s2214" name="Bitmap Image" r:id="rId7" imgW="3743280" imgH="3024360" progId="Paint.Picture">
                   <p:embed/>
                 </p:oleObj>
               </mc:Choice>
@@ -15521,6 +15694,13 @@
           </a:p>
           <a:p>
             <a:pPr lvl="2"/>
+            <a:r>
+              <a:rPr lang="en-US" dirty="0"/>
+              <a:t>Use feature engineering to generate more features</a:t>
+            </a:r>
+          </a:p>
+          <a:p>
+            <a:pPr lvl="2"/>
             <a:endParaRPr lang="en-US" dirty="0"/>
           </a:p>
           <a:p>
@@ -15761,11 +15941,11 @@
     <p:bg>
       <p:bgPr>
         <a:blipFill dpi="0" rotWithShape="1">
-          <a:blip r:embed="rId3">
+          <a:blip r:embed="rId4">
             <a:extLst>
               <a:ext uri="{BEBA8EAE-BF5A-486C-A8C5-ECC9F3942E4B}">
                 <a14:imgProps xmlns:a14="http://schemas.microsoft.com/office/drawing/2010/main">
-                  <a14:imgLayer r:embed="rId4">
+                  <a14:imgLayer r:embed="rId5">
                     <a14:imgEffect>
                       <a14:brightnessContrast bright="-50000"/>
                     </a14:imgEffect>
@@ -15813,7 +15993,7 @@
           <a:p>
             <a:r>
               <a:rPr lang="en-US" dirty="0"/>
-              <a:t>Linear Models - Regressors</a:t>
+              <a:t>Linear Models - Classifiers</a:t>
             </a:r>
           </a:p>
         </p:txBody>
@@ -15830,184 +16010,70 @@
         </p:nvSpPr>
         <p:spPr/>
         <p:txBody>
-          <a:bodyPr>
-            <a:normAutofit/>
-          </a:bodyPr>
-          <a:lstStyle/>
-          <a:p>
-            <a:r>
-              <a:rPr lang="en-US" dirty="0"/>
-              <a:t>Regressors</a:t>
+          <a:bodyPr/>
+          <a:lstStyle/>
+          <a:p>
+            <a:r>
+              <a:rPr lang="en-US" dirty="0"/>
+              <a:t>Kernelized SVM</a:t>
             </a:r>
           </a:p>
           <a:p>
             <a:pPr lvl="1"/>
             <a:r>
               <a:rPr lang="en-US" dirty="0"/>
-              <a:t>Tries to predict as close to a value as possible.</a:t>
-            </a:r>
-          </a:p>
-          <a:p>
-            <a:pPr lvl="1"/>
-            <a:r>
-              <a:rPr lang="en-US" dirty="0"/>
-              <a:t>Creates a linear equation to predict outcomes:</a:t>
-            </a:r>
+              <a:t>Transforms this (see reference 1):</a:t>
+            </a:r>
+          </a:p>
+          <a:p>
+            <a:pPr marL="914400" lvl="2" indent="0">
+              <a:buNone/>
+            </a:pPr>
+            <a:endParaRPr lang="en-US" dirty="0"/>
           </a:p>
           <a:p>
             <a:pPr lvl="2"/>
-            <a:r>
-              <a:rPr lang="en-US" dirty="0" err="1"/>
-              <a:t>Y</a:t>
-            </a:r>
-            <a:r>
-              <a:rPr lang="en-US" baseline="-25000" dirty="0" err="1"/>
-              <a:t>predict</a:t>
-            </a:r>
-            <a:r>
-              <a:rPr lang="en-US" dirty="0"/>
-              <a:t> = w</a:t>
-            </a:r>
-            <a:r>
-              <a:rPr lang="en-US" baseline="-25000" dirty="0"/>
-              <a:t>1</a:t>
-            </a:r>
-            <a:r>
-              <a:rPr lang="en-US" dirty="0"/>
-              <a:t>*f</a:t>
-            </a:r>
-            <a:r>
-              <a:rPr lang="en-US" baseline="-25000" dirty="0"/>
-              <a:t>1</a:t>
-            </a:r>
-            <a:r>
-              <a:rPr lang="en-US" dirty="0"/>
-              <a:t> + w</a:t>
-            </a:r>
-            <a:r>
-              <a:rPr lang="en-US" baseline="-25000" dirty="0"/>
-              <a:t>2</a:t>
-            </a:r>
-            <a:r>
-              <a:rPr lang="en-US" dirty="0"/>
-              <a:t>*f</a:t>
-            </a:r>
-            <a:r>
-              <a:rPr lang="en-US" baseline="-25000" dirty="0"/>
-              <a:t>2</a:t>
-            </a:r>
-            <a:r>
-              <a:rPr lang="en-US" dirty="0"/>
-              <a:t> + w</a:t>
-            </a:r>
-            <a:r>
-              <a:rPr lang="en-US" baseline="-25000" dirty="0"/>
-              <a:t>3</a:t>
-            </a:r>
-            <a:r>
-              <a:rPr lang="en-US" dirty="0"/>
-              <a:t>*f</a:t>
-            </a:r>
-            <a:r>
-              <a:rPr lang="en-US" baseline="-25000" dirty="0"/>
-              <a:t>3</a:t>
-            </a:r>
-            <a:r>
-              <a:rPr lang="en-US" dirty="0"/>
-              <a:t> + … + </a:t>
-            </a:r>
-            <a:r>
-              <a:rPr lang="en-US" dirty="0" err="1"/>
-              <a:t>w</a:t>
-            </a:r>
-            <a:r>
-              <a:rPr lang="en-US" baseline="-25000" dirty="0" err="1"/>
-              <a:t>n</a:t>
-            </a:r>
-            <a:r>
-              <a:rPr lang="en-US" dirty="0"/>
-              <a:t>*</a:t>
-            </a:r>
-            <a:r>
-              <a:rPr lang="en-US" dirty="0" err="1"/>
-              <a:t>f</a:t>
-            </a:r>
-            <a:r>
-              <a:rPr lang="en-US" baseline="-25000" dirty="0" err="1"/>
-              <a:t>n</a:t>
-            </a:r>
-            <a:r>
-              <a:rPr lang="en-US" dirty="0"/>
-              <a:t> + b</a:t>
-            </a:r>
-          </a:p>
-          <a:p>
-            <a:pPr lvl="3"/>
-            <a:r>
-              <a:rPr lang="en-US" dirty="0" err="1"/>
-              <a:t>Y</a:t>
-            </a:r>
-            <a:r>
-              <a:rPr lang="en-US" baseline="-25000" dirty="0" err="1"/>
-              <a:t>predict</a:t>
-            </a:r>
-            <a:r>
-              <a:rPr lang="en-US" dirty="0"/>
-              <a:t> = predicted value for given sample</a:t>
-            </a:r>
-          </a:p>
-          <a:p>
-            <a:pPr lvl="3"/>
-            <a:r>
-              <a:rPr lang="en-US" dirty="0"/>
-              <a:t>w = weights</a:t>
-            </a:r>
-          </a:p>
-          <a:p>
-            <a:pPr lvl="3"/>
-            <a:r>
-              <a:rPr lang="en-US" dirty="0"/>
-              <a:t>f = feature value</a:t>
-            </a:r>
-          </a:p>
-          <a:p>
-            <a:pPr lvl="3"/>
-            <a:r>
-              <a:rPr lang="en-US" dirty="0"/>
-              <a:t>b = intercept of linear line</a:t>
-            </a:r>
-          </a:p>
-          <a:p>
-            <a:pPr lvl="3"/>
-            <a:r>
-              <a:rPr lang="en-US" dirty="0"/>
-              <a:t>n = number of features</a:t>
-            </a:r>
-          </a:p>
-          <a:p>
-            <a:pPr lvl="2"/>
-            <a:r>
-              <a:rPr lang="en-US" dirty="0" err="1"/>
-              <a:t>A.k.a</a:t>
-            </a:r>
-            <a:r>
-              <a:rPr lang="en-US" dirty="0"/>
-              <a:t> the prediction function.</a:t>
-            </a:r>
-          </a:p>
-          <a:p>
-            <a:pPr lvl="2"/>
-            <a:endParaRPr lang="en-US" dirty="0"/>
-          </a:p>
-          <a:p>
-            <a:endParaRPr lang="en-US" dirty="0"/>
-          </a:p>
-        </p:txBody>
-      </p:sp>
+            <a:endParaRPr lang="en-US" dirty="0"/>
+          </a:p>
+          <a:p>
+            <a:endParaRPr lang="en-US" dirty="0"/>
+          </a:p>
+        </p:txBody>
+      </p:sp>
+      <p:pic>
+        <p:nvPicPr>
+          <p:cNvPr id="5" name="Picture 4">
+            <a:extLst>
+              <a:ext uri="{FF2B5EF4-FFF2-40B4-BE49-F238E27FC236}">
+                <a16:creationId xmlns:a16="http://schemas.microsoft.com/office/drawing/2014/main" id="{0E65974A-2A2C-42A1-B46E-5C9A8A76F242}"/>
+              </a:ext>
+            </a:extLst>
+          </p:cNvPr>
+          <p:cNvPicPr>
+            <a:picLocks noChangeAspect="1"/>
+          </p:cNvPicPr>
+          <p:nvPr/>
+        </p:nvPicPr>
+        <p:blipFill>
+          <a:blip r:embed="rId6"/>
+          <a:stretch>
+            <a:fillRect/>
+          </a:stretch>
+        </p:blipFill>
+        <p:spPr>
+          <a:xfrm>
+            <a:off x="1720453" y="2819400"/>
+            <a:ext cx="5703093" cy="3849196"/>
+          </a:xfrm>
+          <a:prstGeom prst="rect">
+            <a:avLst/>
+          </a:prstGeom>
+        </p:spPr>
+      </p:pic>
     </p:spTree>
     <p:extLst>
       <p:ext uri="{BB962C8B-B14F-4D97-AF65-F5344CB8AC3E}">
-        <p14:creationId xmlns:p14="http://schemas.microsoft.com/office/powerpoint/2010/main" val="1469044682"/>
+        <p14:creationId xmlns:p14="http://schemas.microsoft.com/office/powerpoint/2010/main" val="3348980918"/>
       </p:ext>
     </p:extLst>
   </p:cSld>
@@ -16166,11 +16232,11 @@
     <p:bg>
       <p:bgPr>
         <a:blipFill dpi="0" rotWithShape="1">
-          <a:blip r:embed="rId3">
+          <a:blip r:embed="rId4">
             <a:extLst>
               <a:ext uri="{BEBA8EAE-BF5A-486C-A8C5-ECC9F3942E4B}">
                 <a14:imgProps xmlns:a14="http://schemas.microsoft.com/office/drawing/2010/main">
-                  <a14:imgLayer r:embed="rId4">
+                  <a14:imgLayer r:embed="rId5">
                     <a14:imgEffect>
                       <a14:brightnessContrast bright="-50000"/>
                     </a14:imgEffect>
@@ -16218,7 +16284,7 @@
           <a:p>
             <a:r>
               <a:rPr lang="en-US" dirty="0"/>
-              <a:t>Linear Models - Regressors</a:t>
+              <a:t>Linear Models - Classifiers</a:t>
             </a:r>
           </a:p>
         </p:txBody>
@@ -16235,76 +16301,70 @@
         </p:nvSpPr>
         <p:spPr/>
         <p:txBody>
-          <a:bodyPr>
-            <a:normAutofit/>
-          </a:bodyPr>
-          <a:lstStyle/>
-          <a:p>
-            <a:r>
-              <a:rPr lang="en-US" dirty="0"/>
-              <a:t>Regressors</a:t>
+          <a:bodyPr/>
+          <a:lstStyle/>
+          <a:p>
+            <a:r>
+              <a:rPr lang="en-US" dirty="0"/>
+              <a:t>Kernelized SVM</a:t>
             </a:r>
           </a:p>
           <a:p>
             <a:pPr lvl="1"/>
             <a:r>
               <a:rPr lang="en-US" dirty="0"/>
-              <a:t>The models we train adjust the values of </a:t>
-            </a:r>
-            <a:r>
-              <a:rPr lang="en-US" dirty="0" err="1"/>
-              <a:t>w</a:t>
-            </a:r>
-            <a:r>
-              <a:rPr lang="en-US" baseline="-25000" dirty="0" err="1"/>
-              <a:t>x</a:t>
-            </a:r>
-            <a:r>
-              <a:rPr lang="en-US" dirty="0"/>
-              <a:t> and b.</a:t>
-            </a:r>
-          </a:p>
-          <a:p>
-            <a:pPr lvl="1"/>
-            <a:r>
-              <a:rPr lang="en-US" dirty="0"/>
-              <a:t>For functions with regularization, an additional term is added for model to optimize when generating prediction function</a:t>
-            </a:r>
-          </a:p>
-          <a:p>
-            <a:pPr lvl="1"/>
-            <a:r>
-              <a:rPr lang="en-US" dirty="0"/>
-              <a:t>Examples:</a:t>
-            </a:r>
+              <a:t>To this (see reference 1):</a:t>
+            </a:r>
+          </a:p>
+          <a:p>
+            <a:pPr marL="914400" lvl="2" indent="0">
+              <a:buNone/>
+            </a:pPr>
+            <a:endParaRPr lang="en-US" dirty="0"/>
           </a:p>
           <a:p>
             <a:pPr lvl="2"/>
-            <a:r>
-              <a:rPr lang="en-US" dirty="0"/>
-              <a:t>Trying to predict median household income of an area.</a:t>
-            </a:r>
-          </a:p>
-          <a:p>
-            <a:pPr lvl="2"/>
-            <a:r>
-              <a:rPr lang="en-US" dirty="0"/>
-              <a:t>Trying to predict the value a stock will rise to.</a:t>
-            </a:r>
-          </a:p>
-          <a:p>
-            <a:pPr lvl="2"/>
-            <a:endParaRPr lang="en-US" dirty="0"/>
-          </a:p>
-          <a:p>
-            <a:endParaRPr lang="en-US" dirty="0"/>
-          </a:p>
-        </p:txBody>
-      </p:sp>
+            <a:endParaRPr lang="en-US" dirty="0"/>
+          </a:p>
+          <a:p>
+            <a:endParaRPr lang="en-US" dirty="0"/>
+          </a:p>
+        </p:txBody>
+      </p:sp>
+      <p:pic>
+        <p:nvPicPr>
+          <p:cNvPr id="6" name="Picture 5">
+            <a:extLst>
+              <a:ext uri="{FF2B5EF4-FFF2-40B4-BE49-F238E27FC236}">
+                <a16:creationId xmlns:a16="http://schemas.microsoft.com/office/drawing/2014/main" id="{7842DFF7-2744-40EA-AF91-EFA6332CCB60}"/>
+              </a:ext>
+            </a:extLst>
+          </p:cNvPr>
+          <p:cNvPicPr>
+            <a:picLocks noChangeAspect="1"/>
+          </p:cNvPicPr>
+          <p:nvPr/>
+        </p:nvPicPr>
+        <p:blipFill>
+          <a:blip r:embed="rId6"/>
+          <a:stretch>
+            <a:fillRect/>
+          </a:stretch>
+        </p:blipFill>
+        <p:spPr>
+          <a:xfrm>
+            <a:off x="1792650" y="2819400"/>
+            <a:ext cx="5558699" cy="3763962"/>
+          </a:xfrm>
+          <a:prstGeom prst="rect">
+            <a:avLst/>
+          </a:prstGeom>
+        </p:spPr>
+      </p:pic>
     </p:spTree>
     <p:extLst>
       <p:ext uri="{BB962C8B-B14F-4D97-AF65-F5344CB8AC3E}">
-        <p14:creationId xmlns:p14="http://schemas.microsoft.com/office/powerpoint/2010/main" val="3393903202"/>
+        <p14:creationId xmlns:p14="http://schemas.microsoft.com/office/powerpoint/2010/main" val="3212847762"/>
       </p:ext>
     </p:extLst>
   </p:cSld>
@@ -16389,26 +16449,169 @@
         </p:nvSpPr>
         <p:spPr/>
         <p:txBody>
-          <a:bodyPr/>
-          <a:lstStyle/>
-          <a:p>
-            <a:r>
-              <a:rPr lang="en-US" dirty="0"/>
-              <a:t>K-Nearest Neighbors Regression</a:t>
+          <a:bodyPr>
+            <a:normAutofit/>
+          </a:bodyPr>
+          <a:lstStyle/>
+          <a:p>
+            <a:r>
+              <a:rPr lang="en-US" dirty="0"/>
+              <a:t>Regressors</a:t>
             </a:r>
           </a:p>
           <a:p>
             <a:pPr lvl="1"/>
             <a:r>
               <a:rPr lang="en-US" dirty="0"/>
-              <a:t>Similar to the classifier, the regressor picks the value that is closest to the most similar neighbor.</a:t>
+              <a:t>Tries to predict as close to a value as possible.</a:t>
             </a:r>
           </a:p>
           <a:p>
             <a:pPr lvl="1"/>
             <a:r>
               <a:rPr lang="en-US" dirty="0"/>
-              <a:t>Multiple neighbors are averaged together.</a:t>
+              <a:t>Creates a linear equation to predict outcomes:</a:t>
+            </a:r>
+          </a:p>
+          <a:p>
+            <a:pPr lvl="2"/>
+            <a:r>
+              <a:rPr lang="en-US" dirty="0" err="1"/>
+              <a:t>Y</a:t>
+            </a:r>
+            <a:r>
+              <a:rPr lang="en-US" baseline="-25000" dirty="0" err="1"/>
+              <a:t>predict</a:t>
+            </a:r>
+            <a:r>
+              <a:rPr lang="en-US" dirty="0"/>
+              <a:t> = w</a:t>
+            </a:r>
+            <a:r>
+              <a:rPr lang="en-US" baseline="-25000" dirty="0"/>
+              <a:t>1</a:t>
+            </a:r>
+            <a:r>
+              <a:rPr lang="en-US" dirty="0"/>
+              <a:t>*f</a:t>
+            </a:r>
+            <a:r>
+              <a:rPr lang="en-US" baseline="-25000" dirty="0"/>
+              <a:t>1</a:t>
+            </a:r>
+            <a:r>
+              <a:rPr lang="en-US" dirty="0"/>
+              <a:t> + w</a:t>
+            </a:r>
+            <a:r>
+              <a:rPr lang="en-US" baseline="-25000" dirty="0"/>
+              <a:t>2</a:t>
+            </a:r>
+            <a:r>
+              <a:rPr lang="en-US" dirty="0"/>
+              <a:t>*f</a:t>
+            </a:r>
+            <a:r>
+              <a:rPr lang="en-US" baseline="-25000" dirty="0"/>
+              <a:t>2</a:t>
+            </a:r>
+            <a:r>
+              <a:rPr lang="en-US" dirty="0"/>
+              <a:t> + w</a:t>
+            </a:r>
+            <a:r>
+              <a:rPr lang="en-US" baseline="-25000" dirty="0"/>
+              <a:t>3</a:t>
+            </a:r>
+            <a:r>
+              <a:rPr lang="en-US" dirty="0"/>
+              <a:t>*f</a:t>
+            </a:r>
+            <a:r>
+              <a:rPr lang="en-US" baseline="-25000" dirty="0"/>
+              <a:t>3</a:t>
+            </a:r>
+            <a:r>
+              <a:rPr lang="en-US" dirty="0"/>
+              <a:t> + … + </a:t>
+            </a:r>
+            <a:r>
+              <a:rPr lang="en-US" dirty="0" err="1"/>
+              <a:t>w</a:t>
+            </a:r>
+            <a:r>
+              <a:rPr lang="en-US" baseline="-25000" dirty="0" err="1"/>
+              <a:t>n</a:t>
+            </a:r>
+            <a:r>
+              <a:rPr lang="en-US" dirty="0"/>
+              <a:t>*</a:t>
+            </a:r>
+            <a:r>
+              <a:rPr lang="en-US" dirty="0" err="1"/>
+              <a:t>f</a:t>
+            </a:r>
+            <a:r>
+              <a:rPr lang="en-US" baseline="-25000" dirty="0" err="1"/>
+              <a:t>n</a:t>
+            </a:r>
+            <a:r>
+              <a:rPr lang="en-US" dirty="0"/>
+              <a:t> + b</a:t>
+            </a:r>
+          </a:p>
+          <a:p>
+            <a:pPr lvl="3"/>
+            <a:r>
+              <a:rPr lang="en-US" dirty="0" err="1"/>
+              <a:t>Y</a:t>
+            </a:r>
+            <a:r>
+              <a:rPr lang="en-US" baseline="-25000" dirty="0" err="1"/>
+              <a:t>predict</a:t>
+            </a:r>
+            <a:r>
+              <a:rPr lang="en-US" dirty="0"/>
+              <a:t> = predicted value for given sample</a:t>
+            </a:r>
+          </a:p>
+          <a:p>
+            <a:pPr lvl="3"/>
+            <a:r>
+              <a:rPr lang="en-US" dirty="0"/>
+              <a:t>w = weights</a:t>
+            </a:r>
+          </a:p>
+          <a:p>
+            <a:pPr lvl="3"/>
+            <a:r>
+              <a:rPr lang="en-US" dirty="0"/>
+              <a:t>f = feature value</a:t>
+            </a:r>
+          </a:p>
+          <a:p>
+            <a:pPr lvl="3"/>
+            <a:r>
+              <a:rPr lang="en-US" dirty="0"/>
+              <a:t>b = intercept of linear line</a:t>
+            </a:r>
+          </a:p>
+          <a:p>
+            <a:pPr lvl="3"/>
+            <a:r>
+              <a:rPr lang="en-US" dirty="0"/>
+              <a:t>n = number of features</a:t>
+            </a:r>
+          </a:p>
+          <a:p>
+            <a:pPr lvl="2"/>
+            <a:r>
+              <a:rPr lang="en-US" dirty="0" err="1"/>
+              <a:t>A.k.a</a:t>
+            </a:r>
+            <a:r>
+              <a:rPr lang="en-US" dirty="0"/>
+              <a:t> the prediction function.</a:t>
             </a:r>
           </a:p>
           <a:p>
@@ -16423,7 +16626,7 @@
     </p:spTree>
     <p:extLst>
       <p:ext uri="{BB962C8B-B14F-4D97-AF65-F5344CB8AC3E}">
-        <p14:creationId xmlns:p14="http://schemas.microsoft.com/office/powerpoint/2010/main" val="3048577779"/>
+        <p14:creationId xmlns:p14="http://schemas.microsoft.com/office/powerpoint/2010/main" val="1469044682"/>
       </p:ext>
     </p:extLst>
   </p:cSld>
@@ -16508,34 +16711,66 @@
         </p:nvSpPr>
         <p:spPr/>
         <p:txBody>
-          <a:bodyPr/>
-          <a:lstStyle/>
-          <a:p>
-            <a:r>
-              <a:rPr lang="en-US" dirty="0"/>
-              <a:t>Linear Regression (Ordinary Least Squares)</a:t>
+          <a:bodyPr>
+            <a:normAutofit/>
+          </a:bodyPr>
+          <a:lstStyle/>
+          <a:p>
+            <a:r>
+              <a:rPr lang="en-US" dirty="0"/>
+              <a:t>Regressors</a:t>
             </a:r>
           </a:p>
           <a:p>
             <a:pPr lvl="1"/>
             <a:r>
               <a:rPr lang="en-US" dirty="0"/>
-              <a:t>Attempts to minimize the mean squared error between the prediction and the target values.</a:t>
+              <a:t>The models we train adjust the values of </a:t>
+            </a:r>
+            <a:r>
+              <a:rPr lang="en-US" dirty="0" err="1"/>
+              <a:t>w</a:t>
+            </a:r>
+            <a:r>
+              <a:rPr lang="en-US" baseline="-25000" dirty="0" err="1"/>
+              <a:t>x</a:t>
+            </a:r>
+            <a:r>
+              <a:rPr lang="en-US" dirty="0"/>
+              <a:t> and b.</a:t>
             </a:r>
           </a:p>
           <a:p>
             <a:pPr lvl="1"/>
             <a:r>
               <a:rPr lang="en-US" dirty="0"/>
-              <a:t>The error of this trainer is calculated by adding the squared differences between the predicted value with the actual target value.</a:t>
+              <a:t>For functions with regularization, an additional term is added for model to optimize when generating prediction function</a:t>
             </a:r>
           </a:p>
           <a:p>
             <a:pPr lvl="1"/>
             <a:r>
               <a:rPr lang="en-US" dirty="0"/>
-              <a:t>No regularization parameters to adjust the accuracy of this trainer</a:t>
-            </a:r>
+              <a:t>Examples:</a:t>
+            </a:r>
+          </a:p>
+          <a:p>
+            <a:pPr lvl="2"/>
+            <a:r>
+              <a:rPr lang="en-US" dirty="0"/>
+              <a:t>Trying to predict median household income of an area.</a:t>
+            </a:r>
+          </a:p>
+          <a:p>
+            <a:pPr lvl="2"/>
+            <a:r>
+              <a:rPr lang="en-US" dirty="0"/>
+              <a:t>Trying to predict the value a stock will rise to.</a:t>
+            </a:r>
+          </a:p>
+          <a:p>
+            <a:pPr lvl="2"/>
+            <a:endParaRPr lang="en-US" dirty="0"/>
           </a:p>
           <a:p>
             <a:endParaRPr lang="en-US" dirty="0"/>
@@ -16545,7 +16780,7 @@
     </p:spTree>
     <p:extLst>
       <p:ext uri="{BB962C8B-B14F-4D97-AF65-F5344CB8AC3E}">
-        <p14:creationId xmlns:p14="http://schemas.microsoft.com/office/powerpoint/2010/main" val="2836403428"/>
+        <p14:creationId xmlns:p14="http://schemas.microsoft.com/office/powerpoint/2010/main" val="3393903202"/>
       </p:ext>
     </p:extLst>
   </p:cSld>
@@ -16635,27 +16870,22 @@
           <a:p>
             <a:r>
               <a:rPr lang="en-US" dirty="0"/>
-              <a:t>In-Class Example – Linear Regression</a:t>
+              <a:t>K-Nearest Neighbors Regression</a:t>
             </a:r>
           </a:p>
           <a:p>
             <a:pPr lvl="1"/>
-            <a:endParaRPr lang="en-US" dirty="0"/>
-          </a:p>
-          <a:p>
-            <a:pPr lvl="2"/>
-            <a:endParaRPr lang="en-US" dirty="0"/>
-          </a:p>
-          <a:p>
-            <a:endParaRPr lang="en-US" dirty="0"/>
+            <a:r>
+              <a:rPr lang="en-US" dirty="0"/>
+              <a:t>Similar to the classifier, the regressor picks the value that is closest to the most similar neighbor.</a:t>
+            </a:r>
           </a:p>
           <a:p>
             <a:pPr lvl="1"/>
-            <a:endParaRPr lang="en-US" dirty="0"/>
-          </a:p>
-          <a:p>
-            <a:pPr lvl="2"/>
-            <a:endParaRPr lang="en-US" dirty="0"/>
+            <a:r>
+              <a:rPr lang="en-US" dirty="0"/>
+              <a:t>Multiple neighbors are averaged together.</a:t>
+            </a:r>
           </a:p>
           <a:p>
             <a:pPr lvl="2"/>
@@ -16669,7 +16899,7 @@
     </p:spTree>
     <p:extLst>
       <p:ext uri="{BB962C8B-B14F-4D97-AF65-F5344CB8AC3E}">
-        <p14:creationId xmlns:p14="http://schemas.microsoft.com/office/powerpoint/2010/main" val="3636144303"/>
+        <p14:creationId xmlns:p14="http://schemas.microsoft.com/office/powerpoint/2010/main" val="3048577779"/>
       </p:ext>
     </p:extLst>
   </p:cSld>
@@ -16754,26 +16984,34 @@
         </p:nvSpPr>
         <p:spPr/>
         <p:txBody>
-          <a:bodyPr>
-            <a:normAutofit/>
-          </a:bodyPr>
-          <a:lstStyle/>
-          <a:p>
-            <a:r>
-              <a:rPr lang="en-US" dirty="0"/>
-              <a:t>Ridge Regression</a:t>
+          <a:bodyPr/>
+          <a:lstStyle/>
+          <a:p>
+            <a:r>
+              <a:rPr lang="en-US" dirty="0"/>
+              <a:t>Linear Regression (Ordinary Least Squares)</a:t>
             </a:r>
           </a:p>
           <a:p>
             <a:pPr lvl="1"/>
             <a:r>
               <a:rPr lang="en-US" dirty="0"/>
-              <a:t>Uses OLS to fit the data, with the additional constraint of attempting to minimize the magnitude of the weight coefficients for each feature without eliminating the feature.</a:t>
-            </a:r>
-          </a:p>
-          <a:p>
-            <a:pPr lvl="2"/>
-            <a:endParaRPr lang="en-US" dirty="0"/>
+              <a:t>Attempts to minimize the mean squared error between the prediction and the target values.</a:t>
+            </a:r>
+          </a:p>
+          <a:p>
+            <a:pPr lvl="1"/>
+            <a:r>
+              <a:rPr lang="en-US" dirty="0"/>
+              <a:t>The error of this trainer is calculated by adding the squared differences between the predicted value with the actual target value.</a:t>
+            </a:r>
+          </a:p>
+          <a:p>
+            <a:pPr lvl="1"/>
+            <a:r>
+              <a:rPr lang="en-US" dirty="0"/>
+              <a:t>No regularization parameters to adjust the accuracy of this trainer</a:t>
+            </a:r>
           </a:p>
           <a:p>
             <a:endParaRPr lang="en-US" dirty="0"/>
@@ -16783,7 +17021,7 @@
     </p:spTree>
     <p:extLst>
       <p:ext uri="{BB962C8B-B14F-4D97-AF65-F5344CB8AC3E}">
-        <p14:creationId xmlns:p14="http://schemas.microsoft.com/office/powerpoint/2010/main" val="474133971"/>
+        <p14:creationId xmlns:p14="http://schemas.microsoft.com/office/powerpoint/2010/main" val="2836403428"/>
       </p:ext>
     </p:extLst>
   </p:cSld>
@@ -16868,36 +17106,32 @@
         </p:nvSpPr>
         <p:spPr/>
         <p:txBody>
-          <a:bodyPr>
-            <a:normAutofit/>
-          </a:bodyPr>
-          <a:lstStyle/>
-          <a:p>
-            <a:r>
-              <a:rPr lang="en-US" dirty="0"/>
-              <a:t>Ridge Regression</a:t>
+          <a:bodyPr/>
+          <a:lstStyle/>
+          <a:p>
+            <a:r>
+              <a:rPr lang="en-US" dirty="0"/>
+              <a:t>In-Class Example – Linear Regression</a:t>
             </a:r>
           </a:p>
           <a:p>
             <a:pPr lvl="1"/>
-            <a:r>
-              <a:rPr lang="en-US" dirty="0"/>
-              <a:t>Each weight should be as close to zero as possible.</a:t>
-            </a:r>
+            <a:endParaRPr lang="en-US" dirty="0"/>
+          </a:p>
+          <a:p>
+            <a:pPr lvl="2"/>
+            <a:endParaRPr lang="en-US" dirty="0"/>
+          </a:p>
+          <a:p>
+            <a:endParaRPr lang="en-US" dirty="0"/>
           </a:p>
           <a:p>
             <a:pPr lvl="1"/>
-            <a:r>
-              <a:rPr lang="en-US" dirty="0"/>
-              <a:t>Each feature will have as little affect on the prediction as possible.</a:t>
-            </a:r>
-          </a:p>
-          <a:p>
-            <a:pPr lvl="1"/>
-            <a:r>
-              <a:rPr lang="en-US" dirty="0"/>
-              <a:t>Note that the feature weights will not be exactly zero using this trainer, so each feature still affects the prediction.</a:t>
-            </a:r>
+            <a:endParaRPr lang="en-US" dirty="0"/>
+          </a:p>
+          <a:p>
+            <a:pPr lvl="2"/>
+            <a:endParaRPr lang="en-US" dirty="0"/>
           </a:p>
           <a:p>
             <a:pPr lvl="2"/>
@@ -16911,7 +17145,7 @@
     </p:spTree>
     <p:extLst>
       <p:ext uri="{BB962C8B-B14F-4D97-AF65-F5344CB8AC3E}">
-        <p14:creationId xmlns:p14="http://schemas.microsoft.com/office/powerpoint/2010/main" val="3620252848"/>
+        <p14:creationId xmlns:p14="http://schemas.microsoft.com/office/powerpoint/2010/main" val="3636144303"/>
       </p:ext>
     </p:extLst>
   </p:cSld>
@@ -16996,7 +17230,9 @@
         </p:nvSpPr>
         <p:spPr/>
         <p:txBody>
-          <a:bodyPr/>
+          <a:bodyPr>
+            <a:normAutofit/>
+          </a:bodyPr>
           <a:lstStyle/>
           <a:p>
             <a:r>
@@ -17008,28 +17244,7 @@
             <a:pPr lvl="1"/>
             <a:r>
               <a:rPr lang="en-US" dirty="0"/>
-              <a:t>Attempting to minimize the weight magnitudes is a form of regularization.</a:t>
-            </a:r>
-          </a:p>
-          <a:p>
-            <a:pPr lvl="2"/>
-            <a:r>
-              <a:rPr lang="en-US" dirty="0"/>
-              <a:t>Regularization is used to attempt to prevent overfitting.</a:t>
-            </a:r>
-          </a:p>
-          <a:p>
-            <a:pPr lvl="1"/>
-            <a:r>
-              <a:rPr lang="en-US" dirty="0"/>
-              <a:t>This trainer uses L2 regularization</a:t>
-            </a:r>
-          </a:p>
-          <a:p>
-            <a:pPr lvl="2"/>
-            <a:r>
-              <a:rPr lang="en-US" dirty="0"/>
-              <a:t>The sum of the square of the weight coefficient for each feature is used as a penalty term in determining model accuracy.</a:t>
+              <a:t>Uses OLS to fit the data, with the additional constraint of attempting to minimize the magnitude of the weight coefficients for each feature without eliminating the feature.</a:t>
             </a:r>
           </a:p>
           <a:p>
@@ -17044,7 +17259,7 @@
     </p:spTree>
     <p:extLst>
       <p:ext uri="{BB962C8B-B14F-4D97-AF65-F5344CB8AC3E}">
-        <p14:creationId xmlns:p14="http://schemas.microsoft.com/office/powerpoint/2010/main" val="1031170893"/>
+        <p14:creationId xmlns:p14="http://schemas.microsoft.com/office/powerpoint/2010/main" val="474133971"/>
       </p:ext>
     </p:extLst>
   </p:cSld>
@@ -17129,7 +17344,9 @@
         </p:nvSpPr>
         <p:spPr/>
         <p:txBody>
-          <a:bodyPr/>
+          <a:bodyPr>
+            <a:normAutofit/>
+          </a:bodyPr>
           <a:lstStyle/>
           <a:p>
             <a:r>
@@ -17141,40 +17358,22 @@
             <a:pPr lvl="1"/>
             <a:r>
               <a:rPr lang="en-US" dirty="0"/>
-              <a:t>For this Scikit-Learn trainer, the alpha term is used for regularization.</a:t>
+              <a:t>Each weight should be as close to zero as possible.</a:t>
             </a:r>
           </a:p>
           <a:p>
             <a:pPr lvl="1"/>
             <a:r>
               <a:rPr lang="en-US" dirty="0"/>
-              <a:t>Increasing alpha moves each feature’s weight more towards zero.</a:t>
-            </a:r>
-          </a:p>
-          <a:p>
-            <a:pPr lvl="2"/>
-            <a:r>
-              <a:rPr lang="en-US" dirty="0"/>
-              <a:t>This may help make the model more generalized, which will help overfitting.</a:t>
-            </a:r>
-          </a:p>
-          <a:p>
-            <a:pPr lvl="2"/>
-            <a:r>
-              <a:rPr lang="en-US" dirty="0"/>
-              <a:t>This will decrease training set performance.</a:t>
-            </a:r>
-          </a:p>
-          <a:p>
-            <a:endParaRPr lang="en-US" dirty="0"/>
+              <a:t>Each feature will have as little affect on the prediction as possible.</a:t>
+            </a:r>
           </a:p>
           <a:p>
             <a:pPr lvl="1"/>
-            <a:endParaRPr lang="en-US" dirty="0"/>
-          </a:p>
-          <a:p>
-            <a:pPr lvl="2"/>
-            <a:endParaRPr lang="en-US" dirty="0"/>
+            <a:r>
+              <a:rPr lang="en-US" dirty="0"/>
+              <a:t>Note that the feature weights will not be exactly zero using this trainer, so each feature still affects the prediction.</a:t>
+            </a:r>
           </a:p>
           <a:p>
             <a:pPr lvl="2"/>
@@ -17188,7 +17387,7 @@
     </p:spTree>
     <p:extLst>
       <p:ext uri="{BB962C8B-B14F-4D97-AF65-F5344CB8AC3E}">
-        <p14:creationId xmlns:p14="http://schemas.microsoft.com/office/powerpoint/2010/main" val="4041600192"/>
+        <p14:creationId xmlns:p14="http://schemas.microsoft.com/office/powerpoint/2010/main" val="3620252848"/>
       </p:ext>
     </p:extLst>
   </p:cSld>
@@ -17285,30 +17484,29 @@
             <a:pPr lvl="1"/>
             <a:r>
               <a:rPr lang="en-US" dirty="0"/>
-              <a:t>Increasing alpha more and more will not necessarily make the model more predictive.</a:t>
+              <a:t>Attempting to minimize the weight magnitudes is a form of regularization.</a:t>
+            </a:r>
+          </a:p>
+          <a:p>
+            <a:pPr lvl="2"/>
+            <a:r>
+              <a:rPr lang="en-US" dirty="0"/>
+              <a:t>Regularization is used to attempt to prevent overfitting.</a:t>
             </a:r>
           </a:p>
           <a:p>
             <a:pPr lvl="1"/>
             <a:r>
               <a:rPr lang="en-US" dirty="0"/>
-              <a:t>Alpha will need tuned for an optimal model.</a:t>
+              <a:t>This trainer uses L2 regularization</a:t>
             </a:r>
           </a:p>
           <a:p>
             <a:pPr lvl="2"/>
-            <a:endParaRPr lang="en-US" dirty="0"/>
-          </a:p>
-          <a:p>
-            <a:endParaRPr lang="en-US" dirty="0"/>
-          </a:p>
-          <a:p>
-            <a:pPr lvl="1"/>
-            <a:endParaRPr lang="en-US" dirty="0"/>
-          </a:p>
-          <a:p>
-            <a:pPr lvl="2"/>
-            <a:endParaRPr lang="en-US" dirty="0"/>
+            <a:r>
+              <a:rPr lang="en-US" dirty="0"/>
+              <a:t>The sum of the square of the weight coefficient for each feature is used as a penalty term in determining model accuracy.</a:t>
+            </a:r>
           </a:p>
           <a:p>
             <a:pPr lvl="2"/>
@@ -17322,7 +17520,7 @@
     </p:spTree>
     <p:extLst>
       <p:ext uri="{BB962C8B-B14F-4D97-AF65-F5344CB8AC3E}">
-        <p14:creationId xmlns:p14="http://schemas.microsoft.com/office/powerpoint/2010/main" val="52183678"/>
+        <p14:creationId xmlns:p14="http://schemas.microsoft.com/office/powerpoint/2010/main" val="1031170893"/>
       </p:ext>
     </p:extLst>
   </p:cSld>
@@ -17412,16 +17610,36 @@
           <a:p>
             <a:r>
               <a:rPr lang="en-US" dirty="0"/>
-              <a:t>In-Class Example – Ridge Regression</a:t>
+              <a:t>Ridge Regression</a:t>
             </a:r>
           </a:p>
           <a:p>
             <a:pPr lvl="1"/>
-            <a:endParaRPr lang="en-US" dirty="0"/>
+            <a:r>
+              <a:rPr lang="en-US" dirty="0"/>
+              <a:t>For this Scikit-Learn trainer, the alpha term is used for regularization.</a:t>
+            </a:r>
+          </a:p>
+          <a:p>
+            <a:pPr lvl="1"/>
+            <a:r>
+              <a:rPr lang="en-US" dirty="0"/>
+              <a:t>Increasing alpha moves each feature’s weight more towards zero.</a:t>
+            </a:r>
           </a:p>
           <a:p>
             <a:pPr lvl="2"/>
-            <a:endParaRPr lang="en-US" dirty="0"/>
+            <a:r>
+              <a:rPr lang="en-US" dirty="0"/>
+              <a:t>This may help make the model more generalized, which will help overfitting.</a:t>
+            </a:r>
+          </a:p>
+          <a:p>
+            <a:pPr lvl="2"/>
+            <a:r>
+              <a:rPr lang="en-US" dirty="0"/>
+              <a:t>This will decrease training set performance.</a:t>
+            </a:r>
           </a:p>
           <a:p>
             <a:endParaRPr lang="en-US" dirty="0"/>
@@ -17446,7 +17664,7 @@
     </p:spTree>
     <p:extLst>
       <p:ext uri="{BB962C8B-B14F-4D97-AF65-F5344CB8AC3E}">
-        <p14:creationId xmlns:p14="http://schemas.microsoft.com/office/powerpoint/2010/main" val="1030170644"/>
+        <p14:creationId xmlns:p14="http://schemas.microsoft.com/office/powerpoint/2010/main" val="4041600192"/>
       </p:ext>
     </p:extLst>
   </p:cSld>
@@ -17679,14 +17897,21 @@
           <a:p>
             <a:r>
               <a:rPr lang="en-US" dirty="0"/>
-              <a:t>In-Class Exercise</a:t>
+              <a:t>Ridge Regression</a:t>
             </a:r>
           </a:p>
           <a:p>
             <a:pPr lvl="1"/>
             <a:r>
               <a:rPr lang="en-US" dirty="0"/>
-              <a:t>Run the example with ridge regression, attempting to optimize the test prediction data set by adjusting alpha.</a:t>
+              <a:t>Increasing alpha more and more will not necessarily make the model more predictive.</a:t>
+            </a:r>
+          </a:p>
+          <a:p>
+            <a:pPr lvl="1"/>
+            <a:r>
+              <a:rPr lang="en-US" dirty="0"/>
+              <a:t>Alpha will need tuned for an optimal model.</a:t>
             </a:r>
           </a:p>
           <a:p>
@@ -17716,7 +17941,7 @@
     </p:spTree>
     <p:extLst>
       <p:ext uri="{BB962C8B-B14F-4D97-AF65-F5344CB8AC3E}">
-        <p14:creationId xmlns:p14="http://schemas.microsoft.com/office/powerpoint/2010/main" val="2651109508"/>
+        <p14:creationId xmlns:p14="http://schemas.microsoft.com/office/powerpoint/2010/main" val="52183678"/>
       </p:ext>
     </p:extLst>
   </p:cSld>
@@ -17806,39 +18031,26 @@
           <a:p>
             <a:r>
               <a:rPr lang="en-US" dirty="0"/>
-              <a:t>LASSO Regression</a:t>
+              <a:t>In-Class Example – Ridge Regression</a:t>
             </a:r>
           </a:p>
           <a:p>
             <a:pPr lvl="1"/>
-            <a:r>
-              <a:rPr lang="en-US" dirty="0"/>
-              <a:t>Similar to ridge regression, uses a modified OLS algorithm that attempts to make each weight close to zero.</a:t>
-            </a:r>
+            <a:endParaRPr lang="en-US" dirty="0"/>
+          </a:p>
+          <a:p>
+            <a:pPr lvl="2"/>
+            <a:endParaRPr lang="en-US" dirty="0"/>
+          </a:p>
+          <a:p>
+            <a:endParaRPr lang="en-US" dirty="0"/>
           </a:p>
           <a:p>
             <a:pPr lvl="1"/>
-            <a:r>
-              <a:rPr lang="en-US" dirty="0"/>
-              <a:t>In this trainer, a weight value can be zero, so that a feature will not affect the prediction.</a:t>
-            </a:r>
-          </a:p>
-          <a:p>
-            <a:pPr lvl="1"/>
-            <a:r>
-              <a:rPr lang="en-US" dirty="0"/>
-              <a:t>This trainer uses L1 regularization.</a:t>
-            </a:r>
+            <a:endParaRPr lang="en-US" dirty="0"/>
           </a:p>
           <a:p>
             <a:pPr lvl="2"/>
-            <a:r>
-              <a:rPr lang="en-US" dirty="0"/>
-              <a:t>The sum of the weight coefficient for each feature is used as a penalty term in determining model accuracy.</a:t>
-            </a:r>
-          </a:p>
-          <a:p>
-            <a:pPr lvl="1"/>
             <a:endParaRPr lang="en-US" dirty="0"/>
           </a:p>
           <a:p>
@@ -17853,7 +18065,7 @@
     </p:spTree>
     <p:extLst>
       <p:ext uri="{BB962C8B-B14F-4D97-AF65-F5344CB8AC3E}">
-        <p14:creationId xmlns:p14="http://schemas.microsoft.com/office/powerpoint/2010/main" val="2833183138"/>
+        <p14:creationId xmlns:p14="http://schemas.microsoft.com/office/powerpoint/2010/main" val="1030170644"/>
       </p:ext>
     </p:extLst>
   </p:cSld>
@@ -17943,18 +18155,29 @@
           <a:p>
             <a:r>
               <a:rPr lang="en-US" dirty="0"/>
-              <a:t>LASSO Regression</a:t>
+              <a:t>In-Class Exercise</a:t>
             </a:r>
           </a:p>
           <a:p>
             <a:pPr lvl="1"/>
             <a:r>
               <a:rPr lang="en-US" dirty="0"/>
-              <a:t>For this Scikit-Learn trainer, the alpha term is also used for regularization.</a:t>
-            </a:r>
+              <a:t>Run the example with ridge regression, attempting to optimize the test prediction data set by adjusting alpha.</a:t>
+            </a:r>
+          </a:p>
+          <a:p>
+            <a:pPr lvl="2"/>
+            <a:endParaRPr lang="en-US" dirty="0"/>
+          </a:p>
+          <a:p>
+            <a:endParaRPr lang="en-US" dirty="0"/>
           </a:p>
           <a:p>
             <a:pPr lvl="1"/>
+            <a:endParaRPr lang="en-US" dirty="0"/>
+          </a:p>
+          <a:p>
+            <a:pPr lvl="2"/>
             <a:endParaRPr lang="en-US" dirty="0"/>
           </a:p>
           <a:p>
@@ -17969,7 +18192,7 @@
     </p:spTree>
     <p:extLst>
       <p:ext uri="{BB962C8B-B14F-4D97-AF65-F5344CB8AC3E}">
-        <p14:creationId xmlns:p14="http://schemas.microsoft.com/office/powerpoint/2010/main" val="2503353380"/>
+        <p14:creationId xmlns:p14="http://schemas.microsoft.com/office/powerpoint/2010/main" val="2651109508"/>
       </p:ext>
     </p:extLst>
   </p:cSld>
@@ -18059,26 +18282,39 @@
           <a:p>
             <a:r>
               <a:rPr lang="en-US" dirty="0"/>
-              <a:t>In-Class Example – LASSO Regression</a:t>
+              <a:t>LASSO Regression</a:t>
             </a:r>
           </a:p>
           <a:p>
             <a:pPr lvl="1"/>
-            <a:endParaRPr lang="en-US" dirty="0"/>
+            <a:r>
+              <a:rPr lang="en-US" dirty="0"/>
+              <a:t>Similar to ridge regression, uses a modified OLS algorithm that attempts to make each weight close to zero.</a:t>
+            </a:r>
+          </a:p>
+          <a:p>
+            <a:pPr lvl="1"/>
+            <a:r>
+              <a:rPr lang="en-US" dirty="0"/>
+              <a:t>In this trainer, a weight value can be zero, so that a feature will not affect the prediction.</a:t>
+            </a:r>
+          </a:p>
+          <a:p>
+            <a:pPr lvl="1"/>
+            <a:r>
+              <a:rPr lang="en-US" dirty="0"/>
+              <a:t>This trainer uses L1 regularization.</a:t>
+            </a:r>
           </a:p>
           <a:p>
             <a:pPr lvl="2"/>
-            <a:endParaRPr lang="en-US" dirty="0"/>
-          </a:p>
-          <a:p>
-            <a:endParaRPr lang="en-US" dirty="0"/>
+            <a:r>
+              <a:rPr lang="en-US" dirty="0"/>
+              <a:t>The sum of the weight coefficient for each feature is used as a penalty term in determining model accuracy.</a:t>
+            </a:r>
           </a:p>
           <a:p>
             <a:pPr lvl="1"/>
-            <a:endParaRPr lang="en-US" dirty="0"/>
-          </a:p>
-          <a:p>
-            <a:pPr lvl="2"/>
             <a:endParaRPr lang="en-US" dirty="0"/>
           </a:p>
           <a:p>
@@ -18093,7 +18329,7 @@
     </p:spTree>
     <p:extLst>
       <p:ext uri="{BB962C8B-B14F-4D97-AF65-F5344CB8AC3E}">
-        <p14:creationId xmlns:p14="http://schemas.microsoft.com/office/powerpoint/2010/main" val="1318670462"/>
+        <p14:creationId xmlns:p14="http://schemas.microsoft.com/office/powerpoint/2010/main" val="2833183138"/>
       </p:ext>
     </p:extLst>
   </p:cSld>
@@ -18183,44 +18419,18 @@
           <a:p>
             <a:r>
               <a:rPr lang="en-US" dirty="0"/>
-              <a:t>In-Class Exercise</a:t>
+              <a:t>LASSO Regression</a:t>
             </a:r>
           </a:p>
           <a:p>
             <a:pPr lvl="1"/>
             <a:r>
               <a:rPr lang="en-US" dirty="0"/>
-              <a:t>Generate models for the </a:t>
-            </a:r>
-            <a:r>
-              <a:rPr lang="en-US" dirty="0" err="1"/>
-              <a:t>boston</a:t>
-            </a:r>
-            <a:r>
-              <a:rPr lang="en-US" dirty="0"/>
-              <a:t> housing data using linear, ridge, and LASSO regressors.  For models that use regularization, attempt to optimize the predictions (can use previous example code).</a:t>
+              <a:t>For this Scikit-Learn trainer, the alpha term is also used for regularization.</a:t>
             </a:r>
           </a:p>
           <a:p>
             <a:pPr lvl="1"/>
-            <a:r>
-              <a:rPr lang="en-US" dirty="0"/>
-              <a:t>Which model is the most accurate with respect to test data predictions?  Are there benefits to the models that are less accurate?</a:t>
-            </a:r>
-          </a:p>
-          <a:p>
-            <a:pPr lvl="2"/>
-            <a:endParaRPr lang="en-US" dirty="0"/>
-          </a:p>
-          <a:p>
-            <a:endParaRPr lang="en-US" dirty="0"/>
-          </a:p>
-          <a:p>
-            <a:pPr lvl="1"/>
-            <a:endParaRPr lang="en-US" dirty="0"/>
-          </a:p>
-          <a:p>
-            <a:pPr lvl="2"/>
             <a:endParaRPr lang="en-US" dirty="0"/>
           </a:p>
           <a:p>
@@ -18235,7 +18445,7 @@
     </p:spTree>
     <p:extLst>
       <p:ext uri="{BB962C8B-B14F-4D97-AF65-F5344CB8AC3E}">
-        <p14:creationId xmlns:p14="http://schemas.microsoft.com/office/powerpoint/2010/main" val="2777821716"/>
+        <p14:creationId xmlns:p14="http://schemas.microsoft.com/office/powerpoint/2010/main" val="2503353380"/>
       </p:ext>
     </p:extLst>
   </p:cSld>
@@ -18325,8 +18535,27 @@
           <a:p>
             <a:r>
               <a:rPr lang="en-US" dirty="0"/>
-              <a:t>Decision Tree</a:t>
-            </a:r>
+              <a:t>In-Class Example – LASSO Regression</a:t>
+            </a:r>
+          </a:p>
+          <a:p>
+            <a:pPr lvl="1"/>
+            <a:endParaRPr lang="en-US" dirty="0"/>
+          </a:p>
+          <a:p>
+            <a:pPr lvl="2"/>
+            <a:endParaRPr lang="en-US" dirty="0"/>
+          </a:p>
+          <a:p>
+            <a:endParaRPr lang="en-US" dirty="0"/>
+          </a:p>
+          <a:p>
+            <a:pPr lvl="1"/>
+            <a:endParaRPr lang="en-US" dirty="0"/>
+          </a:p>
+          <a:p>
+            <a:pPr lvl="2"/>
+            <a:endParaRPr lang="en-US" dirty="0"/>
           </a:p>
           <a:p>
             <a:pPr lvl="2"/>
@@ -18340,7 +18569,7 @@
     </p:spTree>
     <p:extLst>
       <p:ext uri="{BB962C8B-B14F-4D97-AF65-F5344CB8AC3E}">
-        <p14:creationId xmlns:p14="http://schemas.microsoft.com/office/powerpoint/2010/main" val="1924952010"/>
+        <p14:creationId xmlns:p14="http://schemas.microsoft.com/office/powerpoint/2010/main" val="1318670462"/>
       </p:ext>
     </p:extLst>
   </p:cSld>
@@ -18430,8 +18659,45 @@
           <a:p>
             <a:r>
               <a:rPr lang="en-US" dirty="0"/>
-              <a:t>Forest</a:t>
-            </a:r>
+              <a:t>In-Class Exercise</a:t>
+            </a:r>
+          </a:p>
+          <a:p>
+            <a:pPr lvl="1"/>
+            <a:r>
+              <a:rPr lang="en-US" dirty="0"/>
+              <a:t>Generate models for the </a:t>
+            </a:r>
+            <a:r>
+              <a:rPr lang="en-US" dirty="0" err="1"/>
+              <a:t>boston</a:t>
+            </a:r>
+            <a:r>
+              <a:rPr lang="en-US" dirty="0"/>
+              <a:t> housing data using linear, ridge, and LASSO regressors.  For models that use regularization, attempt to optimize the predictions (can use previous example code).</a:t>
+            </a:r>
+          </a:p>
+          <a:p>
+            <a:pPr lvl="1"/>
+            <a:r>
+              <a:rPr lang="en-US" dirty="0"/>
+              <a:t>Which model is the most accurate with respect to test data predictions?  Are there benefits to the models that are less accurate?</a:t>
+            </a:r>
+          </a:p>
+          <a:p>
+            <a:pPr lvl="2"/>
+            <a:endParaRPr lang="en-US" dirty="0"/>
+          </a:p>
+          <a:p>
+            <a:endParaRPr lang="en-US" dirty="0"/>
+          </a:p>
+          <a:p>
+            <a:pPr lvl="1"/>
+            <a:endParaRPr lang="en-US" dirty="0"/>
+          </a:p>
+          <a:p>
+            <a:pPr lvl="2"/>
+            <a:endParaRPr lang="en-US" dirty="0"/>
           </a:p>
           <a:p>
             <a:pPr lvl="2"/>
@@ -18445,7 +18711,7 @@
     </p:spTree>
     <p:extLst>
       <p:ext uri="{BB962C8B-B14F-4D97-AF65-F5344CB8AC3E}">
-        <p14:creationId xmlns:p14="http://schemas.microsoft.com/office/powerpoint/2010/main" val="358457677"/>
+        <p14:creationId xmlns:p14="http://schemas.microsoft.com/office/powerpoint/2010/main" val="2777821716"/>
       </p:ext>
     </p:extLst>
   </p:cSld>
@@ -18535,7 +18801,7 @@
           <a:p>
             <a:r>
               <a:rPr lang="en-US" dirty="0"/>
-              <a:t>Gradient-Boosted Forest</a:t>
+              <a:t>Decision Tree</a:t>
             </a:r>
           </a:p>
           <a:p>
@@ -18550,7 +18816,7 @@
     </p:spTree>
     <p:extLst>
       <p:ext uri="{BB962C8B-B14F-4D97-AF65-F5344CB8AC3E}">
-        <p14:creationId xmlns:p14="http://schemas.microsoft.com/office/powerpoint/2010/main" val="1436682753"/>
+        <p14:creationId xmlns:p14="http://schemas.microsoft.com/office/powerpoint/2010/main" val="1924952010"/>
       </p:ext>
     </p:extLst>
   </p:cSld>
@@ -18618,7 +18884,7 @@
           <a:p>
             <a:r>
               <a:rPr lang="en-US" dirty="0"/>
-              <a:t>Dataset Preparation</a:t>
+              <a:t>Linear Models - Regressors</a:t>
             </a:r>
           </a:p>
         </p:txBody>
@@ -18640,29 +18906,22 @@
           <a:p>
             <a:r>
               <a:rPr lang="en-US" dirty="0"/>
-              <a:t>Overview</a:t>
-            </a:r>
-          </a:p>
-          <a:p>
-            <a:pPr lvl="1"/>
-            <a:r>
-              <a:rPr lang="en-US" dirty="0"/>
-              <a:t>Train Test Split</a:t>
-            </a:r>
-          </a:p>
-          <a:p>
-            <a:pPr lvl="1"/>
-            <a:r>
-              <a:rPr lang="en-US" dirty="0"/>
-              <a:t>Cross Validation</a:t>
-            </a:r>
+              <a:t>Forest</a:t>
+            </a:r>
+          </a:p>
+          <a:p>
+            <a:pPr lvl="2"/>
+            <a:endParaRPr lang="en-US" dirty="0"/>
+          </a:p>
+          <a:p>
+            <a:endParaRPr lang="en-US" dirty="0"/>
           </a:p>
         </p:txBody>
       </p:sp>
     </p:spTree>
     <p:extLst>
       <p:ext uri="{BB962C8B-B14F-4D97-AF65-F5344CB8AC3E}">
-        <p14:creationId xmlns:p14="http://schemas.microsoft.com/office/powerpoint/2010/main" val="4053921630"/>
+        <p14:creationId xmlns:p14="http://schemas.microsoft.com/office/powerpoint/2010/main" val="358457677"/>
       </p:ext>
     </p:extLst>
   </p:cSld>
@@ -18730,7 +18989,7 @@
           <a:p>
             <a:r>
               <a:rPr lang="en-US" dirty="0"/>
-              <a:t>Evaluating Accuracy</a:t>
+              <a:t>Linear Models - Regressors</a:t>
             </a:r>
           </a:p>
         </p:txBody>
@@ -18747,105 +19006,27 @@
         </p:nvSpPr>
         <p:spPr/>
         <p:txBody>
-          <a:bodyPr>
-            <a:normAutofit fontScale="92500" lnSpcReduction="20000"/>
-          </a:bodyPr>
-          <a:lstStyle/>
-          <a:p>
-            <a:r>
-              <a:rPr lang="en-US" dirty="0"/>
-              <a:t>Overview</a:t>
-            </a:r>
-          </a:p>
-          <a:p>
-            <a:pPr lvl="1"/>
-            <a:r>
-              <a:rPr lang="en-US" dirty="0"/>
-              <a:t>Accuracy</a:t>
+          <a:bodyPr/>
+          <a:lstStyle/>
+          <a:p>
+            <a:r>
+              <a:rPr lang="en-US" dirty="0"/>
+              <a:t>Gradient-Boosted Forest</a:t>
             </a:r>
           </a:p>
           <a:p>
             <a:pPr lvl="2"/>
-            <a:r>
-              <a:rPr lang="en-US" dirty="0"/>
-              <a:t>score()</a:t>
-            </a:r>
-          </a:p>
-          <a:p>
-            <a:pPr lvl="1"/>
-            <a:r>
-              <a:rPr lang="en-US" dirty="0"/>
-              <a:t>Mean Squared Error</a:t>
-            </a:r>
-          </a:p>
-          <a:p>
-            <a:pPr lvl="2"/>
-            <a:r>
-              <a:rPr lang="en-US" dirty="0" err="1"/>
-              <a:t>mse</a:t>
-            </a:r>
-            <a:endParaRPr lang="en-US" dirty="0"/>
-          </a:p>
-          <a:p>
-            <a:pPr lvl="1"/>
-            <a:r>
-              <a:rPr lang="en-US" dirty="0"/>
-              <a:t>Precision Recall Curves</a:t>
-            </a:r>
-          </a:p>
-          <a:p>
-            <a:pPr lvl="2"/>
-            <a:r>
-              <a:rPr lang="en-US" dirty="0" err="1"/>
-              <a:t>precision_recall_curve</a:t>
-            </a:r>
-            <a:r>
-              <a:rPr lang="en-US" dirty="0"/>
-              <a:t>()</a:t>
-            </a:r>
-          </a:p>
-          <a:p>
-            <a:pPr lvl="1"/>
-            <a:r>
-              <a:rPr lang="en-US" dirty="0"/>
-              <a:t>Receiver Operating Characteristics (ROC) Curve</a:t>
-            </a:r>
-          </a:p>
-          <a:p>
-            <a:pPr lvl="2"/>
-            <a:r>
-              <a:rPr lang="en-US" dirty="0" err="1"/>
-              <a:t>roc_curve</a:t>
-            </a:r>
-            <a:r>
-              <a:rPr lang="en-US" dirty="0"/>
-              <a:t>()</a:t>
-            </a:r>
-          </a:p>
-          <a:p>
-            <a:pPr lvl="1"/>
-            <a:r>
-              <a:rPr lang="en-US" dirty="0"/>
-              <a:t>Area Under the Curve (AUC)</a:t>
-            </a:r>
-          </a:p>
-          <a:p>
-            <a:pPr lvl="2"/>
-            <a:r>
-              <a:rPr lang="en-US" dirty="0" err="1"/>
-              <a:t>roc_auc_score</a:t>
-            </a:r>
-            <a:r>
-              <a:rPr lang="en-US" dirty="0"/>
-              <a:t>()</a:t>
-            </a:r>
+            <a:endParaRPr lang="en-US" dirty="0"/>
+          </a:p>
+          <a:p>
+            <a:endParaRPr lang="en-US" dirty="0"/>
           </a:p>
         </p:txBody>
       </p:sp>
     </p:spTree>
     <p:extLst>
       <p:ext uri="{BB962C8B-B14F-4D97-AF65-F5344CB8AC3E}">
-        <p14:creationId xmlns:p14="http://schemas.microsoft.com/office/powerpoint/2010/main" val="3169363239"/>
+        <p14:creationId xmlns:p14="http://schemas.microsoft.com/office/powerpoint/2010/main" val="1436682753"/>
       </p:ext>
     </p:extLst>
   </p:cSld>
@@ -19174,12 +19355,8 @@
           <a:lstStyle/>
           <a:p>
             <a:r>
-              <a:rPr lang="en-US" dirty="0" err="1"/>
-              <a:t>Scikit</a:t>
-            </a:r>
-            <a:r>
-              <a:rPr lang="en-US" dirty="0"/>
-              <a:t>-Learn Machine Learning</a:t>
+              <a:rPr lang="en-US" dirty="0"/>
+              <a:t>Dataset Preparation</a:t>
             </a:r>
           </a:p>
         </p:txBody>
@@ -19208,50 +19385,22 @@
             <a:pPr lvl="1"/>
             <a:r>
               <a:rPr lang="en-US" dirty="0"/>
-              <a:t>Definition</a:t>
+              <a:t>Train Test Split</a:t>
             </a:r>
           </a:p>
           <a:p>
             <a:pPr lvl="1"/>
             <a:r>
               <a:rPr lang="en-US" dirty="0"/>
-              <a:t>General Types</a:t>
-            </a:r>
-          </a:p>
-          <a:p>
-            <a:pPr lvl="1"/>
-            <a:r>
-              <a:rPr lang="en-US" dirty="0"/>
-              <a:t>Basic Linear Models</a:t>
-            </a:r>
-          </a:p>
-          <a:p>
-            <a:pPr lvl="1"/>
-            <a:r>
-              <a:rPr lang="en-US" dirty="0"/>
-              <a:t>Algorithm Types</a:t>
-            </a:r>
-          </a:p>
-          <a:p>
-            <a:pPr lvl="1"/>
-            <a:r>
-              <a:rPr lang="en-US" dirty="0"/>
-              <a:t>Tuning</a:t>
-            </a:r>
-          </a:p>
-          <a:p>
-            <a:pPr lvl="2"/>
-            <a:endParaRPr lang="en-US" dirty="0"/>
-          </a:p>
-          <a:p>
-            <a:endParaRPr lang="en-US" dirty="0"/>
+              <a:t>Cross Validation</a:t>
+            </a:r>
           </a:p>
         </p:txBody>
       </p:sp>
     </p:spTree>
     <p:extLst>
       <p:ext uri="{BB962C8B-B14F-4D97-AF65-F5344CB8AC3E}">
-        <p14:creationId xmlns:p14="http://schemas.microsoft.com/office/powerpoint/2010/main" val="754999196"/>
+        <p14:creationId xmlns:p14="http://schemas.microsoft.com/office/powerpoint/2010/main" val="4053921630"/>
       </p:ext>
     </p:extLst>
   </p:cSld>
@@ -19319,7 +19468,7 @@
           <a:p>
             <a:r>
               <a:rPr lang="en-US" dirty="0"/>
-              <a:t>Tuning</a:t>
+              <a:t>Evaluating Accuracy</a:t>
             </a:r>
           </a:p>
         </p:txBody>
@@ -19336,39 +19485,105 @@
         </p:nvSpPr>
         <p:spPr/>
         <p:txBody>
-          <a:bodyPr/>
-          <a:lstStyle/>
-          <a:p>
-            <a:r>
-              <a:rPr lang="en-US" dirty="0"/>
-              <a:t>Determining what features matter</a:t>
-            </a:r>
-          </a:p>
-          <a:p>
-            <a:r>
-              <a:rPr lang="en-US" dirty="0"/>
-              <a:t>If both prediction test scores and training scores are low, then the model is suffering from underfitting.</a:t>
-            </a:r>
-          </a:p>
-          <a:p>
-            <a:r>
-              <a:rPr lang="en-US" dirty="0"/>
-              <a:t>If the model has extremely high training scores, but not nearly as high prediction test scores, the model is suffering from overfitting.</a:t>
+          <a:bodyPr>
+            <a:normAutofit fontScale="92500" lnSpcReduction="20000"/>
+          </a:bodyPr>
+          <a:lstStyle/>
+          <a:p>
+            <a:r>
+              <a:rPr lang="en-US" dirty="0"/>
+              <a:t>Overview</a:t>
+            </a:r>
+          </a:p>
+          <a:p>
+            <a:pPr lvl="1"/>
+            <a:r>
+              <a:rPr lang="en-US" dirty="0"/>
+              <a:t>Accuracy</a:t>
             </a:r>
           </a:p>
           <a:p>
             <a:pPr lvl="2"/>
-            <a:endParaRPr lang="en-US" dirty="0"/>
-          </a:p>
-          <a:p>
-            <a:endParaRPr lang="en-US" dirty="0"/>
+            <a:r>
+              <a:rPr lang="en-US" dirty="0"/>
+              <a:t>score()</a:t>
+            </a:r>
+          </a:p>
+          <a:p>
+            <a:pPr lvl="1"/>
+            <a:r>
+              <a:rPr lang="en-US" dirty="0"/>
+              <a:t>Mean Squared Error</a:t>
+            </a:r>
+          </a:p>
+          <a:p>
+            <a:pPr lvl="2"/>
+            <a:r>
+              <a:rPr lang="en-US" dirty="0" err="1"/>
+              <a:t>mse</a:t>
+            </a:r>
+            <a:endParaRPr lang="en-US" dirty="0"/>
+          </a:p>
+          <a:p>
+            <a:pPr lvl="1"/>
+            <a:r>
+              <a:rPr lang="en-US" dirty="0"/>
+              <a:t>Precision Recall Curves</a:t>
+            </a:r>
+          </a:p>
+          <a:p>
+            <a:pPr lvl="2"/>
+            <a:r>
+              <a:rPr lang="en-US" dirty="0" err="1"/>
+              <a:t>precision_recall_curve</a:t>
+            </a:r>
+            <a:r>
+              <a:rPr lang="en-US" dirty="0"/>
+              <a:t>()</a:t>
+            </a:r>
+          </a:p>
+          <a:p>
+            <a:pPr lvl="1"/>
+            <a:r>
+              <a:rPr lang="en-US" dirty="0"/>
+              <a:t>Receiver Operating Characteristics (ROC) Curve</a:t>
+            </a:r>
+          </a:p>
+          <a:p>
+            <a:pPr lvl="2"/>
+            <a:r>
+              <a:rPr lang="en-US" dirty="0" err="1"/>
+              <a:t>roc_curve</a:t>
+            </a:r>
+            <a:r>
+              <a:rPr lang="en-US" dirty="0"/>
+              <a:t>()</a:t>
+            </a:r>
+          </a:p>
+          <a:p>
+            <a:pPr lvl="1"/>
+            <a:r>
+              <a:rPr lang="en-US" dirty="0"/>
+              <a:t>Area Under the Curve (AUC)</a:t>
+            </a:r>
+          </a:p>
+          <a:p>
+            <a:pPr lvl="2"/>
+            <a:r>
+              <a:rPr lang="en-US" dirty="0" err="1"/>
+              <a:t>roc_auc_score</a:t>
+            </a:r>
+            <a:r>
+              <a:rPr lang="en-US" dirty="0"/>
+              <a:t>()</a:t>
+            </a:r>
           </a:p>
         </p:txBody>
       </p:sp>
     </p:spTree>
     <p:extLst>
       <p:ext uri="{BB962C8B-B14F-4D97-AF65-F5344CB8AC3E}">
-        <p14:creationId xmlns:p14="http://schemas.microsoft.com/office/powerpoint/2010/main" val="3393037686"/>
+        <p14:creationId xmlns:p14="http://schemas.microsoft.com/office/powerpoint/2010/main" val="3169363239"/>
       </p:ext>
     </p:extLst>
   </p:cSld>
@@ -19435,51 +19650,69 @@
           <a:lstStyle/>
           <a:p>
             <a:r>
+              <a:rPr lang="en-US" dirty="0" err="1"/>
+              <a:t>Scikit</a:t>
+            </a:r>
+            <a:r>
+              <a:rPr lang="en-US" dirty="0"/>
+              <a:t>-Learn Machine Learning</a:t>
+            </a:r>
+          </a:p>
+        </p:txBody>
+      </p:sp>
+      <p:sp>
+        <p:nvSpPr>
+          <p:cNvPr id="3" name="Content Placeholder 2"/>
+          <p:cNvSpPr>
+            <a:spLocks noGrp="1"/>
+          </p:cNvSpPr>
+          <p:nvPr>
+            <p:ph idx="1"/>
+          </p:nvPr>
+        </p:nvSpPr>
+        <p:spPr/>
+        <p:txBody>
+          <a:bodyPr/>
+          <a:lstStyle/>
+          <a:p>
+            <a:r>
+              <a:rPr lang="en-US" dirty="0"/>
+              <a:t>Overview</a:t>
+            </a:r>
+          </a:p>
+          <a:p>
+            <a:pPr lvl="1"/>
+            <a:r>
+              <a:rPr lang="en-US" dirty="0"/>
+              <a:t>Definition</a:t>
+            </a:r>
+          </a:p>
+          <a:p>
+            <a:pPr lvl="1"/>
+            <a:r>
+              <a:rPr lang="en-US" dirty="0"/>
+              <a:t>General Types</a:t>
+            </a:r>
+          </a:p>
+          <a:p>
+            <a:pPr lvl="1"/>
+            <a:r>
+              <a:rPr lang="en-US" dirty="0"/>
+              <a:t>Basic Linear Models</a:t>
+            </a:r>
+          </a:p>
+          <a:p>
+            <a:pPr lvl="1"/>
+            <a:r>
+              <a:rPr lang="en-US" dirty="0"/>
+              <a:t>Algorithm Types</a:t>
+            </a:r>
+          </a:p>
+          <a:p>
+            <a:pPr lvl="1"/>
+            <a:r>
               <a:rPr lang="en-US" dirty="0"/>
               <a:t>Tuning</a:t>
-            </a:r>
-          </a:p>
-        </p:txBody>
-      </p:sp>
-      <p:sp>
-        <p:nvSpPr>
-          <p:cNvPr id="3" name="Content Placeholder 2"/>
-          <p:cNvSpPr>
-            <a:spLocks noGrp="1"/>
-          </p:cNvSpPr>
-          <p:nvPr>
-            <p:ph idx="1"/>
-          </p:nvPr>
-        </p:nvSpPr>
-        <p:spPr/>
-        <p:txBody>
-          <a:bodyPr/>
-          <a:lstStyle/>
-          <a:p>
-            <a:r>
-              <a:rPr lang="en-US" dirty="0"/>
-              <a:t>Parameters to Play with</a:t>
-            </a:r>
-          </a:p>
-          <a:p>
-            <a:pPr lvl="1"/>
-            <a:r>
-              <a:rPr lang="en-US" dirty="0"/>
-              <a:t>K-Nearest Neighbors</a:t>
-            </a:r>
-          </a:p>
-          <a:p>
-            <a:pPr lvl="2"/>
-            <a:r>
-              <a:rPr lang="en-US" dirty="0"/>
-              <a:t>Number of neighbors to test point</a:t>
-            </a:r>
-          </a:p>
-          <a:p>
-            <a:pPr lvl="2"/>
-            <a:r>
-              <a:rPr lang="en-US" dirty="0"/>
-              <a:t>Algorithm to evaluate distance test point is from data points</a:t>
             </a:r>
           </a:p>
           <a:p>
@@ -19494,7 +19727,7 @@
     </p:spTree>
     <p:extLst>
       <p:ext uri="{BB962C8B-B14F-4D97-AF65-F5344CB8AC3E}">
-        <p14:creationId xmlns:p14="http://schemas.microsoft.com/office/powerpoint/2010/main" val="274238177"/>
+        <p14:creationId xmlns:p14="http://schemas.microsoft.com/office/powerpoint/2010/main" val="754999196"/>
       </p:ext>
     </p:extLst>
   </p:cSld>
@@ -19584,7 +19817,19 @@
           <a:p>
             <a:r>
               <a:rPr lang="en-US" dirty="0"/>
-              <a:t>Grid Search</a:t>
+              <a:t>Determining what features matter</a:t>
+            </a:r>
+          </a:p>
+          <a:p>
+            <a:r>
+              <a:rPr lang="en-US" dirty="0"/>
+              <a:t>If both prediction test scores and training scores are low, then the model is suffering from underfitting.</a:t>
+            </a:r>
+          </a:p>
+          <a:p>
+            <a:r>
+              <a:rPr lang="en-US" dirty="0"/>
+              <a:t>If the model has extremely high training scores, but not nearly as high prediction test scores, the model is suffering from overfitting.</a:t>
             </a:r>
           </a:p>
           <a:p>
@@ -19599,7 +19844,7 @@
     </p:spTree>
     <p:extLst>
       <p:ext uri="{BB962C8B-B14F-4D97-AF65-F5344CB8AC3E}">
-        <p14:creationId xmlns:p14="http://schemas.microsoft.com/office/powerpoint/2010/main" val="2622179278"/>
+        <p14:creationId xmlns:p14="http://schemas.microsoft.com/office/powerpoint/2010/main" val="3393037686"/>
       </p:ext>
     </p:extLst>
   </p:cSld>
@@ -19666,6 +19911,237 @@
           <a:lstStyle/>
           <a:p>
             <a:r>
+              <a:rPr lang="en-US" dirty="0"/>
+              <a:t>Tuning</a:t>
+            </a:r>
+          </a:p>
+        </p:txBody>
+      </p:sp>
+      <p:sp>
+        <p:nvSpPr>
+          <p:cNvPr id="3" name="Content Placeholder 2"/>
+          <p:cNvSpPr>
+            <a:spLocks noGrp="1"/>
+          </p:cNvSpPr>
+          <p:nvPr>
+            <p:ph idx="1"/>
+          </p:nvPr>
+        </p:nvSpPr>
+        <p:spPr/>
+        <p:txBody>
+          <a:bodyPr/>
+          <a:lstStyle/>
+          <a:p>
+            <a:r>
+              <a:rPr lang="en-US" dirty="0"/>
+              <a:t>Parameters to Play with</a:t>
+            </a:r>
+          </a:p>
+          <a:p>
+            <a:pPr lvl="1"/>
+            <a:r>
+              <a:rPr lang="en-US" dirty="0"/>
+              <a:t>K-Nearest Neighbors</a:t>
+            </a:r>
+          </a:p>
+          <a:p>
+            <a:pPr lvl="2"/>
+            <a:r>
+              <a:rPr lang="en-US" dirty="0"/>
+              <a:t>Number of neighbors to test point</a:t>
+            </a:r>
+          </a:p>
+          <a:p>
+            <a:pPr lvl="2"/>
+            <a:r>
+              <a:rPr lang="en-US" dirty="0"/>
+              <a:t>Algorithm to evaluate distance test point is from data points</a:t>
+            </a:r>
+          </a:p>
+          <a:p>
+            <a:pPr lvl="2"/>
+            <a:endParaRPr lang="en-US" dirty="0"/>
+          </a:p>
+          <a:p>
+            <a:endParaRPr lang="en-US" dirty="0"/>
+          </a:p>
+        </p:txBody>
+      </p:sp>
+    </p:spTree>
+    <p:extLst>
+      <p:ext uri="{BB962C8B-B14F-4D97-AF65-F5344CB8AC3E}">
+        <p14:creationId xmlns:p14="http://schemas.microsoft.com/office/powerpoint/2010/main" val="274238177"/>
+      </p:ext>
+    </p:extLst>
+  </p:cSld>
+  <p:clrMapOvr>
+    <a:overrideClrMapping bg1="lt1" tx1="dk1" bg2="lt2" tx2="dk2" accent1="accent1" accent2="accent2" accent3="accent3" accent4="accent4" accent5="accent5" accent6="accent6" hlink="hlink" folHlink="folHlink"/>
+  </p:clrMapOvr>
+</p:sld>
+</file>
+
+<file path=ppt/slides/slide85.xml><?xml version="1.0" encoding="utf-8"?>
+<p:sld xmlns:a="http://schemas.openxmlformats.org/drawingml/2006/main" xmlns:r="http://schemas.openxmlformats.org/officeDocument/2006/relationships" xmlns:p="http://schemas.openxmlformats.org/presentationml/2006/main">
+  <p:cSld>
+    <p:bg>
+      <p:bgPr>
+        <a:blipFill dpi="0" rotWithShape="1">
+          <a:blip r:embed="rId3">
+            <a:extLst>
+              <a:ext uri="{BEBA8EAE-BF5A-486C-A8C5-ECC9F3942E4B}">
+                <a14:imgProps xmlns:a14="http://schemas.microsoft.com/office/drawing/2010/main">
+                  <a14:imgLayer r:embed="rId4">
+                    <a14:imgEffect>
+                      <a14:brightnessContrast bright="-50000"/>
+                    </a14:imgEffect>
+                  </a14:imgLayer>
+                </a14:imgProps>
+              </a:ext>
+            </a:extLst>
+          </a:blip>
+          <a:srcRect/>
+          <a:stretch>
+            <a:fillRect l="-10000" r="-10000"/>
+          </a:stretch>
+        </a:blipFill>
+        <a:effectLst/>
+      </p:bgPr>
+    </p:bg>
+    <p:spTree>
+      <p:nvGrpSpPr>
+        <p:cNvPr id="1" name=""/>
+        <p:cNvGrpSpPr/>
+        <p:nvPr/>
+      </p:nvGrpSpPr>
+      <p:grpSpPr>
+        <a:xfrm>
+          <a:off x="0" y="0"/>
+          <a:ext cx="0" cy="0"/>
+          <a:chOff x="0" y="0"/>
+          <a:chExt cx="0" cy="0"/>
+        </a:xfrm>
+      </p:grpSpPr>
+      <p:sp>
+        <p:nvSpPr>
+          <p:cNvPr id="2" name="Title 1"/>
+          <p:cNvSpPr>
+            <a:spLocks noGrp="1"/>
+          </p:cNvSpPr>
+          <p:nvPr>
+            <p:ph type="title"/>
+          </p:nvPr>
+        </p:nvSpPr>
+        <p:spPr/>
+        <p:txBody>
+          <a:bodyPr/>
+          <a:lstStyle/>
+          <a:p>
+            <a:r>
+              <a:rPr lang="en-US" dirty="0"/>
+              <a:t>Tuning</a:t>
+            </a:r>
+          </a:p>
+        </p:txBody>
+      </p:sp>
+      <p:sp>
+        <p:nvSpPr>
+          <p:cNvPr id="3" name="Content Placeholder 2"/>
+          <p:cNvSpPr>
+            <a:spLocks noGrp="1"/>
+          </p:cNvSpPr>
+          <p:nvPr>
+            <p:ph idx="1"/>
+          </p:nvPr>
+        </p:nvSpPr>
+        <p:spPr/>
+        <p:txBody>
+          <a:bodyPr/>
+          <a:lstStyle/>
+          <a:p>
+            <a:r>
+              <a:rPr lang="en-US" dirty="0"/>
+              <a:t>Grid Search</a:t>
+            </a:r>
+          </a:p>
+          <a:p>
+            <a:pPr lvl="2"/>
+            <a:endParaRPr lang="en-US" dirty="0"/>
+          </a:p>
+          <a:p>
+            <a:endParaRPr lang="en-US" dirty="0"/>
+          </a:p>
+        </p:txBody>
+      </p:sp>
+    </p:spTree>
+    <p:extLst>
+      <p:ext uri="{BB962C8B-B14F-4D97-AF65-F5344CB8AC3E}">
+        <p14:creationId xmlns:p14="http://schemas.microsoft.com/office/powerpoint/2010/main" val="2622179278"/>
+      </p:ext>
+    </p:extLst>
+  </p:cSld>
+  <p:clrMapOvr>
+    <a:overrideClrMapping bg1="lt1" tx1="dk1" bg2="lt2" tx2="dk2" accent1="accent1" accent2="accent2" accent3="accent3" accent4="accent4" accent5="accent5" accent6="accent6" hlink="hlink" folHlink="folHlink"/>
+  </p:clrMapOvr>
+</p:sld>
+</file>
+
+<file path=ppt/slides/slide86.xml><?xml version="1.0" encoding="utf-8"?>
+<p:sld xmlns:a="http://schemas.openxmlformats.org/drawingml/2006/main" xmlns:r="http://schemas.openxmlformats.org/officeDocument/2006/relationships" xmlns:p="http://schemas.openxmlformats.org/presentationml/2006/main">
+  <p:cSld>
+    <p:bg>
+      <p:bgPr>
+        <a:blipFill dpi="0" rotWithShape="1">
+          <a:blip r:embed="rId3">
+            <a:extLst>
+              <a:ext uri="{BEBA8EAE-BF5A-486C-A8C5-ECC9F3942E4B}">
+                <a14:imgProps xmlns:a14="http://schemas.microsoft.com/office/drawing/2010/main">
+                  <a14:imgLayer r:embed="rId4">
+                    <a14:imgEffect>
+                      <a14:brightnessContrast bright="-50000"/>
+                    </a14:imgEffect>
+                  </a14:imgLayer>
+                </a14:imgProps>
+              </a:ext>
+            </a:extLst>
+          </a:blip>
+          <a:srcRect/>
+          <a:stretch>
+            <a:fillRect l="-10000" r="-10000"/>
+          </a:stretch>
+        </a:blipFill>
+        <a:effectLst/>
+      </p:bgPr>
+    </p:bg>
+    <p:spTree>
+      <p:nvGrpSpPr>
+        <p:cNvPr id="1" name=""/>
+        <p:cNvGrpSpPr/>
+        <p:nvPr/>
+      </p:nvGrpSpPr>
+      <p:grpSpPr>
+        <a:xfrm>
+          <a:off x="0" y="0"/>
+          <a:ext cx="0" cy="0"/>
+          <a:chOff x="0" y="0"/>
+          <a:chExt cx="0" cy="0"/>
+        </a:xfrm>
+      </p:grpSpPr>
+      <p:sp>
+        <p:nvSpPr>
+          <p:cNvPr id="2" name="Title 1"/>
+          <p:cNvSpPr>
+            <a:spLocks noGrp="1"/>
+          </p:cNvSpPr>
+          <p:nvPr>
+            <p:ph type="title"/>
+          </p:nvPr>
+        </p:nvSpPr>
+        <p:spPr/>
+        <p:txBody>
+          <a:bodyPr/>
+          <a:lstStyle/>
+          <a:p>
+            <a:r>
               <a:rPr lang="en-US" dirty="0" err="1"/>
               <a:t>Scikit</a:t>
             </a:r>
@@ -19753,7 +20229,7 @@
 </p:sld>
 </file>
 
-<file path=ppt/slides/slide85.xml><?xml version="1.0" encoding="utf-8"?>
+<file path=ppt/slides/slide87.xml><?xml version="1.0" encoding="utf-8"?>
 <p:sld xmlns:a="http://schemas.openxmlformats.org/drawingml/2006/main" xmlns:r="http://schemas.openxmlformats.org/officeDocument/2006/relationships" xmlns:p="http://schemas.openxmlformats.org/presentationml/2006/main">
   <p:cSld>
     <p:bg>
@@ -19878,7 +20354,7 @@
 </p:sld>
 </file>
 
-<file path=ppt/slides/slide86.xml><?xml version="1.0" encoding="utf-8"?>
+<file path=ppt/slides/slide88.xml><?xml version="1.0" encoding="utf-8"?>
 <p:sld xmlns:a="http://schemas.openxmlformats.org/drawingml/2006/main" xmlns:r="http://schemas.openxmlformats.org/officeDocument/2006/relationships" xmlns:p="http://schemas.openxmlformats.org/presentationml/2006/main">
   <p:cSld>
     <p:bg>
@@ -19972,7 +20448,7 @@
 </p:sld>
 </file>
 
-<file path=ppt/slides/slide87.xml><?xml version="1.0" encoding="utf-8"?>
+<file path=ppt/slides/slide89.xml><?xml version="1.0" encoding="utf-8"?>
 <p:sld xmlns:a="http://schemas.openxmlformats.org/drawingml/2006/main" xmlns:r="http://schemas.openxmlformats.org/officeDocument/2006/relationships" xmlns:p="http://schemas.openxmlformats.org/presentationml/2006/main">
   <p:cSld>
     <p:bg>
@@ -24550,6 +25026,92 @@
 </a:themeOverride>
 </file>
 
+<file path=ppt/theme/themeOverride83.xml><?xml version="1.0" encoding="utf-8"?>
+<a:themeOverride xmlns:a="http://schemas.openxmlformats.org/drawingml/2006/main">
+  <a:clrScheme name="Custom 2">
+    <a:dk1>
+      <a:srgbClr val="EFEFEF"/>
+    </a:dk1>
+    <a:lt1>
+      <a:srgbClr val="EFEFEF"/>
+    </a:lt1>
+    <a:dk2>
+      <a:srgbClr val="053E7D"/>
+    </a:dk2>
+    <a:lt2>
+      <a:srgbClr val="FFFFFF"/>
+    </a:lt2>
+    <a:accent1>
+      <a:srgbClr val="EFEFEF"/>
+    </a:accent1>
+    <a:accent2>
+      <a:srgbClr val="EFEFEF"/>
+    </a:accent2>
+    <a:accent3>
+      <a:srgbClr val="EFEFEF"/>
+    </a:accent3>
+    <a:accent4>
+      <a:srgbClr val="808080"/>
+    </a:accent4>
+    <a:accent5>
+      <a:srgbClr val="5F5F5F"/>
+    </a:accent5>
+    <a:accent6>
+      <a:srgbClr val="4D4D4D"/>
+    </a:accent6>
+    <a:hlink>
+      <a:srgbClr val="B5D7FC"/>
+    </a:hlink>
+    <a:folHlink>
+      <a:srgbClr val="919191"/>
+    </a:folHlink>
+  </a:clrScheme>
+</a:themeOverride>
+</file>
+
+<file path=ppt/theme/themeOverride84.xml><?xml version="1.0" encoding="utf-8"?>
+<a:themeOverride xmlns:a="http://schemas.openxmlformats.org/drawingml/2006/main">
+  <a:clrScheme name="Custom 2">
+    <a:dk1>
+      <a:srgbClr val="EFEFEF"/>
+    </a:dk1>
+    <a:lt1>
+      <a:srgbClr val="EFEFEF"/>
+    </a:lt1>
+    <a:dk2>
+      <a:srgbClr val="053E7D"/>
+    </a:dk2>
+    <a:lt2>
+      <a:srgbClr val="FFFFFF"/>
+    </a:lt2>
+    <a:accent1>
+      <a:srgbClr val="EFEFEF"/>
+    </a:accent1>
+    <a:accent2>
+      <a:srgbClr val="EFEFEF"/>
+    </a:accent2>
+    <a:accent3>
+      <a:srgbClr val="EFEFEF"/>
+    </a:accent3>
+    <a:accent4>
+      <a:srgbClr val="808080"/>
+    </a:accent4>
+    <a:accent5>
+      <a:srgbClr val="5F5F5F"/>
+    </a:accent5>
+    <a:accent6>
+      <a:srgbClr val="4D4D4D"/>
+    </a:accent6>
+    <a:hlink>
+      <a:srgbClr val="B5D7FC"/>
+    </a:hlink>
+    <a:folHlink>
+      <a:srgbClr val="919191"/>
+    </a:folHlink>
+  </a:clrScheme>
+</a:themeOverride>
+</file>
+
 <file path=ppt/theme/themeOverride9.xml><?xml version="1.0" encoding="utf-8"?>
 <a:themeOverride xmlns:a="http://schemas.openxmlformats.org/drawingml/2006/main">
   <a:clrScheme name="Custom 2">

</xml_diff>

<commit_message>
Moved class index slide, commented out completed sections of in-class code.
</commit_message>
<xml_diff>
--- a/Session 7 - Python/Instructional Material/Session 7 - Python Brief Intro to Machine Learning with Scikit Learn.pptx
+++ b/Session 7 - Python/Instructional Material/Session 7 - Python Brief Intro to Machine Learning with Scikit Learn.pptx
@@ -45,11 +45,11 @@
     <p:sldId id="377" r:id="rId36"/>
     <p:sldId id="435" r:id="rId37"/>
     <p:sldId id="454" r:id="rId38"/>
-    <p:sldId id="457" r:id="rId39"/>
-    <p:sldId id="390" r:id="rId40"/>
-    <p:sldId id="426" r:id="rId41"/>
-    <p:sldId id="412" r:id="rId42"/>
-    <p:sldId id="444" r:id="rId43"/>
+    <p:sldId id="390" r:id="rId39"/>
+    <p:sldId id="426" r:id="rId40"/>
+    <p:sldId id="412" r:id="rId41"/>
+    <p:sldId id="444" r:id="rId42"/>
+    <p:sldId id="457" r:id="rId43"/>
     <p:sldId id="415" r:id="rId44"/>
     <p:sldId id="413" r:id="rId45"/>
     <p:sldId id="416" r:id="rId46"/>
@@ -297,7 +297,7 @@
           <a:p>
             <a:fld id="{CD3A85A8-362A-422C-AAFE-FA6D3B9BF6BA}" type="datetimeFigureOut">
               <a:rPr lang="en-US" smtClean="0"/>
-              <a:t>12/21/2021</a:t>
+              <a:t>12/22/2021</a:t>
             </a:fld>
             <a:endParaRPr lang="en-US"/>
           </a:p>
@@ -1322,7 +1322,7 @@
     </p:spTree>
     <p:extLst>
       <p:ext uri="{BB962C8B-B14F-4D97-AF65-F5344CB8AC3E}">
-        <p14:creationId xmlns:p14="http://schemas.microsoft.com/office/powerpoint/2010/main" val="621322551"/>
+        <p14:creationId xmlns:p14="http://schemas.microsoft.com/office/powerpoint/2010/main" val="1638362377"/>
       </p:ext>
     </p:extLst>
   </p:cSld>
@@ -1406,7 +1406,7 @@
     </p:spTree>
     <p:extLst>
       <p:ext uri="{BB962C8B-B14F-4D97-AF65-F5344CB8AC3E}">
-        <p14:creationId xmlns:p14="http://schemas.microsoft.com/office/powerpoint/2010/main" val="1638362377"/>
+        <p14:creationId xmlns:p14="http://schemas.microsoft.com/office/powerpoint/2010/main" val="4156309806"/>
       </p:ext>
     </p:extLst>
   </p:cSld>
@@ -1490,7 +1490,7 @@
     </p:spTree>
     <p:extLst>
       <p:ext uri="{BB962C8B-B14F-4D97-AF65-F5344CB8AC3E}">
-        <p14:creationId xmlns:p14="http://schemas.microsoft.com/office/powerpoint/2010/main" val="4156309806"/>
+        <p14:creationId xmlns:p14="http://schemas.microsoft.com/office/powerpoint/2010/main" val="3496575575"/>
       </p:ext>
     </p:extLst>
   </p:cSld>
@@ -1565,7 +1565,7 @@
           <a:p>
             <a:fld id="{3E7B21C4-CE7A-4258-91FF-8CBB981279E1}" type="slidenum">
               <a:rPr lang="en-US" smtClean="0"/>
-              <a:t>40</a:t>
+              <a:t>41</a:t>
             </a:fld>
             <a:endParaRPr lang="en-US"/>
           </a:p>
@@ -1574,7 +1574,7 @@
     </p:spTree>
     <p:extLst>
       <p:ext uri="{BB962C8B-B14F-4D97-AF65-F5344CB8AC3E}">
-        <p14:creationId xmlns:p14="http://schemas.microsoft.com/office/powerpoint/2010/main" val="3496575575"/>
+        <p14:creationId xmlns:p14="http://schemas.microsoft.com/office/powerpoint/2010/main" val="621322551"/>
       </p:ext>
     </p:extLst>
   </p:cSld>
@@ -2099,7 +2099,7 @@
           <a:p>
             <a:fld id="{547641E8-73DF-4AD2-848E-3103064331B1}" type="datetimeFigureOut">
               <a:rPr lang="en-US" smtClean="0"/>
-              <a:t>12/21/2021</a:t>
+              <a:t>12/22/2021</a:t>
             </a:fld>
             <a:endParaRPr lang="en-US"/>
           </a:p>
@@ -2267,7 +2267,7 @@
           <a:p>
             <a:fld id="{547641E8-73DF-4AD2-848E-3103064331B1}" type="datetimeFigureOut">
               <a:rPr lang="en-US" smtClean="0"/>
-              <a:t>12/21/2021</a:t>
+              <a:t>12/22/2021</a:t>
             </a:fld>
             <a:endParaRPr lang="en-US"/>
           </a:p>
@@ -2445,7 +2445,7 @@
           <a:p>
             <a:fld id="{547641E8-73DF-4AD2-848E-3103064331B1}" type="datetimeFigureOut">
               <a:rPr lang="en-US" smtClean="0"/>
-              <a:t>12/21/2021</a:t>
+              <a:t>12/22/2021</a:t>
             </a:fld>
             <a:endParaRPr lang="en-US"/>
           </a:p>
@@ -2692,7 +2692,7 @@
                 </a:solidFill>
               </a:rPr>
               <a:pPr/>
-              <a:t>12/21/2021</a:t>
+              <a:t>12/22/2021</a:t>
             </a:fld>
             <a:endParaRPr lang="en-US">
               <a:solidFill>
@@ -2892,7 +2892,7 @@
                 </a:solidFill>
               </a:rPr>
               <a:pPr/>
-              <a:t>12/21/2021</a:t>
+              <a:t>12/22/2021</a:t>
             </a:fld>
             <a:endParaRPr lang="en-US">
               <a:solidFill>
@@ -3169,7 +3169,7 @@
                 </a:solidFill>
               </a:rPr>
               <a:pPr/>
-              <a:t>12/21/2021</a:t>
+              <a:t>12/22/2021</a:t>
             </a:fld>
             <a:endParaRPr lang="en-US">
               <a:solidFill>
@@ -3486,7 +3486,7 @@
                 </a:solidFill>
               </a:rPr>
               <a:pPr/>
-              <a:t>12/21/2021</a:t>
+              <a:t>12/22/2021</a:t>
             </a:fld>
             <a:endParaRPr lang="en-US">
               <a:solidFill>
@@ -3937,7 +3937,7 @@
                 </a:solidFill>
               </a:rPr>
               <a:pPr/>
-              <a:t>12/21/2021</a:t>
+              <a:t>12/22/2021</a:t>
             </a:fld>
             <a:endParaRPr lang="en-US">
               <a:solidFill>
@@ -4086,7 +4086,7 @@
                 </a:solidFill>
               </a:rPr>
               <a:pPr/>
-              <a:t>12/21/2021</a:t>
+              <a:t>12/22/2021</a:t>
             </a:fld>
             <a:endParaRPr lang="en-US">
               <a:solidFill>
@@ -4213,7 +4213,7 @@
                 </a:solidFill>
               </a:rPr>
               <a:pPr/>
-              <a:t>12/21/2021</a:t>
+              <a:t>12/22/2021</a:t>
             </a:fld>
             <a:endParaRPr lang="en-US">
               <a:solidFill>
@@ -4520,7 +4520,7 @@
                 </a:solidFill>
               </a:rPr>
               <a:pPr/>
-              <a:t>12/21/2021</a:t>
+              <a:t>12/22/2021</a:t>
             </a:fld>
             <a:endParaRPr lang="en-US">
               <a:solidFill>
@@ -4713,7 +4713,7 @@
           <a:p>
             <a:fld id="{547641E8-73DF-4AD2-848E-3103064331B1}" type="datetimeFigureOut">
               <a:rPr lang="en-US" smtClean="0"/>
-              <a:t>12/21/2021</a:t>
+              <a:t>12/22/2021</a:t>
             </a:fld>
             <a:endParaRPr lang="en-US"/>
           </a:p>
@@ -4972,7 +4972,7 @@
                 </a:solidFill>
               </a:rPr>
               <a:pPr/>
-              <a:t>12/21/2021</a:t>
+              <a:t>12/22/2021</a:t>
             </a:fld>
             <a:endParaRPr lang="en-US">
               <a:solidFill>
@@ -5172,7 +5172,7 @@
                 </a:solidFill>
               </a:rPr>
               <a:pPr/>
-              <a:t>12/21/2021</a:t>
+              <a:t>12/22/2021</a:t>
             </a:fld>
             <a:endParaRPr lang="en-US">
               <a:solidFill>
@@ -5382,7 +5382,7 @@
                 </a:solidFill>
               </a:rPr>
               <a:pPr/>
-              <a:t>12/21/2021</a:t>
+              <a:t>12/22/2021</a:t>
             </a:fld>
             <a:endParaRPr lang="en-US">
               <a:solidFill>
@@ -5652,7 +5652,7 @@
           <a:p>
             <a:fld id="{547641E8-73DF-4AD2-848E-3103064331B1}" type="datetimeFigureOut">
               <a:rPr lang="en-US" smtClean="0"/>
-              <a:t>12/21/2021</a:t>
+              <a:t>12/22/2021</a:t>
             </a:fld>
             <a:endParaRPr lang="en-US"/>
           </a:p>
@@ -5937,7 +5937,7 @@
           <a:p>
             <a:fld id="{547641E8-73DF-4AD2-848E-3103064331B1}" type="datetimeFigureOut">
               <a:rPr lang="en-US" smtClean="0"/>
-              <a:t>12/21/2021</a:t>
+              <a:t>12/22/2021</a:t>
             </a:fld>
             <a:endParaRPr lang="en-US"/>
           </a:p>
@@ -6356,7 +6356,7 @@
           <a:p>
             <a:fld id="{547641E8-73DF-4AD2-848E-3103064331B1}" type="datetimeFigureOut">
               <a:rPr lang="en-US" smtClean="0"/>
-              <a:t>12/21/2021</a:t>
+              <a:t>12/22/2021</a:t>
             </a:fld>
             <a:endParaRPr lang="en-US"/>
           </a:p>
@@ -6473,7 +6473,7 @@
           <a:p>
             <a:fld id="{547641E8-73DF-4AD2-848E-3103064331B1}" type="datetimeFigureOut">
               <a:rPr lang="en-US" smtClean="0"/>
-              <a:t>12/21/2021</a:t>
+              <a:t>12/22/2021</a:t>
             </a:fld>
             <a:endParaRPr lang="en-US"/>
           </a:p>
@@ -6568,7 +6568,7 @@
           <a:p>
             <a:fld id="{547641E8-73DF-4AD2-848E-3103064331B1}" type="datetimeFigureOut">
               <a:rPr lang="en-US" smtClean="0"/>
-              <a:t>12/21/2021</a:t>
+              <a:t>12/22/2021</a:t>
             </a:fld>
             <a:endParaRPr lang="en-US"/>
           </a:p>
@@ -6843,7 +6843,7 @@
           <a:p>
             <a:fld id="{547641E8-73DF-4AD2-848E-3103064331B1}" type="datetimeFigureOut">
               <a:rPr lang="en-US" smtClean="0"/>
-              <a:t>12/21/2021</a:t>
+              <a:t>12/22/2021</a:t>
             </a:fld>
             <a:endParaRPr lang="en-US"/>
           </a:p>
@@ -7095,7 +7095,7 @@
           <a:p>
             <a:fld id="{547641E8-73DF-4AD2-848E-3103064331B1}" type="datetimeFigureOut">
               <a:rPr lang="en-US" smtClean="0"/>
-              <a:t>12/21/2021</a:t>
+              <a:t>12/22/2021</a:t>
             </a:fld>
             <a:endParaRPr lang="en-US"/>
           </a:p>
@@ -7309,7 +7309,7 @@
           <a:p>
             <a:fld id="{547641E8-73DF-4AD2-848E-3103064331B1}" type="datetimeFigureOut">
               <a:rPr lang="en-US" smtClean="0"/>
-              <a:t>12/21/2021</a:t>
+              <a:t>12/22/2021</a:t>
             </a:fld>
             <a:endParaRPr lang="en-US"/>
           </a:p>
@@ -7824,7 +7824,7 @@
                 </a:solidFill>
               </a:rPr>
               <a:pPr/>
-              <a:t>12/21/2021</a:t>
+              <a:t>12/22/2021</a:t>
             </a:fld>
             <a:endParaRPr lang="en-US">
               <a:solidFill>
@@ -12331,9 +12331,25 @@
   <p:cSld>
     <p:bg>
       <p:bgPr>
-        <a:solidFill>
-          <a:srgbClr val="92D050"/>
-        </a:solidFill>
+        <a:blipFill dpi="0" rotWithShape="1">
+          <a:blip r:embed="rId4">
+            <a:extLst>
+              <a:ext uri="{BEBA8EAE-BF5A-486C-A8C5-ECC9F3942E4B}">
+                <a14:imgProps xmlns:a14="http://schemas.microsoft.com/office/drawing/2010/main">
+                  <a14:imgLayer r:embed="rId5">
+                    <a14:imgEffect>
+                      <a14:brightnessContrast bright="-50000"/>
+                    </a14:imgEffect>
+                  </a14:imgLayer>
+                </a14:imgProps>
+              </a:ext>
+            </a:extLst>
+          </a:blip>
+          <a:srcRect/>
+          <a:stretch>
+            <a:fillRect l="-10000" r="-10000"/>
+          </a:stretch>
+        </a:blipFill>
         <a:effectLst/>
       </p:bgPr>
     </p:bg>
@@ -12367,22 +12383,91 @@
           <a:lstStyle/>
           <a:p>
             <a:r>
-              <a:rPr lang="en-US" dirty="0">
-                <a:solidFill>
-                  <a:schemeClr val="bg1">
-                    <a:lumMod val="10000"/>
-                  </a:schemeClr>
-                </a:solidFill>
-              </a:rPr>
-              <a:t>STOPPED HERE</a:t>
-            </a:r>
+              <a:rPr lang="en-US" dirty="0"/>
+              <a:t>Linear Models - Classifiers</a:t>
+            </a:r>
+          </a:p>
+        </p:txBody>
+      </p:sp>
+      <p:sp>
+        <p:nvSpPr>
+          <p:cNvPr id="3" name="Content Placeholder 2"/>
+          <p:cNvSpPr>
+            <a:spLocks noGrp="1"/>
+          </p:cNvSpPr>
+          <p:nvPr>
+            <p:ph idx="1"/>
+          </p:nvPr>
+        </p:nvSpPr>
+        <p:spPr/>
+        <p:txBody>
+          <a:bodyPr/>
+          <a:lstStyle/>
+          <a:p>
+            <a:r>
+              <a:rPr lang="en-US" dirty="0"/>
+              <a:t>Classifiers</a:t>
+            </a:r>
+          </a:p>
+          <a:p>
+            <a:pPr lvl="1"/>
+            <a:r>
+              <a:rPr lang="en-US" dirty="0"/>
+              <a:t>Tries to predict a specific thing.</a:t>
+            </a:r>
+          </a:p>
+          <a:p>
+            <a:pPr lvl="1"/>
+            <a:r>
+              <a:rPr lang="en-US" dirty="0"/>
+              <a:t>Is either right or wrong for each prediction.</a:t>
+            </a:r>
+          </a:p>
+          <a:p>
+            <a:pPr lvl="1"/>
+            <a:r>
+              <a:rPr lang="en-US" dirty="0"/>
+              <a:t>Examples</a:t>
+            </a:r>
+          </a:p>
+          <a:p>
+            <a:pPr lvl="2"/>
+            <a:r>
+              <a:rPr lang="en-US" dirty="0"/>
+              <a:t>Predicting a type of fruit.</a:t>
+            </a:r>
+          </a:p>
+          <a:p>
+            <a:pPr lvl="2"/>
+            <a:r>
+              <a:rPr lang="en-US" dirty="0"/>
+              <a:t>Predicting a type of animal.</a:t>
+            </a:r>
+          </a:p>
+          <a:p>
+            <a:pPr lvl="2"/>
+            <a:r>
+              <a:rPr lang="en-US" dirty="0"/>
+              <a:t>Predicting a breed of dog.</a:t>
+            </a:r>
+          </a:p>
+          <a:p>
+            <a:pPr lvl="1"/>
+            <a:endParaRPr lang="en-US" dirty="0"/>
+          </a:p>
+          <a:p>
+            <a:pPr lvl="2"/>
+            <a:endParaRPr lang="en-US" dirty="0"/>
+          </a:p>
+          <a:p>
+            <a:endParaRPr lang="en-US" dirty="0"/>
           </a:p>
         </p:txBody>
       </p:sp>
     </p:spTree>
     <p:extLst>
       <p:ext uri="{BB962C8B-B14F-4D97-AF65-F5344CB8AC3E}">
-        <p14:creationId xmlns:p14="http://schemas.microsoft.com/office/powerpoint/2010/main" val="48087785"/>
+        <p14:creationId xmlns:p14="http://schemas.microsoft.com/office/powerpoint/2010/main" val="76902119"/>
       </p:ext>
     </p:extLst>
   </p:cSld>
@@ -12472,157 +12557,6 @@
           <a:p>
             <a:r>
               <a:rPr lang="en-US" dirty="0"/>
-              <a:t>Classifiers</a:t>
-            </a:r>
-          </a:p>
-          <a:p>
-            <a:pPr lvl="1"/>
-            <a:r>
-              <a:rPr lang="en-US" dirty="0"/>
-              <a:t>Tries to predict a specific thing.</a:t>
-            </a:r>
-          </a:p>
-          <a:p>
-            <a:pPr lvl="1"/>
-            <a:r>
-              <a:rPr lang="en-US" dirty="0"/>
-              <a:t>Is either right or wrong for each prediction.</a:t>
-            </a:r>
-          </a:p>
-          <a:p>
-            <a:pPr lvl="1"/>
-            <a:r>
-              <a:rPr lang="en-US" dirty="0"/>
-              <a:t>Examples</a:t>
-            </a:r>
-          </a:p>
-          <a:p>
-            <a:pPr lvl="2"/>
-            <a:r>
-              <a:rPr lang="en-US" dirty="0"/>
-              <a:t>Predicting a type of fruit.</a:t>
-            </a:r>
-          </a:p>
-          <a:p>
-            <a:pPr lvl="2"/>
-            <a:r>
-              <a:rPr lang="en-US" dirty="0"/>
-              <a:t>Predicting a type of animal.</a:t>
-            </a:r>
-          </a:p>
-          <a:p>
-            <a:pPr lvl="2"/>
-            <a:r>
-              <a:rPr lang="en-US" dirty="0"/>
-              <a:t>Predicting a breed of dog.</a:t>
-            </a:r>
-          </a:p>
-          <a:p>
-            <a:pPr lvl="1"/>
-            <a:endParaRPr lang="en-US" dirty="0"/>
-          </a:p>
-          <a:p>
-            <a:pPr lvl="2"/>
-            <a:endParaRPr lang="en-US" dirty="0"/>
-          </a:p>
-          <a:p>
-            <a:endParaRPr lang="en-US" dirty="0"/>
-          </a:p>
-        </p:txBody>
-      </p:sp>
-    </p:spTree>
-    <p:extLst>
-      <p:ext uri="{BB962C8B-B14F-4D97-AF65-F5344CB8AC3E}">
-        <p14:creationId xmlns:p14="http://schemas.microsoft.com/office/powerpoint/2010/main" val="76902119"/>
-      </p:ext>
-    </p:extLst>
-  </p:cSld>
-  <p:clrMapOvr>
-    <a:overrideClrMapping bg1="lt1" tx1="dk1" bg2="lt2" tx2="dk2" accent1="accent1" accent2="accent2" accent3="accent3" accent4="accent4" accent5="accent5" accent6="accent6" hlink="hlink" folHlink="folHlink"/>
-  </p:clrMapOvr>
-</p:sld>
-</file>
-
-<file path=ppt/slides/slide39.xml><?xml version="1.0" encoding="utf-8"?>
-<p:sld xmlns:a="http://schemas.openxmlformats.org/drawingml/2006/main" xmlns:r="http://schemas.openxmlformats.org/officeDocument/2006/relationships" xmlns:p="http://schemas.openxmlformats.org/presentationml/2006/main">
-  <p:cSld>
-    <p:bg>
-      <p:bgPr>
-        <a:blipFill dpi="0" rotWithShape="1">
-          <a:blip r:embed="rId4">
-            <a:extLst>
-              <a:ext uri="{BEBA8EAE-BF5A-486C-A8C5-ECC9F3942E4B}">
-                <a14:imgProps xmlns:a14="http://schemas.microsoft.com/office/drawing/2010/main">
-                  <a14:imgLayer r:embed="rId5">
-                    <a14:imgEffect>
-                      <a14:brightnessContrast bright="-50000"/>
-                    </a14:imgEffect>
-                  </a14:imgLayer>
-                </a14:imgProps>
-              </a:ext>
-            </a:extLst>
-          </a:blip>
-          <a:srcRect/>
-          <a:stretch>
-            <a:fillRect l="-10000" r="-10000"/>
-          </a:stretch>
-        </a:blipFill>
-        <a:effectLst/>
-      </p:bgPr>
-    </p:bg>
-    <p:spTree>
-      <p:nvGrpSpPr>
-        <p:cNvPr id="1" name=""/>
-        <p:cNvGrpSpPr/>
-        <p:nvPr/>
-      </p:nvGrpSpPr>
-      <p:grpSpPr>
-        <a:xfrm>
-          <a:off x="0" y="0"/>
-          <a:ext cx="0" cy="0"/>
-          <a:chOff x="0" y="0"/>
-          <a:chExt cx="0" cy="0"/>
-        </a:xfrm>
-      </p:grpSpPr>
-      <p:sp>
-        <p:nvSpPr>
-          <p:cNvPr id="2" name="Title 1"/>
-          <p:cNvSpPr>
-            <a:spLocks noGrp="1"/>
-          </p:cNvSpPr>
-          <p:nvPr>
-            <p:ph type="title"/>
-          </p:nvPr>
-        </p:nvSpPr>
-        <p:spPr/>
-        <p:txBody>
-          <a:bodyPr/>
-          <a:lstStyle/>
-          <a:p>
-            <a:r>
-              <a:rPr lang="en-US" dirty="0"/>
-              <a:t>Linear Models - Classifiers</a:t>
-            </a:r>
-          </a:p>
-        </p:txBody>
-      </p:sp>
-      <p:sp>
-        <p:nvSpPr>
-          <p:cNvPr id="3" name="Content Placeholder 2"/>
-          <p:cNvSpPr>
-            <a:spLocks noGrp="1"/>
-          </p:cNvSpPr>
-          <p:nvPr>
-            <p:ph idx="1"/>
-          </p:nvPr>
-        </p:nvSpPr>
-        <p:spPr/>
-        <p:txBody>
-          <a:bodyPr/>
-          <a:lstStyle/>
-          <a:p>
-            <a:r>
-              <a:rPr lang="en-US" dirty="0"/>
               <a:t>K-Nearest Neighbors</a:t>
             </a:r>
           </a:p>
@@ -12662,138 +12596,7 @@
 </p:sld>
 </file>
 
-<file path=ppt/slides/slide4.xml><?xml version="1.0" encoding="utf-8"?>
-<p:sld xmlns:a="http://schemas.openxmlformats.org/drawingml/2006/main" xmlns:r="http://schemas.openxmlformats.org/officeDocument/2006/relationships" xmlns:p="http://schemas.openxmlformats.org/presentationml/2006/main">
-  <p:cSld>
-    <p:bg>
-      <p:bgPr>
-        <a:blipFill dpi="0" rotWithShape="1">
-          <a:blip r:embed="rId3">
-            <a:extLst>
-              <a:ext uri="{BEBA8EAE-BF5A-486C-A8C5-ECC9F3942E4B}">
-                <a14:imgProps xmlns:a14="http://schemas.microsoft.com/office/drawing/2010/main">
-                  <a14:imgLayer r:embed="rId4">
-                    <a14:imgEffect>
-                      <a14:brightnessContrast bright="-50000"/>
-                    </a14:imgEffect>
-                  </a14:imgLayer>
-                </a14:imgProps>
-              </a:ext>
-            </a:extLst>
-          </a:blip>
-          <a:srcRect/>
-          <a:stretch>
-            <a:fillRect l="-10000" r="-10000"/>
-          </a:stretch>
-        </a:blipFill>
-        <a:effectLst/>
-      </p:bgPr>
-    </p:bg>
-    <p:spTree>
-      <p:nvGrpSpPr>
-        <p:cNvPr id="1" name=""/>
-        <p:cNvGrpSpPr/>
-        <p:nvPr/>
-      </p:nvGrpSpPr>
-      <p:grpSpPr>
-        <a:xfrm>
-          <a:off x="0" y="0"/>
-          <a:ext cx="0" cy="0"/>
-          <a:chOff x="0" y="0"/>
-          <a:chExt cx="0" cy="0"/>
-        </a:xfrm>
-      </p:grpSpPr>
-      <p:sp>
-        <p:nvSpPr>
-          <p:cNvPr id="2" name="Title 1"/>
-          <p:cNvSpPr>
-            <a:spLocks noGrp="1"/>
-          </p:cNvSpPr>
-          <p:nvPr>
-            <p:ph type="title"/>
-          </p:nvPr>
-        </p:nvSpPr>
-        <p:spPr/>
-        <p:txBody>
-          <a:bodyPr>
-            <a:normAutofit/>
-          </a:bodyPr>
-          <a:lstStyle/>
-          <a:p>
-            <a:r>
-              <a:rPr lang="en-US" dirty="0"/>
-              <a:t>Concepts and Definitions</a:t>
-            </a:r>
-          </a:p>
-        </p:txBody>
-      </p:sp>
-      <p:sp>
-        <p:nvSpPr>
-          <p:cNvPr id="3" name="Content Placeholder 2"/>
-          <p:cNvSpPr>
-            <a:spLocks noGrp="1"/>
-          </p:cNvSpPr>
-          <p:nvPr>
-            <p:ph idx="1"/>
-          </p:nvPr>
-        </p:nvSpPr>
-        <p:spPr/>
-        <p:txBody>
-          <a:bodyPr/>
-          <a:lstStyle/>
-          <a:p>
-            <a:r>
-              <a:rPr lang="en-US" dirty="0"/>
-              <a:t>Machine Learning</a:t>
-            </a:r>
-          </a:p>
-          <a:p>
-            <a:pPr lvl="1"/>
-            <a:r>
-              <a:rPr lang="en-US" dirty="0"/>
-              <a:t>The use of a model that learns from data to increase the predictive ability of an algorithm.</a:t>
-            </a:r>
-          </a:p>
-          <a:p>
-            <a:pPr lvl="1"/>
-            <a:r>
-              <a:rPr lang="en-US" dirty="0"/>
-              <a:t>Data by itself is not machine learning, since no learning can occur without assimilation of the data towards prediction.</a:t>
-            </a:r>
-          </a:p>
-          <a:p>
-            <a:pPr lvl="1"/>
-            <a:r>
-              <a:rPr lang="en-US" dirty="0"/>
-              <a:t>Data that cannot increase predictive capabilities of an algorithm is not machine learning—no learning occurs in this situation.</a:t>
-            </a:r>
-          </a:p>
-          <a:p>
-            <a:endParaRPr lang="en-US" dirty="0"/>
-          </a:p>
-          <a:p>
-            <a:pPr lvl="2"/>
-            <a:endParaRPr lang="en-US" dirty="0"/>
-          </a:p>
-          <a:p>
-            <a:endParaRPr lang="en-US" dirty="0"/>
-          </a:p>
-        </p:txBody>
-      </p:sp>
-    </p:spTree>
-    <p:extLst>
-      <p:ext uri="{BB962C8B-B14F-4D97-AF65-F5344CB8AC3E}">
-        <p14:creationId xmlns:p14="http://schemas.microsoft.com/office/powerpoint/2010/main" val="3227970962"/>
-      </p:ext>
-    </p:extLst>
-  </p:cSld>
-  <p:clrMapOvr>
-    <a:overrideClrMapping bg1="lt1" tx1="dk1" bg2="lt2" tx2="dk2" accent1="accent1" accent2="accent2" accent3="accent3" accent4="accent4" accent5="accent5" accent6="accent6" hlink="hlink" folHlink="folHlink"/>
-  </p:clrMapOvr>
-</p:sld>
-</file>
-
-<file path=ppt/slides/slide40.xml><?xml version="1.0" encoding="utf-8"?>
+<file path=ppt/slides/slide39.xml><?xml version="1.0" encoding="utf-8"?>
 <p:sld xmlns:a="http://schemas.openxmlformats.org/drawingml/2006/main" xmlns:r="http://schemas.openxmlformats.org/officeDocument/2006/relationships" xmlns:p="http://schemas.openxmlformats.org/presentationml/2006/main">
   <p:cSld>
     <p:bg>
@@ -12920,7 +12723,7 @@
           <a:graphicData uri="http://schemas.openxmlformats.org/presentationml/2006/ole">
             <mc:AlternateContent xmlns:mc="http://schemas.openxmlformats.org/markup-compatibility/2006">
               <mc:Choice xmlns:v="urn:schemas-microsoft-com:vml" Requires="v">
-                <p:oleObj spid="_x0000_s2214" name="Bitmap Image" r:id="rId7" imgW="3743280" imgH="3024360" progId="Paint.Picture">
+                <p:oleObj spid="_x0000_s2217" name="Bitmap Image" r:id="rId7" imgW="3743280" imgH="3024360" progId="Paint.Picture">
                   <p:embed/>
                 </p:oleObj>
               </mc:Choice>
@@ -13004,7 +12807,7 @@
 </p:sld>
 </file>
 
-<file path=ppt/slides/slide41.xml><?xml version="1.0" encoding="utf-8"?>
+<file path=ppt/slides/slide4.xml><?xml version="1.0" encoding="utf-8"?>
 <p:sld xmlns:a="http://schemas.openxmlformats.org/drawingml/2006/main" xmlns:r="http://schemas.openxmlformats.org/officeDocument/2006/relationships" xmlns:p="http://schemas.openxmlformats.org/presentationml/2006/main">
   <p:cSld>
     <p:bg>
@@ -13057,6 +12860,137 @@
         </p:nvSpPr>
         <p:spPr/>
         <p:txBody>
+          <a:bodyPr>
+            <a:normAutofit/>
+          </a:bodyPr>
+          <a:lstStyle/>
+          <a:p>
+            <a:r>
+              <a:rPr lang="en-US" dirty="0"/>
+              <a:t>Concepts and Definitions</a:t>
+            </a:r>
+          </a:p>
+        </p:txBody>
+      </p:sp>
+      <p:sp>
+        <p:nvSpPr>
+          <p:cNvPr id="3" name="Content Placeholder 2"/>
+          <p:cNvSpPr>
+            <a:spLocks noGrp="1"/>
+          </p:cNvSpPr>
+          <p:nvPr>
+            <p:ph idx="1"/>
+          </p:nvPr>
+        </p:nvSpPr>
+        <p:spPr/>
+        <p:txBody>
+          <a:bodyPr/>
+          <a:lstStyle/>
+          <a:p>
+            <a:r>
+              <a:rPr lang="en-US" dirty="0"/>
+              <a:t>Machine Learning</a:t>
+            </a:r>
+          </a:p>
+          <a:p>
+            <a:pPr lvl="1"/>
+            <a:r>
+              <a:rPr lang="en-US" dirty="0"/>
+              <a:t>The use of a model that learns from data to increase the predictive ability of an algorithm.</a:t>
+            </a:r>
+          </a:p>
+          <a:p>
+            <a:pPr lvl="1"/>
+            <a:r>
+              <a:rPr lang="en-US" dirty="0"/>
+              <a:t>Data by itself is not machine learning, since no learning can occur without assimilation of the data towards prediction.</a:t>
+            </a:r>
+          </a:p>
+          <a:p>
+            <a:pPr lvl="1"/>
+            <a:r>
+              <a:rPr lang="en-US" dirty="0"/>
+              <a:t>Data that cannot increase predictive capabilities of an algorithm is not machine learning—no learning occurs in this situation.</a:t>
+            </a:r>
+          </a:p>
+          <a:p>
+            <a:endParaRPr lang="en-US" dirty="0"/>
+          </a:p>
+          <a:p>
+            <a:pPr lvl="2"/>
+            <a:endParaRPr lang="en-US" dirty="0"/>
+          </a:p>
+          <a:p>
+            <a:endParaRPr lang="en-US" dirty="0"/>
+          </a:p>
+        </p:txBody>
+      </p:sp>
+    </p:spTree>
+    <p:extLst>
+      <p:ext uri="{BB962C8B-B14F-4D97-AF65-F5344CB8AC3E}">
+        <p14:creationId xmlns:p14="http://schemas.microsoft.com/office/powerpoint/2010/main" val="3227970962"/>
+      </p:ext>
+    </p:extLst>
+  </p:cSld>
+  <p:clrMapOvr>
+    <a:overrideClrMapping bg1="lt1" tx1="dk1" bg2="lt2" tx2="dk2" accent1="accent1" accent2="accent2" accent3="accent3" accent4="accent4" accent5="accent5" accent6="accent6" hlink="hlink" folHlink="folHlink"/>
+  </p:clrMapOvr>
+</p:sld>
+</file>
+
+<file path=ppt/slides/slide40.xml><?xml version="1.0" encoding="utf-8"?>
+<p:sld xmlns:a="http://schemas.openxmlformats.org/drawingml/2006/main" xmlns:r="http://schemas.openxmlformats.org/officeDocument/2006/relationships" xmlns:p="http://schemas.openxmlformats.org/presentationml/2006/main">
+  <p:cSld>
+    <p:bg>
+      <p:bgPr>
+        <a:blipFill dpi="0" rotWithShape="1">
+          <a:blip r:embed="rId3">
+            <a:extLst>
+              <a:ext uri="{BEBA8EAE-BF5A-486C-A8C5-ECC9F3942E4B}">
+                <a14:imgProps xmlns:a14="http://schemas.microsoft.com/office/drawing/2010/main">
+                  <a14:imgLayer r:embed="rId4">
+                    <a14:imgEffect>
+                      <a14:brightnessContrast bright="-50000"/>
+                    </a14:imgEffect>
+                  </a14:imgLayer>
+                </a14:imgProps>
+              </a:ext>
+            </a:extLst>
+          </a:blip>
+          <a:srcRect/>
+          <a:stretch>
+            <a:fillRect l="-10000" r="-10000"/>
+          </a:stretch>
+        </a:blipFill>
+        <a:effectLst/>
+      </p:bgPr>
+    </p:bg>
+    <p:spTree>
+      <p:nvGrpSpPr>
+        <p:cNvPr id="1" name=""/>
+        <p:cNvGrpSpPr/>
+        <p:nvPr/>
+      </p:nvGrpSpPr>
+      <p:grpSpPr>
+        <a:xfrm>
+          <a:off x="0" y="0"/>
+          <a:ext cx="0" cy="0"/>
+          <a:chOff x="0" y="0"/>
+          <a:chExt cx="0" cy="0"/>
+        </a:xfrm>
+      </p:grpSpPr>
+      <p:sp>
+        <p:nvSpPr>
+          <p:cNvPr id="2" name="Title 1"/>
+          <p:cNvSpPr>
+            <a:spLocks noGrp="1"/>
+          </p:cNvSpPr>
+          <p:nvPr>
+            <p:ph type="title"/>
+          </p:nvPr>
+        </p:nvSpPr>
+        <p:spPr/>
+        <p:txBody>
           <a:bodyPr/>
           <a:lstStyle/>
           <a:p>
@@ -13091,7 +13025,14 @@
             <a:pPr lvl="1"/>
             <a:r>
               <a:rPr lang="en-US" dirty="0"/>
-              <a:t>Run the classifier example with k-nearest neighbors and optimize based on number of neighbors</a:t>
+              <a:t>Run the classifier example with k-nearest neighbors and optimize based on number of neighbors.</a:t>
+            </a:r>
+          </a:p>
+          <a:p>
+            <a:pPr lvl="2"/>
+            <a:r>
+              <a:rPr lang="en-US" dirty="0"/>
+              <a:t>Use the .score() return value as your accuracy metric.</a:t>
             </a:r>
           </a:p>
           <a:p>
@@ -13122,6 +13063,72 @@
     <p:extLst>
       <p:ext uri="{BB962C8B-B14F-4D97-AF65-F5344CB8AC3E}">
         <p14:creationId xmlns:p14="http://schemas.microsoft.com/office/powerpoint/2010/main" val="3634293830"/>
+      </p:ext>
+    </p:extLst>
+  </p:cSld>
+  <p:clrMapOvr>
+    <a:overrideClrMapping bg1="lt1" tx1="dk1" bg2="lt2" tx2="dk2" accent1="accent1" accent2="accent2" accent3="accent3" accent4="accent4" accent5="accent5" accent6="accent6" hlink="hlink" folHlink="folHlink"/>
+  </p:clrMapOvr>
+</p:sld>
+</file>
+
+<file path=ppt/slides/slide41.xml><?xml version="1.0" encoding="utf-8"?>
+<p:sld xmlns:a="http://schemas.openxmlformats.org/drawingml/2006/main" xmlns:r="http://schemas.openxmlformats.org/officeDocument/2006/relationships" xmlns:p="http://schemas.openxmlformats.org/presentationml/2006/main">
+  <p:cSld>
+    <p:bg>
+      <p:bgPr>
+        <a:solidFill>
+          <a:srgbClr val="92D050"/>
+        </a:solidFill>
+        <a:effectLst/>
+      </p:bgPr>
+    </p:bg>
+    <p:spTree>
+      <p:nvGrpSpPr>
+        <p:cNvPr id="1" name=""/>
+        <p:cNvGrpSpPr/>
+        <p:nvPr/>
+      </p:nvGrpSpPr>
+      <p:grpSpPr>
+        <a:xfrm>
+          <a:off x="0" y="0"/>
+          <a:ext cx="0" cy="0"/>
+          <a:chOff x="0" y="0"/>
+          <a:chExt cx="0" cy="0"/>
+        </a:xfrm>
+      </p:grpSpPr>
+      <p:sp>
+        <p:nvSpPr>
+          <p:cNvPr id="2" name="Title 1"/>
+          <p:cNvSpPr>
+            <a:spLocks noGrp="1"/>
+          </p:cNvSpPr>
+          <p:nvPr>
+            <p:ph type="title"/>
+          </p:nvPr>
+        </p:nvSpPr>
+        <p:spPr/>
+        <p:txBody>
+          <a:bodyPr/>
+          <a:lstStyle/>
+          <a:p>
+            <a:r>
+              <a:rPr lang="en-US" dirty="0">
+                <a:solidFill>
+                  <a:schemeClr val="bg1">
+                    <a:lumMod val="10000"/>
+                  </a:schemeClr>
+                </a:solidFill>
+              </a:rPr>
+              <a:t>STOPPED HERE</a:t>
+            </a:r>
+          </a:p>
+        </p:txBody>
+      </p:sp>
+    </p:spTree>
+    <p:extLst>
+      <p:ext uri="{BB962C8B-B14F-4D97-AF65-F5344CB8AC3E}">
+        <p14:creationId xmlns:p14="http://schemas.microsoft.com/office/powerpoint/2010/main" val="48087785"/>
       </p:ext>
     </p:extLst>
   </p:cSld>
@@ -15096,8 +15103,8 @@
           </a:p>
         </p:txBody>
       </p:sp>
-      <mc:AlternateContent xmlns:mc="http://schemas.openxmlformats.org/markup-compatibility/2006">
-        <mc:Choice xmlns:a14="http://schemas.microsoft.com/office/drawing/2010/main" Requires="a14">
+      <mc:AlternateContent xmlns:mc="http://schemas.openxmlformats.org/markup-compatibility/2006" xmlns:a14="http://schemas.microsoft.com/office/drawing/2010/main">
+        <mc:Choice Requires="a14">
           <p:sp>
             <p:nvSpPr>
               <p:cNvPr id="3" name="Content Placeholder 2"/>
@@ -15202,7 +15209,7 @@
             </p:txBody>
           </p:sp>
         </mc:Choice>
-        <mc:Fallback>
+        <mc:Fallback xmlns="">
           <p:sp>
             <p:nvSpPr>
               <p:cNvPr id="3" name="Content Placeholder 2"/>
@@ -15312,8 +15319,8 @@
           </a:p>
         </p:txBody>
       </p:sp>
-      <mc:AlternateContent xmlns:mc="http://schemas.openxmlformats.org/markup-compatibility/2006">
-        <mc:Choice xmlns:a14="http://schemas.microsoft.com/office/drawing/2010/main" Requires="a14">
+      <mc:AlternateContent xmlns:mc="http://schemas.openxmlformats.org/markup-compatibility/2006" xmlns:a14="http://schemas.microsoft.com/office/drawing/2010/main">
+        <mc:Choice Requires="a14">
           <p:sp>
             <p:nvSpPr>
               <p:cNvPr id="3" name="Content Placeholder 2"/>
@@ -15426,7 +15433,7 @@
             </p:txBody>
           </p:sp>
         </mc:Choice>
-        <mc:Fallback>
+        <mc:Fallback xmlns="">
           <p:sp>
             <p:nvSpPr>
               <p:cNvPr id="3" name="Content Placeholder 2"/>

</xml_diff>